<commit_message>
updated poster colors and added network diagram to poster
</commit_message>
<xml_diff>
--- a/poster/NDAC_Poster.pptx
+++ b/poster/NDAC_Poster.pptx
@@ -203,7 +203,7 @@
           <a:p>
             <a:fld id="{F1C0B079-A316-4C9B-B165-DF9EA8325D2C}" type="datetimeFigureOut">
               <a:rPr lang="en-US" smtClean="0"/>
-              <a:t>6/14/2018</a:t>
+              <a:t>6/22/2018</a:t>
             </a:fld>
             <a:endParaRPr lang="en-US"/>
           </a:p>
@@ -368,7 +368,7 @@
           <a:p>
             <a:fld id="{38F28AB8-57D1-494F-9851-055AD867E790}" type="datetimeFigureOut">
               <a:rPr lang="en-US" smtClean="0"/>
-              <a:t>6/14/2018</a:t>
+              <a:t>6/22/2018</a:t>
             </a:fld>
             <a:endParaRPr lang="en-US"/>
           </a:p>
@@ -654,352 +654,6 @@
       </p:grpSpPr>
       <p:sp>
         <p:nvSpPr>
-          <p:cNvPr id="32" name="Instructions"/>
-          <p:cNvSpPr/>
-          <p:nvPr userDrawn="1"/>
-        </p:nvSpPr>
-        <p:spPr>
-          <a:xfrm>
-            <a:off x="44302680" y="-1"/>
-            <a:ext cx="12447270" cy="32918400"/>
-          </a:xfrm>
-          <a:prstGeom prst="rect">
-            <a:avLst/>
-          </a:prstGeom>
-          <a:solidFill>
-            <a:schemeClr val="bg1">
-              <a:lumMod val="85000"/>
-            </a:schemeClr>
-          </a:solidFill>
-          <a:ln>
-            <a:noFill/>
-          </a:ln>
-        </p:spPr>
-        <p:style>
-          <a:lnRef idx="2">
-            <a:schemeClr val="accent1">
-              <a:shade val="50000"/>
-            </a:schemeClr>
-          </a:lnRef>
-          <a:fillRef idx="1">
-            <a:schemeClr val="accent1"/>
-          </a:fillRef>
-          <a:effectRef idx="0">
-            <a:schemeClr val="accent1"/>
-          </a:effectRef>
-          <a:fontRef idx="minor">
-            <a:schemeClr val="lt1"/>
-          </a:fontRef>
-        </p:style>
-        <p:txBody>
-          <a:bodyPr lIns="274320" rIns="274320" rtlCol="0" anchor="t"/>
-          <a:lstStyle/>
-          <a:p>
-            <a:pPr lvl="0">
-              <a:spcBef>
-                <a:spcPts val="1200"/>
-              </a:spcBef>
-            </a:pPr>
-            <a:r>
-              <a:rPr sz="9600" dirty="0">
-                <a:solidFill>
-                  <a:prstClr val="white">
-                    <a:lumMod val="50000"/>
-                  </a:prstClr>
-                </a:solidFill>
-                <a:latin typeface="Calibri Light" panose="020F0302020204030204" pitchFamily="34" charset="0"/>
-                <a:cs typeface="Calibri" panose="020F0502020204030204" pitchFamily="34" charset="0"/>
-              </a:rPr>
-              <a:t>Printing:</a:t>
-            </a:r>
-          </a:p>
-          <a:p>
-            <a:pPr lvl="0">
-              <a:spcBef>
-                <a:spcPts val="1200"/>
-              </a:spcBef>
-            </a:pPr>
-            <a:r>
-              <a:rPr lang="en-US" sz="6600" dirty="0">
-                <a:solidFill>
-                  <a:prstClr val="white">
-                    <a:lumMod val="50000"/>
-                  </a:prstClr>
-                </a:solidFill>
-                <a:latin typeface="Calibri Light" panose="020F0302020204030204" pitchFamily="34" charset="0"/>
-                <a:cs typeface="Calibri" panose="020F0502020204030204" pitchFamily="34" charset="0"/>
-              </a:rPr>
-              <a:t>This poster is 48” wide by 36” high. It’s designed to be printed on a large-format printer.</a:t>
-            </a:r>
-          </a:p>
-          <a:p>
-            <a:pPr lvl="0">
-              <a:spcBef>
-                <a:spcPts val="300"/>
-              </a:spcBef>
-            </a:pPr>
-            <a:endParaRPr sz="6000" dirty="0">
-              <a:solidFill>
-                <a:prstClr val="white">
-                  <a:lumMod val="50000"/>
-                </a:prstClr>
-              </a:solidFill>
-              <a:latin typeface="Calibri Light" panose="020F0302020204030204" pitchFamily="34" charset="0"/>
-              <a:cs typeface="Calibri" panose="020F0502020204030204" pitchFamily="34" charset="0"/>
-            </a:endParaRPr>
-          </a:p>
-          <a:p>
-            <a:pPr lvl="0">
-              <a:spcBef>
-                <a:spcPts val="1200"/>
-              </a:spcBef>
-            </a:pPr>
-            <a:r>
-              <a:rPr sz="8800" dirty="0">
-                <a:solidFill>
-                  <a:prstClr val="white">
-                    <a:lumMod val="50000"/>
-                  </a:prstClr>
-                </a:solidFill>
-                <a:latin typeface="Calibri Light" panose="020F0302020204030204" pitchFamily="34" charset="0"/>
-                <a:cs typeface="Calibri" panose="020F0502020204030204" pitchFamily="34" charset="0"/>
-              </a:rPr>
-              <a:t>Customizing the Content:</a:t>
-            </a:r>
-          </a:p>
-          <a:p>
-            <a:pPr lvl="0">
-              <a:spcBef>
-                <a:spcPts val="1200"/>
-              </a:spcBef>
-            </a:pPr>
-            <a:r>
-              <a:rPr sz="6600" dirty="0">
-                <a:solidFill>
-                  <a:prstClr val="white">
-                    <a:lumMod val="50000"/>
-                  </a:prstClr>
-                </a:solidFill>
-                <a:latin typeface="Calibri Light" panose="020F0302020204030204" pitchFamily="34" charset="0"/>
-                <a:cs typeface="Calibri" panose="020F0502020204030204" pitchFamily="34" charset="0"/>
-              </a:rPr>
-              <a:t>The placeholders in this </a:t>
-            </a:r>
-            <a:r>
-              <a:rPr lang="en-US" sz="6600" dirty="0">
-                <a:solidFill>
-                  <a:prstClr val="white">
-                    <a:lumMod val="50000"/>
-                  </a:prstClr>
-                </a:solidFill>
-                <a:latin typeface="Calibri Light" panose="020F0302020204030204" pitchFamily="34" charset="0"/>
-                <a:cs typeface="Calibri" panose="020F0502020204030204" pitchFamily="34" charset="0"/>
-              </a:rPr>
-              <a:t>poster </a:t>
-            </a:r>
-            <a:r>
-              <a:rPr sz="6600" dirty="0">
-                <a:solidFill>
-                  <a:prstClr val="white">
-                    <a:lumMod val="50000"/>
-                  </a:prstClr>
-                </a:solidFill>
-                <a:latin typeface="Calibri Light" panose="020F0302020204030204" pitchFamily="34" charset="0"/>
-                <a:cs typeface="Calibri" panose="020F0502020204030204" pitchFamily="34" charset="0"/>
-              </a:rPr>
-              <a:t>are formatted for you. </a:t>
-            </a:r>
-            <a:r>
-              <a:rPr lang="en-US" sz="6600" dirty="0">
-                <a:solidFill>
-                  <a:prstClr val="white">
-                    <a:lumMod val="50000"/>
-                  </a:prstClr>
-                </a:solidFill>
-                <a:latin typeface="Calibri Light" panose="020F0302020204030204" pitchFamily="34" charset="0"/>
-                <a:cs typeface="Calibri" panose="020F0502020204030204" pitchFamily="34" charset="0"/>
-              </a:rPr>
-              <a:t>Type</a:t>
-            </a:r>
-            <a:r>
-              <a:rPr lang="en-US" sz="6600" baseline="0" dirty="0">
-                <a:solidFill>
-                  <a:prstClr val="white">
-                    <a:lumMod val="50000"/>
-                  </a:prstClr>
-                </a:solidFill>
-                <a:latin typeface="Calibri Light" panose="020F0302020204030204" pitchFamily="34" charset="0"/>
-                <a:cs typeface="Calibri" panose="020F0502020204030204" pitchFamily="34" charset="0"/>
-              </a:rPr>
-              <a:t> in the placeholders </a:t>
-            </a:r>
-            <a:r>
-              <a:rPr lang="en-US" sz="6600" dirty="0">
-                <a:solidFill>
-                  <a:prstClr val="white">
-                    <a:lumMod val="50000"/>
-                  </a:prstClr>
-                </a:solidFill>
-                <a:latin typeface="Calibri Light" panose="020F0302020204030204" pitchFamily="34" charset="0"/>
-                <a:cs typeface="Calibri" panose="020F0502020204030204" pitchFamily="34" charset="0"/>
-              </a:rPr>
-              <a:t>to add text, or c</a:t>
-            </a:r>
-            <a:r>
-              <a:rPr lang="en-US" sz="6600" baseline="0" dirty="0">
-                <a:solidFill>
-                  <a:prstClr val="white">
-                    <a:lumMod val="50000"/>
-                  </a:prstClr>
-                </a:solidFill>
-                <a:latin typeface="Calibri Light" panose="020F0302020204030204" pitchFamily="34" charset="0"/>
-                <a:cs typeface="Calibri" panose="020F0502020204030204" pitchFamily="34" charset="0"/>
-              </a:rPr>
-              <a:t>lick an icon to add a table, chart, SmartArt graphic, picture or multimedia file.</a:t>
-            </a:r>
-          </a:p>
-          <a:p>
-            <a:pPr lvl="0">
-              <a:spcBef>
-                <a:spcPts val="2400"/>
-              </a:spcBef>
-            </a:pPr>
-            <a:r>
-              <a:rPr lang="en-US" sz="6600" dirty="0">
-                <a:solidFill>
-                  <a:prstClr val="white">
-                    <a:lumMod val="50000"/>
-                  </a:prstClr>
-                </a:solidFill>
-                <a:latin typeface="Calibri Light" panose="020F0302020204030204" pitchFamily="34" charset="0"/>
-                <a:cs typeface="Calibri" panose="020F0502020204030204" pitchFamily="34" charset="0"/>
-              </a:rPr>
-              <a:t>T</a:t>
-            </a:r>
-            <a:r>
-              <a:rPr sz="6600" dirty="0">
-                <a:solidFill>
-                  <a:prstClr val="white">
-                    <a:lumMod val="50000"/>
-                  </a:prstClr>
-                </a:solidFill>
-                <a:latin typeface="Calibri Light" panose="020F0302020204030204" pitchFamily="34" charset="0"/>
-                <a:cs typeface="Calibri" panose="020F0502020204030204" pitchFamily="34" charset="0"/>
-              </a:rPr>
-              <a:t>o add or remove bullet points from text, click the Bullets button on the Home tab.</a:t>
-            </a:r>
-          </a:p>
-          <a:p>
-            <a:pPr lvl="0">
-              <a:spcBef>
-                <a:spcPts val="2400"/>
-              </a:spcBef>
-            </a:pPr>
-            <a:r>
-              <a:rPr sz="6600" dirty="0">
-                <a:solidFill>
-                  <a:prstClr val="white">
-                    <a:lumMod val="50000"/>
-                  </a:prstClr>
-                </a:solidFill>
-                <a:latin typeface="Calibri Light" panose="020F0302020204030204" pitchFamily="34" charset="0"/>
-                <a:cs typeface="Calibri" panose="020F0502020204030204" pitchFamily="34" charset="0"/>
-              </a:rPr>
-              <a:t>If you need more placeholders for titles, </a:t>
-            </a:r>
-            <a:r>
-              <a:rPr lang="en-US" sz="6600" dirty="0">
-                <a:solidFill>
-                  <a:prstClr val="white">
-                    <a:lumMod val="50000"/>
-                  </a:prstClr>
-                </a:solidFill>
-                <a:latin typeface="Calibri Light" panose="020F0302020204030204" pitchFamily="34" charset="0"/>
-                <a:cs typeface="Calibri" panose="020F0502020204030204" pitchFamily="34" charset="0"/>
-              </a:rPr>
-              <a:t>content</a:t>
-            </a:r>
-            <a:r>
-              <a:rPr sz="6600" dirty="0">
-                <a:solidFill>
-                  <a:prstClr val="white">
-                    <a:lumMod val="50000"/>
-                  </a:prstClr>
-                </a:solidFill>
-                <a:latin typeface="Calibri Light" panose="020F0302020204030204" pitchFamily="34" charset="0"/>
-                <a:cs typeface="Calibri" panose="020F0502020204030204" pitchFamily="34" charset="0"/>
-              </a:rPr>
-              <a:t> or body text, make a copy of what you need and drag it into place. PowerPoint’s Smart Guides will help you align it with everything else.</a:t>
-            </a:r>
-          </a:p>
-          <a:p>
-            <a:pPr lvl="0">
-              <a:spcBef>
-                <a:spcPts val="2400"/>
-              </a:spcBef>
-            </a:pPr>
-            <a:r>
-              <a:rPr sz="6600" dirty="0">
-                <a:solidFill>
-                  <a:prstClr val="white">
-                    <a:lumMod val="50000"/>
-                  </a:prstClr>
-                </a:solidFill>
-                <a:latin typeface="Calibri Light" panose="020F0302020204030204" pitchFamily="34" charset="0"/>
-                <a:cs typeface="Calibri" panose="020F0502020204030204" pitchFamily="34" charset="0"/>
-              </a:rPr>
-              <a:t>Want to use your own picture</a:t>
-            </a:r>
-            <a:r>
-              <a:rPr lang="en-US" sz="6600" dirty="0">
-                <a:solidFill>
-                  <a:prstClr val="white">
-                    <a:lumMod val="50000"/>
-                  </a:prstClr>
-                </a:solidFill>
-                <a:latin typeface="Calibri Light" panose="020F0302020204030204" pitchFamily="34" charset="0"/>
-                <a:cs typeface="Calibri" panose="020F0502020204030204" pitchFamily="34" charset="0"/>
-              </a:rPr>
-              <a:t>s</a:t>
-            </a:r>
-            <a:r>
-              <a:rPr sz="6600" dirty="0">
-                <a:solidFill>
-                  <a:prstClr val="white">
-                    <a:lumMod val="50000"/>
-                  </a:prstClr>
-                </a:solidFill>
-                <a:latin typeface="Calibri Light" panose="020F0302020204030204" pitchFamily="34" charset="0"/>
-                <a:cs typeface="Calibri" panose="020F0502020204030204" pitchFamily="34" charset="0"/>
-              </a:rPr>
-              <a:t> instead of ours? No problem!</a:t>
-            </a:r>
-            <a:r>
-              <a:rPr lang="en-US" sz="6600" dirty="0">
-                <a:solidFill>
-                  <a:prstClr val="white">
-                    <a:lumMod val="50000"/>
-                  </a:prstClr>
-                </a:solidFill>
-                <a:latin typeface="Calibri Light" panose="020F0302020204030204" pitchFamily="34" charset="0"/>
-                <a:cs typeface="Calibri" panose="020F0502020204030204" pitchFamily="34" charset="0"/>
-              </a:rPr>
-              <a:t> Just click a picture, press the Delete key, then click the icon to add your picture.</a:t>
-            </a:r>
-            <a:endParaRPr sz="6600" dirty="0">
-              <a:solidFill>
-                <a:prstClr val="white">
-                  <a:lumMod val="50000"/>
-                </a:prstClr>
-              </a:solidFill>
-              <a:latin typeface="Calibri Light" panose="020F0302020204030204" pitchFamily="34" charset="0"/>
-              <a:cs typeface="Calibri" panose="020F0502020204030204" pitchFamily="34" charset="0"/>
-            </a:endParaRPr>
-          </a:p>
-        </p:txBody>
-      </p:sp>
-      <p:sp>
-        <p:nvSpPr>
           <p:cNvPr id="6" name="Title 5"/>
           <p:cNvSpPr>
             <a:spLocks noGrp="1"/>
@@ -3916,7 +3570,7 @@
           <a:p>
             <a:fld id="{ECAA57DF-1C19-4726-AB84-014692BAD8F5}" type="datetimeFigureOut">
               <a:rPr lang="en-US" smtClean="0"/>
-              <a:t>6/14/2018</a:t>
+              <a:t>6/22/2018</a:t>
             </a:fld>
             <a:endParaRPr lang="en-US"/>
           </a:p>
@@ -4255,7 +3909,7 @@
             <a:fld id="{ECAA57DF-1C19-4726-AB84-014692BAD8F5}" type="datetimeFigureOut">
               <a:rPr lang="en-US" smtClean="0"/>
               <a:pPr/>
-              <a:t>6/14/2018</a:t>
+              <a:t>6/22/2018</a:t>
             </a:fld>
             <a:endParaRPr lang="en-US"/>
           </a:p>
@@ -4404,6 +4058,9 @@
             <a:avLst/>
           </a:prstGeom>
           <a:ln w="114300">
+            <a:solidFill>
+              <a:srgbClr val="F0A000"/>
+            </a:solidFill>
             <a:miter lim="800000"/>
           </a:ln>
         </p:spPr>
@@ -4883,7 +4540,12 @@
             <p:ph type="body" sz="quarter" idx="36"/>
           </p:nvPr>
         </p:nvSpPr>
-        <p:spPr/>
+        <p:spPr>
+          <a:xfrm>
+            <a:off x="1158240" y="4093905"/>
+            <a:ext cx="30174412" cy="646331"/>
+          </a:xfrm>
+        </p:spPr>
         <p:txBody>
           <a:bodyPr/>
           <a:lstStyle/>
@@ -4910,6 +4572,29 @@
             <a:off x="1143000" y="5440680"/>
             <a:ext cx="12801600" cy="1280160"/>
           </a:xfrm>
+          <a:gradFill>
+            <a:gsLst>
+              <a:gs pos="0">
+                <a:schemeClr val="tx1">
+                  <a:lumMod val="65000"/>
+                  <a:lumOff val="35000"/>
+                </a:schemeClr>
+              </a:gs>
+              <a:gs pos="91000">
+                <a:srgbClr val="F0A000"/>
+              </a:gs>
+              <a:gs pos="90000">
+                <a:schemeClr val="tx1">
+                  <a:lumMod val="65000"/>
+                  <a:lumOff val="35000"/>
+                </a:schemeClr>
+              </a:gs>
+              <a:gs pos="100000">
+                <a:srgbClr val="F0A000"/>
+              </a:gs>
+            </a:gsLst>
+            <a:lin ang="5400000" scaled="1"/>
+          </a:gradFill>
         </p:spPr>
         <p:txBody>
           <a:bodyPr/>
@@ -4966,6 +4651,28 @@
             <a:off x="1143000" y="10317480"/>
             <a:ext cx="12801600" cy="1280160"/>
           </a:xfrm>
+          <a:gradFill>
+            <a:gsLst>
+              <a:gs pos="0">
+                <a:schemeClr val="tx1">
+                  <a:lumMod val="65000"/>
+                  <a:lumOff val="35000"/>
+                </a:schemeClr>
+              </a:gs>
+              <a:gs pos="91000">
+                <a:srgbClr val="F0A000"/>
+              </a:gs>
+              <a:gs pos="90000">
+                <a:schemeClr val="tx1">
+                  <a:lumMod val="65000"/>
+                  <a:lumOff val="35000"/>
+                </a:schemeClr>
+              </a:gs>
+              <a:gs pos="100000">
+                <a:srgbClr val="F0A000"/>
+              </a:gs>
+            </a:gsLst>
+          </a:gradFill>
         </p:spPr>
         <p:txBody>
           <a:bodyPr/>
@@ -5027,6 +4734,28 @@
             <a:off x="1143000" y="13860780"/>
             <a:ext cx="12801600" cy="1219200"/>
           </a:xfrm>
+          <a:gradFill>
+            <a:gsLst>
+              <a:gs pos="0">
+                <a:schemeClr val="tx1">
+                  <a:lumMod val="65000"/>
+                  <a:lumOff val="35000"/>
+                </a:schemeClr>
+              </a:gs>
+              <a:gs pos="91000">
+                <a:srgbClr val="F0A000"/>
+              </a:gs>
+              <a:gs pos="90000">
+                <a:schemeClr val="tx1">
+                  <a:lumMod val="65000"/>
+                  <a:lumOff val="35000"/>
+                </a:schemeClr>
+              </a:gs>
+              <a:gs pos="100000">
+                <a:srgbClr val="F0A000"/>
+              </a:gs>
+            </a:gsLst>
+          </a:gradFill>
         </p:spPr>
         <p:txBody>
           <a:bodyPr/>
@@ -5054,6 +4783,28 @@
             <a:off x="15544800" y="5440680"/>
             <a:ext cx="12801600" cy="1219200"/>
           </a:xfrm>
+          <a:gradFill>
+            <a:gsLst>
+              <a:gs pos="0">
+                <a:schemeClr val="tx1">
+                  <a:lumMod val="65000"/>
+                  <a:lumOff val="35000"/>
+                </a:schemeClr>
+              </a:gs>
+              <a:gs pos="91000">
+                <a:srgbClr val="F0A000"/>
+              </a:gs>
+              <a:gs pos="90000">
+                <a:schemeClr val="tx1">
+                  <a:lumMod val="65000"/>
+                  <a:lumOff val="35000"/>
+                </a:schemeClr>
+              </a:gs>
+              <a:gs pos="100000">
+                <a:srgbClr val="F0A000"/>
+              </a:gs>
+            </a:gsLst>
+          </a:gradFill>
         </p:spPr>
         <p:txBody>
           <a:bodyPr/>
@@ -5081,6 +4832,28 @@
             <a:off x="15544800" y="11214466"/>
             <a:ext cx="12801600" cy="1219200"/>
           </a:xfrm>
+          <a:gradFill>
+            <a:gsLst>
+              <a:gs pos="0">
+                <a:schemeClr val="tx1">
+                  <a:lumMod val="65000"/>
+                  <a:lumOff val="35000"/>
+                </a:schemeClr>
+              </a:gs>
+              <a:gs pos="91000">
+                <a:srgbClr val="F0A000"/>
+              </a:gs>
+              <a:gs pos="90000">
+                <a:schemeClr val="tx1">
+                  <a:lumMod val="65000"/>
+                  <a:lumOff val="35000"/>
+                </a:schemeClr>
+              </a:gs>
+              <a:gs pos="100000">
+                <a:srgbClr val="F0A000"/>
+              </a:gs>
+            </a:gsLst>
+          </a:gradFill>
         </p:spPr>
         <p:txBody>
           <a:bodyPr/>
@@ -5108,6 +4881,28 @@
             <a:off x="29900880" y="5440680"/>
             <a:ext cx="12801600" cy="1219200"/>
           </a:xfrm>
+          <a:gradFill>
+            <a:gsLst>
+              <a:gs pos="0">
+                <a:schemeClr val="tx1">
+                  <a:lumMod val="65000"/>
+                  <a:lumOff val="35000"/>
+                </a:schemeClr>
+              </a:gs>
+              <a:gs pos="91000">
+                <a:srgbClr val="F0A000"/>
+              </a:gs>
+              <a:gs pos="90000">
+                <a:schemeClr val="tx1">
+                  <a:lumMod val="65000"/>
+                  <a:lumOff val="35000"/>
+                </a:schemeClr>
+              </a:gs>
+              <a:gs pos="100000">
+                <a:srgbClr val="F0A000"/>
+              </a:gs>
+            </a:gsLst>
+          </a:gradFill>
         </p:spPr>
         <p:txBody>
           <a:bodyPr/>
@@ -5185,6 +4980,28 @@
             <a:off x="29900880" y="20046996"/>
             <a:ext cx="12801600" cy="1219200"/>
           </a:xfrm>
+          <a:gradFill>
+            <a:gsLst>
+              <a:gs pos="0">
+                <a:schemeClr val="tx1">
+                  <a:lumMod val="65000"/>
+                  <a:lumOff val="35000"/>
+                </a:schemeClr>
+              </a:gs>
+              <a:gs pos="91000">
+                <a:srgbClr val="F0A000"/>
+              </a:gs>
+              <a:gs pos="90000">
+                <a:schemeClr val="tx1">
+                  <a:lumMod val="65000"/>
+                  <a:lumOff val="35000"/>
+                </a:schemeClr>
+              </a:gs>
+              <a:gs pos="100000">
+                <a:srgbClr val="F0A000"/>
+              </a:gs>
+            </a:gsLst>
+          </a:gradFill>
         </p:spPr>
         <p:txBody>
           <a:bodyPr/>
@@ -5245,6 +5062,28 @@
             <a:off x="29900880" y="25664019"/>
             <a:ext cx="12801600" cy="1219200"/>
           </a:xfrm>
+          <a:gradFill>
+            <a:gsLst>
+              <a:gs pos="0">
+                <a:schemeClr val="tx1">
+                  <a:lumMod val="65000"/>
+                  <a:lumOff val="35000"/>
+                </a:schemeClr>
+              </a:gs>
+              <a:gs pos="91000">
+                <a:srgbClr val="F0A000"/>
+              </a:gs>
+              <a:gs pos="90000">
+                <a:schemeClr val="tx1">
+                  <a:lumMod val="65000"/>
+                  <a:lumOff val="35000"/>
+                </a:schemeClr>
+              </a:gs>
+              <a:gs pos="100000">
+                <a:srgbClr val="F0A000"/>
+              </a:gs>
+            </a:gsLst>
+          </a:gradFill>
         </p:spPr>
         <p:txBody>
           <a:bodyPr/>
@@ -5677,7 +5516,7 @@
         </p:nvSpPr>
         <p:spPr>
           <a:xfrm>
-            <a:off x="15544800" y="19401315"/>
+            <a:off x="15520262" y="13152670"/>
             <a:ext cx="12801600" cy="1219200"/>
           </a:xfrm>
           <a:prstGeom prst="rect">
@@ -5692,7 +5531,7 @@
                 </a:schemeClr>
               </a:gs>
               <a:gs pos="91000">
-                <a:schemeClr val="accent1"/>
+                <a:srgbClr val="F0A000"/>
               </a:gs>
               <a:gs pos="90000">
                 <a:schemeClr val="tx1">
@@ -5701,7 +5540,7 @@
                 </a:schemeClr>
               </a:gs>
               <a:gs pos="100000">
-                <a:schemeClr val="accent1"/>
+                <a:srgbClr val="F0A000"/>
               </a:gs>
             </a:gsLst>
             <a:lin ang="5400000" scaled="1"/>
@@ -6968,17 +6807,17 @@
                   <a:lumOff val="35000"/>
                 </a:schemeClr>
               </a:gs>
-              <a:gs pos="61000">
-                <a:schemeClr val="accent1"/>
+              <a:gs pos="60000">
+                <a:srgbClr val="F0A000"/>
               </a:gs>
-              <a:gs pos="60000">
+              <a:gs pos="59000">
                 <a:schemeClr val="tx1">
                   <a:lumMod val="65000"/>
                   <a:lumOff val="35000"/>
                 </a:schemeClr>
               </a:gs>
               <a:gs pos="100000">
-                <a:schemeClr val="accent1"/>
+                <a:srgbClr val="F0A000"/>
               </a:gs>
             </a:gsLst>
             <a:lin ang="5400000" scaled="1"/>
@@ -7428,36 +7267,6 @@
           </a:p>
         </p:txBody>
       </p:sp>
-      <p:pic>
-        <p:nvPicPr>
-          <p:cNvPr id="129" name="Picture 128">
-            <a:extLst>
-              <a:ext uri="{FF2B5EF4-FFF2-40B4-BE49-F238E27FC236}">
-                <a16:creationId xmlns:a16="http://schemas.microsoft.com/office/drawing/2014/main" id="{F24EE070-CC8C-482D-882D-D14B8CFD77D4}"/>
-              </a:ext>
-            </a:extLst>
-          </p:cNvPr>
-          <p:cNvPicPr>
-            <a:picLocks noChangeAspect="1"/>
-          </p:cNvPicPr>
-          <p:nvPr/>
-        </p:nvPicPr>
-        <p:blipFill>
-          <a:blip r:embed="rId5"/>
-          <a:stretch>
-            <a:fillRect/>
-          </a:stretch>
-        </p:blipFill>
-        <p:spPr>
-          <a:xfrm>
-            <a:off x="20517711" y="21162452"/>
-            <a:ext cx="7823937" cy="6451157"/>
-          </a:xfrm>
-          <a:prstGeom prst="rect">
-            <a:avLst/>
-          </a:prstGeom>
-        </p:spPr>
-      </p:pic>
       <p:sp>
         <p:nvSpPr>
           <p:cNvPr id="130" name="Content Placeholder 5">
@@ -7474,8 +7283,8 @@
         </p:nvSpPr>
         <p:spPr>
           <a:xfrm>
-            <a:off x="15590012" y="22240841"/>
-            <a:ext cx="5295375" cy="3683487"/>
+            <a:off x="23581802" y="14388608"/>
+            <a:ext cx="5295375" cy="2648406"/>
           </a:xfrm>
           <a:prstGeom prst="rect">
             <a:avLst/>
@@ -7709,13 +7518,8 @@
             </a:pPr>
             <a:r>
               <a:rPr lang="en-US" dirty="0"/>
-              <a:t>(Need to draw something up </a:t>
-            </a:r>
-            <a:r>
-              <a:rPr lang="en-US"/>
-              <a:t>to describe)</a:t>
-            </a:r>
-            <a:endParaRPr lang="en-US" dirty="0"/>
+              <a:t>(Need to draw something up to describe)</a:t>
+            </a:r>
           </a:p>
           <a:p>
             <a:pPr marL="0" indent="0">
@@ -7723,255 +7527,6 @@
               <a:buNone/>
             </a:pPr>
             <a:endParaRPr lang="en-US" dirty="0"/>
-          </a:p>
-        </p:txBody>
-      </p:sp>
-      <p:sp>
-        <p:nvSpPr>
-          <p:cNvPr id="131" name="Content Placeholder 10">
-            <a:extLst>
-              <a:ext uri="{FF2B5EF4-FFF2-40B4-BE49-F238E27FC236}">
-                <a16:creationId xmlns:a16="http://schemas.microsoft.com/office/drawing/2014/main" id="{4B83C9D4-AFEA-446B-B225-0EE74305C0F1}"/>
-              </a:ext>
-            </a:extLst>
-          </p:cNvPr>
-          <p:cNvSpPr txBox="1">
-            <a:spLocks/>
-          </p:cNvSpPr>
-          <p:nvPr/>
-        </p:nvSpPr>
-        <p:spPr>
-          <a:xfrm>
-            <a:off x="15818281" y="17541378"/>
-            <a:ext cx="12801600" cy="1483343"/>
-          </a:xfrm>
-          <a:prstGeom prst="rect">
-            <a:avLst/>
-          </a:prstGeom>
-        </p:spPr>
-        <p:txBody>
-          <a:bodyPr vert="horz" lIns="0" tIns="0" rIns="0" bIns="0" rtlCol="0">
-            <a:normAutofit/>
-          </a:bodyPr>
-          <a:lstStyle>
-            <a:lvl1pPr marL="457200" indent="-457200" algn="l" defTabSz="4389120" rtl="0" eaLnBrk="1" latinLnBrk="0" hangingPunct="1">
-              <a:lnSpc>
-                <a:spcPct val="100000"/>
-              </a:lnSpc>
-              <a:spcBef>
-                <a:spcPts val="1200"/>
-              </a:spcBef>
-              <a:buClr>
-                <a:schemeClr val="bg1">
-                  <a:lumMod val="65000"/>
-                </a:schemeClr>
-              </a:buClr>
-              <a:buFont typeface="Arial" panose="020B0604020202020204" pitchFamily="34" charset="0"/>
-              <a:buChar char="•"/>
-              <a:defRPr sz="3200" kern="1200" baseline="0">
-                <a:solidFill>
-                  <a:schemeClr val="tx1"/>
-                </a:solidFill>
-                <a:latin typeface="+mn-lt"/>
-                <a:ea typeface="+mn-ea"/>
-                <a:cs typeface="+mn-cs"/>
-              </a:defRPr>
-            </a:lvl1pPr>
-            <a:lvl2pPr marL="1097280" indent="-457200" algn="l" defTabSz="4389120" rtl="0" eaLnBrk="1" latinLnBrk="0" hangingPunct="1">
-              <a:lnSpc>
-                <a:spcPct val="100000"/>
-              </a:lnSpc>
-              <a:spcBef>
-                <a:spcPts val="1200"/>
-              </a:spcBef>
-              <a:buClr>
-                <a:schemeClr val="bg1">
-                  <a:lumMod val="65000"/>
-                </a:schemeClr>
-              </a:buClr>
-              <a:buFont typeface="Arial" panose="020B0604020202020204" pitchFamily="34" charset="0"/>
-              <a:buChar char="•"/>
-              <a:defRPr sz="2800" kern="1200">
-                <a:solidFill>
-                  <a:schemeClr val="tx1"/>
-                </a:solidFill>
-                <a:latin typeface="+mn-lt"/>
-                <a:ea typeface="+mn-ea"/>
-                <a:cs typeface="+mn-cs"/>
-              </a:defRPr>
-            </a:lvl2pPr>
-            <a:lvl3pPr marL="1097280" indent="-457200" algn="l" defTabSz="4389120" rtl="0" eaLnBrk="1" latinLnBrk="0" hangingPunct="1">
-              <a:lnSpc>
-                <a:spcPct val="100000"/>
-              </a:lnSpc>
-              <a:spcBef>
-                <a:spcPts val="1200"/>
-              </a:spcBef>
-              <a:buClr>
-                <a:schemeClr val="bg1">
-                  <a:lumMod val="65000"/>
-                </a:schemeClr>
-              </a:buClr>
-              <a:buFont typeface="Arial" panose="020B0604020202020204" pitchFamily="34" charset="0"/>
-              <a:buChar char="•"/>
-              <a:defRPr sz="2800" kern="1200">
-                <a:solidFill>
-                  <a:schemeClr val="tx1"/>
-                </a:solidFill>
-                <a:latin typeface="+mn-lt"/>
-                <a:ea typeface="+mn-ea"/>
-                <a:cs typeface="+mn-cs"/>
-              </a:defRPr>
-            </a:lvl3pPr>
-            <a:lvl4pPr marL="1097280" indent="-457200" algn="l" defTabSz="4389120" rtl="0" eaLnBrk="1" latinLnBrk="0" hangingPunct="1">
-              <a:lnSpc>
-                <a:spcPct val="100000"/>
-              </a:lnSpc>
-              <a:spcBef>
-                <a:spcPts val="1200"/>
-              </a:spcBef>
-              <a:buClr>
-                <a:schemeClr val="bg1">
-                  <a:lumMod val="65000"/>
-                </a:schemeClr>
-              </a:buClr>
-              <a:buFont typeface="Arial" panose="020B0604020202020204" pitchFamily="34" charset="0"/>
-              <a:buChar char="•"/>
-              <a:defRPr sz="2800" kern="1200">
-                <a:solidFill>
-                  <a:schemeClr val="tx1"/>
-                </a:solidFill>
-                <a:latin typeface="+mn-lt"/>
-                <a:ea typeface="+mn-ea"/>
-                <a:cs typeface="+mn-cs"/>
-              </a:defRPr>
-            </a:lvl4pPr>
-            <a:lvl5pPr marL="1097280" indent="-457200" algn="l" defTabSz="4389120" rtl="0" eaLnBrk="1" latinLnBrk="0" hangingPunct="1">
-              <a:lnSpc>
-                <a:spcPct val="100000"/>
-              </a:lnSpc>
-              <a:spcBef>
-                <a:spcPts val="1200"/>
-              </a:spcBef>
-              <a:buClr>
-                <a:schemeClr val="bg1">
-                  <a:lumMod val="65000"/>
-                </a:schemeClr>
-              </a:buClr>
-              <a:buFont typeface="Arial" panose="020B0604020202020204" pitchFamily="34" charset="0"/>
-              <a:buChar char="•"/>
-              <a:defRPr sz="2800" kern="1200">
-                <a:solidFill>
-                  <a:schemeClr val="tx1"/>
-                </a:solidFill>
-                <a:latin typeface="+mn-lt"/>
-                <a:ea typeface="+mn-ea"/>
-                <a:cs typeface="+mn-cs"/>
-              </a:defRPr>
-            </a:lvl5pPr>
-            <a:lvl6pPr marL="1097280" indent="-457200" algn="l" defTabSz="4389120" rtl="0" eaLnBrk="1" latinLnBrk="0" hangingPunct="1">
-              <a:lnSpc>
-                <a:spcPct val="100000"/>
-              </a:lnSpc>
-              <a:spcBef>
-                <a:spcPts val="1200"/>
-              </a:spcBef>
-              <a:buClr>
-                <a:schemeClr val="bg1">
-                  <a:lumMod val="65000"/>
-                </a:schemeClr>
-              </a:buClr>
-              <a:buFont typeface="Arial" panose="020B0604020202020204" pitchFamily="34" charset="0"/>
-              <a:buChar char="•"/>
-              <a:defRPr sz="2800" kern="1200">
-                <a:solidFill>
-                  <a:schemeClr val="tx1"/>
-                </a:solidFill>
-                <a:latin typeface="+mn-lt"/>
-                <a:ea typeface="+mn-ea"/>
-                <a:cs typeface="+mn-cs"/>
-              </a:defRPr>
-            </a:lvl6pPr>
-            <a:lvl7pPr marL="1097280" indent="-457200" algn="l" defTabSz="4389120" rtl="0" eaLnBrk="1" latinLnBrk="0" hangingPunct="1">
-              <a:lnSpc>
-                <a:spcPct val="100000"/>
-              </a:lnSpc>
-              <a:spcBef>
-                <a:spcPts val="1200"/>
-              </a:spcBef>
-              <a:buClr>
-                <a:schemeClr val="bg1">
-                  <a:lumMod val="65000"/>
-                </a:schemeClr>
-              </a:buClr>
-              <a:buFont typeface="Arial" panose="020B0604020202020204" pitchFamily="34" charset="0"/>
-              <a:buChar char="•"/>
-              <a:defRPr sz="2800" kern="1200">
-                <a:solidFill>
-                  <a:schemeClr val="tx1"/>
-                </a:solidFill>
-                <a:latin typeface="+mn-lt"/>
-                <a:ea typeface="+mn-ea"/>
-                <a:cs typeface="+mn-cs"/>
-              </a:defRPr>
-            </a:lvl7pPr>
-            <a:lvl8pPr marL="1097280" indent="-457200" algn="l" defTabSz="4389120" rtl="0" eaLnBrk="1" latinLnBrk="0" hangingPunct="1">
-              <a:lnSpc>
-                <a:spcPct val="100000"/>
-              </a:lnSpc>
-              <a:spcBef>
-                <a:spcPts val="1200"/>
-              </a:spcBef>
-              <a:buClr>
-                <a:schemeClr val="bg1">
-                  <a:lumMod val="65000"/>
-                </a:schemeClr>
-              </a:buClr>
-              <a:buFont typeface="Arial" panose="020B0604020202020204" pitchFamily="34" charset="0"/>
-              <a:buChar char="•"/>
-              <a:defRPr sz="2800" kern="1200">
-                <a:solidFill>
-                  <a:schemeClr val="tx1"/>
-                </a:solidFill>
-                <a:latin typeface="+mn-lt"/>
-                <a:ea typeface="+mn-ea"/>
-                <a:cs typeface="+mn-cs"/>
-              </a:defRPr>
-            </a:lvl8pPr>
-            <a:lvl9pPr marL="1097280" indent="-457200" algn="l" defTabSz="4389120" rtl="0" eaLnBrk="1" latinLnBrk="0" hangingPunct="1">
-              <a:lnSpc>
-                <a:spcPct val="100000"/>
-              </a:lnSpc>
-              <a:spcBef>
-                <a:spcPts val="1200"/>
-              </a:spcBef>
-              <a:buClr>
-                <a:schemeClr val="bg1">
-                  <a:lumMod val="65000"/>
-                </a:schemeClr>
-              </a:buClr>
-              <a:buFont typeface="Arial" panose="020B0604020202020204" pitchFamily="34" charset="0"/>
-              <a:buChar char="•"/>
-              <a:defRPr sz="2800" kern="1200">
-                <a:solidFill>
-                  <a:schemeClr val="tx1"/>
-                </a:solidFill>
-                <a:latin typeface="+mn-lt"/>
-                <a:ea typeface="+mn-ea"/>
-                <a:cs typeface="+mn-cs"/>
-              </a:defRPr>
-            </a:lvl9pPr>
-          </a:lstStyle>
-          <a:p>
-            <a:pPr marL="0" indent="0" algn="just">
-              <a:buClrTx/>
-              <a:buSzPct val="150000"/>
-              <a:buNone/>
-            </a:pPr>
-            <a:r>
-              <a:rPr lang="en-US" sz="2800" dirty="0"/>
-              <a:t>Images of one hot encoded and embedded sequence representations </a:t>
-            </a:r>
           </a:p>
         </p:txBody>
       </p:sp>
@@ -8029,6 +7584,1816 @@
           </a:p>
         </p:txBody>
       </p:sp>
+      <p:grpSp>
+        <p:nvGrpSpPr>
+          <p:cNvPr id="229" name="Group 228">
+            <a:extLst>
+              <a:ext uri="{FF2B5EF4-FFF2-40B4-BE49-F238E27FC236}">
+                <a16:creationId xmlns:a16="http://schemas.microsoft.com/office/drawing/2014/main" id="{F6119C1B-3484-4BF8-9AE2-F8D125FBBEA6}"/>
+              </a:ext>
+            </a:extLst>
+          </p:cNvPr>
+          <p:cNvGrpSpPr/>
+          <p:nvPr/>
+        </p:nvGrpSpPr>
+        <p:grpSpPr>
+          <a:xfrm>
+            <a:off x="15345173" y="14691433"/>
+            <a:ext cx="8122737" cy="12544765"/>
+            <a:chOff x="560766" y="433903"/>
+            <a:chExt cx="3517534" cy="5432484"/>
+          </a:xfrm>
+        </p:grpSpPr>
+        <p:cxnSp>
+          <p:nvCxnSpPr>
+            <p:cNvPr id="230" name="Straight Arrow Connector 229">
+              <a:extLst>
+                <a:ext uri="{FF2B5EF4-FFF2-40B4-BE49-F238E27FC236}">
+                  <a16:creationId xmlns:a16="http://schemas.microsoft.com/office/drawing/2014/main" id="{AD4B3F89-92CD-48F3-AB08-61063ED265D7}"/>
+                </a:ext>
+              </a:extLst>
+            </p:cNvPr>
+            <p:cNvCxnSpPr>
+              <a:endCxn id="246" idx="0"/>
+            </p:cNvCxnSpPr>
+            <p:nvPr/>
+          </p:nvCxnSpPr>
+          <p:spPr>
+            <a:xfrm flipH="1">
+              <a:off x="1239808" y="4300222"/>
+              <a:ext cx="230217" cy="586176"/>
+            </a:xfrm>
+            <a:prstGeom prst="straightConnector1">
+              <a:avLst/>
+            </a:prstGeom>
+            <a:noFill/>
+            <a:ln w="6350" cap="flat" cmpd="sng" algn="ctr">
+              <a:solidFill>
+                <a:sysClr val="windowText" lastClr="000000"/>
+              </a:solidFill>
+              <a:prstDash val="solid"/>
+              <a:miter lim="800000"/>
+              <a:tailEnd type="triangle"/>
+            </a:ln>
+            <a:effectLst/>
+          </p:spPr>
+        </p:cxnSp>
+        <p:sp>
+          <p:nvSpPr>
+            <p:cNvPr id="231" name="Rectangle 230">
+              <a:extLst>
+                <a:ext uri="{FF2B5EF4-FFF2-40B4-BE49-F238E27FC236}">
+                  <a16:creationId xmlns:a16="http://schemas.microsoft.com/office/drawing/2014/main" id="{7C9EEC8F-5FDA-4325-A979-10470FC1F29F}"/>
+                </a:ext>
+              </a:extLst>
+            </p:cNvPr>
+            <p:cNvSpPr/>
+            <p:nvPr/>
+          </p:nvSpPr>
+          <p:spPr>
+            <a:xfrm>
+              <a:off x="631884" y="3249422"/>
+              <a:ext cx="3300033" cy="98790"/>
+            </a:xfrm>
+            <a:prstGeom prst="rect">
+              <a:avLst/>
+            </a:prstGeom>
+            <a:solidFill>
+              <a:sysClr val="window" lastClr="FFFFFF"/>
+            </a:solidFill>
+            <a:ln w="12700" cap="flat" cmpd="sng" algn="ctr">
+              <a:solidFill>
+                <a:sysClr val="windowText" lastClr="000000"/>
+              </a:solidFill>
+              <a:prstDash val="solid"/>
+              <a:miter lim="800000"/>
+            </a:ln>
+            <a:effectLst/>
+          </p:spPr>
+          <p:txBody>
+            <a:bodyPr rtlCol="0" anchor="ctr"/>
+            <a:lstStyle/>
+            <a:p>
+              <a:pPr marL="0" marR="0" lvl="0" indent="0" algn="ctr" defTabSz="914400" eaLnBrk="1" fontAlgn="auto" latinLnBrk="0" hangingPunct="1">
+                <a:lnSpc>
+                  <a:spcPct val="100000"/>
+                </a:lnSpc>
+                <a:spcBef>
+                  <a:spcPts val="0"/>
+                </a:spcBef>
+                <a:spcAft>
+                  <a:spcPts val="0"/>
+                </a:spcAft>
+                <a:buClrTx/>
+                <a:buSzTx/>
+                <a:buFontTx/>
+                <a:buNone/>
+                <a:tabLst/>
+                <a:defRPr/>
+              </a:pPr>
+              <a:endParaRPr kumimoji="0" lang="en-US" sz="3200" b="0" i="0" u="none" strike="noStrike" kern="0" cap="none" spc="0" normalizeH="0" baseline="0" noProof="0">
+                <a:ln>
+                  <a:noFill/>
+                </a:ln>
+                <a:solidFill>
+                  <a:prstClr val="black"/>
+                </a:solidFill>
+                <a:effectLst/>
+                <a:uLnTx/>
+                <a:uFillTx/>
+                <a:latin typeface="Calibri" panose="020F0502020204030204"/>
+                <a:ea typeface="+mn-ea"/>
+                <a:cs typeface="+mn-cs"/>
+              </a:endParaRPr>
+            </a:p>
+          </p:txBody>
+        </p:sp>
+        <p:pic>
+          <p:nvPicPr>
+            <p:cNvPr id="232" name="Picture 231">
+              <a:extLst>
+                <a:ext uri="{FF2B5EF4-FFF2-40B4-BE49-F238E27FC236}">
+                  <a16:creationId xmlns:a16="http://schemas.microsoft.com/office/drawing/2014/main" id="{3712B373-854E-4A50-8A98-B412EA21C7C9}"/>
+                </a:ext>
+              </a:extLst>
+            </p:cNvPr>
+            <p:cNvPicPr>
+              <a:picLocks noChangeAspect="1"/>
+            </p:cNvPicPr>
+            <p:nvPr/>
+          </p:nvPicPr>
+          <p:blipFill>
+            <a:blip r:embed="rId5"/>
+            <a:stretch>
+              <a:fillRect/>
+            </a:stretch>
+          </p:blipFill>
+          <p:spPr>
+            <a:xfrm>
+              <a:off x="631886" y="1382217"/>
+              <a:ext cx="3300034" cy="455684"/>
+            </a:xfrm>
+            <a:prstGeom prst="rect">
+              <a:avLst/>
+            </a:prstGeom>
+          </p:spPr>
+        </p:pic>
+        <p:sp>
+          <p:nvSpPr>
+            <p:cNvPr id="233" name="Rectangle 1">
+              <a:extLst>
+                <a:ext uri="{FF2B5EF4-FFF2-40B4-BE49-F238E27FC236}">
+                  <a16:creationId xmlns:a16="http://schemas.microsoft.com/office/drawing/2014/main" id="{AF8E450A-830C-4665-A378-9EEC7BAFEA77}"/>
+                </a:ext>
+              </a:extLst>
+            </p:cNvPr>
+            <p:cNvSpPr>
+              <a:spLocks noChangeArrowheads="1"/>
+            </p:cNvSpPr>
+            <p:nvPr/>
+          </p:nvSpPr>
+          <p:spPr bwMode="auto">
+            <a:xfrm>
+              <a:off x="560766" y="709637"/>
+              <a:ext cx="3517534" cy="253236"/>
+            </a:xfrm>
+            <a:prstGeom prst="rect">
+              <a:avLst/>
+            </a:prstGeom>
+            <a:noFill/>
+            <a:ln>
+              <a:noFill/>
+            </a:ln>
+            <a:effectLst/>
+            <a:extLst>
+              <a:ext uri="{909E8E84-426E-40DD-AFC4-6F175D3DCCD1}">
+                <a14:hiddenFill xmlns:a14="http://schemas.microsoft.com/office/drawing/2010/main">
+                  <a:solidFill>
+                    <a:schemeClr val="accent1"/>
+                  </a:solidFill>
+                </a14:hiddenFill>
+              </a:ext>
+              <a:ext uri="{91240B29-F687-4F45-9708-019B960494DF}">
+                <a14:hiddenLine xmlns:a14="http://schemas.microsoft.com/office/drawing/2010/main" w="9525">
+                  <a:solidFill>
+                    <a:schemeClr val="tx1"/>
+                  </a:solidFill>
+                  <a:miter lim="800000"/>
+                  <a:headEnd/>
+                  <a:tailEnd/>
+                </a14:hiddenLine>
+              </a:ext>
+              <a:ext uri="{AF507438-7753-43E0-B8FC-AC1667EBCBE1}">
+                <a14:hiddenEffects xmlns:a14="http://schemas.microsoft.com/office/drawing/2010/main">
+                  <a:effectLst>
+                    <a:outerShdw dist="35921" dir="2700000" algn="ctr" rotWithShape="0">
+                      <a:schemeClr val="bg2"/>
+                    </a:outerShdw>
+                  </a:effectLst>
+                </a14:hiddenEffects>
+              </a:ext>
+            </a:extLst>
+          </p:spPr>
+          <p:txBody>
+            <a:bodyPr vert="horz" wrap="none" lIns="91440" tIns="45720" rIns="91440" bIns="45720" numCol="1" anchor="ctr" anchorCtr="0" compatLnSpc="1">
+              <a:prstTxWarp prst="textNoShape">
+                <a:avLst/>
+              </a:prstTxWarp>
+              <a:spAutoFit/>
+            </a:bodyPr>
+            <a:lstStyle/>
+            <a:p>
+              <a:pPr marL="0" marR="0" lvl="0" indent="0" defTabSz="914400" eaLnBrk="0" fontAlgn="base" latinLnBrk="0" hangingPunct="0">
+                <a:lnSpc>
+                  <a:spcPct val="100000"/>
+                </a:lnSpc>
+                <a:spcBef>
+                  <a:spcPct val="0"/>
+                </a:spcBef>
+                <a:spcAft>
+                  <a:spcPct val="0"/>
+                </a:spcAft>
+                <a:buClrTx/>
+                <a:buSzTx/>
+                <a:buFontTx/>
+                <a:buNone/>
+                <a:tabLst/>
+                <a:defRPr/>
+              </a:pPr>
+              <a:r>
+                <a:rPr kumimoji="0" lang="en-US" altLang="en-US" sz="3200" b="0" i="0" u="none" strike="noStrike" kern="0" cap="none" spc="0" normalizeH="0" baseline="0" noProof="0" dirty="0">
+                  <a:ln>
+                    <a:noFill/>
+                  </a:ln>
+                  <a:solidFill>
+                    <a:prstClr val="black"/>
+                  </a:solidFill>
+                  <a:effectLst/>
+                  <a:uLnTx/>
+                  <a:uFillTx/>
+                  <a:latin typeface="Arial Unicode MS"/>
+                </a:rPr>
+                <a:t>KSKFSGAVLNVPDTSDNSKKQMLRTRS…</a:t>
+              </a:r>
+              <a:endParaRPr kumimoji="0" lang="en-US" altLang="en-US" sz="3200" b="0" i="0" u="none" strike="noStrike" kern="0" cap="none" spc="0" normalizeH="0" baseline="0" noProof="0" dirty="0">
+                <a:ln>
+                  <a:noFill/>
+                </a:ln>
+                <a:solidFill>
+                  <a:prstClr val="black"/>
+                </a:solidFill>
+                <a:effectLst/>
+                <a:uLnTx/>
+                <a:uFillTx/>
+              </a:endParaRPr>
+            </a:p>
+          </p:txBody>
+        </p:sp>
+        <p:sp>
+          <p:nvSpPr>
+            <p:cNvPr id="234" name="Rectangle: Rounded Corners 233">
+              <a:extLst>
+                <a:ext uri="{FF2B5EF4-FFF2-40B4-BE49-F238E27FC236}">
+                  <a16:creationId xmlns:a16="http://schemas.microsoft.com/office/drawing/2014/main" id="{BDD4FF5B-74BF-4F57-AF29-417EB5737148}"/>
+                </a:ext>
+              </a:extLst>
+            </p:cNvPr>
+            <p:cNvSpPr/>
+            <p:nvPr/>
+          </p:nvSpPr>
+          <p:spPr>
+            <a:xfrm>
+              <a:off x="631886" y="433903"/>
+              <a:ext cx="2268794" cy="248463"/>
+            </a:xfrm>
+            <a:prstGeom prst="roundRect">
+              <a:avLst/>
+            </a:prstGeom>
+            <a:solidFill>
+              <a:srgbClr val="F0A000"/>
+            </a:solidFill>
+            <a:ln w="38100" cap="flat" cmpd="sng" algn="ctr">
+              <a:solidFill>
+                <a:schemeClr val="tx1"/>
+              </a:solidFill>
+              <a:prstDash val="solid"/>
+              <a:miter lim="800000"/>
+            </a:ln>
+            <a:effectLst/>
+          </p:spPr>
+          <p:txBody>
+            <a:bodyPr rtlCol="0" anchor="ctr"/>
+            <a:lstStyle/>
+            <a:p>
+              <a:pPr marL="0" marR="0" lvl="0" indent="0" algn="ctr" defTabSz="914400" eaLnBrk="1" fontAlgn="auto" latinLnBrk="0" hangingPunct="1">
+                <a:lnSpc>
+                  <a:spcPct val="100000"/>
+                </a:lnSpc>
+                <a:spcBef>
+                  <a:spcPts val="0"/>
+                </a:spcBef>
+                <a:spcAft>
+                  <a:spcPts val="0"/>
+                </a:spcAft>
+                <a:buClrTx/>
+                <a:buSzTx/>
+                <a:buFontTx/>
+                <a:buNone/>
+                <a:tabLst/>
+                <a:defRPr/>
+              </a:pPr>
+              <a:r>
+                <a:rPr kumimoji="0" lang="en-US" sz="3200" b="0" i="0" u="none" strike="noStrike" kern="0" cap="none" spc="0" normalizeH="0" baseline="0" noProof="0" dirty="0">
+                  <a:ln>
+                    <a:noFill/>
+                  </a:ln>
+                  <a:solidFill>
+                    <a:prstClr val="white"/>
+                  </a:solidFill>
+                  <a:effectLst/>
+                  <a:uLnTx/>
+                  <a:uFillTx/>
+                  <a:latin typeface="Calibri" panose="020F0502020204030204"/>
+                  <a:ea typeface="+mn-ea"/>
+                  <a:cs typeface="+mn-cs"/>
+                </a:rPr>
+                <a:t>Amino Acid Sequence</a:t>
+              </a:r>
+            </a:p>
+          </p:txBody>
+        </p:sp>
+        <p:sp>
+          <p:nvSpPr>
+            <p:cNvPr id="235" name="Rectangle: Rounded Corners 234">
+              <a:extLst>
+                <a:ext uri="{FF2B5EF4-FFF2-40B4-BE49-F238E27FC236}">
+                  <a16:creationId xmlns:a16="http://schemas.microsoft.com/office/drawing/2014/main" id="{9C79F7D2-A4EE-4A57-AFB2-8651D175FA29}"/>
+                </a:ext>
+              </a:extLst>
+            </p:cNvPr>
+            <p:cNvSpPr/>
+            <p:nvPr/>
+          </p:nvSpPr>
+          <p:spPr>
+            <a:xfrm>
+              <a:off x="631886" y="1090594"/>
+              <a:ext cx="2268794" cy="248463"/>
+            </a:xfrm>
+            <a:prstGeom prst="roundRect">
+              <a:avLst/>
+            </a:prstGeom>
+            <a:solidFill>
+              <a:srgbClr val="F0A000"/>
+            </a:solidFill>
+            <a:ln w="38100" cap="flat" cmpd="sng" algn="ctr">
+              <a:solidFill>
+                <a:schemeClr val="tx1"/>
+              </a:solidFill>
+              <a:prstDash val="solid"/>
+              <a:miter lim="800000"/>
+            </a:ln>
+            <a:effectLst/>
+          </p:spPr>
+          <p:txBody>
+            <a:bodyPr rtlCol="0" anchor="ctr"/>
+            <a:lstStyle/>
+            <a:p>
+              <a:pPr marL="0" marR="0" lvl="0" indent="0" algn="ctr" defTabSz="914400" eaLnBrk="1" fontAlgn="auto" latinLnBrk="0" hangingPunct="1">
+                <a:lnSpc>
+                  <a:spcPct val="100000"/>
+                </a:lnSpc>
+                <a:spcBef>
+                  <a:spcPts val="0"/>
+                </a:spcBef>
+                <a:spcAft>
+                  <a:spcPts val="0"/>
+                </a:spcAft>
+                <a:buClrTx/>
+                <a:buSzTx/>
+                <a:buFontTx/>
+                <a:buNone/>
+                <a:tabLst/>
+                <a:defRPr/>
+              </a:pPr>
+              <a:r>
+                <a:rPr kumimoji="0" lang="en-US" sz="3200" b="0" i="0" u="none" strike="noStrike" kern="0" cap="none" spc="0" normalizeH="0" baseline="0" noProof="0" dirty="0">
+                  <a:ln>
+                    <a:noFill/>
+                  </a:ln>
+                  <a:solidFill>
+                    <a:prstClr val="white"/>
+                  </a:solidFill>
+                  <a:effectLst/>
+                  <a:uLnTx/>
+                  <a:uFillTx/>
+                  <a:latin typeface="Calibri" panose="020F0502020204030204"/>
+                  <a:ea typeface="+mn-ea"/>
+                  <a:cs typeface="+mn-cs"/>
+                </a:rPr>
+                <a:t>One-Hot Encoded</a:t>
+              </a:r>
+            </a:p>
+          </p:txBody>
+        </p:sp>
+        <p:sp>
+          <p:nvSpPr>
+            <p:cNvPr id="236" name="Rectangle: Rounded Corners 235">
+              <a:extLst>
+                <a:ext uri="{FF2B5EF4-FFF2-40B4-BE49-F238E27FC236}">
+                  <a16:creationId xmlns:a16="http://schemas.microsoft.com/office/drawing/2014/main" id="{ACC522B5-5492-4CA4-A5B0-54810A64ED2F}"/>
+                </a:ext>
+              </a:extLst>
+            </p:cNvPr>
+            <p:cNvSpPr/>
+            <p:nvPr/>
+          </p:nvSpPr>
+          <p:spPr>
+            <a:xfrm>
+              <a:off x="631886" y="1955426"/>
+              <a:ext cx="2268794" cy="248463"/>
+            </a:xfrm>
+            <a:prstGeom prst="roundRect">
+              <a:avLst/>
+            </a:prstGeom>
+            <a:solidFill>
+              <a:srgbClr val="F0A000"/>
+            </a:solidFill>
+            <a:ln w="38100" cap="flat" cmpd="sng" algn="ctr">
+              <a:solidFill>
+                <a:schemeClr val="tx1"/>
+              </a:solidFill>
+              <a:prstDash val="solid"/>
+              <a:miter lim="800000"/>
+            </a:ln>
+            <a:effectLst/>
+          </p:spPr>
+          <p:txBody>
+            <a:bodyPr rtlCol="0" anchor="ctr"/>
+            <a:lstStyle/>
+            <a:p>
+              <a:pPr marL="0" marR="0" lvl="0" indent="0" algn="ctr" defTabSz="914400" eaLnBrk="1" fontAlgn="auto" latinLnBrk="0" hangingPunct="1">
+                <a:lnSpc>
+                  <a:spcPct val="100000"/>
+                </a:lnSpc>
+                <a:spcBef>
+                  <a:spcPts val="0"/>
+                </a:spcBef>
+                <a:spcAft>
+                  <a:spcPts val="0"/>
+                </a:spcAft>
+                <a:buClrTx/>
+                <a:buSzTx/>
+                <a:buFontTx/>
+                <a:buNone/>
+                <a:tabLst/>
+                <a:defRPr/>
+              </a:pPr>
+              <a:r>
+                <a:rPr kumimoji="0" lang="en-US" sz="3200" b="0" i="0" u="none" strike="noStrike" kern="0" cap="none" spc="0" normalizeH="0" baseline="0" noProof="0" dirty="0">
+                  <a:ln>
+                    <a:noFill/>
+                  </a:ln>
+                  <a:solidFill>
+                    <a:prstClr val="white"/>
+                  </a:solidFill>
+                  <a:effectLst/>
+                  <a:uLnTx/>
+                  <a:uFillTx/>
+                  <a:latin typeface="Calibri" panose="020F0502020204030204"/>
+                  <a:ea typeface="+mn-ea"/>
+                  <a:cs typeface="+mn-cs"/>
+                </a:rPr>
+                <a:t>Embedded Sequence</a:t>
+              </a:r>
+            </a:p>
+          </p:txBody>
+        </p:sp>
+        <p:sp>
+          <p:nvSpPr>
+            <p:cNvPr id="237" name="Rectangle: Rounded Corners 236">
+              <a:extLst>
+                <a:ext uri="{FF2B5EF4-FFF2-40B4-BE49-F238E27FC236}">
+                  <a16:creationId xmlns:a16="http://schemas.microsoft.com/office/drawing/2014/main" id="{CF9F0CDA-FF2B-4FFB-9829-850D8C1B27EB}"/>
+                </a:ext>
+              </a:extLst>
+            </p:cNvPr>
+            <p:cNvSpPr/>
+            <p:nvPr/>
+          </p:nvSpPr>
+          <p:spPr>
+            <a:xfrm>
+              <a:off x="631884" y="2883434"/>
+              <a:ext cx="2268794" cy="248463"/>
+            </a:xfrm>
+            <a:prstGeom prst="roundRect">
+              <a:avLst/>
+            </a:prstGeom>
+            <a:solidFill>
+              <a:srgbClr val="F0A000"/>
+            </a:solidFill>
+            <a:ln w="38100" cap="flat" cmpd="sng" algn="ctr">
+              <a:solidFill>
+                <a:schemeClr val="tx1"/>
+              </a:solidFill>
+              <a:prstDash val="solid"/>
+              <a:miter lim="800000"/>
+            </a:ln>
+            <a:effectLst/>
+          </p:spPr>
+          <p:txBody>
+            <a:bodyPr rtlCol="0" anchor="ctr"/>
+            <a:lstStyle/>
+            <a:p>
+              <a:pPr marL="0" marR="0" lvl="0" indent="0" algn="ctr" defTabSz="914400" eaLnBrk="1" fontAlgn="auto" latinLnBrk="0" hangingPunct="1">
+                <a:lnSpc>
+                  <a:spcPct val="100000"/>
+                </a:lnSpc>
+                <a:spcBef>
+                  <a:spcPts val="0"/>
+                </a:spcBef>
+                <a:spcAft>
+                  <a:spcPts val="0"/>
+                </a:spcAft>
+                <a:buClrTx/>
+                <a:buSzTx/>
+                <a:buFontTx/>
+                <a:buNone/>
+                <a:tabLst/>
+                <a:defRPr/>
+              </a:pPr>
+              <a:r>
+                <a:rPr kumimoji="0" lang="en-US" sz="3200" b="0" i="0" u="none" strike="noStrike" kern="0" cap="none" spc="0" normalizeH="0" baseline="0" noProof="0" dirty="0">
+                  <a:ln>
+                    <a:noFill/>
+                  </a:ln>
+                  <a:solidFill>
+                    <a:prstClr val="white"/>
+                  </a:solidFill>
+                  <a:effectLst/>
+                  <a:uLnTx/>
+                  <a:uFillTx/>
+                  <a:latin typeface="Calibri" panose="020F0502020204030204"/>
+                  <a:ea typeface="+mn-ea"/>
+                  <a:cs typeface="+mn-cs"/>
+                </a:rPr>
+                <a:t>1D Convolution</a:t>
+              </a:r>
+            </a:p>
+          </p:txBody>
+        </p:sp>
+        <p:cxnSp>
+          <p:nvCxnSpPr>
+            <p:cNvPr id="238" name="Straight Connector 237">
+              <a:extLst>
+                <a:ext uri="{FF2B5EF4-FFF2-40B4-BE49-F238E27FC236}">
+                  <a16:creationId xmlns:a16="http://schemas.microsoft.com/office/drawing/2014/main" id="{139DC0F1-15CA-44BD-BB99-DFB711D6CE3C}"/>
+                </a:ext>
+              </a:extLst>
+            </p:cNvPr>
+            <p:cNvCxnSpPr/>
+            <p:nvPr/>
+          </p:nvCxnSpPr>
+          <p:spPr>
+            <a:xfrm>
+              <a:off x="3098800" y="2410087"/>
+              <a:ext cx="109220" cy="888730"/>
+            </a:xfrm>
+            <a:prstGeom prst="line">
+              <a:avLst/>
+            </a:prstGeom>
+            <a:noFill/>
+            <a:ln w="31750" cap="flat" cmpd="sng" algn="ctr">
+              <a:solidFill>
+                <a:sysClr val="windowText" lastClr="000000"/>
+              </a:solidFill>
+              <a:prstDash val="solid"/>
+              <a:miter lim="800000"/>
+            </a:ln>
+            <a:effectLst/>
+          </p:spPr>
+        </p:cxnSp>
+        <p:cxnSp>
+          <p:nvCxnSpPr>
+            <p:cNvPr id="239" name="Straight Connector 238">
+              <a:extLst>
+                <a:ext uri="{FF2B5EF4-FFF2-40B4-BE49-F238E27FC236}">
+                  <a16:creationId xmlns:a16="http://schemas.microsoft.com/office/drawing/2014/main" id="{AF945B7D-98A6-47A5-9DE4-CD9672B9C6E6}"/>
+                </a:ext>
+              </a:extLst>
+            </p:cNvPr>
+            <p:cNvCxnSpPr>
+              <a:cxnSpLocks/>
+            </p:cNvCxnSpPr>
+            <p:nvPr/>
+          </p:nvCxnSpPr>
+          <p:spPr>
+            <a:xfrm flipH="1">
+              <a:off x="3208020" y="2419976"/>
+              <a:ext cx="109220" cy="878841"/>
+            </a:xfrm>
+            <a:prstGeom prst="line">
+              <a:avLst/>
+            </a:prstGeom>
+            <a:noFill/>
+            <a:ln w="31750" cap="flat" cmpd="sng" algn="ctr">
+              <a:solidFill>
+                <a:sysClr val="windowText" lastClr="000000"/>
+              </a:solidFill>
+              <a:prstDash val="solid"/>
+              <a:miter lim="800000"/>
+            </a:ln>
+            <a:effectLst/>
+          </p:spPr>
+        </p:cxnSp>
+        <p:sp>
+          <p:nvSpPr>
+            <p:cNvPr id="240" name="Rectangle 239">
+              <a:extLst>
+                <a:ext uri="{FF2B5EF4-FFF2-40B4-BE49-F238E27FC236}">
+                  <a16:creationId xmlns:a16="http://schemas.microsoft.com/office/drawing/2014/main" id="{33AC8E0A-82C3-4458-B8FF-AC6DC70DC64C}"/>
+                </a:ext>
+              </a:extLst>
+            </p:cNvPr>
+            <p:cNvSpPr/>
+            <p:nvPr/>
+          </p:nvSpPr>
+          <p:spPr>
+            <a:xfrm>
+              <a:off x="1287492" y="4201432"/>
+              <a:ext cx="1917641" cy="98790"/>
+            </a:xfrm>
+            <a:prstGeom prst="rect">
+              <a:avLst/>
+            </a:prstGeom>
+            <a:solidFill>
+              <a:sysClr val="window" lastClr="FFFFFF"/>
+            </a:solidFill>
+            <a:ln w="12700" cap="flat" cmpd="sng" algn="ctr">
+              <a:solidFill>
+                <a:sysClr val="windowText" lastClr="000000"/>
+              </a:solidFill>
+              <a:prstDash val="solid"/>
+              <a:miter lim="800000"/>
+            </a:ln>
+            <a:effectLst/>
+          </p:spPr>
+          <p:txBody>
+            <a:bodyPr rtlCol="0" anchor="ctr"/>
+            <a:lstStyle/>
+            <a:p>
+              <a:pPr marL="0" marR="0" lvl="0" indent="0" algn="ctr" defTabSz="914400" eaLnBrk="1" fontAlgn="auto" latinLnBrk="0" hangingPunct="1">
+                <a:lnSpc>
+                  <a:spcPct val="100000"/>
+                </a:lnSpc>
+                <a:spcBef>
+                  <a:spcPts val="0"/>
+                </a:spcBef>
+                <a:spcAft>
+                  <a:spcPts val="0"/>
+                </a:spcAft>
+                <a:buClrTx/>
+                <a:buSzTx/>
+                <a:buFontTx/>
+                <a:buNone/>
+                <a:tabLst/>
+                <a:defRPr/>
+              </a:pPr>
+              <a:endParaRPr kumimoji="0" lang="en-US" sz="3200" b="0" i="0" u="none" strike="noStrike" kern="0" cap="none" spc="0" normalizeH="0" baseline="0" noProof="0">
+                <a:ln>
+                  <a:noFill/>
+                </a:ln>
+                <a:solidFill>
+                  <a:prstClr val="black"/>
+                </a:solidFill>
+                <a:effectLst/>
+                <a:uLnTx/>
+                <a:uFillTx/>
+                <a:latin typeface="Calibri" panose="020F0502020204030204"/>
+                <a:ea typeface="+mn-ea"/>
+                <a:cs typeface="+mn-cs"/>
+              </a:endParaRPr>
+            </a:p>
+          </p:txBody>
+        </p:sp>
+        <p:sp>
+          <p:nvSpPr>
+            <p:cNvPr id="241" name="Rectangle: Rounded Corners 240">
+              <a:extLst>
+                <a:ext uri="{FF2B5EF4-FFF2-40B4-BE49-F238E27FC236}">
+                  <a16:creationId xmlns:a16="http://schemas.microsoft.com/office/drawing/2014/main" id="{86716503-0E52-412C-B875-BE6853B8D5C9}"/>
+                </a:ext>
+              </a:extLst>
+            </p:cNvPr>
+            <p:cNvSpPr/>
+            <p:nvPr/>
+          </p:nvSpPr>
+          <p:spPr>
+            <a:xfrm>
+              <a:off x="631884" y="3811926"/>
+              <a:ext cx="1311216" cy="248463"/>
+            </a:xfrm>
+            <a:prstGeom prst="roundRect">
+              <a:avLst/>
+            </a:prstGeom>
+            <a:solidFill>
+              <a:srgbClr val="F0A000"/>
+            </a:solidFill>
+            <a:ln w="38100" cap="flat" cmpd="sng" algn="ctr">
+              <a:solidFill>
+                <a:schemeClr val="tx1"/>
+              </a:solidFill>
+              <a:prstDash val="solid"/>
+              <a:miter lim="800000"/>
+            </a:ln>
+            <a:effectLst/>
+          </p:spPr>
+          <p:txBody>
+            <a:bodyPr rtlCol="0" anchor="ctr"/>
+            <a:lstStyle/>
+            <a:p>
+              <a:pPr marL="0" marR="0" lvl="0" indent="0" algn="ctr" defTabSz="914400" eaLnBrk="1" fontAlgn="auto" latinLnBrk="0" hangingPunct="1">
+                <a:lnSpc>
+                  <a:spcPct val="100000"/>
+                </a:lnSpc>
+                <a:spcBef>
+                  <a:spcPts val="0"/>
+                </a:spcBef>
+                <a:spcAft>
+                  <a:spcPts val="0"/>
+                </a:spcAft>
+                <a:buClrTx/>
+                <a:buSzTx/>
+                <a:buFontTx/>
+                <a:buNone/>
+                <a:tabLst/>
+                <a:defRPr/>
+              </a:pPr>
+              <a:r>
+                <a:rPr kumimoji="0" lang="en-US" sz="3200" b="0" i="0" u="none" strike="noStrike" kern="0" cap="none" spc="0" normalizeH="0" baseline="0" noProof="0" dirty="0">
+                  <a:ln>
+                    <a:noFill/>
+                  </a:ln>
+                  <a:solidFill>
+                    <a:prstClr val="white"/>
+                  </a:solidFill>
+                  <a:effectLst/>
+                  <a:uLnTx/>
+                  <a:uFillTx/>
+                  <a:latin typeface="Calibri" panose="020F0502020204030204"/>
+                  <a:ea typeface="+mn-ea"/>
+                  <a:cs typeface="+mn-cs"/>
+                </a:rPr>
+                <a:t>Pooling</a:t>
+              </a:r>
+            </a:p>
+          </p:txBody>
+        </p:sp>
+        <p:sp>
+          <p:nvSpPr>
+            <p:cNvPr id="242" name="Rectangle 241">
+              <a:extLst>
+                <a:ext uri="{FF2B5EF4-FFF2-40B4-BE49-F238E27FC236}">
+                  <a16:creationId xmlns:a16="http://schemas.microsoft.com/office/drawing/2014/main" id="{46903652-8E1F-4A88-960B-3C7AF7AD370E}"/>
+                </a:ext>
+              </a:extLst>
+            </p:cNvPr>
+            <p:cNvSpPr/>
+            <p:nvPr/>
+          </p:nvSpPr>
+          <p:spPr>
+            <a:xfrm>
+              <a:off x="2086610" y="3246612"/>
+              <a:ext cx="218440" cy="98790"/>
+            </a:xfrm>
+            <a:prstGeom prst="rect">
+              <a:avLst/>
+            </a:prstGeom>
+            <a:solidFill>
+              <a:sysClr val="window" lastClr="FFFFFF"/>
+            </a:solidFill>
+            <a:ln w="12700" cap="flat" cmpd="sng" algn="ctr">
+              <a:solidFill>
+                <a:srgbClr val="ED7D31"/>
+              </a:solidFill>
+              <a:prstDash val="solid"/>
+              <a:miter lim="800000"/>
+            </a:ln>
+            <a:effectLst/>
+          </p:spPr>
+          <p:txBody>
+            <a:bodyPr rtlCol="0" anchor="ctr"/>
+            <a:lstStyle/>
+            <a:p>
+              <a:pPr marL="0" marR="0" lvl="0" indent="0" algn="ctr" defTabSz="914400" eaLnBrk="1" fontAlgn="auto" latinLnBrk="0" hangingPunct="1">
+                <a:lnSpc>
+                  <a:spcPct val="100000"/>
+                </a:lnSpc>
+                <a:spcBef>
+                  <a:spcPts val="0"/>
+                </a:spcBef>
+                <a:spcAft>
+                  <a:spcPts val="0"/>
+                </a:spcAft>
+                <a:buClrTx/>
+                <a:buSzTx/>
+                <a:buFontTx/>
+                <a:buNone/>
+                <a:tabLst/>
+                <a:defRPr/>
+              </a:pPr>
+              <a:endParaRPr kumimoji="0" lang="en-US" sz="3200" b="0" i="0" u="none" strike="noStrike" kern="0" cap="none" spc="0" normalizeH="0" baseline="0" noProof="0">
+                <a:ln>
+                  <a:noFill/>
+                </a:ln>
+                <a:solidFill>
+                  <a:prstClr val="black"/>
+                </a:solidFill>
+                <a:effectLst/>
+                <a:uLnTx/>
+                <a:uFillTx/>
+                <a:latin typeface="Calibri" panose="020F0502020204030204"/>
+                <a:ea typeface="+mn-ea"/>
+                <a:cs typeface="+mn-cs"/>
+              </a:endParaRPr>
+            </a:p>
+          </p:txBody>
+        </p:sp>
+        <p:cxnSp>
+          <p:nvCxnSpPr>
+            <p:cNvPr id="243" name="Straight Connector 242">
+              <a:extLst>
+                <a:ext uri="{FF2B5EF4-FFF2-40B4-BE49-F238E27FC236}">
+                  <a16:creationId xmlns:a16="http://schemas.microsoft.com/office/drawing/2014/main" id="{7D6A2FA1-2718-4637-AD3B-9923785B1C5C}"/>
+                </a:ext>
+              </a:extLst>
+            </p:cNvPr>
+            <p:cNvCxnSpPr/>
+            <p:nvPr/>
+          </p:nvCxnSpPr>
+          <p:spPr>
+            <a:xfrm>
+              <a:off x="2086610" y="3352208"/>
+              <a:ext cx="109220" cy="888730"/>
+            </a:xfrm>
+            <a:prstGeom prst="line">
+              <a:avLst/>
+            </a:prstGeom>
+            <a:noFill/>
+            <a:ln w="31750" cap="flat" cmpd="sng" algn="ctr">
+              <a:solidFill>
+                <a:sysClr val="windowText" lastClr="000000"/>
+              </a:solidFill>
+              <a:prstDash val="solid"/>
+              <a:miter lim="800000"/>
+            </a:ln>
+            <a:effectLst/>
+          </p:spPr>
+        </p:cxnSp>
+        <p:cxnSp>
+          <p:nvCxnSpPr>
+            <p:cNvPr id="244" name="Straight Connector 243">
+              <a:extLst>
+                <a:ext uri="{FF2B5EF4-FFF2-40B4-BE49-F238E27FC236}">
+                  <a16:creationId xmlns:a16="http://schemas.microsoft.com/office/drawing/2014/main" id="{C063EE31-4E7F-460A-8C4E-A91F607D1664}"/>
+                </a:ext>
+              </a:extLst>
+            </p:cNvPr>
+            <p:cNvCxnSpPr>
+              <a:cxnSpLocks/>
+            </p:cNvCxnSpPr>
+            <p:nvPr/>
+          </p:nvCxnSpPr>
+          <p:spPr>
+            <a:xfrm flipH="1">
+              <a:off x="2195830" y="3362097"/>
+              <a:ext cx="109220" cy="878841"/>
+            </a:xfrm>
+            <a:prstGeom prst="line">
+              <a:avLst/>
+            </a:prstGeom>
+            <a:noFill/>
+            <a:ln w="31750" cap="flat" cmpd="sng" algn="ctr">
+              <a:solidFill>
+                <a:sysClr val="windowText" lastClr="000000"/>
+              </a:solidFill>
+              <a:prstDash val="solid"/>
+              <a:miter lim="800000"/>
+            </a:ln>
+            <a:effectLst/>
+          </p:spPr>
+        </p:cxnSp>
+        <p:sp>
+          <p:nvSpPr>
+            <p:cNvPr id="245" name="Rectangle: Rounded Corners 244">
+              <a:extLst>
+                <a:ext uri="{FF2B5EF4-FFF2-40B4-BE49-F238E27FC236}">
+                  <a16:creationId xmlns:a16="http://schemas.microsoft.com/office/drawing/2014/main" id="{B8687CF9-1D83-48B3-BD17-EBE2BA957C6C}"/>
+                </a:ext>
+              </a:extLst>
+            </p:cNvPr>
+            <p:cNvSpPr/>
+            <p:nvPr/>
+          </p:nvSpPr>
+          <p:spPr>
+            <a:xfrm>
+              <a:off x="625504" y="4441265"/>
+              <a:ext cx="1015941" cy="248463"/>
+            </a:xfrm>
+            <a:prstGeom prst="roundRect">
+              <a:avLst/>
+            </a:prstGeom>
+            <a:solidFill>
+              <a:srgbClr val="F0A000"/>
+            </a:solidFill>
+            <a:ln w="38100" cap="flat" cmpd="sng" algn="ctr">
+              <a:solidFill>
+                <a:schemeClr val="tx1"/>
+              </a:solidFill>
+              <a:prstDash val="solid"/>
+              <a:miter lim="800000"/>
+            </a:ln>
+            <a:effectLst/>
+          </p:spPr>
+          <p:txBody>
+            <a:bodyPr rtlCol="0" anchor="ctr"/>
+            <a:lstStyle/>
+            <a:p>
+              <a:pPr marL="0" marR="0" lvl="0" indent="0" algn="ctr" defTabSz="914400" eaLnBrk="1" fontAlgn="auto" latinLnBrk="0" hangingPunct="1">
+                <a:lnSpc>
+                  <a:spcPct val="100000"/>
+                </a:lnSpc>
+                <a:spcBef>
+                  <a:spcPts val="0"/>
+                </a:spcBef>
+                <a:spcAft>
+                  <a:spcPts val="0"/>
+                </a:spcAft>
+                <a:buClrTx/>
+                <a:buSzTx/>
+                <a:buFontTx/>
+                <a:buNone/>
+                <a:tabLst/>
+                <a:defRPr/>
+              </a:pPr>
+              <a:r>
+                <a:rPr kumimoji="0" lang="en-US" sz="3200" b="0" i="0" u="none" strike="noStrike" kern="0" cap="none" spc="0" normalizeH="0" baseline="0" noProof="0" dirty="0">
+                  <a:ln>
+                    <a:noFill/>
+                  </a:ln>
+                  <a:solidFill>
+                    <a:prstClr val="white"/>
+                  </a:solidFill>
+                  <a:effectLst/>
+                  <a:uLnTx/>
+                  <a:uFillTx/>
+                  <a:latin typeface="Calibri" panose="020F0502020204030204"/>
+                  <a:ea typeface="+mn-ea"/>
+                  <a:cs typeface="+mn-cs"/>
+                </a:rPr>
+                <a:t>LSTM</a:t>
+              </a:r>
+            </a:p>
+          </p:txBody>
+        </p:sp>
+        <p:sp>
+          <p:nvSpPr>
+            <p:cNvPr id="246" name="Oval 245">
+              <a:extLst>
+                <a:ext uri="{FF2B5EF4-FFF2-40B4-BE49-F238E27FC236}">
+                  <a16:creationId xmlns:a16="http://schemas.microsoft.com/office/drawing/2014/main" id="{EBC02BFD-9E78-4370-8B12-74E8783A7465}"/>
+                </a:ext>
+              </a:extLst>
+            </p:cNvPr>
+            <p:cNvSpPr/>
+            <p:nvPr/>
+          </p:nvSpPr>
+          <p:spPr>
+            <a:xfrm>
+              <a:off x="1085820" y="4886398"/>
+              <a:ext cx="307975" cy="307975"/>
+            </a:xfrm>
+            <a:prstGeom prst="ellipse">
+              <a:avLst/>
+            </a:prstGeom>
+            <a:solidFill>
+              <a:sysClr val="window" lastClr="FFFFFF"/>
+            </a:solidFill>
+            <a:ln w="12700" cap="flat" cmpd="sng" algn="ctr">
+              <a:solidFill>
+                <a:sysClr val="windowText" lastClr="000000"/>
+              </a:solidFill>
+              <a:prstDash val="solid"/>
+              <a:miter lim="800000"/>
+            </a:ln>
+            <a:effectLst/>
+          </p:spPr>
+          <p:txBody>
+            <a:bodyPr rtlCol="0" anchor="ctr"/>
+            <a:lstStyle/>
+            <a:p>
+              <a:pPr marL="0" marR="0" lvl="0" indent="0" algn="ctr" defTabSz="914400" eaLnBrk="1" fontAlgn="auto" latinLnBrk="0" hangingPunct="1">
+                <a:lnSpc>
+                  <a:spcPct val="100000"/>
+                </a:lnSpc>
+                <a:spcBef>
+                  <a:spcPts val="0"/>
+                </a:spcBef>
+                <a:spcAft>
+                  <a:spcPts val="0"/>
+                </a:spcAft>
+                <a:buClrTx/>
+                <a:buSzTx/>
+                <a:buFontTx/>
+                <a:buNone/>
+                <a:tabLst/>
+                <a:defRPr/>
+              </a:pPr>
+              <a:endParaRPr kumimoji="0" lang="en-US" sz="3200" b="0" i="0" u="none" strike="noStrike" kern="0" cap="none" spc="0" normalizeH="0" baseline="0" noProof="0">
+                <a:ln>
+                  <a:noFill/>
+                </a:ln>
+                <a:solidFill>
+                  <a:prstClr val="black"/>
+                </a:solidFill>
+                <a:effectLst/>
+                <a:uLnTx/>
+                <a:uFillTx/>
+                <a:latin typeface="Calibri" panose="020F0502020204030204"/>
+                <a:ea typeface="+mn-ea"/>
+                <a:cs typeface="+mn-cs"/>
+              </a:endParaRPr>
+            </a:p>
+          </p:txBody>
+        </p:sp>
+        <p:sp>
+          <p:nvSpPr>
+            <p:cNvPr id="247" name="Oval 246">
+              <a:extLst>
+                <a:ext uri="{FF2B5EF4-FFF2-40B4-BE49-F238E27FC236}">
+                  <a16:creationId xmlns:a16="http://schemas.microsoft.com/office/drawing/2014/main" id="{15A31490-A702-4E05-9A39-F3DD969EEE31}"/>
+                </a:ext>
+              </a:extLst>
+            </p:cNvPr>
+            <p:cNvSpPr/>
+            <p:nvPr/>
+          </p:nvSpPr>
+          <p:spPr>
+            <a:xfrm>
+              <a:off x="1578594" y="4896994"/>
+              <a:ext cx="307975" cy="307975"/>
+            </a:xfrm>
+            <a:prstGeom prst="ellipse">
+              <a:avLst/>
+            </a:prstGeom>
+            <a:solidFill>
+              <a:sysClr val="window" lastClr="FFFFFF"/>
+            </a:solidFill>
+            <a:ln w="12700" cap="flat" cmpd="sng" algn="ctr">
+              <a:solidFill>
+                <a:sysClr val="windowText" lastClr="000000"/>
+              </a:solidFill>
+              <a:prstDash val="solid"/>
+              <a:miter lim="800000"/>
+            </a:ln>
+            <a:effectLst/>
+          </p:spPr>
+          <p:txBody>
+            <a:bodyPr rtlCol="0" anchor="ctr"/>
+            <a:lstStyle/>
+            <a:p>
+              <a:pPr marL="0" marR="0" lvl="0" indent="0" algn="ctr" defTabSz="914400" eaLnBrk="1" fontAlgn="auto" latinLnBrk="0" hangingPunct="1">
+                <a:lnSpc>
+                  <a:spcPct val="100000"/>
+                </a:lnSpc>
+                <a:spcBef>
+                  <a:spcPts val="0"/>
+                </a:spcBef>
+                <a:spcAft>
+                  <a:spcPts val="0"/>
+                </a:spcAft>
+                <a:buClrTx/>
+                <a:buSzTx/>
+                <a:buFontTx/>
+                <a:buNone/>
+                <a:tabLst/>
+                <a:defRPr/>
+              </a:pPr>
+              <a:endParaRPr kumimoji="0" lang="en-US" sz="3200" b="0" i="0" u="none" strike="noStrike" kern="0" cap="none" spc="0" normalizeH="0" baseline="0" noProof="0">
+                <a:ln>
+                  <a:noFill/>
+                </a:ln>
+                <a:solidFill>
+                  <a:prstClr val="black"/>
+                </a:solidFill>
+                <a:effectLst/>
+                <a:uLnTx/>
+                <a:uFillTx/>
+                <a:latin typeface="Calibri" panose="020F0502020204030204"/>
+                <a:ea typeface="+mn-ea"/>
+                <a:cs typeface="+mn-cs"/>
+              </a:endParaRPr>
+            </a:p>
+          </p:txBody>
+        </p:sp>
+        <p:sp>
+          <p:nvSpPr>
+            <p:cNvPr id="248" name="Oval 247">
+              <a:extLst>
+                <a:ext uri="{FF2B5EF4-FFF2-40B4-BE49-F238E27FC236}">
+                  <a16:creationId xmlns:a16="http://schemas.microsoft.com/office/drawing/2014/main" id="{C69E8D56-9A30-49D6-ADAA-1E100D198634}"/>
+                </a:ext>
+              </a:extLst>
+            </p:cNvPr>
+            <p:cNvSpPr/>
+            <p:nvPr/>
+          </p:nvSpPr>
+          <p:spPr>
+            <a:xfrm>
+              <a:off x="2071369" y="4896994"/>
+              <a:ext cx="307975" cy="307975"/>
+            </a:xfrm>
+            <a:prstGeom prst="ellipse">
+              <a:avLst/>
+            </a:prstGeom>
+            <a:solidFill>
+              <a:sysClr val="window" lastClr="FFFFFF"/>
+            </a:solidFill>
+            <a:ln w="12700" cap="flat" cmpd="sng" algn="ctr">
+              <a:solidFill>
+                <a:sysClr val="windowText" lastClr="000000"/>
+              </a:solidFill>
+              <a:prstDash val="solid"/>
+              <a:miter lim="800000"/>
+            </a:ln>
+            <a:effectLst/>
+          </p:spPr>
+          <p:txBody>
+            <a:bodyPr rtlCol="0" anchor="ctr"/>
+            <a:lstStyle/>
+            <a:p>
+              <a:pPr marL="0" marR="0" lvl="0" indent="0" algn="ctr" defTabSz="914400" eaLnBrk="1" fontAlgn="auto" latinLnBrk="0" hangingPunct="1">
+                <a:lnSpc>
+                  <a:spcPct val="100000"/>
+                </a:lnSpc>
+                <a:spcBef>
+                  <a:spcPts val="0"/>
+                </a:spcBef>
+                <a:spcAft>
+                  <a:spcPts val="0"/>
+                </a:spcAft>
+                <a:buClrTx/>
+                <a:buSzTx/>
+                <a:buFontTx/>
+                <a:buNone/>
+                <a:tabLst/>
+                <a:defRPr/>
+              </a:pPr>
+              <a:endParaRPr kumimoji="0" lang="en-US" sz="3200" b="0" i="0" u="none" strike="noStrike" kern="0" cap="none" spc="0" normalizeH="0" baseline="0" noProof="0">
+                <a:ln>
+                  <a:noFill/>
+                </a:ln>
+                <a:solidFill>
+                  <a:prstClr val="black"/>
+                </a:solidFill>
+                <a:effectLst/>
+                <a:uLnTx/>
+                <a:uFillTx/>
+                <a:latin typeface="Calibri" panose="020F0502020204030204"/>
+                <a:ea typeface="+mn-ea"/>
+                <a:cs typeface="+mn-cs"/>
+              </a:endParaRPr>
+            </a:p>
+          </p:txBody>
+        </p:sp>
+        <p:sp>
+          <p:nvSpPr>
+            <p:cNvPr id="249" name="Oval 248">
+              <a:extLst>
+                <a:ext uri="{FF2B5EF4-FFF2-40B4-BE49-F238E27FC236}">
+                  <a16:creationId xmlns:a16="http://schemas.microsoft.com/office/drawing/2014/main" id="{02AFF0C2-DBC4-4B78-9F00-6F085F2706DB}"/>
+                </a:ext>
+              </a:extLst>
+            </p:cNvPr>
+            <p:cNvSpPr/>
+            <p:nvPr/>
+          </p:nvSpPr>
+          <p:spPr>
+            <a:xfrm>
+              <a:off x="2564144" y="4886398"/>
+              <a:ext cx="307975" cy="307975"/>
+            </a:xfrm>
+            <a:prstGeom prst="ellipse">
+              <a:avLst/>
+            </a:prstGeom>
+            <a:solidFill>
+              <a:sysClr val="window" lastClr="FFFFFF"/>
+            </a:solidFill>
+            <a:ln w="12700" cap="flat" cmpd="sng" algn="ctr">
+              <a:solidFill>
+                <a:sysClr val="windowText" lastClr="000000"/>
+              </a:solidFill>
+              <a:prstDash val="solid"/>
+              <a:miter lim="800000"/>
+            </a:ln>
+            <a:effectLst/>
+          </p:spPr>
+          <p:txBody>
+            <a:bodyPr rtlCol="0" anchor="ctr"/>
+            <a:lstStyle/>
+            <a:p>
+              <a:pPr marL="0" marR="0" lvl="0" indent="0" algn="ctr" defTabSz="914400" eaLnBrk="1" fontAlgn="auto" latinLnBrk="0" hangingPunct="1">
+                <a:lnSpc>
+                  <a:spcPct val="100000"/>
+                </a:lnSpc>
+                <a:spcBef>
+                  <a:spcPts val="0"/>
+                </a:spcBef>
+                <a:spcAft>
+                  <a:spcPts val="0"/>
+                </a:spcAft>
+                <a:buClrTx/>
+                <a:buSzTx/>
+                <a:buFontTx/>
+                <a:buNone/>
+                <a:tabLst/>
+                <a:defRPr/>
+              </a:pPr>
+              <a:endParaRPr kumimoji="0" lang="en-US" sz="3200" b="0" i="0" u="none" strike="noStrike" kern="0" cap="none" spc="0" normalizeH="0" baseline="0" noProof="0">
+                <a:ln>
+                  <a:noFill/>
+                </a:ln>
+                <a:solidFill>
+                  <a:prstClr val="black"/>
+                </a:solidFill>
+                <a:effectLst/>
+                <a:uLnTx/>
+                <a:uFillTx/>
+                <a:latin typeface="Calibri" panose="020F0502020204030204"/>
+                <a:ea typeface="+mn-ea"/>
+                <a:cs typeface="+mn-cs"/>
+              </a:endParaRPr>
+            </a:p>
+          </p:txBody>
+        </p:sp>
+        <p:sp>
+          <p:nvSpPr>
+            <p:cNvPr id="250" name="Oval 249">
+              <a:extLst>
+                <a:ext uri="{FF2B5EF4-FFF2-40B4-BE49-F238E27FC236}">
+                  <a16:creationId xmlns:a16="http://schemas.microsoft.com/office/drawing/2014/main" id="{C8DBDA27-1BC9-42A4-B6D8-27B8C88459E8}"/>
+                </a:ext>
+              </a:extLst>
+            </p:cNvPr>
+            <p:cNvSpPr/>
+            <p:nvPr/>
+          </p:nvSpPr>
+          <p:spPr>
+            <a:xfrm>
+              <a:off x="3051145" y="4877586"/>
+              <a:ext cx="307975" cy="307975"/>
+            </a:xfrm>
+            <a:prstGeom prst="ellipse">
+              <a:avLst/>
+            </a:prstGeom>
+            <a:solidFill>
+              <a:sysClr val="window" lastClr="FFFFFF"/>
+            </a:solidFill>
+            <a:ln w="12700" cap="flat" cmpd="sng" algn="ctr">
+              <a:solidFill>
+                <a:sysClr val="windowText" lastClr="000000"/>
+              </a:solidFill>
+              <a:prstDash val="solid"/>
+              <a:miter lim="800000"/>
+            </a:ln>
+            <a:effectLst/>
+          </p:spPr>
+          <p:txBody>
+            <a:bodyPr rtlCol="0" anchor="ctr"/>
+            <a:lstStyle/>
+            <a:p>
+              <a:pPr marL="0" marR="0" lvl="0" indent="0" algn="ctr" defTabSz="914400" eaLnBrk="1" fontAlgn="auto" latinLnBrk="0" hangingPunct="1">
+                <a:lnSpc>
+                  <a:spcPct val="100000"/>
+                </a:lnSpc>
+                <a:spcBef>
+                  <a:spcPts val="0"/>
+                </a:spcBef>
+                <a:spcAft>
+                  <a:spcPts val="0"/>
+                </a:spcAft>
+                <a:buClrTx/>
+                <a:buSzTx/>
+                <a:buFontTx/>
+                <a:buNone/>
+                <a:tabLst/>
+                <a:defRPr/>
+              </a:pPr>
+              <a:endParaRPr kumimoji="0" lang="en-US" sz="3200" b="0" i="0" u="none" strike="noStrike" kern="0" cap="none" spc="0" normalizeH="0" baseline="0" noProof="0">
+                <a:ln>
+                  <a:noFill/>
+                </a:ln>
+                <a:solidFill>
+                  <a:prstClr val="black"/>
+                </a:solidFill>
+                <a:effectLst/>
+                <a:uLnTx/>
+                <a:uFillTx/>
+                <a:latin typeface="Calibri" panose="020F0502020204030204"/>
+                <a:ea typeface="+mn-ea"/>
+                <a:cs typeface="+mn-cs"/>
+              </a:endParaRPr>
+            </a:p>
+          </p:txBody>
+        </p:sp>
+        <p:cxnSp>
+          <p:nvCxnSpPr>
+            <p:cNvPr id="251" name="Straight Arrow Connector 250">
+              <a:extLst>
+                <a:ext uri="{FF2B5EF4-FFF2-40B4-BE49-F238E27FC236}">
+                  <a16:creationId xmlns:a16="http://schemas.microsoft.com/office/drawing/2014/main" id="{F7E85C3B-A220-4277-B6FB-81EED59D5688}"/>
+                </a:ext>
+              </a:extLst>
+            </p:cNvPr>
+            <p:cNvCxnSpPr>
+              <a:cxnSpLocks/>
+              <a:endCxn id="247" idx="0"/>
+            </p:cNvCxnSpPr>
+            <p:nvPr/>
+          </p:nvCxnSpPr>
+          <p:spPr>
+            <a:xfrm flipH="1">
+              <a:off x="1732582" y="4295510"/>
+              <a:ext cx="230218" cy="601484"/>
+            </a:xfrm>
+            <a:prstGeom prst="straightConnector1">
+              <a:avLst/>
+            </a:prstGeom>
+            <a:noFill/>
+            <a:ln w="6350" cap="flat" cmpd="sng" algn="ctr">
+              <a:solidFill>
+                <a:sysClr val="windowText" lastClr="000000"/>
+              </a:solidFill>
+              <a:prstDash val="solid"/>
+              <a:miter lim="800000"/>
+              <a:tailEnd type="triangle"/>
+            </a:ln>
+            <a:effectLst/>
+          </p:spPr>
+        </p:cxnSp>
+        <p:cxnSp>
+          <p:nvCxnSpPr>
+            <p:cNvPr id="252" name="Straight Arrow Connector 251">
+              <a:extLst>
+                <a:ext uri="{FF2B5EF4-FFF2-40B4-BE49-F238E27FC236}">
+                  <a16:creationId xmlns:a16="http://schemas.microsoft.com/office/drawing/2014/main" id="{F392475C-8B28-4BE8-B1FA-09F730CC3B0C}"/>
+                </a:ext>
+              </a:extLst>
+            </p:cNvPr>
+            <p:cNvCxnSpPr>
+              <a:cxnSpLocks/>
+              <a:stCxn id="240" idx="2"/>
+              <a:endCxn id="248" idx="0"/>
+            </p:cNvCxnSpPr>
+            <p:nvPr/>
+          </p:nvCxnSpPr>
+          <p:spPr>
+            <a:xfrm flipH="1">
+              <a:off x="2225357" y="4300222"/>
+              <a:ext cx="20956" cy="596772"/>
+            </a:xfrm>
+            <a:prstGeom prst="straightConnector1">
+              <a:avLst/>
+            </a:prstGeom>
+            <a:noFill/>
+            <a:ln w="6350" cap="flat" cmpd="sng" algn="ctr">
+              <a:solidFill>
+                <a:sysClr val="windowText" lastClr="000000"/>
+              </a:solidFill>
+              <a:prstDash val="solid"/>
+              <a:miter lim="800000"/>
+              <a:tailEnd type="triangle"/>
+            </a:ln>
+            <a:effectLst/>
+          </p:spPr>
+        </p:cxnSp>
+        <p:cxnSp>
+          <p:nvCxnSpPr>
+            <p:cNvPr id="253" name="Straight Arrow Connector 252">
+              <a:extLst>
+                <a:ext uri="{FF2B5EF4-FFF2-40B4-BE49-F238E27FC236}">
+                  <a16:creationId xmlns:a16="http://schemas.microsoft.com/office/drawing/2014/main" id="{3DC21295-4B77-452B-A039-10132A2E6E71}"/>
+                </a:ext>
+              </a:extLst>
+            </p:cNvPr>
+            <p:cNvCxnSpPr>
+              <a:cxnSpLocks/>
+              <a:endCxn id="249" idx="0"/>
+            </p:cNvCxnSpPr>
+            <p:nvPr/>
+          </p:nvCxnSpPr>
+          <p:spPr>
+            <a:xfrm>
+              <a:off x="2609396" y="4320080"/>
+              <a:ext cx="108736" cy="566318"/>
+            </a:xfrm>
+            <a:prstGeom prst="straightConnector1">
+              <a:avLst/>
+            </a:prstGeom>
+            <a:noFill/>
+            <a:ln w="6350" cap="flat" cmpd="sng" algn="ctr">
+              <a:solidFill>
+                <a:sysClr val="windowText" lastClr="000000"/>
+              </a:solidFill>
+              <a:prstDash val="solid"/>
+              <a:miter lim="800000"/>
+              <a:tailEnd type="triangle"/>
+            </a:ln>
+            <a:effectLst/>
+          </p:spPr>
+        </p:cxnSp>
+        <p:cxnSp>
+          <p:nvCxnSpPr>
+            <p:cNvPr id="254" name="Straight Arrow Connector 253">
+              <a:extLst>
+                <a:ext uri="{FF2B5EF4-FFF2-40B4-BE49-F238E27FC236}">
+                  <a16:creationId xmlns:a16="http://schemas.microsoft.com/office/drawing/2014/main" id="{D234B2BB-6F37-4249-9595-76940DA74CB5}"/>
+                </a:ext>
+              </a:extLst>
+            </p:cNvPr>
+            <p:cNvCxnSpPr>
+              <a:cxnSpLocks/>
+              <a:endCxn id="250" idx="0"/>
+            </p:cNvCxnSpPr>
+            <p:nvPr/>
+          </p:nvCxnSpPr>
+          <p:spPr>
+            <a:xfrm>
+              <a:off x="3000375" y="4295510"/>
+              <a:ext cx="204758" cy="582076"/>
+            </a:xfrm>
+            <a:prstGeom prst="straightConnector1">
+              <a:avLst/>
+            </a:prstGeom>
+            <a:noFill/>
+            <a:ln w="6350" cap="flat" cmpd="sng" algn="ctr">
+              <a:solidFill>
+                <a:sysClr val="windowText" lastClr="000000"/>
+              </a:solidFill>
+              <a:prstDash val="solid"/>
+              <a:miter lim="800000"/>
+              <a:tailEnd type="triangle"/>
+            </a:ln>
+            <a:effectLst/>
+          </p:spPr>
+        </p:cxnSp>
+        <p:cxnSp>
+          <p:nvCxnSpPr>
+            <p:cNvPr id="255" name="Straight Arrow Connector 254">
+              <a:extLst>
+                <a:ext uri="{FF2B5EF4-FFF2-40B4-BE49-F238E27FC236}">
+                  <a16:creationId xmlns:a16="http://schemas.microsoft.com/office/drawing/2014/main" id="{47F82E85-CC9E-4FE1-A927-085AC1A75C6F}"/>
+                </a:ext>
+              </a:extLst>
+            </p:cNvPr>
+            <p:cNvCxnSpPr>
+              <a:cxnSpLocks/>
+              <a:stCxn id="246" idx="6"/>
+              <a:endCxn id="247" idx="2"/>
+            </p:cNvCxnSpPr>
+            <p:nvPr/>
+          </p:nvCxnSpPr>
+          <p:spPr>
+            <a:xfrm>
+              <a:off x="1393795" y="5040386"/>
+              <a:ext cx="184799" cy="10596"/>
+            </a:xfrm>
+            <a:prstGeom prst="straightConnector1">
+              <a:avLst/>
+            </a:prstGeom>
+            <a:noFill/>
+            <a:ln w="6350" cap="flat" cmpd="sng" algn="ctr">
+              <a:solidFill>
+                <a:sysClr val="windowText" lastClr="000000"/>
+              </a:solidFill>
+              <a:prstDash val="solid"/>
+              <a:miter lim="800000"/>
+              <a:tailEnd type="triangle"/>
+            </a:ln>
+            <a:effectLst/>
+          </p:spPr>
+        </p:cxnSp>
+        <p:cxnSp>
+          <p:nvCxnSpPr>
+            <p:cNvPr id="256" name="Straight Arrow Connector 255">
+              <a:extLst>
+                <a:ext uri="{FF2B5EF4-FFF2-40B4-BE49-F238E27FC236}">
+                  <a16:creationId xmlns:a16="http://schemas.microsoft.com/office/drawing/2014/main" id="{7D251306-EA28-4977-812E-347412F6DA90}"/>
+                </a:ext>
+              </a:extLst>
+            </p:cNvPr>
+            <p:cNvCxnSpPr>
+              <a:cxnSpLocks/>
+            </p:cNvCxnSpPr>
+            <p:nvPr/>
+          </p:nvCxnSpPr>
+          <p:spPr>
+            <a:xfrm>
+              <a:off x="1892343" y="5050981"/>
+              <a:ext cx="184799" cy="10596"/>
+            </a:xfrm>
+            <a:prstGeom prst="straightConnector1">
+              <a:avLst/>
+            </a:prstGeom>
+            <a:noFill/>
+            <a:ln w="6350" cap="flat" cmpd="sng" algn="ctr">
+              <a:solidFill>
+                <a:sysClr val="windowText" lastClr="000000"/>
+              </a:solidFill>
+              <a:prstDash val="solid"/>
+              <a:miter lim="800000"/>
+              <a:tailEnd type="triangle"/>
+            </a:ln>
+            <a:effectLst/>
+          </p:spPr>
+        </p:cxnSp>
+        <p:cxnSp>
+          <p:nvCxnSpPr>
+            <p:cNvPr id="257" name="Straight Arrow Connector 256">
+              <a:extLst>
+                <a:ext uri="{FF2B5EF4-FFF2-40B4-BE49-F238E27FC236}">
+                  <a16:creationId xmlns:a16="http://schemas.microsoft.com/office/drawing/2014/main" id="{0360B753-4CE0-4002-A0C3-725747FF07A0}"/>
+                </a:ext>
+              </a:extLst>
+            </p:cNvPr>
+            <p:cNvCxnSpPr>
+              <a:cxnSpLocks/>
+            </p:cNvCxnSpPr>
+            <p:nvPr/>
+          </p:nvCxnSpPr>
+          <p:spPr>
+            <a:xfrm>
+              <a:off x="2373571" y="5045683"/>
+              <a:ext cx="184799" cy="10596"/>
+            </a:xfrm>
+            <a:prstGeom prst="straightConnector1">
+              <a:avLst/>
+            </a:prstGeom>
+            <a:noFill/>
+            <a:ln w="6350" cap="flat" cmpd="sng" algn="ctr">
+              <a:solidFill>
+                <a:sysClr val="windowText" lastClr="000000"/>
+              </a:solidFill>
+              <a:prstDash val="solid"/>
+              <a:miter lim="800000"/>
+              <a:tailEnd type="triangle"/>
+            </a:ln>
+            <a:effectLst/>
+          </p:spPr>
+        </p:cxnSp>
+        <p:cxnSp>
+          <p:nvCxnSpPr>
+            <p:cNvPr id="258" name="Straight Arrow Connector 257">
+              <a:extLst>
+                <a:ext uri="{FF2B5EF4-FFF2-40B4-BE49-F238E27FC236}">
+                  <a16:creationId xmlns:a16="http://schemas.microsoft.com/office/drawing/2014/main" id="{5BA783DA-4177-4BE9-8557-55BACEFA6429}"/>
+                </a:ext>
+              </a:extLst>
+            </p:cNvPr>
+            <p:cNvCxnSpPr>
+              <a:cxnSpLocks/>
+            </p:cNvCxnSpPr>
+            <p:nvPr/>
+          </p:nvCxnSpPr>
+          <p:spPr>
+            <a:xfrm>
+              <a:off x="2866346" y="5050981"/>
+              <a:ext cx="184799" cy="10596"/>
+            </a:xfrm>
+            <a:prstGeom prst="straightConnector1">
+              <a:avLst/>
+            </a:prstGeom>
+            <a:noFill/>
+            <a:ln w="6350" cap="flat" cmpd="sng" algn="ctr">
+              <a:solidFill>
+                <a:sysClr val="windowText" lastClr="000000"/>
+              </a:solidFill>
+              <a:prstDash val="solid"/>
+              <a:miter lim="800000"/>
+              <a:tailEnd type="triangle"/>
+            </a:ln>
+            <a:effectLst/>
+          </p:spPr>
+        </p:cxnSp>
+        <p:cxnSp>
+          <p:nvCxnSpPr>
+            <p:cNvPr id="259" name="Straight Arrow Connector 258">
+              <a:extLst>
+                <a:ext uri="{FF2B5EF4-FFF2-40B4-BE49-F238E27FC236}">
+                  <a16:creationId xmlns:a16="http://schemas.microsoft.com/office/drawing/2014/main" id="{E4ACEEC6-56EA-4448-BC3B-83B3A466A9BA}"/>
+                </a:ext>
+              </a:extLst>
+            </p:cNvPr>
+            <p:cNvCxnSpPr>
+              <a:cxnSpLocks/>
+              <a:stCxn id="250" idx="4"/>
+              <a:endCxn id="262" idx="3"/>
+            </p:cNvCxnSpPr>
+            <p:nvPr/>
+          </p:nvCxnSpPr>
+          <p:spPr>
+            <a:xfrm flipH="1">
+              <a:off x="1820572" y="5185561"/>
+              <a:ext cx="1384561" cy="556595"/>
+            </a:xfrm>
+            <a:prstGeom prst="straightConnector1">
+              <a:avLst/>
+            </a:prstGeom>
+            <a:noFill/>
+            <a:ln w="6350" cap="flat" cmpd="sng" algn="ctr">
+              <a:solidFill>
+                <a:sysClr val="windowText" lastClr="000000"/>
+              </a:solidFill>
+              <a:prstDash val="solid"/>
+              <a:miter lim="800000"/>
+              <a:tailEnd type="triangle"/>
+            </a:ln>
+            <a:effectLst/>
+          </p:spPr>
+        </p:cxnSp>
+        <p:pic>
+          <p:nvPicPr>
+            <p:cNvPr id="260" name="Picture 259">
+              <a:extLst>
+                <a:ext uri="{FF2B5EF4-FFF2-40B4-BE49-F238E27FC236}">
+                  <a16:creationId xmlns:a16="http://schemas.microsoft.com/office/drawing/2014/main" id="{A4736AB3-0D42-4C1B-9B4E-97EDA63B18A2}"/>
+                </a:ext>
+              </a:extLst>
+            </p:cNvPr>
+            <p:cNvPicPr>
+              <a:picLocks noChangeAspect="1"/>
+            </p:cNvPicPr>
+            <p:nvPr/>
+          </p:nvPicPr>
+          <p:blipFill>
+            <a:blip r:embed="rId6"/>
+            <a:stretch>
+              <a:fillRect/>
+            </a:stretch>
+          </p:blipFill>
+          <p:spPr>
+            <a:xfrm>
+              <a:off x="631884" y="2297505"/>
+              <a:ext cx="3300551" cy="117760"/>
+            </a:xfrm>
+            <a:prstGeom prst="rect">
+              <a:avLst/>
+            </a:prstGeom>
+          </p:spPr>
+        </p:pic>
+        <p:sp>
+          <p:nvSpPr>
+            <p:cNvPr id="261" name="Rectangle 260">
+              <a:extLst>
+                <a:ext uri="{FF2B5EF4-FFF2-40B4-BE49-F238E27FC236}">
+                  <a16:creationId xmlns:a16="http://schemas.microsoft.com/office/drawing/2014/main" id="{52C640A3-CFE3-4EAC-9B36-5EA73A8C4BA0}"/>
+                </a:ext>
+              </a:extLst>
+            </p:cNvPr>
+            <p:cNvSpPr/>
+            <p:nvPr/>
+          </p:nvSpPr>
+          <p:spPr>
+            <a:xfrm>
+              <a:off x="3098800" y="2292984"/>
+              <a:ext cx="218440" cy="122281"/>
+            </a:xfrm>
+            <a:prstGeom prst="rect">
+              <a:avLst/>
+            </a:prstGeom>
+            <a:solidFill>
+              <a:sysClr val="window" lastClr="FFFFFF"/>
+            </a:solidFill>
+            <a:ln w="12700" cap="flat" cmpd="sng" algn="ctr">
+              <a:solidFill>
+                <a:srgbClr val="ED7D31"/>
+              </a:solidFill>
+              <a:prstDash val="solid"/>
+              <a:miter lim="800000"/>
+            </a:ln>
+            <a:effectLst/>
+          </p:spPr>
+          <p:txBody>
+            <a:bodyPr rtlCol="0" anchor="ctr"/>
+            <a:lstStyle/>
+            <a:p>
+              <a:pPr marL="0" marR="0" lvl="0" indent="0" algn="ctr" defTabSz="914400" eaLnBrk="1" fontAlgn="auto" latinLnBrk="0" hangingPunct="1">
+                <a:lnSpc>
+                  <a:spcPct val="100000"/>
+                </a:lnSpc>
+                <a:spcBef>
+                  <a:spcPts val="0"/>
+                </a:spcBef>
+                <a:spcAft>
+                  <a:spcPts val="0"/>
+                </a:spcAft>
+                <a:buClrTx/>
+                <a:buSzTx/>
+                <a:buFontTx/>
+                <a:buNone/>
+                <a:tabLst/>
+                <a:defRPr/>
+              </a:pPr>
+              <a:endParaRPr kumimoji="0" lang="en-US" sz="3200" b="0" i="0" u="none" strike="noStrike" kern="0" cap="none" spc="0" normalizeH="0" baseline="0" noProof="0">
+                <a:ln>
+                  <a:noFill/>
+                </a:ln>
+                <a:solidFill>
+                  <a:prstClr val="black"/>
+                </a:solidFill>
+                <a:effectLst/>
+                <a:uLnTx/>
+                <a:uFillTx/>
+                <a:latin typeface="Calibri" panose="020F0502020204030204"/>
+                <a:ea typeface="+mn-ea"/>
+                <a:cs typeface="+mn-cs"/>
+              </a:endParaRPr>
+            </a:p>
+          </p:txBody>
+        </p:sp>
+        <p:sp>
+          <p:nvSpPr>
+            <p:cNvPr id="262" name="Rectangle: Rounded Corners 261">
+              <a:extLst>
+                <a:ext uri="{FF2B5EF4-FFF2-40B4-BE49-F238E27FC236}">
+                  <a16:creationId xmlns:a16="http://schemas.microsoft.com/office/drawing/2014/main" id="{E253E332-3398-4344-8A39-79E4AD139BBD}"/>
+                </a:ext>
+              </a:extLst>
+            </p:cNvPr>
+            <p:cNvSpPr/>
+            <p:nvPr/>
+          </p:nvSpPr>
+          <p:spPr>
+            <a:xfrm>
+              <a:off x="620741" y="5617924"/>
+              <a:ext cx="1199831" cy="248463"/>
+            </a:xfrm>
+            <a:prstGeom prst="roundRect">
+              <a:avLst/>
+            </a:prstGeom>
+            <a:solidFill>
+              <a:srgbClr val="F0A000"/>
+            </a:solidFill>
+            <a:ln w="38100" cap="flat" cmpd="sng" algn="ctr">
+              <a:solidFill>
+                <a:schemeClr val="tx1"/>
+              </a:solidFill>
+              <a:prstDash val="solid"/>
+              <a:miter lim="800000"/>
+            </a:ln>
+            <a:effectLst/>
+          </p:spPr>
+          <p:txBody>
+            <a:bodyPr rtlCol="0" anchor="ctr"/>
+            <a:lstStyle/>
+            <a:p>
+              <a:pPr marL="0" marR="0" lvl="0" indent="0" algn="ctr" defTabSz="914400" eaLnBrk="1" fontAlgn="auto" latinLnBrk="0" hangingPunct="1">
+                <a:lnSpc>
+                  <a:spcPct val="100000"/>
+                </a:lnSpc>
+                <a:spcBef>
+                  <a:spcPts val="0"/>
+                </a:spcBef>
+                <a:spcAft>
+                  <a:spcPts val="0"/>
+                </a:spcAft>
+                <a:buClrTx/>
+                <a:buSzTx/>
+                <a:buFontTx/>
+                <a:buNone/>
+                <a:tabLst/>
+                <a:defRPr/>
+              </a:pPr>
+              <a:r>
+                <a:rPr kumimoji="0" lang="en-US" sz="3200" b="0" i="0" u="none" strike="noStrike" kern="0" cap="none" spc="0" normalizeH="0" baseline="0" noProof="0" dirty="0">
+                  <a:ln>
+                    <a:noFill/>
+                  </a:ln>
+                  <a:solidFill>
+                    <a:prstClr val="white"/>
+                  </a:solidFill>
+                  <a:effectLst/>
+                  <a:uLnTx/>
+                  <a:uFillTx/>
+                  <a:latin typeface="Calibri" panose="020F0502020204030204"/>
+                  <a:ea typeface="+mn-ea"/>
+                  <a:cs typeface="+mn-cs"/>
+                </a:rPr>
+                <a:t>Prediction</a:t>
+              </a:r>
+            </a:p>
+          </p:txBody>
+        </p:sp>
+      </p:grpSp>
     </p:spTree>
     <p:extLst>
       <p:ext uri="{BB962C8B-B14F-4D97-AF65-F5344CB8AC3E}">

</xml_diff>

<commit_message>
update to histograms to make them look nice for the poster
</commit_message>
<xml_diff>
--- a/poster/NDAC_Poster.pptx
+++ b/poster/NDAC_Poster.pptx
@@ -203,7 +203,7 @@
           <a:p>
             <a:fld id="{F1C0B079-A316-4C9B-B165-DF9EA8325D2C}" type="datetimeFigureOut">
               <a:rPr lang="en-US" smtClean="0"/>
-              <a:t>6/25/2018</a:t>
+              <a:t>6/26/2018</a:t>
             </a:fld>
             <a:endParaRPr lang="en-US"/>
           </a:p>
@@ -368,7 +368,7 @@
           <a:p>
             <a:fld id="{38F28AB8-57D1-494F-9851-055AD867E790}" type="datetimeFigureOut">
               <a:rPr lang="en-US" smtClean="0"/>
-              <a:t>6/25/2018</a:t>
+              <a:t>6/26/2018</a:t>
             </a:fld>
             <a:endParaRPr lang="en-US"/>
           </a:p>
@@ -3570,7 +3570,7 @@
           <a:p>
             <a:fld id="{ECAA57DF-1C19-4726-AB84-014692BAD8F5}" type="datetimeFigureOut">
               <a:rPr lang="en-US" smtClean="0"/>
-              <a:t>6/25/2018</a:t>
+              <a:t>6/26/2018</a:t>
             </a:fld>
             <a:endParaRPr lang="en-US"/>
           </a:p>
@@ -3909,7 +3909,7 @@
             <a:fld id="{ECAA57DF-1C19-4726-AB84-014692BAD8F5}" type="datetimeFigureOut">
               <a:rPr lang="en-US" smtClean="0"/>
               <a:pPr/>
-              <a:t>6/25/2018</a:t>
+              <a:t>6/26/2018</a:t>
             </a:fld>
             <a:endParaRPr lang="en-US"/>
           </a:p>
@@ -4819,55 +4819,6 @@
       </p:sp>
       <p:sp>
         <p:nvSpPr>
-          <p:cNvPr id="16" name="Text Placeholder 15"/>
-          <p:cNvSpPr>
-            <a:spLocks noGrp="1"/>
-          </p:cNvSpPr>
-          <p:nvPr>
-            <p:ph type="body" sz="quarter" idx="29"/>
-          </p:nvPr>
-        </p:nvSpPr>
-        <p:spPr>
-          <a:xfrm>
-            <a:off x="15544800" y="11214466"/>
-            <a:ext cx="12801600" cy="1219200"/>
-          </a:xfrm>
-          <a:gradFill>
-            <a:gsLst>
-              <a:gs pos="0">
-                <a:schemeClr val="tx1">
-                  <a:lumMod val="65000"/>
-                  <a:lumOff val="35000"/>
-                </a:schemeClr>
-              </a:gs>
-              <a:gs pos="91000">
-                <a:srgbClr val="F0A000"/>
-              </a:gs>
-              <a:gs pos="90000">
-                <a:schemeClr val="tx1">
-                  <a:lumMod val="65000"/>
-                  <a:lumOff val="35000"/>
-                </a:schemeClr>
-              </a:gs>
-              <a:gs pos="100000">
-                <a:srgbClr val="F0A000"/>
-              </a:gs>
-            </a:gsLst>
-          </a:gradFill>
-        </p:spPr>
-        <p:txBody>
-          <a:bodyPr/>
-          <a:lstStyle/>
-          <a:p>
-            <a:r>
-              <a:rPr lang="en-US" dirty="0"/>
-              <a:t>Sequence Encoding and Embedding</a:t>
-            </a:r>
-          </a:p>
-        </p:txBody>
-      </p:sp>
-      <p:sp>
-        <p:nvSpPr>
           <p:cNvPr id="18" name="Text Placeholder 17"/>
           <p:cNvSpPr>
             <a:spLocks noGrp="1"/>
@@ -5264,8 +5215,8 @@
         </p:nvSpPr>
         <p:spPr>
           <a:xfrm>
-            <a:off x="22929601" y="6850280"/>
-            <a:ext cx="5412047" cy="2262529"/>
+            <a:off x="15619154" y="6691724"/>
+            <a:ext cx="7240846" cy="6437873"/>
           </a:xfrm>
           <a:prstGeom prst="rect">
             <a:avLst/>
@@ -5275,7 +5226,7 @@
           </a:ln>
         </p:spPr>
         <p:txBody>
-          <a:bodyPr vert="horz" lIns="91440" tIns="91440" rIns="91440" bIns="91440" rtlCol="0" anchor="ctr">
+          <a:bodyPr vert="horz" lIns="91440" tIns="91440" rIns="91440" bIns="91440" rtlCol="0" anchor="t">
             <a:normAutofit/>
           </a:bodyPr>
           <a:lstStyle>
@@ -5494,8 +5445,172 @@
             </a:pPr>
             <a:r>
               <a:rPr lang="en-US" sz="2600" dirty="0"/>
-              <a:t>Description of the dataset here</a:t>
-            </a:r>
+              <a:t>Protein </a:t>
+            </a:r>
+            <a:r>
+              <a:rPr lang="en-US" sz="2600" dirty="0" err="1"/>
+              <a:t>Epitote</a:t>
+            </a:r>
+            <a:r>
+              <a:rPr lang="en-US" sz="2600" dirty="0"/>
+              <a:t> Signature Tags (</a:t>
+            </a:r>
+            <a:r>
+              <a:rPr lang="en-US" sz="2600" dirty="0" err="1"/>
+              <a:t>PrESTs</a:t>
+            </a:r>
+            <a:r>
+              <a:rPr lang="en-US" sz="2600" dirty="0"/>
+              <a:t>), consisting of 20-150 amino acids</a:t>
+            </a:r>
+          </a:p>
+          <a:p>
+            <a:pPr lvl="1">
+              <a:buClrTx/>
+              <a:buSzPct val="150000"/>
+            </a:pPr>
+            <a:r>
+              <a:rPr lang="en-US" sz="2200" dirty="0"/>
+              <a:t>Expressed for Proteomics – Human Protein Atlas (**Ref) </a:t>
+            </a:r>
+          </a:p>
+          <a:p>
+            <a:pPr lvl="1">
+              <a:buClrTx/>
+              <a:buSzPct val="150000"/>
+            </a:pPr>
+            <a:r>
+              <a:rPr lang="en-US" sz="2200" dirty="0"/>
+              <a:t>Classified according to Sastry et. al.</a:t>
+            </a:r>
+          </a:p>
+          <a:p>
+            <a:pPr>
+              <a:buClrTx/>
+              <a:buSzPct val="150000"/>
+            </a:pPr>
+            <a:r>
+              <a:rPr lang="en-US" sz="2600" dirty="0"/>
+              <a:t>Protein expression data for 45,206 </a:t>
+            </a:r>
+            <a:r>
+              <a:rPr lang="en-US" sz="2600" dirty="0" err="1"/>
+              <a:t>PrESTs</a:t>
+            </a:r>
+            <a:endParaRPr lang="en-US" sz="2600" dirty="0"/>
+          </a:p>
+          <a:p>
+            <a:pPr lvl="1">
+              <a:buClrTx/>
+              <a:buSzPct val="150000"/>
+            </a:pPr>
+            <a:r>
+              <a:rPr lang="en-US" sz="2200" dirty="0"/>
+              <a:t>1</a:t>
+            </a:r>
+            <a:r>
+              <a:rPr lang="en-US" sz="2200" baseline="30000" dirty="0"/>
+              <a:t>st</a:t>
+            </a:r>
+            <a:r>
+              <a:rPr lang="en-US" sz="2200" dirty="0"/>
+              <a:t> quantile = low expression (11302 samples)</a:t>
+            </a:r>
+          </a:p>
+          <a:p>
+            <a:pPr lvl="1">
+              <a:buClrTx/>
+              <a:buSzPct val="150000"/>
+            </a:pPr>
+            <a:r>
+              <a:rPr lang="en-US" sz="2200" dirty="0"/>
+              <a:t>4</a:t>
+            </a:r>
+            <a:r>
+              <a:rPr lang="en-US" sz="2200" baseline="30000" dirty="0"/>
+              <a:t>th</a:t>
+            </a:r>
+            <a:r>
+              <a:rPr lang="en-US" sz="2200" dirty="0"/>
+              <a:t> quantile = high expression (11301 samples)</a:t>
+            </a:r>
+          </a:p>
+          <a:p>
+            <a:pPr lvl="1">
+              <a:buClrTx/>
+              <a:buSzPct val="150000"/>
+            </a:pPr>
+            <a:r>
+              <a:rPr lang="en-US" sz="2200" dirty="0"/>
+              <a:t>2</a:t>
+            </a:r>
+            <a:r>
+              <a:rPr lang="en-US" sz="2200" baseline="30000" dirty="0"/>
+              <a:t>nd</a:t>
+            </a:r>
+            <a:r>
+              <a:rPr lang="en-US" sz="2200" dirty="0"/>
+              <a:t> and 3</a:t>
+            </a:r>
+            <a:r>
+              <a:rPr lang="en-US" sz="2200" baseline="30000" dirty="0"/>
+              <a:t>rd</a:t>
+            </a:r>
+            <a:r>
+              <a:rPr lang="en-US" sz="2200" dirty="0"/>
+              <a:t> quantiles removed (22603 samples)</a:t>
+            </a:r>
+          </a:p>
+          <a:p>
+            <a:pPr>
+              <a:buClrTx/>
+              <a:buSzPct val="150000"/>
+            </a:pPr>
+            <a:r>
+              <a:rPr lang="en-US" sz="2600" dirty="0"/>
+              <a:t>Protein solubility data for 16,082 </a:t>
+            </a:r>
+            <a:r>
+              <a:rPr lang="en-US" sz="2600" dirty="0" err="1"/>
+              <a:t>PrESTs</a:t>
+            </a:r>
+            <a:endParaRPr lang="en-US" sz="2600" dirty="0"/>
+          </a:p>
+          <a:p>
+            <a:pPr lvl="1">
+              <a:buClrTx/>
+              <a:buSzPct val="150000"/>
+            </a:pPr>
+            <a:r>
+              <a:rPr lang="en-US" sz="2200" dirty="0"/>
+              <a:t>Low solubility classes 1 - 3.5 (3324 samples)</a:t>
+            </a:r>
+          </a:p>
+          <a:p>
+            <a:pPr lvl="1">
+              <a:buClrTx/>
+              <a:buSzPct val="150000"/>
+            </a:pPr>
+            <a:r>
+              <a:rPr lang="en-US" sz="2200" dirty="0"/>
+              <a:t>High solubility classes 4.5 – 5 (5091 samples)</a:t>
+            </a:r>
+          </a:p>
+          <a:p>
+            <a:pPr lvl="1">
+              <a:buClrTx/>
+              <a:buSzPct val="150000"/>
+            </a:pPr>
+            <a:r>
+              <a:rPr lang="en-US" sz="2200" dirty="0"/>
+              <a:t>Solubility class 4 removed (7667 samples) </a:t>
+            </a:r>
+          </a:p>
+          <a:p>
+            <a:pPr>
+              <a:buClrTx/>
+              <a:buSzPct val="150000"/>
+            </a:pPr>
             <a:endParaRPr lang="en-US" sz="2000" dirty="0"/>
           </a:p>
         </p:txBody>
@@ -9970,6 +10085,84 @@
           </p:style>
         </p:cxnSp>
       </p:grpSp>
+      <p:pic>
+        <p:nvPicPr>
+          <p:cNvPr id="3" name="Graphic 2">
+            <a:extLst>
+              <a:ext uri="{FF2B5EF4-FFF2-40B4-BE49-F238E27FC236}">
+                <a16:creationId xmlns:a16="http://schemas.microsoft.com/office/drawing/2014/main" id="{4DBA3C3C-33F3-4C80-B9C2-58B3F9B6421C}"/>
+              </a:ext>
+            </a:extLst>
+          </p:cNvPr>
+          <p:cNvPicPr>
+            <a:picLocks noChangeAspect="1"/>
+          </p:cNvPicPr>
+          <p:nvPr/>
+        </p:nvPicPr>
+        <p:blipFill>
+          <a:blip r:embed="rId7">
+            <a:extLst>
+              <a:ext uri="{28A0092B-C50C-407E-A947-70E740481C1C}">
+                <a14:useLocalDpi xmlns:a14="http://schemas.microsoft.com/office/drawing/2010/main" val="0"/>
+              </a:ext>
+              <a:ext uri="{96DAC541-7B7A-43D3-8B79-37D633B846F1}">
+                <asvg:svgBlip xmlns:asvg="http://schemas.microsoft.com/office/drawing/2016/SVG/main" r:embed="rId8"/>
+              </a:ext>
+            </a:extLst>
+          </a:blip>
+          <a:stretch>
+            <a:fillRect/>
+          </a:stretch>
+        </p:blipFill>
+        <p:spPr>
+          <a:xfrm>
+            <a:off x="23498175" y="6797917"/>
+            <a:ext cx="4800600" cy="3200400"/>
+          </a:xfrm>
+          <a:prstGeom prst="rect">
+            <a:avLst/>
+          </a:prstGeom>
+        </p:spPr>
+      </p:pic>
+      <p:pic>
+        <p:nvPicPr>
+          <p:cNvPr id="19" name="Graphic 18">
+            <a:extLst>
+              <a:ext uri="{FF2B5EF4-FFF2-40B4-BE49-F238E27FC236}">
+                <a16:creationId xmlns:a16="http://schemas.microsoft.com/office/drawing/2014/main" id="{7B200219-3871-4F29-9461-34FEB7BC1838}"/>
+              </a:ext>
+            </a:extLst>
+          </p:cNvPr>
+          <p:cNvPicPr>
+            <a:picLocks noChangeAspect="1"/>
+          </p:cNvPicPr>
+          <p:nvPr/>
+        </p:nvPicPr>
+        <p:blipFill>
+          <a:blip r:embed="rId9">
+            <a:extLst>
+              <a:ext uri="{28A0092B-C50C-407E-A947-70E740481C1C}">
+                <a14:useLocalDpi xmlns:a14="http://schemas.microsoft.com/office/drawing/2010/main" val="0"/>
+              </a:ext>
+              <a:ext uri="{96DAC541-7B7A-43D3-8B79-37D633B846F1}">
+                <asvg:svgBlip xmlns:asvg="http://schemas.microsoft.com/office/drawing/2016/SVG/main" r:embed="rId10"/>
+              </a:ext>
+            </a:extLst>
+          </a:blip>
+          <a:stretch>
+            <a:fillRect/>
+          </a:stretch>
+        </p:blipFill>
+        <p:spPr>
+          <a:xfrm>
+            <a:off x="23446635" y="9750324"/>
+            <a:ext cx="4800600" cy="3200400"/>
+          </a:xfrm>
+          <a:prstGeom prst="rect">
+            <a:avLst/>
+          </a:prstGeom>
+        </p:spPr>
+      </p:pic>
     </p:spTree>
     <p:extLst>
       <p:ext uri="{BB962C8B-B14F-4D97-AF65-F5344CB8AC3E}">

</xml_diff>

<commit_message>
poster update and added abstract
</commit_message>
<xml_diff>
--- a/poster/NDAC_Poster.pptx
+++ b/poster/NDAC_Poster.pptx
@@ -4700,7 +4700,7 @@
         </p:nvSpPr>
         <p:spPr>
           <a:xfrm>
-            <a:off x="1143000" y="11558030"/>
+            <a:off x="1143000" y="10967480"/>
             <a:ext cx="12801600" cy="1280160"/>
           </a:xfrm>
           <a:gradFill>
@@ -4749,13 +4749,13 @@
         </p:nvSpPr>
         <p:spPr>
           <a:xfrm>
-            <a:off x="1158240" y="12794116"/>
-            <a:ext cx="12801600" cy="1978242"/>
+            <a:off x="1158240" y="12355601"/>
+            <a:ext cx="12801600" cy="1581131"/>
           </a:xfrm>
         </p:spPr>
         <p:txBody>
           <a:bodyPr lIns="0" tIns="0" rIns="0" bIns="0">
-            <a:normAutofit/>
+            <a:normAutofit fontScale="92500"/>
           </a:bodyPr>
           <a:lstStyle/>
           <a:p>
@@ -4765,9 +4765,22 @@
             </a:pPr>
             <a:r>
               <a:rPr lang="en-US" sz="2800" dirty="0"/>
-              <a:t>Classify protein expression level based on sequence data </a:t>
-            </a:r>
-            <a:endParaRPr lang="en-US" dirty="0"/>
+              <a:t>Use data generated by the Human Protein Atlas to predict protein expression and solubility directly from DNA or amino acid sequences using a neural network.</a:t>
+            </a:r>
+          </a:p>
+          <a:p>
+            <a:pPr algn="just">
+              <a:buClrTx/>
+              <a:buSzPct val="150000"/>
+            </a:pPr>
+            <a:r>
+              <a:rPr lang="en-US" sz="2800" dirty="0"/>
+              <a:t>Compare this approach with the computational biology approach of Sastry et. al.</a:t>
+            </a:r>
+            <a:r>
+              <a:rPr lang="en-US" sz="2800" baseline="30000" dirty="0"/>
+              <a:t>1</a:t>
+            </a:r>
           </a:p>
         </p:txBody>
       </p:sp>
@@ -4783,7 +4796,7 @@
         </p:nvSpPr>
         <p:spPr>
           <a:xfrm>
-            <a:off x="1143000" y="13860780"/>
+            <a:off x="1143000" y="14603730"/>
             <a:ext cx="12801600" cy="1219200"/>
           </a:xfrm>
           <a:gradFill>
@@ -4980,7 +4993,7 @@
         </p:nvSpPr>
         <p:spPr>
           <a:xfrm>
-            <a:off x="29900880" y="20046996"/>
+            <a:off x="29900880" y="21247146"/>
             <a:ext cx="12801600" cy="1219200"/>
           </a:xfrm>
           <a:gradFill>
@@ -5030,8 +5043,8 @@
         </p:nvSpPr>
         <p:spPr>
           <a:xfrm>
-            <a:off x="29900880" y="21491748"/>
-            <a:ext cx="12801600" cy="4344786"/>
+            <a:off x="29900880" y="22691898"/>
+            <a:ext cx="12801600" cy="3183217"/>
           </a:xfrm>
         </p:spPr>
         <p:txBody>
@@ -5062,7 +5075,7 @@
         </p:nvSpPr>
         <p:spPr>
           <a:xfrm>
-            <a:off x="29900880" y="25664019"/>
+            <a:off x="29900880" y="25968819"/>
             <a:ext cx="12801600" cy="1219200"/>
           </a:xfrm>
           <a:gradFill>
@@ -5111,8 +5124,8 @@
         </p:nvSpPr>
         <p:spPr>
           <a:xfrm>
-            <a:off x="29900880" y="26963626"/>
-            <a:ext cx="12801600" cy="2851053"/>
+            <a:off x="29900880" y="27268427"/>
+            <a:ext cx="12801600" cy="2830574"/>
           </a:xfrm>
         </p:spPr>
         <p:txBody>
@@ -5126,7 +5139,19 @@
             </a:pPr>
             <a:r>
               <a:rPr lang="en-US" dirty="0"/>
-              <a:t>1.  Sastry …</a:t>
+              <a:t>1</a:t>
+            </a:r>
+            <a:r>
+              <a:rPr lang="en-US" sz="2800" dirty="0"/>
+              <a:t>. Sastry, Anand, et al. </a:t>
+            </a:r>
+            <a:r>
+              <a:rPr lang="en-US" sz="2800" i="1" dirty="0"/>
+              <a:t>Machine Learning in Computational Biology to Accelerate High-Throughput Protein Expression.</a:t>
+            </a:r>
+            <a:r>
+              <a:rPr lang="en-US" sz="2800" dirty="0"/>
+              <a:t> 2017</a:t>
             </a:r>
           </a:p>
           <a:p>
@@ -5134,46 +5159,56 @@
               <a:buNone/>
             </a:pPr>
             <a:r>
-              <a:rPr lang="en-US" dirty="0"/>
-              <a:t>2.  C-LSTM paper</a:t>
+              <a:rPr lang="en-US" sz="2800" dirty="0"/>
+              <a:t>2. Zhou, </a:t>
+            </a:r>
+            <a:r>
+              <a:rPr lang="en-US" sz="2800" dirty="0" err="1"/>
+              <a:t>Chunting</a:t>
+            </a:r>
+            <a:r>
+              <a:rPr lang="en-US" sz="2800" dirty="0"/>
+              <a:t>, et al. </a:t>
+            </a:r>
+            <a:r>
+              <a:rPr lang="en-US" sz="2800" i="1" dirty="0"/>
+              <a:t>A C-LSTM Neural Network for Text Classification.</a:t>
+            </a:r>
+            <a:r>
+              <a:rPr lang="en-US" sz="2800" dirty="0"/>
+              <a:t> 2015</a:t>
             </a:r>
           </a:p>
           <a:p>
             <a:pPr marL="0" indent="0">
               <a:buNone/>
             </a:pPr>
-            <a:endParaRPr lang="en-US" sz="1600" dirty="0"/>
-          </a:p>
-          <a:p>
-            <a:pPr marL="0" indent="0">
-              <a:buNone/>
-            </a:pPr>
-            <a:r>
-              <a:rPr lang="en-US" dirty="0"/>
+            <a:r>
+              <a:rPr lang="en-US" sz="2800" dirty="0"/>
               <a:t>This work makes use of: </a:t>
             </a:r>
             <a:r>
-              <a:rPr lang="en-US" dirty="0" err="1"/>
+              <a:rPr lang="en-US" sz="2800" dirty="0" err="1"/>
               <a:t>Keras</a:t>
             </a:r>
             <a:r>
-              <a:rPr lang="en-US" dirty="0"/>
+              <a:rPr lang="en-US" sz="2800" dirty="0"/>
               <a:t>, TensorFlow, matplotlib, </a:t>
             </a:r>
             <a:r>
-              <a:rPr lang="en-US" dirty="0" err="1"/>
+              <a:rPr lang="en-US" sz="2800" dirty="0" err="1"/>
               <a:t>sklearn</a:t>
             </a:r>
             <a:r>
-              <a:rPr lang="en-US" dirty="0"/>
+              <a:rPr lang="en-US" sz="2800" dirty="0"/>
               <a:t>, 	 h5py, </a:t>
             </a:r>
             <a:r>
-              <a:rPr lang="en-US" dirty="0" err="1"/>
+              <a:rPr lang="en-US" sz="2800" dirty="0" err="1"/>
               <a:t>numpy</a:t>
             </a:r>
             <a:r>
-              <a:rPr lang="en-US" dirty="0"/>
+              <a:rPr lang="en-US" sz="2800" dirty="0"/>
               <a:t>, and pandas</a:t>
             </a:r>
           </a:p>
@@ -5958,7 +5993,7 @@
         </p:nvSpPr>
         <p:spPr>
           <a:xfrm>
-            <a:off x="998397" y="15215641"/>
+            <a:off x="998397" y="15958591"/>
             <a:ext cx="12801600" cy="801200"/>
           </a:xfrm>
           <a:prstGeom prst="rect">
@@ -6214,7 +6249,7 @@
         </p:nvSpPr>
         <p:spPr>
           <a:xfrm>
-            <a:off x="631997" y="20240161"/>
+            <a:off x="631997" y="20983111"/>
             <a:ext cx="12801600" cy="723655"/>
           </a:xfrm>
           <a:prstGeom prst="rect">
@@ -6470,7 +6505,7 @@
         </p:nvSpPr>
         <p:spPr>
           <a:xfrm>
-            <a:off x="1253218" y="24862641"/>
+            <a:off x="1253218" y="25605591"/>
             <a:ext cx="12801600" cy="1483343"/>
           </a:xfrm>
           <a:prstGeom prst="rect">
@@ -6719,7 +6754,7 @@
         </p:nvSpPr>
         <p:spPr>
           <a:xfrm>
-            <a:off x="1178365" y="18967410"/>
+            <a:off x="1178365" y="19710360"/>
             <a:ext cx="12801600" cy="1483343"/>
           </a:xfrm>
           <a:prstGeom prst="rect">
@@ -7351,7 +7386,7 @@
         </p:nvSpPr>
         <p:spPr>
           <a:xfrm>
-            <a:off x="1253219" y="16016841"/>
+            <a:off x="1253219" y="16759791"/>
             <a:ext cx="12367531" cy="2725149"/>
           </a:xfrm>
           <a:prstGeom prst="rect">
@@ -7788,7 +7823,7 @@
         </p:nvSpPr>
         <p:spPr>
           <a:xfrm>
-            <a:off x="1253218" y="21206866"/>
+            <a:off x="1253218" y="21949816"/>
             <a:ext cx="12367531" cy="2725149"/>
           </a:xfrm>
           <a:prstGeom prst="rect">
@@ -10408,8 +10443,8 @@
         </p:nvSpPr>
         <p:spPr>
           <a:xfrm>
-            <a:off x="1253218" y="6859413"/>
-            <a:ext cx="12576990" cy="3539430"/>
+            <a:off x="1253218" y="9097788"/>
+            <a:ext cx="12576990" cy="1815882"/>
           </a:xfrm>
           <a:prstGeom prst="rect">
             <a:avLst/>
@@ -10425,6 +10460,42 @@
             <a:pPr algn="just"/>
             <a:r>
               <a:rPr lang="en-US" sz="2800" dirty="0"/>
+              <a:t>Currently the protein atlas targets 17,000 unique proteins using 26,009 antibodies.  Finding recombinant DNA sequences that express well requires extensive experimentation that could be reduced using high performance computing. </a:t>
+            </a:r>
+          </a:p>
+        </p:txBody>
+      </p:sp>
+      <p:sp>
+        <p:nvSpPr>
+          <p:cNvPr id="122" name="TextBox 121">
+            <a:extLst>
+              <a:ext uri="{FF2B5EF4-FFF2-40B4-BE49-F238E27FC236}">
+                <a16:creationId xmlns:a16="http://schemas.microsoft.com/office/drawing/2014/main" id="{CB0995F5-E783-4AE2-9012-C1A17BAA625C}"/>
+              </a:ext>
+            </a:extLst>
+          </p:cNvPr>
+          <p:cNvSpPr txBox="1"/>
+          <p:nvPr/>
+        </p:nvSpPr>
+        <p:spPr>
+          <a:xfrm>
+            <a:off x="1215117" y="6945138"/>
+            <a:ext cx="6449063" cy="2246769"/>
+          </a:xfrm>
+          <a:prstGeom prst="rect">
+            <a:avLst/>
+          </a:prstGeom>
+          <a:noFill/>
+        </p:spPr>
+        <p:txBody>
+          <a:bodyPr wrap="square" rtlCol="0">
+            <a:spAutoFit/>
+          </a:bodyPr>
+          <a:lstStyle/>
+          <a:p>
+            <a:pPr algn="just"/>
+            <a:r>
+              <a:rPr lang="en-US" sz="2800" dirty="0"/>
               <a:t>The Human Protein Atlas aims to map </a:t>
             </a:r>
           </a:p>
@@ -10432,41 +10503,8 @@
             <a:pPr algn="just"/>
             <a:r>
               <a:rPr lang="en-US" sz="2800" dirty="0"/>
-              <a:t>all the proteins in the human body.  This</a:t>
-            </a:r>
-          </a:p>
-          <a:p>
-            <a:pPr algn="just"/>
-            <a:r>
-              <a:rPr lang="en-US" sz="2800" dirty="0"/>
-              <a:t>ambitious goal requires expressing </a:t>
-            </a:r>
-          </a:p>
-          <a:p>
-            <a:pPr algn="just"/>
-            <a:r>
-              <a:rPr lang="en-US" sz="2800" dirty="0"/>
-              <a:t>thousands of different recombinant </a:t>
-            </a:r>
-          </a:p>
-          <a:p>
-            <a:pPr algn="just"/>
-            <a:r>
-              <a:rPr lang="en-US" sz="2800" dirty="0"/>
-              <a:t>proteins. Currently the protein atlas </a:t>
-            </a:r>
-          </a:p>
-          <a:p>
-            <a:pPr algn="just"/>
-            <a:r>
-              <a:rPr lang="en-US" sz="2800" dirty="0"/>
-              <a:t>Targets 17,000 unique proteins using 26,009 antibodies.  Finding recombinant proteins that express well requires extensive experimentation that could be reduced with the use </a:t>
-            </a:r>
-            <a:r>
-              <a:rPr lang="en-US" sz="2800"/>
-              <a:t>of computational methods.   </a:t>
-            </a:r>
-            <a:endParaRPr lang="en-US" sz="2800" dirty="0"/>
+              <a:t>all the proteins in the human body. This ambitious goal requires expressing thousands of different recombinant proteins to generate antibodies. </a:t>
+            </a:r>
           </a:p>
         </p:txBody>
       </p:sp>

</xml_diff>

<commit_message>
updated poster layout to give more room for results and added draft of results
</commit_message>
<xml_diff>
--- a/poster/NDAC_Poster.pptx
+++ b/poster/NDAC_Poster.pptx
@@ -4786,55 +4786,6 @@
       </p:sp>
       <p:sp>
         <p:nvSpPr>
-          <p:cNvPr id="7" name="Text Placeholder 6"/>
-          <p:cNvSpPr>
-            <a:spLocks noGrp="1"/>
-          </p:cNvSpPr>
-          <p:nvPr>
-            <p:ph type="body" sz="quarter" idx="17"/>
-          </p:nvPr>
-        </p:nvSpPr>
-        <p:spPr>
-          <a:xfrm>
-            <a:off x="1143000" y="14603730"/>
-            <a:ext cx="12801600" cy="1219200"/>
-          </a:xfrm>
-          <a:gradFill>
-            <a:gsLst>
-              <a:gs pos="0">
-                <a:schemeClr val="tx1">
-                  <a:lumMod val="65000"/>
-                  <a:lumOff val="35000"/>
-                </a:schemeClr>
-              </a:gs>
-              <a:gs pos="91000">
-                <a:srgbClr val="F0A000"/>
-              </a:gs>
-              <a:gs pos="90000">
-                <a:schemeClr val="tx1">
-                  <a:lumMod val="65000"/>
-                  <a:lumOff val="35000"/>
-                </a:schemeClr>
-              </a:gs>
-              <a:gs pos="100000">
-                <a:srgbClr val="F0A000"/>
-              </a:gs>
-            </a:gsLst>
-          </a:gradFill>
-        </p:spPr>
-        <p:txBody>
-          <a:bodyPr/>
-          <a:lstStyle/>
-          <a:p>
-            <a:r>
-              <a:rPr lang="en-US" dirty="0"/>
-              <a:t>Methods</a:t>
-            </a:r>
-          </a:p>
-        </p:txBody>
-      </p:sp>
-      <p:sp>
-        <p:nvSpPr>
           <p:cNvPr id="9" name="Text Placeholder 8"/>
           <p:cNvSpPr>
             <a:spLocks noGrp="1"/>
@@ -4927,56 +4878,6 @@
             <a:r>
               <a:rPr lang="en-US" dirty="0"/>
               <a:t>Results</a:t>
-            </a:r>
-          </a:p>
-        </p:txBody>
-      </p:sp>
-      <p:sp>
-        <p:nvSpPr>
-          <p:cNvPr id="6" name="Content Placeholder 5"/>
-          <p:cNvSpPr>
-            <a:spLocks noGrp="1"/>
-          </p:cNvSpPr>
-          <p:nvPr>
-            <p:ph sz="quarter" idx="33"/>
-          </p:nvPr>
-        </p:nvSpPr>
-        <p:spPr>
-          <a:xfrm>
-            <a:off x="35555002" y="13281828"/>
-            <a:ext cx="6196212" cy="6009194"/>
-          </a:xfrm>
-        </p:spPr>
-        <p:txBody>
-          <a:bodyPr wrap="square">
-            <a:noAutofit/>
-          </a:bodyPr>
-          <a:lstStyle/>
-          <a:p>
-            <a:pPr marL="0" indent="0" algn="ctr">
-              <a:buNone/>
-            </a:pPr>
-            <a:r>
-              <a:rPr lang="en-US" sz="3000" b="1" dirty="0"/>
-              <a:t>Classification results here.</a:t>
-            </a:r>
-          </a:p>
-          <a:p>
-            <a:pPr>
-              <a:buClrTx/>
-            </a:pPr>
-            <a:r>
-              <a:rPr lang="en-US" sz="2400" dirty="0"/>
-              <a:t>Sensitivity analysis for different quantiles</a:t>
-            </a:r>
-          </a:p>
-          <a:p>
-            <a:pPr>
-              <a:buClrTx/>
-            </a:pPr>
-            <a:r>
-              <a:rPr lang="en-US" sz="2400" dirty="0"/>
-              <a:t>Other descriptions of the results…</a:t>
             </a:r>
           </a:p>
         </p:txBody>
@@ -5560,14 +5461,6 @@
               <a:rPr lang="en-US" sz="2200" dirty="0"/>
               <a:t>Expressed for Proteomics – Human Protein Atlas </a:t>
             </a:r>
-            <a:r>
-              <a:rPr lang="en-US" sz="2200" dirty="0">
-                <a:solidFill>
-                  <a:srgbClr val="FF0000"/>
-                </a:solidFill>
-              </a:rPr>
-              <a:t>(**Ref) </a:t>
-            </a:r>
           </a:p>
           <a:p>
             <a:pPr lvl="1">
@@ -5726,7 +5619,7 @@
         </p:nvSpPr>
         <p:spPr>
           <a:xfrm>
-            <a:off x="15520262" y="14270268"/>
+            <a:off x="1143000" y="14116829"/>
             <a:ext cx="12801600" cy="1219200"/>
           </a:xfrm>
           <a:prstGeom prst="rect">
@@ -5973,1016 +5866,6 @@
             <a:r>
               <a:rPr lang="en-US" dirty="0"/>
               <a:t>The Network</a:t>
-            </a:r>
-          </a:p>
-        </p:txBody>
-      </p:sp>
-      <p:sp>
-        <p:nvSpPr>
-          <p:cNvPr id="85" name="Content Placeholder 10">
-            <a:extLst>
-              <a:ext uri="{FF2B5EF4-FFF2-40B4-BE49-F238E27FC236}">
-                <a16:creationId xmlns:a16="http://schemas.microsoft.com/office/drawing/2014/main" id="{BCFD37B6-77F3-485E-9136-BAA0EFEAC39B}"/>
-              </a:ext>
-            </a:extLst>
-          </p:cNvPr>
-          <p:cNvSpPr txBox="1">
-            <a:spLocks/>
-          </p:cNvSpPr>
-          <p:nvPr/>
-        </p:nvSpPr>
-        <p:spPr>
-          <a:xfrm>
-            <a:off x="998397" y="15958591"/>
-            <a:ext cx="12801600" cy="801200"/>
-          </a:xfrm>
-          <a:prstGeom prst="rect">
-            <a:avLst/>
-          </a:prstGeom>
-        </p:spPr>
-        <p:txBody>
-          <a:bodyPr vert="horz" lIns="0" tIns="0" rIns="0" bIns="0" rtlCol="0">
-            <a:normAutofit/>
-          </a:bodyPr>
-          <a:lstStyle>
-            <a:lvl1pPr marL="457200" indent="-457200" algn="l" defTabSz="4389120" rtl="0" eaLnBrk="1" latinLnBrk="0" hangingPunct="1">
-              <a:lnSpc>
-                <a:spcPct val="100000"/>
-              </a:lnSpc>
-              <a:spcBef>
-                <a:spcPts val="1200"/>
-              </a:spcBef>
-              <a:buClr>
-                <a:schemeClr val="bg1">
-                  <a:lumMod val="65000"/>
-                </a:schemeClr>
-              </a:buClr>
-              <a:buFont typeface="Arial" panose="020B0604020202020204" pitchFamily="34" charset="0"/>
-              <a:buChar char="•"/>
-              <a:defRPr sz="3200" kern="1200" baseline="0">
-                <a:solidFill>
-                  <a:schemeClr val="tx1"/>
-                </a:solidFill>
-                <a:latin typeface="+mn-lt"/>
-                <a:ea typeface="+mn-ea"/>
-                <a:cs typeface="+mn-cs"/>
-              </a:defRPr>
-            </a:lvl1pPr>
-            <a:lvl2pPr marL="1097280" indent="-457200" algn="l" defTabSz="4389120" rtl="0" eaLnBrk="1" latinLnBrk="0" hangingPunct="1">
-              <a:lnSpc>
-                <a:spcPct val="100000"/>
-              </a:lnSpc>
-              <a:spcBef>
-                <a:spcPts val="1200"/>
-              </a:spcBef>
-              <a:buClr>
-                <a:schemeClr val="bg1">
-                  <a:lumMod val="65000"/>
-                </a:schemeClr>
-              </a:buClr>
-              <a:buFont typeface="Arial" panose="020B0604020202020204" pitchFamily="34" charset="0"/>
-              <a:buChar char="•"/>
-              <a:defRPr sz="2800" kern="1200">
-                <a:solidFill>
-                  <a:schemeClr val="tx1"/>
-                </a:solidFill>
-                <a:latin typeface="+mn-lt"/>
-                <a:ea typeface="+mn-ea"/>
-                <a:cs typeface="+mn-cs"/>
-              </a:defRPr>
-            </a:lvl2pPr>
-            <a:lvl3pPr marL="1097280" indent="-457200" algn="l" defTabSz="4389120" rtl="0" eaLnBrk="1" latinLnBrk="0" hangingPunct="1">
-              <a:lnSpc>
-                <a:spcPct val="100000"/>
-              </a:lnSpc>
-              <a:spcBef>
-                <a:spcPts val="1200"/>
-              </a:spcBef>
-              <a:buClr>
-                <a:schemeClr val="bg1">
-                  <a:lumMod val="65000"/>
-                </a:schemeClr>
-              </a:buClr>
-              <a:buFont typeface="Arial" panose="020B0604020202020204" pitchFamily="34" charset="0"/>
-              <a:buChar char="•"/>
-              <a:defRPr sz="2800" kern="1200">
-                <a:solidFill>
-                  <a:schemeClr val="tx1"/>
-                </a:solidFill>
-                <a:latin typeface="+mn-lt"/>
-                <a:ea typeface="+mn-ea"/>
-                <a:cs typeface="+mn-cs"/>
-              </a:defRPr>
-            </a:lvl3pPr>
-            <a:lvl4pPr marL="1097280" indent="-457200" algn="l" defTabSz="4389120" rtl="0" eaLnBrk="1" latinLnBrk="0" hangingPunct="1">
-              <a:lnSpc>
-                <a:spcPct val="100000"/>
-              </a:lnSpc>
-              <a:spcBef>
-                <a:spcPts val="1200"/>
-              </a:spcBef>
-              <a:buClr>
-                <a:schemeClr val="bg1">
-                  <a:lumMod val="65000"/>
-                </a:schemeClr>
-              </a:buClr>
-              <a:buFont typeface="Arial" panose="020B0604020202020204" pitchFamily="34" charset="0"/>
-              <a:buChar char="•"/>
-              <a:defRPr sz="2800" kern="1200">
-                <a:solidFill>
-                  <a:schemeClr val="tx1"/>
-                </a:solidFill>
-                <a:latin typeface="+mn-lt"/>
-                <a:ea typeface="+mn-ea"/>
-                <a:cs typeface="+mn-cs"/>
-              </a:defRPr>
-            </a:lvl4pPr>
-            <a:lvl5pPr marL="1097280" indent="-457200" algn="l" defTabSz="4389120" rtl="0" eaLnBrk="1" latinLnBrk="0" hangingPunct="1">
-              <a:lnSpc>
-                <a:spcPct val="100000"/>
-              </a:lnSpc>
-              <a:spcBef>
-                <a:spcPts val="1200"/>
-              </a:spcBef>
-              <a:buClr>
-                <a:schemeClr val="bg1">
-                  <a:lumMod val="65000"/>
-                </a:schemeClr>
-              </a:buClr>
-              <a:buFont typeface="Arial" panose="020B0604020202020204" pitchFamily="34" charset="0"/>
-              <a:buChar char="•"/>
-              <a:defRPr sz="2800" kern="1200">
-                <a:solidFill>
-                  <a:schemeClr val="tx1"/>
-                </a:solidFill>
-                <a:latin typeface="+mn-lt"/>
-                <a:ea typeface="+mn-ea"/>
-                <a:cs typeface="+mn-cs"/>
-              </a:defRPr>
-            </a:lvl5pPr>
-            <a:lvl6pPr marL="1097280" indent="-457200" algn="l" defTabSz="4389120" rtl="0" eaLnBrk="1" latinLnBrk="0" hangingPunct="1">
-              <a:lnSpc>
-                <a:spcPct val="100000"/>
-              </a:lnSpc>
-              <a:spcBef>
-                <a:spcPts val="1200"/>
-              </a:spcBef>
-              <a:buClr>
-                <a:schemeClr val="bg1">
-                  <a:lumMod val="65000"/>
-                </a:schemeClr>
-              </a:buClr>
-              <a:buFont typeface="Arial" panose="020B0604020202020204" pitchFamily="34" charset="0"/>
-              <a:buChar char="•"/>
-              <a:defRPr sz="2800" kern="1200">
-                <a:solidFill>
-                  <a:schemeClr val="tx1"/>
-                </a:solidFill>
-                <a:latin typeface="+mn-lt"/>
-                <a:ea typeface="+mn-ea"/>
-                <a:cs typeface="+mn-cs"/>
-              </a:defRPr>
-            </a:lvl6pPr>
-            <a:lvl7pPr marL="1097280" indent="-457200" algn="l" defTabSz="4389120" rtl="0" eaLnBrk="1" latinLnBrk="0" hangingPunct="1">
-              <a:lnSpc>
-                <a:spcPct val="100000"/>
-              </a:lnSpc>
-              <a:spcBef>
-                <a:spcPts val="1200"/>
-              </a:spcBef>
-              <a:buClr>
-                <a:schemeClr val="bg1">
-                  <a:lumMod val="65000"/>
-                </a:schemeClr>
-              </a:buClr>
-              <a:buFont typeface="Arial" panose="020B0604020202020204" pitchFamily="34" charset="0"/>
-              <a:buChar char="•"/>
-              <a:defRPr sz="2800" kern="1200">
-                <a:solidFill>
-                  <a:schemeClr val="tx1"/>
-                </a:solidFill>
-                <a:latin typeface="+mn-lt"/>
-                <a:ea typeface="+mn-ea"/>
-                <a:cs typeface="+mn-cs"/>
-              </a:defRPr>
-            </a:lvl7pPr>
-            <a:lvl8pPr marL="1097280" indent="-457200" algn="l" defTabSz="4389120" rtl="0" eaLnBrk="1" latinLnBrk="0" hangingPunct="1">
-              <a:lnSpc>
-                <a:spcPct val="100000"/>
-              </a:lnSpc>
-              <a:spcBef>
-                <a:spcPts val="1200"/>
-              </a:spcBef>
-              <a:buClr>
-                <a:schemeClr val="bg1">
-                  <a:lumMod val="65000"/>
-                </a:schemeClr>
-              </a:buClr>
-              <a:buFont typeface="Arial" panose="020B0604020202020204" pitchFamily="34" charset="0"/>
-              <a:buChar char="•"/>
-              <a:defRPr sz="2800" kern="1200">
-                <a:solidFill>
-                  <a:schemeClr val="tx1"/>
-                </a:solidFill>
-                <a:latin typeface="+mn-lt"/>
-                <a:ea typeface="+mn-ea"/>
-                <a:cs typeface="+mn-cs"/>
-              </a:defRPr>
-            </a:lvl8pPr>
-            <a:lvl9pPr marL="1097280" indent="-457200" algn="l" defTabSz="4389120" rtl="0" eaLnBrk="1" latinLnBrk="0" hangingPunct="1">
-              <a:lnSpc>
-                <a:spcPct val="100000"/>
-              </a:lnSpc>
-              <a:spcBef>
-                <a:spcPts val="1200"/>
-              </a:spcBef>
-              <a:buClr>
-                <a:schemeClr val="bg1">
-                  <a:lumMod val="65000"/>
-                </a:schemeClr>
-              </a:buClr>
-              <a:buFont typeface="Arial" panose="020B0604020202020204" pitchFamily="34" charset="0"/>
-              <a:buChar char="•"/>
-              <a:defRPr sz="2800" kern="1200">
-                <a:solidFill>
-                  <a:schemeClr val="tx1"/>
-                </a:solidFill>
-                <a:latin typeface="+mn-lt"/>
-                <a:ea typeface="+mn-ea"/>
-                <a:cs typeface="+mn-cs"/>
-              </a:defRPr>
-            </a:lvl9pPr>
-          </a:lstStyle>
-          <a:p>
-            <a:pPr marL="0" indent="0" algn="ctr">
-              <a:buClrTx/>
-              <a:buSzPct val="150000"/>
-              <a:buNone/>
-            </a:pPr>
-            <a:r>
-              <a:rPr lang="en-US" sz="3600" u="sng" dirty="0"/>
-              <a:t>Property Calculation Method Used by Sastry et al</a:t>
-            </a:r>
-          </a:p>
-          <a:p>
-            <a:pPr algn="just">
-              <a:buClrTx/>
-              <a:buSzPct val="150000"/>
-            </a:pPr>
-            <a:endParaRPr lang="en-US" dirty="0"/>
-          </a:p>
-        </p:txBody>
-      </p:sp>
-      <p:sp>
-        <p:nvSpPr>
-          <p:cNvPr id="86" name="Content Placeholder 10">
-            <a:extLst>
-              <a:ext uri="{FF2B5EF4-FFF2-40B4-BE49-F238E27FC236}">
-                <a16:creationId xmlns:a16="http://schemas.microsoft.com/office/drawing/2014/main" id="{C95ECE3B-C67E-4787-9800-8B08E493284E}"/>
-              </a:ext>
-            </a:extLst>
-          </p:cNvPr>
-          <p:cNvSpPr txBox="1">
-            <a:spLocks/>
-          </p:cNvSpPr>
-          <p:nvPr/>
-        </p:nvSpPr>
-        <p:spPr>
-          <a:xfrm>
-            <a:off x="631997" y="20983111"/>
-            <a:ext cx="12801600" cy="723655"/>
-          </a:xfrm>
-          <a:prstGeom prst="rect">
-            <a:avLst/>
-          </a:prstGeom>
-        </p:spPr>
-        <p:txBody>
-          <a:bodyPr vert="horz" lIns="0" tIns="0" rIns="0" bIns="0" rtlCol="0">
-            <a:normAutofit/>
-          </a:bodyPr>
-          <a:lstStyle>
-            <a:lvl1pPr marL="457200" indent="-457200" algn="l" defTabSz="4389120" rtl="0" eaLnBrk="1" latinLnBrk="0" hangingPunct="1">
-              <a:lnSpc>
-                <a:spcPct val="100000"/>
-              </a:lnSpc>
-              <a:spcBef>
-                <a:spcPts val="1200"/>
-              </a:spcBef>
-              <a:buClr>
-                <a:schemeClr val="bg1">
-                  <a:lumMod val="65000"/>
-                </a:schemeClr>
-              </a:buClr>
-              <a:buFont typeface="Arial" panose="020B0604020202020204" pitchFamily="34" charset="0"/>
-              <a:buChar char="•"/>
-              <a:defRPr sz="3200" kern="1200" baseline="0">
-                <a:solidFill>
-                  <a:schemeClr val="tx1"/>
-                </a:solidFill>
-                <a:latin typeface="+mn-lt"/>
-                <a:ea typeface="+mn-ea"/>
-                <a:cs typeface="+mn-cs"/>
-              </a:defRPr>
-            </a:lvl1pPr>
-            <a:lvl2pPr marL="1097280" indent="-457200" algn="l" defTabSz="4389120" rtl="0" eaLnBrk="1" latinLnBrk="0" hangingPunct="1">
-              <a:lnSpc>
-                <a:spcPct val="100000"/>
-              </a:lnSpc>
-              <a:spcBef>
-                <a:spcPts val="1200"/>
-              </a:spcBef>
-              <a:buClr>
-                <a:schemeClr val="bg1">
-                  <a:lumMod val="65000"/>
-                </a:schemeClr>
-              </a:buClr>
-              <a:buFont typeface="Arial" panose="020B0604020202020204" pitchFamily="34" charset="0"/>
-              <a:buChar char="•"/>
-              <a:defRPr sz="2800" kern="1200">
-                <a:solidFill>
-                  <a:schemeClr val="tx1"/>
-                </a:solidFill>
-                <a:latin typeface="+mn-lt"/>
-                <a:ea typeface="+mn-ea"/>
-                <a:cs typeface="+mn-cs"/>
-              </a:defRPr>
-            </a:lvl2pPr>
-            <a:lvl3pPr marL="1097280" indent="-457200" algn="l" defTabSz="4389120" rtl="0" eaLnBrk="1" latinLnBrk="0" hangingPunct="1">
-              <a:lnSpc>
-                <a:spcPct val="100000"/>
-              </a:lnSpc>
-              <a:spcBef>
-                <a:spcPts val="1200"/>
-              </a:spcBef>
-              <a:buClr>
-                <a:schemeClr val="bg1">
-                  <a:lumMod val="65000"/>
-                </a:schemeClr>
-              </a:buClr>
-              <a:buFont typeface="Arial" panose="020B0604020202020204" pitchFamily="34" charset="0"/>
-              <a:buChar char="•"/>
-              <a:defRPr sz="2800" kern="1200">
-                <a:solidFill>
-                  <a:schemeClr val="tx1"/>
-                </a:solidFill>
-                <a:latin typeface="+mn-lt"/>
-                <a:ea typeface="+mn-ea"/>
-                <a:cs typeface="+mn-cs"/>
-              </a:defRPr>
-            </a:lvl3pPr>
-            <a:lvl4pPr marL="1097280" indent="-457200" algn="l" defTabSz="4389120" rtl="0" eaLnBrk="1" latinLnBrk="0" hangingPunct="1">
-              <a:lnSpc>
-                <a:spcPct val="100000"/>
-              </a:lnSpc>
-              <a:spcBef>
-                <a:spcPts val="1200"/>
-              </a:spcBef>
-              <a:buClr>
-                <a:schemeClr val="bg1">
-                  <a:lumMod val="65000"/>
-                </a:schemeClr>
-              </a:buClr>
-              <a:buFont typeface="Arial" panose="020B0604020202020204" pitchFamily="34" charset="0"/>
-              <a:buChar char="•"/>
-              <a:defRPr sz="2800" kern="1200">
-                <a:solidFill>
-                  <a:schemeClr val="tx1"/>
-                </a:solidFill>
-                <a:latin typeface="+mn-lt"/>
-                <a:ea typeface="+mn-ea"/>
-                <a:cs typeface="+mn-cs"/>
-              </a:defRPr>
-            </a:lvl4pPr>
-            <a:lvl5pPr marL="1097280" indent="-457200" algn="l" defTabSz="4389120" rtl="0" eaLnBrk="1" latinLnBrk="0" hangingPunct="1">
-              <a:lnSpc>
-                <a:spcPct val="100000"/>
-              </a:lnSpc>
-              <a:spcBef>
-                <a:spcPts val="1200"/>
-              </a:spcBef>
-              <a:buClr>
-                <a:schemeClr val="bg1">
-                  <a:lumMod val="65000"/>
-                </a:schemeClr>
-              </a:buClr>
-              <a:buFont typeface="Arial" panose="020B0604020202020204" pitchFamily="34" charset="0"/>
-              <a:buChar char="•"/>
-              <a:defRPr sz="2800" kern="1200">
-                <a:solidFill>
-                  <a:schemeClr val="tx1"/>
-                </a:solidFill>
-                <a:latin typeface="+mn-lt"/>
-                <a:ea typeface="+mn-ea"/>
-                <a:cs typeface="+mn-cs"/>
-              </a:defRPr>
-            </a:lvl5pPr>
-            <a:lvl6pPr marL="1097280" indent="-457200" algn="l" defTabSz="4389120" rtl="0" eaLnBrk="1" latinLnBrk="0" hangingPunct="1">
-              <a:lnSpc>
-                <a:spcPct val="100000"/>
-              </a:lnSpc>
-              <a:spcBef>
-                <a:spcPts val="1200"/>
-              </a:spcBef>
-              <a:buClr>
-                <a:schemeClr val="bg1">
-                  <a:lumMod val="65000"/>
-                </a:schemeClr>
-              </a:buClr>
-              <a:buFont typeface="Arial" panose="020B0604020202020204" pitchFamily="34" charset="0"/>
-              <a:buChar char="•"/>
-              <a:defRPr sz="2800" kern="1200">
-                <a:solidFill>
-                  <a:schemeClr val="tx1"/>
-                </a:solidFill>
-                <a:latin typeface="+mn-lt"/>
-                <a:ea typeface="+mn-ea"/>
-                <a:cs typeface="+mn-cs"/>
-              </a:defRPr>
-            </a:lvl6pPr>
-            <a:lvl7pPr marL="1097280" indent="-457200" algn="l" defTabSz="4389120" rtl="0" eaLnBrk="1" latinLnBrk="0" hangingPunct="1">
-              <a:lnSpc>
-                <a:spcPct val="100000"/>
-              </a:lnSpc>
-              <a:spcBef>
-                <a:spcPts val="1200"/>
-              </a:spcBef>
-              <a:buClr>
-                <a:schemeClr val="bg1">
-                  <a:lumMod val="65000"/>
-                </a:schemeClr>
-              </a:buClr>
-              <a:buFont typeface="Arial" panose="020B0604020202020204" pitchFamily="34" charset="0"/>
-              <a:buChar char="•"/>
-              <a:defRPr sz="2800" kern="1200">
-                <a:solidFill>
-                  <a:schemeClr val="tx1"/>
-                </a:solidFill>
-                <a:latin typeface="+mn-lt"/>
-                <a:ea typeface="+mn-ea"/>
-                <a:cs typeface="+mn-cs"/>
-              </a:defRPr>
-            </a:lvl7pPr>
-            <a:lvl8pPr marL="1097280" indent="-457200" algn="l" defTabSz="4389120" rtl="0" eaLnBrk="1" latinLnBrk="0" hangingPunct="1">
-              <a:lnSpc>
-                <a:spcPct val="100000"/>
-              </a:lnSpc>
-              <a:spcBef>
-                <a:spcPts val="1200"/>
-              </a:spcBef>
-              <a:buClr>
-                <a:schemeClr val="bg1">
-                  <a:lumMod val="65000"/>
-                </a:schemeClr>
-              </a:buClr>
-              <a:buFont typeface="Arial" panose="020B0604020202020204" pitchFamily="34" charset="0"/>
-              <a:buChar char="•"/>
-              <a:defRPr sz="2800" kern="1200">
-                <a:solidFill>
-                  <a:schemeClr val="tx1"/>
-                </a:solidFill>
-                <a:latin typeface="+mn-lt"/>
-                <a:ea typeface="+mn-ea"/>
-                <a:cs typeface="+mn-cs"/>
-              </a:defRPr>
-            </a:lvl8pPr>
-            <a:lvl9pPr marL="1097280" indent="-457200" algn="l" defTabSz="4389120" rtl="0" eaLnBrk="1" latinLnBrk="0" hangingPunct="1">
-              <a:lnSpc>
-                <a:spcPct val="100000"/>
-              </a:lnSpc>
-              <a:spcBef>
-                <a:spcPts val="1200"/>
-              </a:spcBef>
-              <a:buClr>
-                <a:schemeClr val="bg1">
-                  <a:lumMod val="65000"/>
-                </a:schemeClr>
-              </a:buClr>
-              <a:buFont typeface="Arial" panose="020B0604020202020204" pitchFamily="34" charset="0"/>
-              <a:buChar char="•"/>
-              <a:defRPr sz="2800" kern="1200">
-                <a:solidFill>
-                  <a:schemeClr val="tx1"/>
-                </a:solidFill>
-                <a:latin typeface="+mn-lt"/>
-                <a:ea typeface="+mn-ea"/>
-                <a:cs typeface="+mn-cs"/>
-              </a:defRPr>
-            </a:lvl9pPr>
-          </a:lstStyle>
-          <a:p>
-            <a:pPr marL="0" indent="0" algn="ctr">
-              <a:buClrTx/>
-              <a:buSzPct val="150000"/>
-              <a:buNone/>
-            </a:pPr>
-            <a:r>
-              <a:rPr lang="en-US" sz="3600" u="sng" dirty="0"/>
-              <a:t>Sequence to Prediction Method</a:t>
-            </a:r>
-          </a:p>
-          <a:p>
-            <a:pPr algn="just">
-              <a:buClrTx/>
-              <a:buSzPct val="150000"/>
-            </a:pPr>
-            <a:endParaRPr lang="en-US" dirty="0"/>
-          </a:p>
-        </p:txBody>
-      </p:sp>
-      <p:sp>
-        <p:nvSpPr>
-          <p:cNvPr id="90" name="Content Placeholder 10">
-            <a:extLst>
-              <a:ext uri="{FF2B5EF4-FFF2-40B4-BE49-F238E27FC236}">
-                <a16:creationId xmlns:a16="http://schemas.microsoft.com/office/drawing/2014/main" id="{084406F7-ACF1-4F6D-96E1-9746B498C29E}"/>
-              </a:ext>
-            </a:extLst>
-          </p:cNvPr>
-          <p:cNvSpPr txBox="1">
-            <a:spLocks/>
-          </p:cNvSpPr>
-          <p:nvPr/>
-        </p:nvSpPr>
-        <p:spPr>
-          <a:xfrm>
-            <a:off x="1253218" y="25605591"/>
-            <a:ext cx="12801600" cy="1483343"/>
-          </a:xfrm>
-          <a:prstGeom prst="rect">
-            <a:avLst/>
-          </a:prstGeom>
-        </p:spPr>
-        <p:txBody>
-          <a:bodyPr vert="horz" lIns="0" tIns="0" rIns="0" bIns="0" rtlCol="0">
-            <a:normAutofit/>
-          </a:bodyPr>
-          <a:lstStyle>
-            <a:lvl1pPr marL="457200" indent="-457200" algn="l" defTabSz="4389120" rtl="0" eaLnBrk="1" latinLnBrk="0" hangingPunct="1">
-              <a:lnSpc>
-                <a:spcPct val="100000"/>
-              </a:lnSpc>
-              <a:spcBef>
-                <a:spcPts val="1200"/>
-              </a:spcBef>
-              <a:buClr>
-                <a:schemeClr val="bg1">
-                  <a:lumMod val="65000"/>
-                </a:schemeClr>
-              </a:buClr>
-              <a:buFont typeface="Arial" panose="020B0604020202020204" pitchFamily="34" charset="0"/>
-              <a:buChar char="•"/>
-              <a:defRPr sz="3200" kern="1200" baseline="0">
-                <a:solidFill>
-                  <a:schemeClr val="tx1"/>
-                </a:solidFill>
-                <a:latin typeface="+mn-lt"/>
-                <a:ea typeface="+mn-ea"/>
-                <a:cs typeface="+mn-cs"/>
-              </a:defRPr>
-            </a:lvl1pPr>
-            <a:lvl2pPr marL="1097280" indent="-457200" algn="l" defTabSz="4389120" rtl="0" eaLnBrk="1" latinLnBrk="0" hangingPunct="1">
-              <a:lnSpc>
-                <a:spcPct val="100000"/>
-              </a:lnSpc>
-              <a:spcBef>
-                <a:spcPts val="1200"/>
-              </a:spcBef>
-              <a:buClr>
-                <a:schemeClr val="bg1">
-                  <a:lumMod val="65000"/>
-                </a:schemeClr>
-              </a:buClr>
-              <a:buFont typeface="Arial" panose="020B0604020202020204" pitchFamily="34" charset="0"/>
-              <a:buChar char="•"/>
-              <a:defRPr sz="2800" kern="1200">
-                <a:solidFill>
-                  <a:schemeClr val="tx1"/>
-                </a:solidFill>
-                <a:latin typeface="+mn-lt"/>
-                <a:ea typeface="+mn-ea"/>
-                <a:cs typeface="+mn-cs"/>
-              </a:defRPr>
-            </a:lvl2pPr>
-            <a:lvl3pPr marL="1097280" indent="-457200" algn="l" defTabSz="4389120" rtl="0" eaLnBrk="1" latinLnBrk="0" hangingPunct="1">
-              <a:lnSpc>
-                <a:spcPct val="100000"/>
-              </a:lnSpc>
-              <a:spcBef>
-                <a:spcPts val="1200"/>
-              </a:spcBef>
-              <a:buClr>
-                <a:schemeClr val="bg1">
-                  <a:lumMod val="65000"/>
-                </a:schemeClr>
-              </a:buClr>
-              <a:buFont typeface="Arial" panose="020B0604020202020204" pitchFamily="34" charset="0"/>
-              <a:buChar char="•"/>
-              <a:defRPr sz="2800" kern="1200">
-                <a:solidFill>
-                  <a:schemeClr val="tx1"/>
-                </a:solidFill>
-                <a:latin typeface="+mn-lt"/>
-                <a:ea typeface="+mn-ea"/>
-                <a:cs typeface="+mn-cs"/>
-              </a:defRPr>
-            </a:lvl3pPr>
-            <a:lvl4pPr marL="1097280" indent="-457200" algn="l" defTabSz="4389120" rtl="0" eaLnBrk="1" latinLnBrk="0" hangingPunct="1">
-              <a:lnSpc>
-                <a:spcPct val="100000"/>
-              </a:lnSpc>
-              <a:spcBef>
-                <a:spcPts val="1200"/>
-              </a:spcBef>
-              <a:buClr>
-                <a:schemeClr val="bg1">
-                  <a:lumMod val="65000"/>
-                </a:schemeClr>
-              </a:buClr>
-              <a:buFont typeface="Arial" panose="020B0604020202020204" pitchFamily="34" charset="0"/>
-              <a:buChar char="•"/>
-              <a:defRPr sz="2800" kern="1200">
-                <a:solidFill>
-                  <a:schemeClr val="tx1"/>
-                </a:solidFill>
-                <a:latin typeface="+mn-lt"/>
-                <a:ea typeface="+mn-ea"/>
-                <a:cs typeface="+mn-cs"/>
-              </a:defRPr>
-            </a:lvl4pPr>
-            <a:lvl5pPr marL="1097280" indent="-457200" algn="l" defTabSz="4389120" rtl="0" eaLnBrk="1" latinLnBrk="0" hangingPunct="1">
-              <a:lnSpc>
-                <a:spcPct val="100000"/>
-              </a:lnSpc>
-              <a:spcBef>
-                <a:spcPts val="1200"/>
-              </a:spcBef>
-              <a:buClr>
-                <a:schemeClr val="bg1">
-                  <a:lumMod val="65000"/>
-                </a:schemeClr>
-              </a:buClr>
-              <a:buFont typeface="Arial" panose="020B0604020202020204" pitchFamily="34" charset="0"/>
-              <a:buChar char="•"/>
-              <a:defRPr sz="2800" kern="1200">
-                <a:solidFill>
-                  <a:schemeClr val="tx1"/>
-                </a:solidFill>
-                <a:latin typeface="+mn-lt"/>
-                <a:ea typeface="+mn-ea"/>
-                <a:cs typeface="+mn-cs"/>
-              </a:defRPr>
-            </a:lvl5pPr>
-            <a:lvl6pPr marL="1097280" indent="-457200" algn="l" defTabSz="4389120" rtl="0" eaLnBrk="1" latinLnBrk="0" hangingPunct="1">
-              <a:lnSpc>
-                <a:spcPct val="100000"/>
-              </a:lnSpc>
-              <a:spcBef>
-                <a:spcPts val="1200"/>
-              </a:spcBef>
-              <a:buClr>
-                <a:schemeClr val="bg1">
-                  <a:lumMod val="65000"/>
-                </a:schemeClr>
-              </a:buClr>
-              <a:buFont typeface="Arial" panose="020B0604020202020204" pitchFamily="34" charset="0"/>
-              <a:buChar char="•"/>
-              <a:defRPr sz="2800" kern="1200">
-                <a:solidFill>
-                  <a:schemeClr val="tx1"/>
-                </a:solidFill>
-                <a:latin typeface="+mn-lt"/>
-                <a:ea typeface="+mn-ea"/>
-                <a:cs typeface="+mn-cs"/>
-              </a:defRPr>
-            </a:lvl6pPr>
-            <a:lvl7pPr marL="1097280" indent="-457200" algn="l" defTabSz="4389120" rtl="0" eaLnBrk="1" latinLnBrk="0" hangingPunct="1">
-              <a:lnSpc>
-                <a:spcPct val="100000"/>
-              </a:lnSpc>
-              <a:spcBef>
-                <a:spcPts val="1200"/>
-              </a:spcBef>
-              <a:buClr>
-                <a:schemeClr val="bg1">
-                  <a:lumMod val="65000"/>
-                </a:schemeClr>
-              </a:buClr>
-              <a:buFont typeface="Arial" panose="020B0604020202020204" pitchFamily="34" charset="0"/>
-              <a:buChar char="•"/>
-              <a:defRPr sz="2800" kern="1200">
-                <a:solidFill>
-                  <a:schemeClr val="tx1"/>
-                </a:solidFill>
-                <a:latin typeface="+mn-lt"/>
-                <a:ea typeface="+mn-ea"/>
-                <a:cs typeface="+mn-cs"/>
-              </a:defRPr>
-            </a:lvl7pPr>
-            <a:lvl8pPr marL="1097280" indent="-457200" algn="l" defTabSz="4389120" rtl="0" eaLnBrk="1" latinLnBrk="0" hangingPunct="1">
-              <a:lnSpc>
-                <a:spcPct val="100000"/>
-              </a:lnSpc>
-              <a:spcBef>
-                <a:spcPts val="1200"/>
-              </a:spcBef>
-              <a:buClr>
-                <a:schemeClr val="bg1">
-                  <a:lumMod val="65000"/>
-                </a:schemeClr>
-              </a:buClr>
-              <a:buFont typeface="Arial" panose="020B0604020202020204" pitchFamily="34" charset="0"/>
-              <a:buChar char="•"/>
-              <a:defRPr sz="2800" kern="1200">
-                <a:solidFill>
-                  <a:schemeClr val="tx1"/>
-                </a:solidFill>
-                <a:latin typeface="+mn-lt"/>
-                <a:ea typeface="+mn-ea"/>
-                <a:cs typeface="+mn-cs"/>
-              </a:defRPr>
-            </a:lvl8pPr>
-            <a:lvl9pPr marL="1097280" indent="-457200" algn="l" defTabSz="4389120" rtl="0" eaLnBrk="1" latinLnBrk="0" hangingPunct="1">
-              <a:lnSpc>
-                <a:spcPct val="100000"/>
-              </a:lnSpc>
-              <a:spcBef>
-                <a:spcPts val="1200"/>
-              </a:spcBef>
-              <a:buClr>
-                <a:schemeClr val="bg1">
-                  <a:lumMod val="65000"/>
-                </a:schemeClr>
-              </a:buClr>
-              <a:buFont typeface="Arial" panose="020B0604020202020204" pitchFamily="34" charset="0"/>
-              <a:buChar char="•"/>
-              <a:defRPr sz="2800" kern="1200">
-                <a:solidFill>
-                  <a:schemeClr val="tx1"/>
-                </a:solidFill>
-                <a:latin typeface="+mn-lt"/>
-                <a:ea typeface="+mn-ea"/>
-                <a:cs typeface="+mn-cs"/>
-              </a:defRPr>
-            </a:lvl9pPr>
-          </a:lstStyle>
-          <a:p>
-            <a:pPr marL="0" indent="0" algn="just">
-              <a:buClrTx/>
-              <a:buSzPct val="150000"/>
-              <a:buNone/>
-            </a:pPr>
-            <a:r>
-              <a:rPr lang="en-US" sz="2800" dirty="0"/>
-              <a:t>Graphic showing sequence to classification approach</a:t>
-            </a:r>
-          </a:p>
-        </p:txBody>
-      </p:sp>
-      <p:sp>
-        <p:nvSpPr>
-          <p:cNvPr id="91" name="Content Placeholder 10">
-            <a:extLst>
-              <a:ext uri="{FF2B5EF4-FFF2-40B4-BE49-F238E27FC236}">
-                <a16:creationId xmlns:a16="http://schemas.microsoft.com/office/drawing/2014/main" id="{2CF6707C-9C76-4AE4-9D0D-4CD8FB4FC320}"/>
-              </a:ext>
-            </a:extLst>
-          </p:cNvPr>
-          <p:cNvSpPr txBox="1">
-            <a:spLocks/>
-          </p:cNvSpPr>
-          <p:nvPr/>
-        </p:nvSpPr>
-        <p:spPr>
-          <a:xfrm>
-            <a:off x="1178365" y="19710360"/>
-            <a:ext cx="12801600" cy="1483343"/>
-          </a:xfrm>
-          <a:prstGeom prst="rect">
-            <a:avLst/>
-          </a:prstGeom>
-        </p:spPr>
-        <p:txBody>
-          <a:bodyPr vert="horz" lIns="0" tIns="0" rIns="0" bIns="0" rtlCol="0">
-            <a:normAutofit/>
-          </a:bodyPr>
-          <a:lstStyle>
-            <a:lvl1pPr marL="457200" indent="-457200" algn="l" defTabSz="4389120" rtl="0" eaLnBrk="1" latinLnBrk="0" hangingPunct="1">
-              <a:lnSpc>
-                <a:spcPct val="100000"/>
-              </a:lnSpc>
-              <a:spcBef>
-                <a:spcPts val="1200"/>
-              </a:spcBef>
-              <a:buClr>
-                <a:schemeClr val="bg1">
-                  <a:lumMod val="65000"/>
-                </a:schemeClr>
-              </a:buClr>
-              <a:buFont typeface="Arial" panose="020B0604020202020204" pitchFamily="34" charset="0"/>
-              <a:buChar char="•"/>
-              <a:defRPr sz="3200" kern="1200" baseline="0">
-                <a:solidFill>
-                  <a:schemeClr val="tx1"/>
-                </a:solidFill>
-                <a:latin typeface="+mn-lt"/>
-                <a:ea typeface="+mn-ea"/>
-                <a:cs typeface="+mn-cs"/>
-              </a:defRPr>
-            </a:lvl1pPr>
-            <a:lvl2pPr marL="1097280" indent="-457200" algn="l" defTabSz="4389120" rtl="0" eaLnBrk="1" latinLnBrk="0" hangingPunct="1">
-              <a:lnSpc>
-                <a:spcPct val="100000"/>
-              </a:lnSpc>
-              <a:spcBef>
-                <a:spcPts val="1200"/>
-              </a:spcBef>
-              <a:buClr>
-                <a:schemeClr val="bg1">
-                  <a:lumMod val="65000"/>
-                </a:schemeClr>
-              </a:buClr>
-              <a:buFont typeface="Arial" panose="020B0604020202020204" pitchFamily="34" charset="0"/>
-              <a:buChar char="•"/>
-              <a:defRPr sz="2800" kern="1200">
-                <a:solidFill>
-                  <a:schemeClr val="tx1"/>
-                </a:solidFill>
-                <a:latin typeface="+mn-lt"/>
-                <a:ea typeface="+mn-ea"/>
-                <a:cs typeface="+mn-cs"/>
-              </a:defRPr>
-            </a:lvl2pPr>
-            <a:lvl3pPr marL="1097280" indent="-457200" algn="l" defTabSz="4389120" rtl="0" eaLnBrk="1" latinLnBrk="0" hangingPunct="1">
-              <a:lnSpc>
-                <a:spcPct val="100000"/>
-              </a:lnSpc>
-              <a:spcBef>
-                <a:spcPts val="1200"/>
-              </a:spcBef>
-              <a:buClr>
-                <a:schemeClr val="bg1">
-                  <a:lumMod val="65000"/>
-                </a:schemeClr>
-              </a:buClr>
-              <a:buFont typeface="Arial" panose="020B0604020202020204" pitchFamily="34" charset="0"/>
-              <a:buChar char="•"/>
-              <a:defRPr sz="2800" kern="1200">
-                <a:solidFill>
-                  <a:schemeClr val="tx1"/>
-                </a:solidFill>
-                <a:latin typeface="+mn-lt"/>
-                <a:ea typeface="+mn-ea"/>
-                <a:cs typeface="+mn-cs"/>
-              </a:defRPr>
-            </a:lvl3pPr>
-            <a:lvl4pPr marL="1097280" indent="-457200" algn="l" defTabSz="4389120" rtl="0" eaLnBrk="1" latinLnBrk="0" hangingPunct="1">
-              <a:lnSpc>
-                <a:spcPct val="100000"/>
-              </a:lnSpc>
-              <a:spcBef>
-                <a:spcPts val="1200"/>
-              </a:spcBef>
-              <a:buClr>
-                <a:schemeClr val="bg1">
-                  <a:lumMod val="65000"/>
-                </a:schemeClr>
-              </a:buClr>
-              <a:buFont typeface="Arial" panose="020B0604020202020204" pitchFamily="34" charset="0"/>
-              <a:buChar char="•"/>
-              <a:defRPr sz="2800" kern="1200">
-                <a:solidFill>
-                  <a:schemeClr val="tx1"/>
-                </a:solidFill>
-                <a:latin typeface="+mn-lt"/>
-                <a:ea typeface="+mn-ea"/>
-                <a:cs typeface="+mn-cs"/>
-              </a:defRPr>
-            </a:lvl4pPr>
-            <a:lvl5pPr marL="1097280" indent="-457200" algn="l" defTabSz="4389120" rtl="0" eaLnBrk="1" latinLnBrk="0" hangingPunct="1">
-              <a:lnSpc>
-                <a:spcPct val="100000"/>
-              </a:lnSpc>
-              <a:spcBef>
-                <a:spcPts val="1200"/>
-              </a:spcBef>
-              <a:buClr>
-                <a:schemeClr val="bg1">
-                  <a:lumMod val="65000"/>
-                </a:schemeClr>
-              </a:buClr>
-              <a:buFont typeface="Arial" panose="020B0604020202020204" pitchFamily="34" charset="0"/>
-              <a:buChar char="•"/>
-              <a:defRPr sz="2800" kern="1200">
-                <a:solidFill>
-                  <a:schemeClr val="tx1"/>
-                </a:solidFill>
-                <a:latin typeface="+mn-lt"/>
-                <a:ea typeface="+mn-ea"/>
-                <a:cs typeface="+mn-cs"/>
-              </a:defRPr>
-            </a:lvl5pPr>
-            <a:lvl6pPr marL="1097280" indent="-457200" algn="l" defTabSz="4389120" rtl="0" eaLnBrk="1" latinLnBrk="0" hangingPunct="1">
-              <a:lnSpc>
-                <a:spcPct val="100000"/>
-              </a:lnSpc>
-              <a:spcBef>
-                <a:spcPts val="1200"/>
-              </a:spcBef>
-              <a:buClr>
-                <a:schemeClr val="bg1">
-                  <a:lumMod val="65000"/>
-                </a:schemeClr>
-              </a:buClr>
-              <a:buFont typeface="Arial" panose="020B0604020202020204" pitchFamily="34" charset="0"/>
-              <a:buChar char="•"/>
-              <a:defRPr sz="2800" kern="1200">
-                <a:solidFill>
-                  <a:schemeClr val="tx1"/>
-                </a:solidFill>
-                <a:latin typeface="+mn-lt"/>
-                <a:ea typeface="+mn-ea"/>
-                <a:cs typeface="+mn-cs"/>
-              </a:defRPr>
-            </a:lvl6pPr>
-            <a:lvl7pPr marL="1097280" indent="-457200" algn="l" defTabSz="4389120" rtl="0" eaLnBrk="1" latinLnBrk="0" hangingPunct="1">
-              <a:lnSpc>
-                <a:spcPct val="100000"/>
-              </a:lnSpc>
-              <a:spcBef>
-                <a:spcPts val="1200"/>
-              </a:spcBef>
-              <a:buClr>
-                <a:schemeClr val="bg1">
-                  <a:lumMod val="65000"/>
-                </a:schemeClr>
-              </a:buClr>
-              <a:buFont typeface="Arial" panose="020B0604020202020204" pitchFamily="34" charset="0"/>
-              <a:buChar char="•"/>
-              <a:defRPr sz="2800" kern="1200">
-                <a:solidFill>
-                  <a:schemeClr val="tx1"/>
-                </a:solidFill>
-                <a:latin typeface="+mn-lt"/>
-                <a:ea typeface="+mn-ea"/>
-                <a:cs typeface="+mn-cs"/>
-              </a:defRPr>
-            </a:lvl7pPr>
-            <a:lvl8pPr marL="1097280" indent="-457200" algn="l" defTabSz="4389120" rtl="0" eaLnBrk="1" latinLnBrk="0" hangingPunct="1">
-              <a:lnSpc>
-                <a:spcPct val="100000"/>
-              </a:lnSpc>
-              <a:spcBef>
-                <a:spcPts val="1200"/>
-              </a:spcBef>
-              <a:buClr>
-                <a:schemeClr val="bg1">
-                  <a:lumMod val="65000"/>
-                </a:schemeClr>
-              </a:buClr>
-              <a:buFont typeface="Arial" panose="020B0604020202020204" pitchFamily="34" charset="0"/>
-              <a:buChar char="•"/>
-              <a:defRPr sz="2800" kern="1200">
-                <a:solidFill>
-                  <a:schemeClr val="tx1"/>
-                </a:solidFill>
-                <a:latin typeface="+mn-lt"/>
-                <a:ea typeface="+mn-ea"/>
-                <a:cs typeface="+mn-cs"/>
-              </a:defRPr>
-            </a:lvl8pPr>
-            <a:lvl9pPr marL="1097280" indent="-457200" algn="l" defTabSz="4389120" rtl="0" eaLnBrk="1" latinLnBrk="0" hangingPunct="1">
-              <a:lnSpc>
-                <a:spcPct val="100000"/>
-              </a:lnSpc>
-              <a:spcBef>
-                <a:spcPts val="1200"/>
-              </a:spcBef>
-              <a:buClr>
-                <a:schemeClr val="bg1">
-                  <a:lumMod val="65000"/>
-                </a:schemeClr>
-              </a:buClr>
-              <a:buFont typeface="Arial" panose="020B0604020202020204" pitchFamily="34" charset="0"/>
-              <a:buChar char="•"/>
-              <a:defRPr sz="2800" kern="1200">
-                <a:solidFill>
-                  <a:schemeClr val="tx1"/>
-                </a:solidFill>
-                <a:latin typeface="+mn-lt"/>
-                <a:ea typeface="+mn-ea"/>
-                <a:cs typeface="+mn-cs"/>
-              </a:defRPr>
-            </a:lvl9pPr>
-          </a:lstStyle>
-          <a:p>
-            <a:pPr marL="0" indent="0" algn="just">
-              <a:buClrTx/>
-              <a:buSzPct val="150000"/>
-              <a:buNone/>
-            </a:pPr>
-            <a:r>
-              <a:rPr lang="en-US" sz="2800" dirty="0"/>
-              <a:t>Graphic explaining how Sastry et al accomplished classification</a:t>
             </a:r>
           </a:p>
         </p:txBody>
@@ -7331,7 +6214,7 @@
                 <a:ea typeface="MS Mincho" pitchFamily="49" charset="-128"/>
                 <a:cs typeface="Arial" panose="020B0604020202020204" pitchFamily="34" charset="0"/>
               </a:rPr>
-              <a:t> for coordinating and the Chemical Engineering department for providing funding</a:t>
+              <a:t> for coordinating funding while on sabbatical and the Chemical Engineering department for providing funding</a:t>
             </a:r>
           </a:p>
         </p:txBody>
@@ -7374,60 +6257,6 @@
       </p:pic>
       <p:sp>
         <p:nvSpPr>
-          <p:cNvPr id="48" name="Rectangle 47">
-            <a:extLst>
-              <a:ext uri="{FF2B5EF4-FFF2-40B4-BE49-F238E27FC236}">
-                <a16:creationId xmlns:a16="http://schemas.microsoft.com/office/drawing/2014/main" id="{D325A3C3-2641-49C4-9667-FA5F77C991C7}"/>
-              </a:ext>
-            </a:extLst>
-          </p:cNvPr>
-          <p:cNvSpPr/>
-          <p:nvPr/>
-        </p:nvSpPr>
-        <p:spPr>
-          <a:xfrm>
-            <a:off x="1253219" y="16759791"/>
-            <a:ext cx="12367531" cy="2725149"/>
-          </a:xfrm>
-          <a:prstGeom prst="rect">
-            <a:avLst/>
-          </a:prstGeom>
-          <a:noFill/>
-          <a:ln w="9525" cap="flat" cmpd="sng" algn="ctr">
-            <a:solidFill>
-              <a:schemeClr val="dk1"/>
-            </a:solidFill>
-            <a:prstDash val="solid"/>
-            <a:round/>
-            <a:headEnd type="none" w="med" len="med"/>
-            <a:tailEnd type="none" w="med" len="med"/>
-          </a:ln>
-        </p:spPr>
-        <p:style>
-          <a:lnRef idx="0">
-            <a:scrgbClr r="0" g="0" b="0"/>
-          </a:lnRef>
-          <a:fillRef idx="0">
-            <a:scrgbClr r="0" g="0" b="0"/>
-          </a:fillRef>
-          <a:effectRef idx="0">
-            <a:scrgbClr r="0" g="0" b="0"/>
-          </a:effectRef>
-          <a:fontRef idx="minor">
-            <a:schemeClr val="dk1"/>
-          </a:fontRef>
-        </p:style>
-        <p:txBody>
-          <a:bodyPr rtlCol="0" anchor="ctr"/>
-          <a:lstStyle/>
-          <a:p>
-            <a:pPr algn="ctr"/>
-            <a:endParaRPr lang="en-US" sz="6000" dirty="0" err="1"/>
-          </a:p>
-        </p:txBody>
-      </p:sp>
-      <p:sp>
-        <p:nvSpPr>
           <p:cNvPr id="130" name="Content Placeholder 5">
             <a:extLst>
               <a:ext uri="{FF2B5EF4-FFF2-40B4-BE49-F238E27FC236}">
@@ -7442,7 +6271,7 @@
         </p:nvSpPr>
         <p:spPr>
           <a:xfrm>
-            <a:off x="23409466" y="15896717"/>
+            <a:off x="9032204" y="15743278"/>
             <a:ext cx="5295375" cy="13500605"/>
           </a:xfrm>
           <a:prstGeom prst="rect">
@@ -7668,7 +6497,7 @@
             </a:pPr>
             <a:r>
               <a:rPr lang="en-US" sz="2800" dirty="0"/>
-              <a:t>Amino Acid or DNA sequence input</a:t>
+              <a:t>Amino acid or DNA sequence input</a:t>
             </a:r>
           </a:p>
           <a:p>
@@ -7696,12 +6525,70 @@
             </a:r>
           </a:p>
           <a:p>
+            <a:pPr marL="640080" lvl="1" indent="0">
+              <a:buClrTx/>
+              <a:buNone/>
+            </a:pPr>
+            <a:r>
+              <a:rPr lang="en-US" sz="2400" dirty="0"/>
+              <a:t>AA embedding length = 16 </a:t>
+            </a:r>
+          </a:p>
+          <a:p>
+            <a:pPr marL="640080" lvl="1" indent="0">
+              <a:buClrTx/>
+              <a:buNone/>
+            </a:pPr>
+            <a:r>
+              <a:rPr lang="en-US" sz="2400" dirty="0"/>
+              <a:t>DNA embedding length = **</a:t>
+            </a:r>
+          </a:p>
+          <a:p>
+            <a:pPr>
+              <a:buClrTx/>
+            </a:pPr>
+            <a:r>
+              <a:rPr lang="en-US" sz="2800" dirty="0"/>
+              <a:t>Convolution – learn short range patterns</a:t>
+            </a:r>
+          </a:p>
+          <a:p>
+            <a:pPr marL="640080" lvl="1" indent="0">
+              <a:buClrTx/>
+              <a:buNone/>
+            </a:pPr>
+            <a:r>
+              <a:rPr lang="en-US" sz="2400" dirty="0"/>
+              <a:t>AA -  filter length 8,  100 filters</a:t>
+            </a:r>
+          </a:p>
+          <a:p>
+            <a:pPr marL="640080" lvl="1" indent="0">
+              <a:buClrTx/>
+              <a:buNone/>
+            </a:pPr>
+            <a:r>
+              <a:rPr lang="en-US" sz="2400" dirty="0"/>
+              <a:t>DNA - ** filter length x ** filters</a:t>
+            </a:r>
+          </a:p>
+          <a:p>
+            <a:pPr>
+              <a:buClrTx/>
+            </a:pPr>
+            <a:r>
+              <a:rPr lang="en-US" sz="2800" dirty="0"/>
+              <a:t>Pooling - **what does this do?</a:t>
+            </a:r>
+          </a:p>
+          <a:p>
             <a:pPr lvl="1">
               <a:buClrTx/>
             </a:pPr>
             <a:r>
               <a:rPr lang="en-US" sz="2400" dirty="0"/>
-              <a:t>AA embedding length = ** </a:t>
+              <a:t> AA – pool size = 3</a:t>
             </a:r>
           </a:p>
           <a:p>
@@ -7710,7 +6597,7 @@
             </a:pPr>
             <a:r>
               <a:rPr lang="en-US" sz="2400" dirty="0"/>
-              <a:t>DNA embedding length = **</a:t>
+              <a:t>DNA – pool size = **</a:t>
             </a:r>
           </a:p>
           <a:p>
@@ -7719,7 +6606,7 @@
             </a:pPr>
             <a:r>
               <a:rPr lang="en-US" sz="2800" dirty="0"/>
-              <a:t>Convolution – learn short range patterns</a:t>
+              <a:t>LSTM – Learn long range patterns</a:t>
             </a:r>
           </a:p>
           <a:p>
@@ -7728,61 +6615,7 @@
             </a:pPr>
             <a:r>
               <a:rPr lang="en-US" sz="2400" dirty="0"/>
-              <a:t>AA - ** filter length x ** filters</a:t>
-            </a:r>
-          </a:p>
-          <a:p>
-            <a:pPr lvl="1">
-              <a:buClrTx/>
-            </a:pPr>
-            <a:r>
-              <a:rPr lang="en-US" sz="2400" dirty="0"/>
-              <a:t>DNA - ** filter length x ** filters</a:t>
-            </a:r>
-          </a:p>
-          <a:p>
-            <a:pPr>
-              <a:buClrTx/>
-            </a:pPr>
-            <a:r>
-              <a:rPr lang="en-US" sz="2800" dirty="0"/>
-              <a:t>Pooling - *what does this do?*</a:t>
-            </a:r>
-          </a:p>
-          <a:p>
-            <a:pPr lvl="1">
-              <a:buClrTx/>
-            </a:pPr>
-            <a:r>
-              <a:rPr lang="en-US" sz="2400" dirty="0"/>
-              <a:t> AA – pooling width = **</a:t>
-            </a:r>
-          </a:p>
-          <a:p>
-            <a:pPr lvl="1">
-              <a:buClrTx/>
-            </a:pPr>
-            <a:r>
-              <a:rPr lang="en-US" sz="2400" dirty="0"/>
-              <a:t>DNA – pool width = **</a:t>
-            </a:r>
-          </a:p>
-          <a:p>
-            <a:pPr>
-              <a:buClrTx/>
-            </a:pPr>
-            <a:r>
-              <a:rPr lang="en-US" sz="2800" dirty="0"/>
-              <a:t>LSTM – Learn long range patterns</a:t>
-            </a:r>
-          </a:p>
-          <a:p>
-            <a:pPr lvl="1">
-              <a:buClrTx/>
-            </a:pPr>
-            <a:r>
-              <a:rPr lang="en-US" sz="2400" dirty="0"/>
-              <a:t>AA - ** nodes</a:t>
+              <a:t>AA - 200 nodes</a:t>
             </a:r>
           </a:p>
           <a:p>
@@ -7806,60 +6639,6 @@
               <a:buNone/>
             </a:pPr>
             <a:endParaRPr lang="en-US" dirty="0"/>
-          </a:p>
-        </p:txBody>
-      </p:sp>
-      <p:sp>
-        <p:nvSpPr>
-          <p:cNvPr id="132" name="Rectangle 131">
-            <a:extLst>
-              <a:ext uri="{FF2B5EF4-FFF2-40B4-BE49-F238E27FC236}">
-                <a16:creationId xmlns:a16="http://schemas.microsoft.com/office/drawing/2014/main" id="{D09EA884-F533-415B-A764-85B980574547}"/>
-              </a:ext>
-            </a:extLst>
-          </p:cNvPr>
-          <p:cNvSpPr/>
-          <p:nvPr/>
-        </p:nvSpPr>
-        <p:spPr>
-          <a:xfrm>
-            <a:off x="1253218" y="21949816"/>
-            <a:ext cx="12367531" cy="2725149"/>
-          </a:xfrm>
-          <a:prstGeom prst="rect">
-            <a:avLst/>
-          </a:prstGeom>
-          <a:noFill/>
-          <a:ln w="9525" cap="flat" cmpd="sng" algn="ctr">
-            <a:solidFill>
-              <a:schemeClr val="dk1"/>
-            </a:solidFill>
-            <a:prstDash val="solid"/>
-            <a:round/>
-            <a:headEnd type="none" w="med" len="med"/>
-            <a:tailEnd type="none" w="med" len="med"/>
-          </a:ln>
-        </p:spPr>
-        <p:style>
-          <a:lnRef idx="0">
-            <a:scrgbClr r="0" g="0" b="0"/>
-          </a:lnRef>
-          <a:fillRef idx="0">
-            <a:scrgbClr r="0" g="0" b="0"/>
-          </a:fillRef>
-          <a:effectRef idx="0">
-            <a:scrgbClr r="0" g="0" b="0"/>
-          </a:effectRef>
-          <a:fontRef idx="minor">
-            <a:schemeClr val="dk1"/>
-          </a:fontRef>
-        </p:style>
-        <p:txBody>
-          <a:bodyPr rtlCol="0" anchor="ctr"/>
-          <a:lstStyle/>
-          <a:p>
-            <a:pPr algn="ctr"/>
-            <a:endParaRPr lang="en-US" sz="6000" dirty="0" err="1"/>
           </a:p>
         </p:txBody>
       </p:sp>
@@ -7880,7 +6659,7 @@
         </p:nvCxnSpPr>
         <p:spPr>
           <a:xfrm flipH="1">
-            <a:off x="17088315" y="79466980"/>
+            <a:off x="2711053" y="79313541"/>
             <a:ext cx="531620" cy="1353605"/>
           </a:xfrm>
           <a:prstGeom prst="straightConnector1">
@@ -7915,7 +6694,7 @@
         </p:nvCxnSpPr>
         <p:spPr>
           <a:xfrm flipH="1">
-            <a:off x="18226235" y="79638979"/>
+            <a:off x="3848973" y="79485540"/>
             <a:ext cx="531623" cy="1388955"/>
           </a:xfrm>
           <a:prstGeom prst="straightConnector1">
@@ -7950,7 +6729,7 @@
         </p:nvCxnSpPr>
         <p:spPr>
           <a:xfrm>
-            <a:off x="20250986" y="106670516"/>
+            <a:off x="5873724" y="106517077"/>
             <a:ext cx="251095" cy="1307749"/>
           </a:xfrm>
           <a:prstGeom prst="straightConnector1">
@@ -7985,7 +6764,7 @@
         </p:nvCxnSpPr>
         <p:spPr>
           <a:xfrm>
-            <a:off x="21153840" y="79456099"/>
+            <a:off x="6776578" y="79302660"/>
             <a:ext cx="472830" cy="1344138"/>
           </a:xfrm>
           <a:prstGeom prst="straightConnector1">
@@ -8017,7 +6796,7 @@
         </p:nvGrpSpPr>
         <p:grpSpPr>
           <a:xfrm>
-            <a:off x="15520262" y="15940437"/>
+            <a:off x="1143000" y="15786998"/>
             <a:ext cx="8122737" cy="13284992"/>
             <a:chOff x="15520262" y="15940437"/>
             <a:chExt cx="8122737" cy="13284992"/>
@@ -10504,6 +9283,2150 @@
             <a:r>
               <a:rPr lang="en-US" sz="2800" dirty="0"/>
               <a:t>all the proteins in the human body. This ambitious goal requires expressing thousands of different recombinant proteins to generate antibodies. </a:t>
+            </a:r>
+          </a:p>
+        </p:txBody>
+      </p:sp>
+      <p:sp>
+        <p:nvSpPr>
+          <p:cNvPr id="123" name="Text Placeholder 17">
+            <a:extLst>
+              <a:ext uri="{FF2B5EF4-FFF2-40B4-BE49-F238E27FC236}">
+                <a16:creationId xmlns:a16="http://schemas.microsoft.com/office/drawing/2014/main" id="{4438A751-58AF-449E-ABA6-C8F72BF492D9}"/>
+              </a:ext>
+            </a:extLst>
+          </p:cNvPr>
+          <p:cNvSpPr txBox="1">
+            <a:spLocks/>
+          </p:cNvSpPr>
+          <p:nvPr/>
+        </p:nvSpPr>
+        <p:spPr>
+          <a:xfrm>
+            <a:off x="15544800" y="14166920"/>
+            <a:ext cx="12801600" cy="1219200"/>
+          </a:xfrm>
+          <a:prstGeom prst="rect">
+            <a:avLst/>
+          </a:prstGeom>
+          <a:gradFill>
+            <a:gsLst>
+              <a:gs pos="0">
+                <a:schemeClr val="tx1">
+                  <a:lumMod val="65000"/>
+                  <a:lumOff val="35000"/>
+                </a:schemeClr>
+              </a:gs>
+              <a:gs pos="91000">
+                <a:srgbClr val="F0A000"/>
+              </a:gs>
+              <a:gs pos="90000">
+                <a:schemeClr val="tx1">
+                  <a:lumMod val="65000"/>
+                  <a:lumOff val="35000"/>
+                </a:schemeClr>
+              </a:gs>
+              <a:gs pos="100000">
+                <a:srgbClr val="F0A000"/>
+              </a:gs>
+            </a:gsLst>
+            <a:lin ang="5400000" scaled="1"/>
+          </a:gradFill>
+        </p:spPr>
+        <p:txBody>
+          <a:bodyPr vert="horz" lIns="365760" tIns="45720" rIns="91440" bIns="45720" rtlCol="0" anchor="ctr">
+            <a:noAutofit/>
+          </a:bodyPr>
+          <a:lstStyle>
+            <a:lvl1pPr marL="0" indent="0" algn="ctr" defTabSz="4389120" rtl="0" eaLnBrk="1" latinLnBrk="0" hangingPunct="1">
+              <a:lnSpc>
+                <a:spcPct val="100000"/>
+              </a:lnSpc>
+              <a:spcBef>
+                <a:spcPts val="0"/>
+              </a:spcBef>
+              <a:buClr>
+                <a:schemeClr val="bg1">
+                  <a:lumMod val="65000"/>
+                </a:schemeClr>
+              </a:buClr>
+              <a:buFont typeface="Arial" panose="020B0604020202020204" pitchFamily="34" charset="0"/>
+              <a:buNone/>
+              <a:defRPr sz="5400" kern="1200" cap="none" baseline="0">
+                <a:solidFill>
+                  <a:schemeClr val="bg1"/>
+                </a:solidFill>
+                <a:latin typeface="+mj-lt"/>
+                <a:ea typeface="+mn-ea"/>
+                <a:cs typeface="+mn-cs"/>
+              </a:defRPr>
+            </a:lvl1pPr>
+            <a:lvl2pPr marL="0" indent="0" algn="l" defTabSz="4389120" rtl="0" eaLnBrk="1" latinLnBrk="0" hangingPunct="1">
+              <a:lnSpc>
+                <a:spcPct val="100000"/>
+              </a:lnSpc>
+              <a:spcBef>
+                <a:spcPts val="0"/>
+              </a:spcBef>
+              <a:buClr>
+                <a:schemeClr val="bg1">
+                  <a:lumMod val="65000"/>
+                </a:schemeClr>
+              </a:buClr>
+              <a:buFont typeface="Arial" panose="020B0604020202020204" pitchFamily="34" charset="0"/>
+              <a:buNone/>
+              <a:defRPr sz="6000" kern="1200" cap="all" baseline="0">
+                <a:solidFill>
+                  <a:schemeClr val="bg1"/>
+                </a:solidFill>
+                <a:latin typeface="+mj-lt"/>
+                <a:ea typeface="+mn-ea"/>
+                <a:cs typeface="+mn-cs"/>
+              </a:defRPr>
+            </a:lvl2pPr>
+            <a:lvl3pPr marL="0" indent="0" algn="l" defTabSz="4389120" rtl="0" eaLnBrk="1" latinLnBrk="0" hangingPunct="1">
+              <a:lnSpc>
+                <a:spcPct val="100000"/>
+              </a:lnSpc>
+              <a:spcBef>
+                <a:spcPts val="0"/>
+              </a:spcBef>
+              <a:buClr>
+                <a:schemeClr val="bg1">
+                  <a:lumMod val="65000"/>
+                </a:schemeClr>
+              </a:buClr>
+              <a:buFont typeface="Arial" panose="020B0604020202020204" pitchFamily="34" charset="0"/>
+              <a:buNone/>
+              <a:defRPr sz="6000" kern="1200" cap="all" baseline="0">
+                <a:solidFill>
+                  <a:schemeClr val="bg1"/>
+                </a:solidFill>
+                <a:latin typeface="+mj-lt"/>
+                <a:ea typeface="+mn-ea"/>
+                <a:cs typeface="+mn-cs"/>
+              </a:defRPr>
+            </a:lvl3pPr>
+            <a:lvl4pPr marL="0" indent="0" algn="l" defTabSz="4389120" rtl="0" eaLnBrk="1" latinLnBrk="0" hangingPunct="1">
+              <a:lnSpc>
+                <a:spcPct val="100000"/>
+              </a:lnSpc>
+              <a:spcBef>
+                <a:spcPts val="0"/>
+              </a:spcBef>
+              <a:buClr>
+                <a:schemeClr val="bg1">
+                  <a:lumMod val="65000"/>
+                </a:schemeClr>
+              </a:buClr>
+              <a:buFont typeface="Arial" panose="020B0604020202020204" pitchFamily="34" charset="0"/>
+              <a:buNone/>
+              <a:defRPr sz="6000" kern="1200" cap="all" baseline="0">
+                <a:solidFill>
+                  <a:schemeClr val="bg1"/>
+                </a:solidFill>
+                <a:latin typeface="+mj-lt"/>
+                <a:ea typeface="+mn-ea"/>
+                <a:cs typeface="+mn-cs"/>
+              </a:defRPr>
+            </a:lvl4pPr>
+            <a:lvl5pPr marL="0" indent="0" algn="l" defTabSz="4389120" rtl="0" eaLnBrk="1" latinLnBrk="0" hangingPunct="1">
+              <a:lnSpc>
+                <a:spcPct val="100000"/>
+              </a:lnSpc>
+              <a:spcBef>
+                <a:spcPts val="0"/>
+              </a:spcBef>
+              <a:buClr>
+                <a:schemeClr val="bg1">
+                  <a:lumMod val="65000"/>
+                </a:schemeClr>
+              </a:buClr>
+              <a:buFont typeface="Arial" panose="020B0604020202020204" pitchFamily="34" charset="0"/>
+              <a:buNone/>
+              <a:defRPr sz="6000" kern="1200" cap="all" baseline="0">
+                <a:solidFill>
+                  <a:schemeClr val="bg1"/>
+                </a:solidFill>
+                <a:latin typeface="+mj-lt"/>
+                <a:ea typeface="+mn-ea"/>
+                <a:cs typeface="+mn-cs"/>
+              </a:defRPr>
+            </a:lvl5pPr>
+            <a:lvl6pPr marL="0" indent="0" algn="l" defTabSz="4389120" rtl="0" eaLnBrk="1" latinLnBrk="0" hangingPunct="1">
+              <a:lnSpc>
+                <a:spcPct val="100000"/>
+              </a:lnSpc>
+              <a:spcBef>
+                <a:spcPts val="0"/>
+              </a:spcBef>
+              <a:buClr>
+                <a:schemeClr val="bg1">
+                  <a:lumMod val="65000"/>
+                </a:schemeClr>
+              </a:buClr>
+              <a:buFont typeface="Arial" panose="020B0604020202020204" pitchFamily="34" charset="0"/>
+              <a:buNone/>
+              <a:defRPr sz="6000" kern="1200" cap="all" baseline="0">
+                <a:solidFill>
+                  <a:schemeClr val="bg1"/>
+                </a:solidFill>
+                <a:latin typeface="+mj-lt"/>
+                <a:ea typeface="+mn-ea"/>
+                <a:cs typeface="+mn-cs"/>
+              </a:defRPr>
+            </a:lvl6pPr>
+            <a:lvl7pPr marL="0" indent="0" algn="l" defTabSz="4389120" rtl="0" eaLnBrk="1" latinLnBrk="0" hangingPunct="1">
+              <a:lnSpc>
+                <a:spcPct val="100000"/>
+              </a:lnSpc>
+              <a:spcBef>
+                <a:spcPts val="0"/>
+              </a:spcBef>
+              <a:buClr>
+                <a:schemeClr val="bg1">
+                  <a:lumMod val="65000"/>
+                </a:schemeClr>
+              </a:buClr>
+              <a:buFont typeface="Arial" panose="020B0604020202020204" pitchFamily="34" charset="0"/>
+              <a:buNone/>
+              <a:defRPr sz="6000" kern="1200" cap="all" baseline="0">
+                <a:solidFill>
+                  <a:schemeClr val="bg1"/>
+                </a:solidFill>
+                <a:latin typeface="+mj-lt"/>
+                <a:ea typeface="+mn-ea"/>
+                <a:cs typeface="+mn-cs"/>
+              </a:defRPr>
+            </a:lvl7pPr>
+            <a:lvl8pPr marL="0" indent="0" algn="l" defTabSz="4389120" rtl="0" eaLnBrk="1" latinLnBrk="0" hangingPunct="1">
+              <a:lnSpc>
+                <a:spcPct val="100000"/>
+              </a:lnSpc>
+              <a:spcBef>
+                <a:spcPts val="0"/>
+              </a:spcBef>
+              <a:buClr>
+                <a:schemeClr val="bg1">
+                  <a:lumMod val="65000"/>
+                </a:schemeClr>
+              </a:buClr>
+              <a:buFont typeface="Arial" panose="020B0604020202020204" pitchFamily="34" charset="0"/>
+              <a:buNone/>
+              <a:defRPr sz="6000" kern="1200" cap="all" baseline="0">
+                <a:solidFill>
+                  <a:schemeClr val="bg1"/>
+                </a:solidFill>
+                <a:latin typeface="+mj-lt"/>
+                <a:ea typeface="+mn-ea"/>
+                <a:cs typeface="+mn-cs"/>
+              </a:defRPr>
+            </a:lvl8pPr>
+            <a:lvl9pPr marL="0" indent="0" algn="l" defTabSz="4389120" rtl="0" eaLnBrk="1" latinLnBrk="0" hangingPunct="1">
+              <a:lnSpc>
+                <a:spcPct val="100000"/>
+              </a:lnSpc>
+              <a:spcBef>
+                <a:spcPts val="0"/>
+              </a:spcBef>
+              <a:buClr>
+                <a:schemeClr val="bg1">
+                  <a:lumMod val="65000"/>
+                </a:schemeClr>
+              </a:buClr>
+              <a:buFont typeface="Arial" panose="020B0604020202020204" pitchFamily="34" charset="0"/>
+              <a:buNone/>
+              <a:defRPr sz="6000" kern="1200" cap="all" baseline="0">
+                <a:solidFill>
+                  <a:schemeClr val="bg1"/>
+                </a:solidFill>
+                <a:latin typeface="+mj-lt"/>
+                <a:ea typeface="+mn-ea"/>
+                <a:cs typeface="+mn-cs"/>
+              </a:defRPr>
+            </a:lvl9pPr>
+          </a:lstStyle>
+          <a:p>
+            <a:r>
+              <a:rPr lang="en-US" dirty="0"/>
+              <a:t>Results</a:t>
+            </a:r>
+          </a:p>
+        </p:txBody>
+      </p:sp>
+      <p:pic>
+        <p:nvPicPr>
+          <p:cNvPr id="20" name="Picture 19">
+            <a:extLst>
+              <a:ext uri="{FF2B5EF4-FFF2-40B4-BE49-F238E27FC236}">
+                <a16:creationId xmlns:a16="http://schemas.microsoft.com/office/drawing/2014/main" id="{CEB5BE10-E70A-46EE-9828-0A98F0E7792C}"/>
+              </a:ext>
+            </a:extLst>
+          </p:cNvPr>
+          <p:cNvPicPr>
+            <a:picLocks noChangeAspect="1"/>
+          </p:cNvPicPr>
+          <p:nvPr/>
+        </p:nvPicPr>
+        <p:blipFill>
+          <a:blip r:embed="rId15">
+            <a:extLst>
+              <a:ext uri="{28A0092B-C50C-407E-A947-70E740481C1C}">
+                <a14:useLocalDpi xmlns:a14="http://schemas.microsoft.com/office/drawing/2010/main" val="0"/>
+              </a:ext>
+            </a:extLst>
+          </a:blip>
+          <a:stretch>
+            <a:fillRect/>
+          </a:stretch>
+        </p:blipFill>
+        <p:spPr>
+          <a:xfrm>
+            <a:off x="29298141" y="7321236"/>
+            <a:ext cx="9433178" cy="7297681"/>
+          </a:xfrm>
+          <a:prstGeom prst="rect">
+            <a:avLst/>
+          </a:prstGeom>
+        </p:spPr>
+      </p:pic>
+      <p:sp>
+        <p:nvSpPr>
+          <p:cNvPr id="124" name="TextBox 123">
+            <a:extLst>
+              <a:ext uri="{FF2B5EF4-FFF2-40B4-BE49-F238E27FC236}">
+                <a16:creationId xmlns:a16="http://schemas.microsoft.com/office/drawing/2014/main" id="{D9A6AAEE-5E70-4AB2-A617-1C8A402C3997}"/>
+              </a:ext>
+            </a:extLst>
+          </p:cNvPr>
+          <p:cNvSpPr txBox="1"/>
+          <p:nvPr/>
+        </p:nvSpPr>
+        <p:spPr>
+          <a:xfrm>
+            <a:off x="29900879" y="6749100"/>
+            <a:ext cx="12801600" cy="646331"/>
+          </a:xfrm>
+          <a:prstGeom prst="rect">
+            <a:avLst/>
+          </a:prstGeom>
+          <a:noFill/>
+        </p:spPr>
+        <p:txBody>
+          <a:bodyPr wrap="square" rtlCol="0">
+            <a:spAutoFit/>
+          </a:bodyPr>
+          <a:lstStyle/>
+          <a:p>
+            <a:pPr algn="ctr"/>
+            <a:r>
+              <a:rPr lang="en-US" sz="3600" u="sng" dirty="0"/>
+              <a:t>What did the the embedding layer learn?</a:t>
+            </a:r>
+          </a:p>
+        </p:txBody>
+      </p:sp>
+      <p:graphicFrame>
+        <p:nvGraphicFramePr>
+          <p:cNvPr id="25" name="Table 24">
+            <a:extLst>
+              <a:ext uri="{FF2B5EF4-FFF2-40B4-BE49-F238E27FC236}">
+                <a16:creationId xmlns:a16="http://schemas.microsoft.com/office/drawing/2014/main" id="{E1225497-D27D-43E1-AB00-A66B97C348A4}"/>
+              </a:ext>
+            </a:extLst>
+          </p:cNvPr>
+          <p:cNvGraphicFramePr>
+            <a:graphicFrameLocks noGrp="1"/>
+          </p:cNvGraphicFramePr>
+          <p:nvPr>
+            <p:extLst>
+              <p:ext uri="{D42A27DB-BD31-4B8C-83A1-F6EECF244321}">
+                <p14:modId xmlns:p14="http://schemas.microsoft.com/office/powerpoint/2010/main" val="110687028"/>
+              </p:ext>
+            </p:extLst>
+          </p:nvPr>
+        </p:nvGraphicFramePr>
+        <p:xfrm>
+          <a:off x="35292794" y="15548254"/>
+          <a:ext cx="6877050" cy="4069800"/>
+        </p:xfrm>
+        <a:graphic>
+          <a:graphicData uri="http://schemas.openxmlformats.org/drawingml/2006/table">
+            <a:tbl>
+              <a:tblPr firstRow="1" bandRow="1">
+                <a:tableStyleId>{7E9639D4-E3E2-4D34-9284-5A2195B3D0D7}</a:tableStyleId>
+              </a:tblPr>
+              <a:tblGrid>
+                <a:gridCol w="3438525">
+                  <a:extLst>
+                    <a:ext uri="{9D8B030D-6E8A-4147-A177-3AD203B41FA5}">
+                      <a16:colId xmlns:a16="http://schemas.microsoft.com/office/drawing/2014/main" val="3739837609"/>
+                    </a:ext>
+                  </a:extLst>
+                </a:gridCol>
+                <a:gridCol w="3438525">
+                  <a:extLst>
+                    <a:ext uri="{9D8B030D-6E8A-4147-A177-3AD203B41FA5}">
+                      <a16:colId xmlns:a16="http://schemas.microsoft.com/office/drawing/2014/main" val="2642331103"/>
+                    </a:ext>
+                  </a:extLst>
+                </a:gridCol>
+              </a:tblGrid>
+              <a:tr h="897544">
+                <a:tc>
+                  <a:txBody>
+                    <a:bodyPr/>
+                    <a:lstStyle/>
+                    <a:p>
+                      <a:r>
+                        <a:rPr lang="en-US" sz="3200" dirty="0"/>
+                        <a:t>Number of Experiments</a:t>
+                      </a:r>
+                    </a:p>
+                  </a:txBody>
+                  <a:tcPr>
+                    <a:lnL w="12700" cap="flat" cmpd="sng" algn="ctr">
+                      <a:solidFill>
+                        <a:schemeClr val="tx1"/>
+                      </a:solidFill>
+                      <a:prstDash val="solid"/>
+                      <a:round/>
+                      <a:headEnd type="none" w="med" len="med"/>
+                      <a:tailEnd type="none" w="med" len="med"/>
+                    </a:lnL>
+                    <a:lnR w="12700" cap="flat" cmpd="sng" algn="ctr">
+                      <a:solidFill>
+                        <a:schemeClr val="tx1"/>
+                      </a:solidFill>
+                      <a:prstDash val="solid"/>
+                      <a:round/>
+                      <a:headEnd type="none" w="med" len="med"/>
+                      <a:tailEnd type="none" w="med" len="med"/>
+                    </a:lnR>
+                    <a:lnT w="12700" cap="flat" cmpd="sng" algn="ctr">
+                      <a:solidFill>
+                        <a:schemeClr val="tx1"/>
+                      </a:solidFill>
+                      <a:prstDash val="solid"/>
+                      <a:round/>
+                      <a:headEnd type="none" w="med" len="med"/>
+                      <a:tailEnd type="none" w="med" len="med"/>
+                    </a:lnT>
+                    <a:lnB w="12700" cap="flat" cmpd="sng" algn="ctr">
+                      <a:solidFill>
+                        <a:schemeClr val="tx1"/>
+                      </a:solidFill>
+                      <a:prstDash val="solid"/>
+                      <a:round/>
+                      <a:headEnd type="none" w="med" len="med"/>
+                      <a:tailEnd type="none" w="med" len="med"/>
+                    </a:lnB>
+                    <a:solidFill>
+                      <a:schemeClr val="tx1">
+                        <a:lumMod val="65000"/>
+                        <a:lumOff val="35000"/>
+                      </a:schemeClr>
+                    </a:solidFill>
+                  </a:tcPr>
+                </a:tc>
+                <a:tc>
+                  <a:txBody>
+                    <a:bodyPr/>
+                    <a:lstStyle/>
+                    <a:p>
+                      <a:r>
+                        <a:rPr lang="en-US" sz="3200" dirty="0"/>
+                        <a:t>Expressed Proteins</a:t>
+                      </a:r>
+                    </a:p>
+                  </a:txBody>
+                  <a:tcPr>
+                    <a:lnL w="12700" cap="flat" cmpd="sng" algn="ctr">
+                      <a:solidFill>
+                        <a:schemeClr val="tx1"/>
+                      </a:solidFill>
+                      <a:prstDash val="solid"/>
+                      <a:round/>
+                      <a:headEnd type="none" w="med" len="med"/>
+                      <a:tailEnd type="none" w="med" len="med"/>
+                    </a:lnL>
+                    <a:lnR w="12700" cap="flat" cmpd="sng" algn="ctr">
+                      <a:solidFill>
+                        <a:schemeClr val="tx1"/>
+                      </a:solidFill>
+                      <a:prstDash val="solid"/>
+                      <a:round/>
+                      <a:headEnd type="none" w="med" len="med"/>
+                      <a:tailEnd type="none" w="med" len="med"/>
+                    </a:lnR>
+                    <a:lnT w="12700" cap="flat" cmpd="sng" algn="ctr">
+                      <a:solidFill>
+                        <a:schemeClr val="tx1"/>
+                      </a:solidFill>
+                      <a:prstDash val="solid"/>
+                      <a:round/>
+                      <a:headEnd type="none" w="med" len="med"/>
+                      <a:tailEnd type="none" w="med" len="med"/>
+                    </a:lnT>
+                    <a:lnB w="12700" cap="flat" cmpd="sng" algn="ctr">
+                      <a:solidFill>
+                        <a:schemeClr val="tx1"/>
+                      </a:solidFill>
+                      <a:prstDash val="solid"/>
+                      <a:round/>
+                      <a:headEnd type="none" w="med" len="med"/>
+                      <a:tailEnd type="none" w="med" len="med"/>
+                    </a:lnB>
+                    <a:solidFill>
+                      <a:schemeClr val="tx1">
+                        <a:lumMod val="65000"/>
+                        <a:lumOff val="35000"/>
+                      </a:schemeClr>
+                    </a:solidFill>
+                  </a:tcPr>
+                </a:tc>
+                <a:extLst>
+                  <a:ext uri="{0D108BD9-81ED-4DB2-BD59-A6C34878D82A}">
+                    <a16:rowId xmlns:a16="http://schemas.microsoft.com/office/drawing/2014/main" val="2399813256"/>
+                  </a:ext>
+                </a:extLst>
+              </a:tr>
+              <a:tr h="600600">
+                <a:tc>
+                  <a:txBody>
+                    <a:bodyPr/>
+                    <a:lstStyle/>
+                    <a:p>
+                      <a:endParaRPr lang="en-US" sz="3200" dirty="0"/>
+                    </a:p>
+                  </a:txBody>
+                  <a:tcPr>
+                    <a:lnL w="12700" cap="flat" cmpd="sng" algn="ctr">
+                      <a:solidFill>
+                        <a:schemeClr val="tx1"/>
+                      </a:solidFill>
+                      <a:prstDash val="solid"/>
+                      <a:round/>
+                      <a:headEnd type="none" w="med" len="med"/>
+                      <a:tailEnd type="none" w="med" len="med"/>
+                    </a:lnL>
+                    <a:lnR w="12700" cap="flat" cmpd="sng" algn="ctr">
+                      <a:solidFill>
+                        <a:schemeClr val="tx1"/>
+                      </a:solidFill>
+                      <a:prstDash val="solid"/>
+                      <a:round/>
+                      <a:headEnd type="none" w="med" len="med"/>
+                      <a:tailEnd type="none" w="med" len="med"/>
+                    </a:lnR>
+                    <a:lnT w="12700" cap="flat" cmpd="sng" algn="ctr">
+                      <a:solidFill>
+                        <a:schemeClr val="tx1"/>
+                      </a:solidFill>
+                      <a:prstDash val="solid"/>
+                      <a:round/>
+                      <a:headEnd type="none" w="med" len="med"/>
+                      <a:tailEnd type="none" w="med" len="med"/>
+                    </a:lnT>
+                    <a:lnB w="12700" cap="flat" cmpd="sng" algn="ctr">
+                      <a:solidFill>
+                        <a:schemeClr val="tx1"/>
+                      </a:solidFill>
+                      <a:prstDash val="solid"/>
+                      <a:round/>
+                      <a:headEnd type="none" w="med" len="med"/>
+                      <a:tailEnd type="none" w="med" len="med"/>
+                    </a:lnB>
+                  </a:tcPr>
+                </a:tc>
+                <a:tc>
+                  <a:txBody>
+                    <a:bodyPr/>
+                    <a:lstStyle/>
+                    <a:p>
+                      <a:endParaRPr lang="en-US" sz="3200"/>
+                    </a:p>
+                  </a:txBody>
+                  <a:tcPr>
+                    <a:lnL w="12700" cap="flat" cmpd="sng" algn="ctr">
+                      <a:solidFill>
+                        <a:schemeClr val="tx1"/>
+                      </a:solidFill>
+                      <a:prstDash val="solid"/>
+                      <a:round/>
+                      <a:headEnd type="none" w="med" len="med"/>
+                      <a:tailEnd type="none" w="med" len="med"/>
+                    </a:lnL>
+                    <a:lnR w="12700" cap="flat" cmpd="sng" algn="ctr">
+                      <a:solidFill>
+                        <a:schemeClr val="tx1"/>
+                      </a:solidFill>
+                      <a:prstDash val="solid"/>
+                      <a:round/>
+                      <a:headEnd type="none" w="med" len="med"/>
+                      <a:tailEnd type="none" w="med" len="med"/>
+                    </a:lnR>
+                    <a:lnT w="12700" cap="flat" cmpd="sng" algn="ctr">
+                      <a:solidFill>
+                        <a:schemeClr val="tx1"/>
+                      </a:solidFill>
+                      <a:prstDash val="solid"/>
+                      <a:round/>
+                      <a:headEnd type="none" w="med" len="med"/>
+                      <a:tailEnd type="none" w="med" len="med"/>
+                    </a:lnT>
+                    <a:lnB w="12700" cap="flat" cmpd="sng" algn="ctr">
+                      <a:solidFill>
+                        <a:schemeClr val="tx1"/>
+                      </a:solidFill>
+                      <a:prstDash val="solid"/>
+                      <a:round/>
+                      <a:headEnd type="none" w="med" len="med"/>
+                      <a:tailEnd type="none" w="med" len="med"/>
+                    </a:lnB>
+                  </a:tcPr>
+                </a:tc>
+                <a:extLst>
+                  <a:ext uri="{0D108BD9-81ED-4DB2-BD59-A6C34878D82A}">
+                    <a16:rowId xmlns:a16="http://schemas.microsoft.com/office/drawing/2014/main" val="3575149461"/>
+                  </a:ext>
+                </a:extLst>
+              </a:tr>
+              <a:tr h="600600">
+                <a:tc>
+                  <a:txBody>
+                    <a:bodyPr/>
+                    <a:lstStyle/>
+                    <a:p>
+                      <a:endParaRPr lang="en-US" sz="3200" dirty="0"/>
+                    </a:p>
+                  </a:txBody>
+                  <a:tcPr>
+                    <a:lnL w="12700" cap="flat" cmpd="sng" algn="ctr">
+                      <a:solidFill>
+                        <a:schemeClr val="tx1"/>
+                      </a:solidFill>
+                      <a:prstDash val="solid"/>
+                      <a:round/>
+                      <a:headEnd type="none" w="med" len="med"/>
+                      <a:tailEnd type="none" w="med" len="med"/>
+                    </a:lnL>
+                    <a:lnR w="12700" cap="flat" cmpd="sng" algn="ctr">
+                      <a:solidFill>
+                        <a:schemeClr val="tx1"/>
+                      </a:solidFill>
+                      <a:prstDash val="solid"/>
+                      <a:round/>
+                      <a:headEnd type="none" w="med" len="med"/>
+                      <a:tailEnd type="none" w="med" len="med"/>
+                    </a:lnR>
+                    <a:lnT w="12700" cap="flat" cmpd="sng" algn="ctr">
+                      <a:solidFill>
+                        <a:schemeClr val="tx1"/>
+                      </a:solidFill>
+                      <a:prstDash val="solid"/>
+                      <a:round/>
+                      <a:headEnd type="none" w="med" len="med"/>
+                      <a:tailEnd type="none" w="med" len="med"/>
+                    </a:lnT>
+                    <a:lnB w="12700" cap="flat" cmpd="sng" algn="ctr">
+                      <a:solidFill>
+                        <a:schemeClr val="tx1"/>
+                      </a:solidFill>
+                      <a:prstDash val="solid"/>
+                      <a:round/>
+                      <a:headEnd type="none" w="med" len="med"/>
+                      <a:tailEnd type="none" w="med" len="med"/>
+                    </a:lnB>
+                  </a:tcPr>
+                </a:tc>
+                <a:tc>
+                  <a:txBody>
+                    <a:bodyPr/>
+                    <a:lstStyle/>
+                    <a:p>
+                      <a:endParaRPr lang="en-US" sz="3200"/>
+                    </a:p>
+                  </a:txBody>
+                  <a:tcPr>
+                    <a:lnL w="12700" cap="flat" cmpd="sng" algn="ctr">
+                      <a:solidFill>
+                        <a:schemeClr val="tx1"/>
+                      </a:solidFill>
+                      <a:prstDash val="solid"/>
+                      <a:round/>
+                      <a:headEnd type="none" w="med" len="med"/>
+                      <a:tailEnd type="none" w="med" len="med"/>
+                    </a:lnL>
+                    <a:lnR w="12700" cap="flat" cmpd="sng" algn="ctr">
+                      <a:solidFill>
+                        <a:schemeClr val="tx1"/>
+                      </a:solidFill>
+                      <a:prstDash val="solid"/>
+                      <a:round/>
+                      <a:headEnd type="none" w="med" len="med"/>
+                      <a:tailEnd type="none" w="med" len="med"/>
+                    </a:lnR>
+                    <a:lnT w="12700" cap="flat" cmpd="sng" algn="ctr">
+                      <a:solidFill>
+                        <a:schemeClr val="tx1"/>
+                      </a:solidFill>
+                      <a:prstDash val="solid"/>
+                      <a:round/>
+                      <a:headEnd type="none" w="med" len="med"/>
+                      <a:tailEnd type="none" w="med" len="med"/>
+                    </a:lnT>
+                    <a:lnB w="12700" cap="flat" cmpd="sng" algn="ctr">
+                      <a:solidFill>
+                        <a:schemeClr val="tx1"/>
+                      </a:solidFill>
+                      <a:prstDash val="solid"/>
+                      <a:round/>
+                      <a:headEnd type="none" w="med" len="med"/>
+                      <a:tailEnd type="none" w="med" len="med"/>
+                    </a:lnB>
+                  </a:tcPr>
+                </a:tc>
+                <a:extLst>
+                  <a:ext uri="{0D108BD9-81ED-4DB2-BD59-A6C34878D82A}">
+                    <a16:rowId xmlns:a16="http://schemas.microsoft.com/office/drawing/2014/main" val="3545368195"/>
+                  </a:ext>
+                </a:extLst>
+              </a:tr>
+              <a:tr h="600600">
+                <a:tc>
+                  <a:txBody>
+                    <a:bodyPr/>
+                    <a:lstStyle/>
+                    <a:p>
+                      <a:endParaRPr lang="en-US" sz="3200" dirty="0"/>
+                    </a:p>
+                  </a:txBody>
+                  <a:tcPr>
+                    <a:lnL w="12700" cap="flat" cmpd="sng" algn="ctr">
+                      <a:solidFill>
+                        <a:schemeClr val="tx1"/>
+                      </a:solidFill>
+                      <a:prstDash val="solid"/>
+                      <a:round/>
+                      <a:headEnd type="none" w="med" len="med"/>
+                      <a:tailEnd type="none" w="med" len="med"/>
+                    </a:lnL>
+                    <a:lnR w="12700" cap="flat" cmpd="sng" algn="ctr">
+                      <a:solidFill>
+                        <a:schemeClr val="tx1"/>
+                      </a:solidFill>
+                      <a:prstDash val="solid"/>
+                      <a:round/>
+                      <a:headEnd type="none" w="med" len="med"/>
+                      <a:tailEnd type="none" w="med" len="med"/>
+                    </a:lnR>
+                    <a:lnT w="12700" cap="flat" cmpd="sng" algn="ctr">
+                      <a:solidFill>
+                        <a:schemeClr val="tx1"/>
+                      </a:solidFill>
+                      <a:prstDash val="solid"/>
+                      <a:round/>
+                      <a:headEnd type="none" w="med" len="med"/>
+                      <a:tailEnd type="none" w="med" len="med"/>
+                    </a:lnT>
+                    <a:lnB w="12700" cap="flat" cmpd="sng" algn="ctr">
+                      <a:solidFill>
+                        <a:schemeClr val="tx1"/>
+                      </a:solidFill>
+                      <a:prstDash val="solid"/>
+                      <a:round/>
+                      <a:headEnd type="none" w="med" len="med"/>
+                      <a:tailEnd type="none" w="med" len="med"/>
+                    </a:lnB>
+                  </a:tcPr>
+                </a:tc>
+                <a:tc>
+                  <a:txBody>
+                    <a:bodyPr/>
+                    <a:lstStyle/>
+                    <a:p>
+                      <a:endParaRPr lang="en-US" sz="3200"/>
+                    </a:p>
+                  </a:txBody>
+                  <a:tcPr>
+                    <a:lnL w="12700" cap="flat" cmpd="sng" algn="ctr">
+                      <a:solidFill>
+                        <a:schemeClr val="tx1"/>
+                      </a:solidFill>
+                      <a:prstDash val="solid"/>
+                      <a:round/>
+                      <a:headEnd type="none" w="med" len="med"/>
+                      <a:tailEnd type="none" w="med" len="med"/>
+                    </a:lnL>
+                    <a:lnR w="12700" cap="flat" cmpd="sng" algn="ctr">
+                      <a:solidFill>
+                        <a:schemeClr val="tx1"/>
+                      </a:solidFill>
+                      <a:prstDash val="solid"/>
+                      <a:round/>
+                      <a:headEnd type="none" w="med" len="med"/>
+                      <a:tailEnd type="none" w="med" len="med"/>
+                    </a:lnR>
+                    <a:lnT w="12700" cap="flat" cmpd="sng" algn="ctr">
+                      <a:solidFill>
+                        <a:schemeClr val="tx1"/>
+                      </a:solidFill>
+                      <a:prstDash val="solid"/>
+                      <a:round/>
+                      <a:headEnd type="none" w="med" len="med"/>
+                      <a:tailEnd type="none" w="med" len="med"/>
+                    </a:lnT>
+                    <a:lnB w="12700" cap="flat" cmpd="sng" algn="ctr">
+                      <a:solidFill>
+                        <a:schemeClr val="tx1"/>
+                      </a:solidFill>
+                      <a:prstDash val="solid"/>
+                      <a:round/>
+                      <a:headEnd type="none" w="med" len="med"/>
+                      <a:tailEnd type="none" w="med" len="med"/>
+                    </a:lnB>
+                  </a:tcPr>
+                </a:tc>
+                <a:extLst>
+                  <a:ext uri="{0D108BD9-81ED-4DB2-BD59-A6C34878D82A}">
+                    <a16:rowId xmlns:a16="http://schemas.microsoft.com/office/drawing/2014/main" val="2424674796"/>
+                  </a:ext>
+                </a:extLst>
+              </a:tr>
+              <a:tr h="600600">
+                <a:tc>
+                  <a:txBody>
+                    <a:bodyPr/>
+                    <a:lstStyle/>
+                    <a:p>
+                      <a:endParaRPr lang="en-US" sz="3200" dirty="0"/>
+                    </a:p>
+                  </a:txBody>
+                  <a:tcPr>
+                    <a:lnL w="12700" cap="flat" cmpd="sng" algn="ctr">
+                      <a:solidFill>
+                        <a:schemeClr val="tx1"/>
+                      </a:solidFill>
+                      <a:prstDash val="solid"/>
+                      <a:round/>
+                      <a:headEnd type="none" w="med" len="med"/>
+                      <a:tailEnd type="none" w="med" len="med"/>
+                    </a:lnL>
+                    <a:lnR w="12700" cap="flat" cmpd="sng" algn="ctr">
+                      <a:solidFill>
+                        <a:schemeClr val="tx1"/>
+                      </a:solidFill>
+                      <a:prstDash val="solid"/>
+                      <a:round/>
+                      <a:headEnd type="none" w="med" len="med"/>
+                      <a:tailEnd type="none" w="med" len="med"/>
+                    </a:lnR>
+                    <a:lnT w="12700" cap="flat" cmpd="sng" algn="ctr">
+                      <a:solidFill>
+                        <a:schemeClr val="tx1"/>
+                      </a:solidFill>
+                      <a:prstDash val="solid"/>
+                      <a:round/>
+                      <a:headEnd type="none" w="med" len="med"/>
+                      <a:tailEnd type="none" w="med" len="med"/>
+                    </a:lnT>
+                    <a:lnB w="12700" cap="flat" cmpd="sng" algn="ctr">
+                      <a:solidFill>
+                        <a:schemeClr val="tx1"/>
+                      </a:solidFill>
+                      <a:prstDash val="solid"/>
+                      <a:round/>
+                      <a:headEnd type="none" w="med" len="med"/>
+                      <a:tailEnd type="none" w="med" len="med"/>
+                    </a:lnB>
+                  </a:tcPr>
+                </a:tc>
+                <a:tc>
+                  <a:txBody>
+                    <a:bodyPr/>
+                    <a:lstStyle/>
+                    <a:p>
+                      <a:endParaRPr lang="en-US" sz="3200"/>
+                    </a:p>
+                  </a:txBody>
+                  <a:tcPr>
+                    <a:lnL w="12700" cap="flat" cmpd="sng" algn="ctr">
+                      <a:solidFill>
+                        <a:schemeClr val="tx1"/>
+                      </a:solidFill>
+                      <a:prstDash val="solid"/>
+                      <a:round/>
+                      <a:headEnd type="none" w="med" len="med"/>
+                      <a:tailEnd type="none" w="med" len="med"/>
+                    </a:lnL>
+                    <a:lnR w="12700" cap="flat" cmpd="sng" algn="ctr">
+                      <a:solidFill>
+                        <a:schemeClr val="tx1"/>
+                      </a:solidFill>
+                      <a:prstDash val="solid"/>
+                      <a:round/>
+                      <a:headEnd type="none" w="med" len="med"/>
+                      <a:tailEnd type="none" w="med" len="med"/>
+                    </a:lnR>
+                    <a:lnT w="12700" cap="flat" cmpd="sng" algn="ctr">
+                      <a:solidFill>
+                        <a:schemeClr val="tx1"/>
+                      </a:solidFill>
+                      <a:prstDash val="solid"/>
+                      <a:round/>
+                      <a:headEnd type="none" w="med" len="med"/>
+                      <a:tailEnd type="none" w="med" len="med"/>
+                    </a:lnT>
+                    <a:lnB w="12700" cap="flat" cmpd="sng" algn="ctr">
+                      <a:solidFill>
+                        <a:schemeClr val="tx1"/>
+                      </a:solidFill>
+                      <a:prstDash val="solid"/>
+                      <a:round/>
+                      <a:headEnd type="none" w="med" len="med"/>
+                      <a:tailEnd type="none" w="med" len="med"/>
+                    </a:lnB>
+                  </a:tcPr>
+                </a:tc>
+                <a:extLst>
+                  <a:ext uri="{0D108BD9-81ED-4DB2-BD59-A6C34878D82A}">
+                    <a16:rowId xmlns:a16="http://schemas.microsoft.com/office/drawing/2014/main" val="1810382673"/>
+                  </a:ext>
+                </a:extLst>
+              </a:tr>
+              <a:tr h="600600">
+                <a:tc>
+                  <a:txBody>
+                    <a:bodyPr/>
+                    <a:lstStyle/>
+                    <a:p>
+                      <a:endParaRPr lang="en-US" sz="3200" dirty="0"/>
+                    </a:p>
+                  </a:txBody>
+                  <a:tcPr>
+                    <a:lnL w="12700" cap="flat" cmpd="sng" algn="ctr">
+                      <a:solidFill>
+                        <a:schemeClr val="tx1"/>
+                      </a:solidFill>
+                      <a:prstDash val="solid"/>
+                      <a:round/>
+                      <a:headEnd type="none" w="med" len="med"/>
+                      <a:tailEnd type="none" w="med" len="med"/>
+                    </a:lnL>
+                    <a:lnR w="12700" cap="flat" cmpd="sng" algn="ctr">
+                      <a:solidFill>
+                        <a:schemeClr val="tx1"/>
+                      </a:solidFill>
+                      <a:prstDash val="solid"/>
+                      <a:round/>
+                      <a:headEnd type="none" w="med" len="med"/>
+                      <a:tailEnd type="none" w="med" len="med"/>
+                    </a:lnR>
+                    <a:lnT w="12700" cap="flat" cmpd="sng" algn="ctr">
+                      <a:solidFill>
+                        <a:schemeClr val="tx1"/>
+                      </a:solidFill>
+                      <a:prstDash val="solid"/>
+                      <a:round/>
+                      <a:headEnd type="none" w="med" len="med"/>
+                      <a:tailEnd type="none" w="med" len="med"/>
+                    </a:lnT>
+                    <a:lnB w="12700" cap="flat" cmpd="sng" algn="ctr">
+                      <a:solidFill>
+                        <a:schemeClr val="tx1"/>
+                      </a:solidFill>
+                      <a:prstDash val="solid"/>
+                      <a:round/>
+                      <a:headEnd type="none" w="med" len="med"/>
+                      <a:tailEnd type="none" w="med" len="med"/>
+                    </a:lnB>
+                  </a:tcPr>
+                </a:tc>
+                <a:tc>
+                  <a:txBody>
+                    <a:bodyPr/>
+                    <a:lstStyle/>
+                    <a:p>
+                      <a:endParaRPr lang="en-US" sz="3200" dirty="0"/>
+                    </a:p>
+                  </a:txBody>
+                  <a:tcPr>
+                    <a:lnL w="12700" cap="flat" cmpd="sng" algn="ctr">
+                      <a:solidFill>
+                        <a:schemeClr val="tx1"/>
+                      </a:solidFill>
+                      <a:prstDash val="solid"/>
+                      <a:round/>
+                      <a:headEnd type="none" w="med" len="med"/>
+                      <a:tailEnd type="none" w="med" len="med"/>
+                    </a:lnL>
+                    <a:lnR w="12700" cap="flat" cmpd="sng" algn="ctr">
+                      <a:solidFill>
+                        <a:schemeClr val="tx1"/>
+                      </a:solidFill>
+                      <a:prstDash val="solid"/>
+                      <a:round/>
+                      <a:headEnd type="none" w="med" len="med"/>
+                      <a:tailEnd type="none" w="med" len="med"/>
+                    </a:lnR>
+                    <a:lnT w="12700" cap="flat" cmpd="sng" algn="ctr">
+                      <a:solidFill>
+                        <a:schemeClr val="tx1"/>
+                      </a:solidFill>
+                      <a:prstDash val="solid"/>
+                      <a:round/>
+                      <a:headEnd type="none" w="med" len="med"/>
+                      <a:tailEnd type="none" w="med" len="med"/>
+                    </a:lnT>
+                    <a:lnB w="12700" cap="flat" cmpd="sng" algn="ctr">
+                      <a:solidFill>
+                        <a:schemeClr val="tx1"/>
+                      </a:solidFill>
+                      <a:prstDash val="solid"/>
+                      <a:round/>
+                      <a:headEnd type="none" w="med" len="med"/>
+                      <a:tailEnd type="none" w="med" len="med"/>
+                    </a:lnB>
+                  </a:tcPr>
+                </a:tc>
+                <a:extLst>
+                  <a:ext uri="{0D108BD9-81ED-4DB2-BD59-A6C34878D82A}">
+                    <a16:rowId xmlns:a16="http://schemas.microsoft.com/office/drawing/2014/main" val="1117193689"/>
+                  </a:ext>
+                </a:extLst>
+              </a:tr>
+            </a:tbl>
+          </a:graphicData>
+        </a:graphic>
+      </p:graphicFrame>
+      <p:sp>
+        <p:nvSpPr>
+          <p:cNvPr id="125" name="TextBox 124">
+            <a:extLst>
+              <a:ext uri="{FF2B5EF4-FFF2-40B4-BE49-F238E27FC236}">
+                <a16:creationId xmlns:a16="http://schemas.microsoft.com/office/drawing/2014/main" id="{A388065E-6140-4EDF-B243-EE75E6E33633}"/>
+              </a:ext>
+            </a:extLst>
+          </p:cNvPr>
+          <p:cNvSpPr txBox="1"/>
+          <p:nvPr/>
+        </p:nvSpPr>
+        <p:spPr>
+          <a:xfrm>
+            <a:off x="38393849" y="7849206"/>
+            <a:ext cx="4339111" cy="5509200"/>
+          </a:xfrm>
+          <a:prstGeom prst="rect">
+            <a:avLst/>
+          </a:prstGeom>
+          <a:noFill/>
+        </p:spPr>
+        <p:txBody>
+          <a:bodyPr wrap="square" rtlCol="0">
+            <a:spAutoFit/>
+          </a:bodyPr>
+          <a:lstStyle/>
+          <a:p>
+            <a:r>
+              <a:rPr lang="en-US" sz="3200" dirty="0"/>
+              <a:t>We evaluated the embedding weights using t-SNE and found that codons that code for the same amino acids grouped together as well as codons of similar hydropathy… (sorry if this is non-sense, just trying to gauge space**) </a:t>
+            </a:r>
+          </a:p>
+        </p:txBody>
+      </p:sp>
+      <p:sp>
+        <p:nvSpPr>
+          <p:cNvPr id="126" name="TextBox 125">
+            <a:extLst>
+              <a:ext uri="{FF2B5EF4-FFF2-40B4-BE49-F238E27FC236}">
+                <a16:creationId xmlns:a16="http://schemas.microsoft.com/office/drawing/2014/main" id="{DDDF0EB4-5F05-45A5-AC44-7AEE153D222A}"/>
+              </a:ext>
+            </a:extLst>
+          </p:cNvPr>
+          <p:cNvSpPr txBox="1"/>
+          <p:nvPr/>
+        </p:nvSpPr>
+        <p:spPr>
+          <a:xfrm>
+            <a:off x="29900879" y="14254078"/>
+            <a:ext cx="12801600" cy="646331"/>
+          </a:xfrm>
+          <a:prstGeom prst="rect">
+            <a:avLst/>
+          </a:prstGeom>
+          <a:noFill/>
+        </p:spPr>
+        <p:txBody>
+          <a:bodyPr wrap="square" rtlCol="0">
+            <a:spAutoFit/>
+          </a:bodyPr>
+          <a:lstStyle/>
+          <a:p>
+            <a:pPr algn="ctr"/>
+            <a:r>
+              <a:rPr lang="en-US" sz="3600" u="sng" dirty="0"/>
+              <a:t>Model Aided Experimentation</a:t>
+            </a:r>
+          </a:p>
+        </p:txBody>
+      </p:sp>
+      <p:sp>
+        <p:nvSpPr>
+          <p:cNvPr id="127" name="TextBox 126">
+            <a:extLst>
+              <a:ext uri="{FF2B5EF4-FFF2-40B4-BE49-F238E27FC236}">
+                <a16:creationId xmlns:a16="http://schemas.microsoft.com/office/drawing/2014/main" id="{EC699AA8-D62F-4DFD-8506-442502F23855}"/>
+              </a:ext>
+            </a:extLst>
+          </p:cNvPr>
+          <p:cNvSpPr txBox="1"/>
+          <p:nvPr/>
+        </p:nvSpPr>
+        <p:spPr>
+          <a:xfrm>
+            <a:off x="29900879" y="15547542"/>
+            <a:ext cx="4339111" cy="4524315"/>
+          </a:xfrm>
+          <a:prstGeom prst="rect">
+            <a:avLst/>
+          </a:prstGeom>
+          <a:noFill/>
+        </p:spPr>
+        <p:txBody>
+          <a:bodyPr wrap="square" rtlCol="0">
+            <a:spAutoFit/>
+          </a:bodyPr>
+          <a:lstStyle/>
+          <a:p>
+            <a:r>
+              <a:rPr lang="en-US" sz="3200" dirty="0"/>
+              <a:t>Description of this…..</a:t>
+            </a:r>
+          </a:p>
+          <a:p>
+            <a:endParaRPr lang="en-US" sz="3200" dirty="0"/>
+          </a:p>
+          <a:p>
+            <a:endParaRPr lang="en-US" sz="3200" dirty="0"/>
+          </a:p>
+          <a:p>
+            <a:endParaRPr lang="en-US" sz="3200" dirty="0"/>
+          </a:p>
+          <a:p>
+            <a:endParaRPr lang="en-US" sz="3200" dirty="0"/>
+          </a:p>
+          <a:p>
+            <a:endParaRPr lang="en-US" sz="3200" dirty="0"/>
+          </a:p>
+          <a:p>
+            <a:endParaRPr lang="en-US" sz="3200" dirty="0"/>
+          </a:p>
+          <a:p>
+            <a:endParaRPr lang="en-US" sz="3200" dirty="0"/>
+          </a:p>
+          <a:p>
+            <a:endParaRPr lang="en-US" sz="3200" dirty="0"/>
+          </a:p>
+        </p:txBody>
+      </p:sp>
+      <p:graphicFrame>
+        <p:nvGraphicFramePr>
+          <p:cNvPr id="129" name="Table 128">
+            <a:extLst>
+              <a:ext uri="{FF2B5EF4-FFF2-40B4-BE49-F238E27FC236}">
+                <a16:creationId xmlns:a16="http://schemas.microsoft.com/office/drawing/2014/main" id="{78DCC267-FA1F-4034-AEC8-2571A0AB40B4}"/>
+              </a:ext>
+            </a:extLst>
+          </p:cNvPr>
+          <p:cNvGraphicFramePr>
+            <a:graphicFrameLocks noGrp="1"/>
+          </p:cNvGraphicFramePr>
+          <p:nvPr>
+            <p:extLst>
+              <p:ext uri="{D42A27DB-BD31-4B8C-83A1-F6EECF244321}">
+                <p14:modId xmlns:p14="http://schemas.microsoft.com/office/powerpoint/2010/main" val="2582960622"/>
+              </p:ext>
+            </p:extLst>
+          </p:nvPr>
+        </p:nvGraphicFramePr>
+        <p:xfrm>
+          <a:off x="15619152" y="16275197"/>
+          <a:ext cx="12593895" cy="3243360"/>
+        </p:xfrm>
+        <a:graphic>
+          <a:graphicData uri="http://schemas.openxmlformats.org/drawingml/2006/table">
+            <a:tbl>
+              <a:tblPr firstRow="1" bandRow="1">
+                <a:tableStyleId>{7E9639D4-E3E2-4D34-9284-5A2195B3D0D7}</a:tableStyleId>
+              </a:tblPr>
+              <a:tblGrid>
+                <a:gridCol w="2518779">
+                  <a:extLst>
+                    <a:ext uri="{9D8B030D-6E8A-4147-A177-3AD203B41FA5}">
+                      <a16:colId xmlns:a16="http://schemas.microsoft.com/office/drawing/2014/main" val="3739837609"/>
+                    </a:ext>
+                  </a:extLst>
+                </a:gridCol>
+                <a:gridCol w="2518779">
+                  <a:extLst>
+                    <a:ext uri="{9D8B030D-6E8A-4147-A177-3AD203B41FA5}">
+                      <a16:colId xmlns:a16="http://schemas.microsoft.com/office/drawing/2014/main" val="2642331103"/>
+                    </a:ext>
+                  </a:extLst>
+                </a:gridCol>
+                <a:gridCol w="2518779">
+                  <a:extLst>
+                    <a:ext uri="{9D8B030D-6E8A-4147-A177-3AD203B41FA5}">
+                      <a16:colId xmlns:a16="http://schemas.microsoft.com/office/drawing/2014/main" val="572115807"/>
+                    </a:ext>
+                  </a:extLst>
+                </a:gridCol>
+                <a:gridCol w="2518779">
+                  <a:extLst>
+                    <a:ext uri="{9D8B030D-6E8A-4147-A177-3AD203B41FA5}">
+                      <a16:colId xmlns:a16="http://schemas.microsoft.com/office/drawing/2014/main" val="1144260684"/>
+                    </a:ext>
+                  </a:extLst>
+                </a:gridCol>
+                <a:gridCol w="2518779">
+                  <a:extLst>
+                    <a:ext uri="{9D8B030D-6E8A-4147-A177-3AD203B41FA5}">
+                      <a16:colId xmlns:a16="http://schemas.microsoft.com/office/drawing/2014/main" val="1810436234"/>
+                    </a:ext>
+                  </a:extLst>
+                </a:gridCol>
+              </a:tblGrid>
+              <a:tr h="897544">
+                <a:tc>
+                  <a:txBody>
+                    <a:bodyPr/>
+                    <a:lstStyle/>
+                    <a:p>
+                      <a:endParaRPr lang="en-US" sz="3200" dirty="0"/>
+                    </a:p>
+                  </a:txBody>
+                  <a:tcPr>
+                    <a:lnL w="12700" cap="flat" cmpd="sng" algn="ctr">
+                      <a:solidFill>
+                        <a:schemeClr val="tx1"/>
+                      </a:solidFill>
+                      <a:prstDash val="solid"/>
+                      <a:round/>
+                      <a:headEnd type="none" w="med" len="med"/>
+                      <a:tailEnd type="none" w="med" len="med"/>
+                    </a:lnL>
+                    <a:lnR w="12700" cap="flat" cmpd="sng" algn="ctr">
+                      <a:solidFill>
+                        <a:schemeClr val="tx1"/>
+                      </a:solidFill>
+                      <a:prstDash val="solid"/>
+                      <a:round/>
+                      <a:headEnd type="none" w="med" len="med"/>
+                      <a:tailEnd type="none" w="med" len="med"/>
+                    </a:lnR>
+                    <a:lnT w="12700" cap="flat" cmpd="sng" algn="ctr">
+                      <a:solidFill>
+                        <a:schemeClr val="tx1"/>
+                      </a:solidFill>
+                      <a:prstDash val="solid"/>
+                      <a:round/>
+                      <a:headEnd type="none" w="med" len="med"/>
+                      <a:tailEnd type="none" w="med" len="med"/>
+                    </a:lnT>
+                    <a:lnB w="12700" cap="flat" cmpd="sng" algn="ctr">
+                      <a:solidFill>
+                        <a:schemeClr val="tx1"/>
+                      </a:solidFill>
+                      <a:prstDash val="solid"/>
+                      <a:round/>
+                      <a:headEnd type="none" w="med" len="med"/>
+                      <a:tailEnd type="none" w="med" len="med"/>
+                    </a:lnB>
+                    <a:solidFill>
+                      <a:schemeClr val="tx1">
+                        <a:lumMod val="65000"/>
+                        <a:lumOff val="35000"/>
+                      </a:schemeClr>
+                    </a:solidFill>
+                  </a:tcPr>
+                </a:tc>
+                <a:tc>
+                  <a:txBody>
+                    <a:bodyPr/>
+                    <a:lstStyle/>
+                    <a:p>
+                      <a:r>
+                        <a:rPr lang="en-US" sz="3200" dirty="0"/>
+                        <a:t>Sastry et. al</a:t>
+                      </a:r>
+                    </a:p>
+                  </a:txBody>
+                  <a:tcPr>
+                    <a:lnL w="12700" cap="flat" cmpd="sng" algn="ctr">
+                      <a:solidFill>
+                        <a:schemeClr val="tx1"/>
+                      </a:solidFill>
+                      <a:prstDash val="solid"/>
+                      <a:round/>
+                      <a:headEnd type="none" w="med" len="med"/>
+                      <a:tailEnd type="none" w="med" len="med"/>
+                    </a:lnL>
+                    <a:lnR w="12700" cap="flat" cmpd="sng" algn="ctr">
+                      <a:solidFill>
+                        <a:schemeClr val="tx1"/>
+                      </a:solidFill>
+                      <a:prstDash val="solid"/>
+                      <a:round/>
+                      <a:headEnd type="none" w="med" len="med"/>
+                      <a:tailEnd type="none" w="med" len="med"/>
+                    </a:lnR>
+                    <a:lnT w="12700" cap="flat" cmpd="sng" algn="ctr">
+                      <a:solidFill>
+                        <a:schemeClr val="tx1"/>
+                      </a:solidFill>
+                      <a:prstDash val="solid"/>
+                      <a:round/>
+                      <a:headEnd type="none" w="med" len="med"/>
+                      <a:tailEnd type="none" w="med" len="med"/>
+                    </a:lnT>
+                    <a:lnB w="12700" cap="flat" cmpd="sng" algn="ctr">
+                      <a:solidFill>
+                        <a:schemeClr val="tx1"/>
+                      </a:solidFill>
+                      <a:prstDash val="solid"/>
+                      <a:round/>
+                      <a:headEnd type="none" w="med" len="med"/>
+                      <a:tailEnd type="none" w="med" len="med"/>
+                    </a:lnB>
+                    <a:solidFill>
+                      <a:schemeClr val="tx1">
+                        <a:lumMod val="65000"/>
+                        <a:lumOff val="35000"/>
+                      </a:schemeClr>
+                    </a:solidFill>
+                  </a:tcPr>
+                </a:tc>
+                <a:tc>
+                  <a:txBody>
+                    <a:bodyPr/>
+                    <a:lstStyle/>
+                    <a:p>
+                      <a:r>
+                        <a:rPr lang="en-US" sz="3200" dirty="0"/>
+                        <a:t>Optimized Network – Nucleotide Sequence</a:t>
+                      </a:r>
+                    </a:p>
+                  </a:txBody>
+                  <a:tcPr>
+                    <a:lnL w="12700" cap="flat" cmpd="sng" algn="ctr">
+                      <a:solidFill>
+                        <a:schemeClr val="tx1"/>
+                      </a:solidFill>
+                      <a:prstDash val="solid"/>
+                      <a:round/>
+                      <a:headEnd type="none" w="med" len="med"/>
+                      <a:tailEnd type="none" w="med" len="med"/>
+                    </a:lnL>
+                    <a:lnR w="12700" cap="flat" cmpd="sng" algn="ctr">
+                      <a:solidFill>
+                        <a:schemeClr val="tx1"/>
+                      </a:solidFill>
+                      <a:prstDash val="solid"/>
+                      <a:round/>
+                      <a:headEnd type="none" w="med" len="med"/>
+                      <a:tailEnd type="none" w="med" len="med"/>
+                    </a:lnR>
+                    <a:lnT w="12700" cap="flat" cmpd="sng" algn="ctr">
+                      <a:solidFill>
+                        <a:schemeClr val="tx1"/>
+                      </a:solidFill>
+                      <a:prstDash val="solid"/>
+                      <a:round/>
+                      <a:headEnd type="none" w="med" len="med"/>
+                      <a:tailEnd type="none" w="med" len="med"/>
+                    </a:lnT>
+                    <a:lnB w="12700" cap="flat" cmpd="sng" algn="ctr">
+                      <a:solidFill>
+                        <a:schemeClr val="tx1"/>
+                      </a:solidFill>
+                      <a:prstDash val="solid"/>
+                      <a:round/>
+                      <a:headEnd type="none" w="med" len="med"/>
+                      <a:tailEnd type="none" w="med" len="med"/>
+                    </a:lnB>
+                    <a:solidFill>
+                      <a:schemeClr val="tx1">
+                        <a:lumMod val="65000"/>
+                        <a:lumOff val="35000"/>
+                      </a:schemeClr>
+                    </a:solidFill>
+                  </a:tcPr>
+                </a:tc>
+                <a:tc>
+                  <a:txBody>
+                    <a:bodyPr/>
+                    <a:lstStyle/>
+                    <a:p>
+                      <a:r>
+                        <a:rPr lang="en-US" sz="3200" dirty="0"/>
+                        <a:t>Optimized Network – Amino Acid Sequence</a:t>
+                      </a:r>
+                    </a:p>
+                  </a:txBody>
+                  <a:tcPr>
+                    <a:lnL w="12700" cap="flat" cmpd="sng" algn="ctr">
+                      <a:solidFill>
+                        <a:schemeClr val="tx1"/>
+                      </a:solidFill>
+                      <a:prstDash val="solid"/>
+                      <a:round/>
+                      <a:headEnd type="none" w="med" len="med"/>
+                      <a:tailEnd type="none" w="med" len="med"/>
+                    </a:lnL>
+                    <a:lnR w="12700" cap="flat" cmpd="sng" algn="ctr">
+                      <a:solidFill>
+                        <a:schemeClr val="tx1"/>
+                      </a:solidFill>
+                      <a:prstDash val="solid"/>
+                      <a:round/>
+                      <a:headEnd type="none" w="med" len="med"/>
+                      <a:tailEnd type="none" w="med" len="med"/>
+                    </a:lnR>
+                    <a:lnT w="12700" cap="flat" cmpd="sng" algn="ctr">
+                      <a:solidFill>
+                        <a:schemeClr val="tx1"/>
+                      </a:solidFill>
+                      <a:prstDash val="solid"/>
+                      <a:round/>
+                      <a:headEnd type="none" w="med" len="med"/>
+                      <a:tailEnd type="none" w="med" len="med"/>
+                    </a:lnT>
+                    <a:lnB w="12700" cap="flat" cmpd="sng" algn="ctr">
+                      <a:solidFill>
+                        <a:schemeClr val="tx1"/>
+                      </a:solidFill>
+                      <a:prstDash val="solid"/>
+                      <a:round/>
+                      <a:headEnd type="none" w="med" len="med"/>
+                      <a:tailEnd type="none" w="med" len="med"/>
+                    </a:lnB>
+                    <a:solidFill>
+                      <a:schemeClr val="tx1">
+                        <a:lumMod val="65000"/>
+                        <a:lumOff val="35000"/>
+                      </a:schemeClr>
+                    </a:solidFill>
+                  </a:tcPr>
+                </a:tc>
+                <a:tc>
+                  <a:txBody>
+                    <a:bodyPr/>
+                    <a:lstStyle/>
+                    <a:p>
+                      <a:r>
+                        <a:rPr lang="en-US" sz="3200" dirty="0"/>
+                        <a:t>LSTM/ CNN</a:t>
+                      </a:r>
+                    </a:p>
+                  </a:txBody>
+                  <a:tcPr>
+                    <a:lnL w="12700" cap="flat" cmpd="sng" algn="ctr">
+                      <a:solidFill>
+                        <a:schemeClr val="tx1"/>
+                      </a:solidFill>
+                      <a:prstDash val="solid"/>
+                      <a:round/>
+                      <a:headEnd type="none" w="med" len="med"/>
+                      <a:tailEnd type="none" w="med" len="med"/>
+                    </a:lnL>
+                    <a:lnR w="12700" cap="flat" cmpd="sng" algn="ctr">
+                      <a:solidFill>
+                        <a:schemeClr val="tx1"/>
+                      </a:solidFill>
+                      <a:prstDash val="solid"/>
+                      <a:round/>
+                      <a:headEnd type="none" w="med" len="med"/>
+                      <a:tailEnd type="none" w="med" len="med"/>
+                    </a:lnR>
+                    <a:lnT w="12700" cap="flat" cmpd="sng" algn="ctr">
+                      <a:solidFill>
+                        <a:schemeClr val="tx1"/>
+                      </a:solidFill>
+                      <a:prstDash val="solid"/>
+                      <a:round/>
+                      <a:headEnd type="none" w="med" len="med"/>
+                      <a:tailEnd type="none" w="med" len="med"/>
+                    </a:lnT>
+                    <a:lnB w="12700" cap="flat" cmpd="sng" algn="ctr">
+                      <a:solidFill>
+                        <a:schemeClr val="tx1"/>
+                      </a:solidFill>
+                      <a:prstDash val="solid"/>
+                      <a:round/>
+                      <a:headEnd type="none" w="med" len="med"/>
+                      <a:tailEnd type="none" w="med" len="med"/>
+                    </a:lnB>
+                    <a:solidFill>
+                      <a:schemeClr val="tx1">
+                        <a:lumMod val="65000"/>
+                        <a:lumOff val="35000"/>
+                      </a:schemeClr>
+                    </a:solidFill>
+                  </a:tcPr>
+                </a:tc>
+                <a:extLst>
+                  <a:ext uri="{0D108BD9-81ED-4DB2-BD59-A6C34878D82A}">
+                    <a16:rowId xmlns:a16="http://schemas.microsoft.com/office/drawing/2014/main" val="2399813256"/>
+                  </a:ext>
+                </a:extLst>
+              </a:tr>
+              <a:tr h="600600">
+                <a:tc>
+                  <a:txBody>
+                    <a:bodyPr/>
+                    <a:lstStyle/>
+                    <a:p>
+                      <a:r>
+                        <a:rPr lang="en-US" sz="3200" dirty="0"/>
+                        <a:t>Expression</a:t>
+                      </a:r>
+                    </a:p>
+                  </a:txBody>
+                  <a:tcPr>
+                    <a:lnL w="12700" cap="flat" cmpd="sng" algn="ctr">
+                      <a:solidFill>
+                        <a:schemeClr val="tx1"/>
+                      </a:solidFill>
+                      <a:prstDash val="solid"/>
+                      <a:round/>
+                      <a:headEnd type="none" w="med" len="med"/>
+                      <a:tailEnd type="none" w="med" len="med"/>
+                    </a:lnL>
+                    <a:lnR w="12700" cap="flat" cmpd="sng" algn="ctr">
+                      <a:solidFill>
+                        <a:schemeClr val="tx1"/>
+                      </a:solidFill>
+                      <a:prstDash val="solid"/>
+                      <a:round/>
+                      <a:headEnd type="none" w="med" len="med"/>
+                      <a:tailEnd type="none" w="med" len="med"/>
+                    </a:lnR>
+                    <a:lnT w="12700" cap="flat" cmpd="sng" algn="ctr">
+                      <a:solidFill>
+                        <a:schemeClr val="tx1"/>
+                      </a:solidFill>
+                      <a:prstDash val="solid"/>
+                      <a:round/>
+                      <a:headEnd type="none" w="med" len="med"/>
+                      <a:tailEnd type="none" w="med" len="med"/>
+                    </a:lnT>
+                    <a:lnB w="12700" cap="flat" cmpd="sng" algn="ctr">
+                      <a:solidFill>
+                        <a:schemeClr val="tx1"/>
+                      </a:solidFill>
+                      <a:prstDash val="solid"/>
+                      <a:round/>
+                      <a:headEnd type="none" w="med" len="med"/>
+                      <a:tailEnd type="none" w="med" len="med"/>
+                    </a:lnB>
+                  </a:tcPr>
+                </a:tc>
+                <a:tc>
+                  <a:txBody>
+                    <a:bodyPr/>
+                    <a:lstStyle/>
+                    <a:p>
+                      <a:r>
+                        <a:rPr lang="en-US" sz="3200" dirty="0"/>
+                        <a:t>70%</a:t>
+                      </a:r>
+                    </a:p>
+                  </a:txBody>
+                  <a:tcPr>
+                    <a:lnL w="12700" cap="flat" cmpd="sng" algn="ctr">
+                      <a:solidFill>
+                        <a:schemeClr val="tx1"/>
+                      </a:solidFill>
+                      <a:prstDash val="solid"/>
+                      <a:round/>
+                      <a:headEnd type="none" w="med" len="med"/>
+                      <a:tailEnd type="none" w="med" len="med"/>
+                    </a:lnL>
+                    <a:lnR w="12700" cap="flat" cmpd="sng" algn="ctr">
+                      <a:solidFill>
+                        <a:schemeClr val="tx1"/>
+                      </a:solidFill>
+                      <a:prstDash val="solid"/>
+                      <a:round/>
+                      <a:headEnd type="none" w="med" len="med"/>
+                      <a:tailEnd type="none" w="med" len="med"/>
+                    </a:lnR>
+                    <a:lnT w="12700" cap="flat" cmpd="sng" algn="ctr">
+                      <a:solidFill>
+                        <a:schemeClr val="tx1"/>
+                      </a:solidFill>
+                      <a:prstDash val="solid"/>
+                      <a:round/>
+                      <a:headEnd type="none" w="med" len="med"/>
+                      <a:tailEnd type="none" w="med" len="med"/>
+                    </a:lnT>
+                    <a:lnB w="12700" cap="flat" cmpd="sng" algn="ctr">
+                      <a:solidFill>
+                        <a:schemeClr val="tx1"/>
+                      </a:solidFill>
+                      <a:prstDash val="solid"/>
+                      <a:round/>
+                      <a:headEnd type="none" w="med" len="med"/>
+                      <a:tailEnd type="none" w="med" len="med"/>
+                    </a:lnB>
+                  </a:tcPr>
+                </a:tc>
+                <a:tc>
+                  <a:txBody>
+                    <a:bodyPr/>
+                    <a:lstStyle/>
+                    <a:p>
+                      <a:r>
+                        <a:rPr lang="en-US" sz="3200" dirty="0"/>
+                        <a:t>72.5% </a:t>
+                      </a:r>
+                      <a:r>
+                        <a:rPr lang="en-US" sz="3200" dirty="0">
+                          <a:latin typeface="Calibri" panose="020F0502020204030204" pitchFamily="34" charset="0"/>
+                          <a:cs typeface="Calibri" panose="020F0502020204030204" pitchFamily="34" charset="0"/>
+                        </a:rPr>
+                        <a:t>± **</a:t>
+                      </a:r>
+                      <a:endParaRPr lang="en-US" sz="3200" dirty="0"/>
+                    </a:p>
+                  </a:txBody>
+                  <a:tcPr>
+                    <a:lnL w="12700" cap="flat" cmpd="sng" algn="ctr">
+                      <a:solidFill>
+                        <a:schemeClr val="tx1"/>
+                      </a:solidFill>
+                      <a:prstDash val="solid"/>
+                      <a:round/>
+                      <a:headEnd type="none" w="med" len="med"/>
+                      <a:tailEnd type="none" w="med" len="med"/>
+                    </a:lnL>
+                    <a:lnR w="12700" cap="flat" cmpd="sng" algn="ctr">
+                      <a:solidFill>
+                        <a:schemeClr val="tx1"/>
+                      </a:solidFill>
+                      <a:prstDash val="solid"/>
+                      <a:round/>
+                      <a:headEnd type="none" w="med" len="med"/>
+                      <a:tailEnd type="none" w="med" len="med"/>
+                    </a:lnR>
+                    <a:lnT w="12700" cap="flat" cmpd="sng" algn="ctr">
+                      <a:solidFill>
+                        <a:schemeClr val="tx1"/>
+                      </a:solidFill>
+                      <a:prstDash val="solid"/>
+                      <a:round/>
+                      <a:headEnd type="none" w="med" len="med"/>
+                      <a:tailEnd type="none" w="med" len="med"/>
+                    </a:lnT>
+                    <a:lnB w="12700" cap="flat" cmpd="sng" algn="ctr">
+                      <a:solidFill>
+                        <a:schemeClr val="tx1"/>
+                      </a:solidFill>
+                      <a:prstDash val="solid"/>
+                      <a:round/>
+                      <a:headEnd type="none" w="med" len="med"/>
+                      <a:tailEnd type="none" w="med" len="med"/>
+                    </a:lnB>
+                  </a:tcPr>
+                </a:tc>
+                <a:tc>
+                  <a:txBody>
+                    <a:bodyPr/>
+                    <a:lstStyle/>
+                    <a:p>
+                      <a:r>
+                        <a:rPr lang="en-US" sz="3200" dirty="0">
+                          <a:latin typeface="Calibri" panose="020F0502020204030204" pitchFamily="34" charset="0"/>
+                          <a:cs typeface="Calibri" panose="020F0502020204030204" pitchFamily="34" charset="0"/>
+                        </a:rPr>
+                        <a:t>73.5% ± 1.0%</a:t>
+                      </a:r>
+                      <a:endParaRPr lang="en-US" sz="3200" dirty="0"/>
+                    </a:p>
+                  </a:txBody>
+                  <a:tcPr>
+                    <a:lnL w="12700" cap="flat" cmpd="sng" algn="ctr">
+                      <a:solidFill>
+                        <a:schemeClr val="tx1"/>
+                      </a:solidFill>
+                      <a:prstDash val="solid"/>
+                      <a:round/>
+                      <a:headEnd type="none" w="med" len="med"/>
+                      <a:tailEnd type="none" w="med" len="med"/>
+                    </a:lnL>
+                    <a:lnR w="12700" cap="flat" cmpd="sng" algn="ctr">
+                      <a:solidFill>
+                        <a:schemeClr val="tx1"/>
+                      </a:solidFill>
+                      <a:prstDash val="solid"/>
+                      <a:round/>
+                      <a:headEnd type="none" w="med" len="med"/>
+                      <a:tailEnd type="none" w="med" len="med"/>
+                    </a:lnR>
+                    <a:lnT w="12700" cap="flat" cmpd="sng" algn="ctr">
+                      <a:solidFill>
+                        <a:schemeClr val="tx1"/>
+                      </a:solidFill>
+                      <a:prstDash val="solid"/>
+                      <a:round/>
+                      <a:headEnd type="none" w="med" len="med"/>
+                      <a:tailEnd type="none" w="med" len="med"/>
+                    </a:lnT>
+                    <a:lnB w="12700" cap="flat" cmpd="sng" algn="ctr">
+                      <a:solidFill>
+                        <a:schemeClr val="tx1"/>
+                      </a:solidFill>
+                      <a:prstDash val="solid"/>
+                      <a:round/>
+                      <a:headEnd type="none" w="med" len="med"/>
+                      <a:tailEnd type="none" w="med" len="med"/>
+                    </a:lnB>
+                  </a:tcPr>
+                </a:tc>
+                <a:tc>
+                  <a:txBody>
+                    <a:bodyPr/>
+                    <a:lstStyle/>
+                    <a:p>
+                      <a:endParaRPr lang="en-US" sz="3200" dirty="0"/>
+                    </a:p>
+                  </a:txBody>
+                  <a:tcPr>
+                    <a:lnL w="12700" cap="flat" cmpd="sng" algn="ctr">
+                      <a:solidFill>
+                        <a:schemeClr val="tx1"/>
+                      </a:solidFill>
+                      <a:prstDash val="solid"/>
+                      <a:round/>
+                      <a:headEnd type="none" w="med" len="med"/>
+                      <a:tailEnd type="none" w="med" len="med"/>
+                    </a:lnL>
+                    <a:lnR w="12700" cap="flat" cmpd="sng" algn="ctr">
+                      <a:solidFill>
+                        <a:schemeClr val="tx1"/>
+                      </a:solidFill>
+                      <a:prstDash val="solid"/>
+                      <a:round/>
+                      <a:headEnd type="none" w="med" len="med"/>
+                      <a:tailEnd type="none" w="med" len="med"/>
+                    </a:lnR>
+                    <a:lnT w="12700" cap="flat" cmpd="sng" algn="ctr">
+                      <a:solidFill>
+                        <a:schemeClr val="tx1"/>
+                      </a:solidFill>
+                      <a:prstDash val="solid"/>
+                      <a:round/>
+                      <a:headEnd type="none" w="med" len="med"/>
+                      <a:tailEnd type="none" w="med" len="med"/>
+                    </a:lnT>
+                    <a:lnB w="12700" cap="flat" cmpd="sng" algn="ctr">
+                      <a:solidFill>
+                        <a:schemeClr val="tx1"/>
+                      </a:solidFill>
+                      <a:prstDash val="solid"/>
+                      <a:round/>
+                      <a:headEnd type="none" w="med" len="med"/>
+                      <a:tailEnd type="none" w="med" len="med"/>
+                    </a:lnB>
+                  </a:tcPr>
+                </a:tc>
+                <a:extLst>
+                  <a:ext uri="{0D108BD9-81ED-4DB2-BD59-A6C34878D82A}">
+                    <a16:rowId xmlns:a16="http://schemas.microsoft.com/office/drawing/2014/main" val="3575149461"/>
+                  </a:ext>
+                </a:extLst>
+              </a:tr>
+              <a:tr h="600600">
+                <a:tc>
+                  <a:txBody>
+                    <a:bodyPr/>
+                    <a:lstStyle/>
+                    <a:p>
+                      <a:r>
+                        <a:rPr lang="en-US" sz="3200" dirty="0"/>
+                        <a:t>Solubility</a:t>
+                      </a:r>
+                    </a:p>
+                  </a:txBody>
+                  <a:tcPr>
+                    <a:lnL w="12700" cap="flat" cmpd="sng" algn="ctr">
+                      <a:solidFill>
+                        <a:schemeClr val="tx1"/>
+                      </a:solidFill>
+                      <a:prstDash val="solid"/>
+                      <a:round/>
+                      <a:headEnd type="none" w="med" len="med"/>
+                      <a:tailEnd type="none" w="med" len="med"/>
+                    </a:lnL>
+                    <a:lnR w="12700" cap="flat" cmpd="sng" algn="ctr">
+                      <a:solidFill>
+                        <a:schemeClr val="tx1"/>
+                      </a:solidFill>
+                      <a:prstDash val="solid"/>
+                      <a:round/>
+                      <a:headEnd type="none" w="med" len="med"/>
+                      <a:tailEnd type="none" w="med" len="med"/>
+                    </a:lnR>
+                    <a:lnT w="12700" cap="flat" cmpd="sng" algn="ctr">
+                      <a:solidFill>
+                        <a:schemeClr val="tx1"/>
+                      </a:solidFill>
+                      <a:prstDash val="solid"/>
+                      <a:round/>
+                      <a:headEnd type="none" w="med" len="med"/>
+                      <a:tailEnd type="none" w="med" len="med"/>
+                    </a:lnT>
+                    <a:lnB w="12700" cap="flat" cmpd="sng" algn="ctr">
+                      <a:solidFill>
+                        <a:schemeClr val="tx1"/>
+                      </a:solidFill>
+                      <a:prstDash val="solid"/>
+                      <a:round/>
+                      <a:headEnd type="none" w="med" len="med"/>
+                      <a:tailEnd type="none" w="med" len="med"/>
+                    </a:lnB>
+                  </a:tcPr>
+                </a:tc>
+                <a:tc>
+                  <a:txBody>
+                    <a:bodyPr/>
+                    <a:lstStyle/>
+                    <a:p>
+                      <a:r>
+                        <a:rPr lang="en-US" sz="3200" dirty="0"/>
+                        <a:t>80%</a:t>
+                      </a:r>
+                    </a:p>
+                  </a:txBody>
+                  <a:tcPr>
+                    <a:lnL w="12700" cap="flat" cmpd="sng" algn="ctr">
+                      <a:solidFill>
+                        <a:schemeClr val="tx1"/>
+                      </a:solidFill>
+                      <a:prstDash val="solid"/>
+                      <a:round/>
+                      <a:headEnd type="none" w="med" len="med"/>
+                      <a:tailEnd type="none" w="med" len="med"/>
+                    </a:lnL>
+                    <a:lnR w="12700" cap="flat" cmpd="sng" algn="ctr">
+                      <a:solidFill>
+                        <a:schemeClr val="tx1"/>
+                      </a:solidFill>
+                      <a:prstDash val="solid"/>
+                      <a:round/>
+                      <a:headEnd type="none" w="med" len="med"/>
+                      <a:tailEnd type="none" w="med" len="med"/>
+                    </a:lnR>
+                    <a:lnT w="12700" cap="flat" cmpd="sng" algn="ctr">
+                      <a:solidFill>
+                        <a:schemeClr val="tx1"/>
+                      </a:solidFill>
+                      <a:prstDash val="solid"/>
+                      <a:round/>
+                      <a:headEnd type="none" w="med" len="med"/>
+                      <a:tailEnd type="none" w="med" len="med"/>
+                    </a:lnT>
+                    <a:lnB w="12700" cap="flat" cmpd="sng" algn="ctr">
+                      <a:solidFill>
+                        <a:schemeClr val="tx1"/>
+                      </a:solidFill>
+                      <a:prstDash val="solid"/>
+                      <a:round/>
+                      <a:headEnd type="none" w="med" len="med"/>
+                      <a:tailEnd type="none" w="med" len="med"/>
+                    </a:lnB>
+                  </a:tcPr>
+                </a:tc>
+                <a:tc>
+                  <a:txBody>
+                    <a:bodyPr/>
+                    <a:lstStyle/>
+                    <a:p>
+                      <a:r>
+                        <a:rPr lang="en-US" sz="3200" dirty="0"/>
+                        <a:t>-- </a:t>
+                      </a:r>
+                    </a:p>
+                  </a:txBody>
+                  <a:tcPr>
+                    <a:lnL w="12700" cap="flat" cmpd="sng" algn="ctr">
+                      <a:solidFill>
+                        <a:schemeClr val="tx1"/>
+                      </a:solidFill>
+                      <a:prstDash val="solid"/>
+                      <a:round/>
+                      <a:headEnd type="none" w="med" len="med"/>
+                      <a:tailEnd type="none" w="med" len="med"/>
+                    </a:lnL>
+                    <a:lnR w="12700" cap="flat" cmpd="sng" algn="ctr">
+                      <a:solidFill>
+                        <a:schemeClr val="tx1"/>
+                      </a:solidFill>
+                      <a:prstDash val="solid"/>
+                      <a:round/>
+                      <a:headEnd type="none" w="med" len="med"/>
+                      <a:tailEnd type="none" w="med" len="med"/>
+                    </a:lnR>
+                    <a:lnT w="12700" cap="flat" cmpd="sng" algn="ctr">
+                      <a:solidFill>
+                        <a:schemeClr val="tx1"/>
+                      </a:solidFill>
+                      <a:prstDash val="solid"/>
+                      <a:round/>
+                      <a:headEnd type="none" w="med" len="med"/>
+                      <a:tailEnd type="none" w="med" len="med"/>
+                    </a:lnT>
+                    <a:lnB w="12700" cap="flat" cmpd="sng" algn="ctr">
+                      <a:solidFill>
+                        <a:schemeClr val="tx1"/>
+                      </a:solidFill>
+                      <a:prstDash val="solid"/>
+                      <a:round/>
+                      <a:headEnd type="none" w="med" len="med"/>
+                      <a:tailEnd type="none" w="med" len="med"/>
+                    </a:lnB>
+                  </a:tcPr>
+                </a:tc>
+                <a:tc>
+                  <a:txBody>
+                    <a:bodyPr/>
+                    <a:lstStyle/>
+                    <a:p>
+                      <a:r>
+                        <a:rPr lang="en-US" sz="3200" dirty="0">
+                          <a:latin typeface="Calibri" panose="020F0502020204030204" pitchFamily="34" charset="0"/>
+                          <a:cs typeface="Calibri" panose="020F0502020204030204" pitchFamily="34" charset="0"/>
+                        </a:rPr>
+                        <a:t>80.1% ± 1.4%</a:t>
+                      </a:r>
+                      <a:endParaRPr lang="en-US" sz="3200" dirty="0"/>
+                    </a:p>
+                  </a:txBody>
+                  <a:tcPr>
+                    <a:lnL w="12700" cap="flat" cmpd="sng" algn="ctr">
+                      <a:solidFill>
+                        <a:schemeClr val="tx1"/>
+                      </a:solidFill>
+                      <a:prstDash val="solid"/>
+                      <a:round/>
+                      <a:headEnd type="none" w="med" len="med"/>
+                      <a:tailEnd type="none" w="med" len="med"/>
+                    </a:lnL>
+                    <a:lnR w="12700" cap="flat" cmpd="sng" algn="ctr">
+                      <a:solidFill>
+                        <a:schemeClr val="tx1"/>
+                      </a:solidFill>
+                      <a:prstDash val="solid"/>
+                      <a:round/>
+                      <a:headEnd type="none" w="med" len="med"/>
+                      <a:tailEnd type="none" w="med" len="med"/>
+                    </a:lnR>
+                    <a:lnT w="12700" cap="flat" cmpd="sng" algn="ctr">
+                      <a:solidFill>
+                        <a:schemeClr val="tx1"/>
+                      </a:solidFill>
+                      <a:prstDash val="solid"/>
+                      <a:round/>
+                      <a:headEnd type="none" w="med" len="med"/>
+                      <a:tailEnd type="none" w="med" len="med"/>
+                    </a:lnT>
+                    <a:lnB w="12700" cap="flat" cmpd="sng" algn="ctr">
+                      <a:solidFill>
+                        <a:schemeClr val="tx1"/>
+                      </a:solidFill>
+                      <a:prstDash val="solid"/>
+                      <a:round/>
+                      <a:headEnd type="none" w="med" len="med"/>
+                      <a:tailEnd type="none" w="med" len="med"/>
+                    </a:lnB>
+                  </a:tcPr>
+                </a:tc>
+                <a:tc>
+                  <a:txBody>
+                    <a:bodyPr/>
+                    <a:lstStyle/>
+                    <a:p>
+                      <a:endParaRPr lang="en-US" sz="3200" dirty="0"/>
+                    </a:p>
+                  </a:txBody>
+                  <a:tcPr>
+                    <a:lnL w="12700" cap="flat" cmpd="sng" algn="ctr">
+                      <a:solidFill>
+                        <a:schemeClr val="tx1"/>
+                      </a:solidFill>
+                      <a:prstDash val="solid"/>
+                      <a:round/>
+                      <a:headEnd type="none" w="med" len="med"/>
+                      <a:tailEnd type="none" w="med" len="med"/>
+                    </a:lnL>
+                    <a:lnR w="12700" cap="flat" cmpd="sng" algn="ctr">
+                      <a:solidFill>
+                        <a:schemeClr val="tx1"/>
+                      </a:solidFill>
+                      <a:prstDash val="solid"/>
+                      <a:round/>
+                      <a:headEnd type="none" w="med" len="med"/>
+                      <a:tailEnd type="none" w="med" len="med"/>
+                    </a:lnR>
+                    <a:lnT w="12700" cap="flat" cmpd="sng" algn="ctr">
+                      <a:solidFill>
+                        <a:schemeClr val="tx1"/>
+                      </a:solidFill>
+                      <a:prstDash val="solid"/>
+                      <a:round/>
+                      <a:headEnd type="none" w="med" len="med"/>
+                      <a:tailEnd type="none" w="med" len="med"/>
+                    </a:lnT>
+                    <a:lnB w="12700" cap="flat" cmpd="sng" algn="ctr">
+                      <a:solidFill>
+                        <a:schemeClr val="tx1"/>
+                      </a:solidFill>
+                      <a:prstDash val="solid"/>
+                      <a:round/>
+                      <a:headEnd type="none" w="med" len="med"/>
+                      <a:tailEnd type="none" w="med" len="med"/>
+                    </a:lnB>
+                  </a:tcPr>
+                </a:tc>
+                <a:extLst>
+                  <a:ext uri="{0D108BD9-81ED-4DB2-BD59-A6C34878D82A}">
+                    <a16:rowId xmlns:a16="http://schemas.microsoft.com/office/drawing/2014/main" val="3545368195"/>
+                  </a:ext>
+                </a:extLst>
+              </a:tr>
+            </a:tbl>
+          </a:graphicData>
+        </a:graphic>
+      </p:graphicFrame>
+      <p:sp>
+        <p:nvSpPr>
+          <p:cNvPr id="131" name="TextBox 130">
+            <a:extLst>
+              <a:ext uri="{FF2B5EF4-FFF2-40B4-BE49-F238E27FC236}">
+                <a16:creationId xmlns:a16="http://schemas.microsoft.com/office/drawing/2014/main" id="{A5EC576F-442F-4C9C-BD00-B23E43E6EA57}"/>
+              </a:ext>
+            </a:extLst>
+          </p:cNvPr>
+          <p:cNvSpPr txBox="1"/>
+          <p:nvPr/>
+        </p:nvSpPr>
+        <p:spPr>
+          <a:xfrm>
+            <a:off x="15515299" y="15484091"/>
+            <a:ext cx="12801600" cy="646331"/>
+          </a:xfrm>
+          <a:prstGeom prst="rect">
+            <a:avLst/>
+          </a:prstGeom>
+          <a:noFill/>
+        </p:spPr>
+        <p:txBody>
+          <a:bodyPr wrap="square" rtlCol="0">
+            <a:spAutoFit/>
+          </a:bodyPr>
+          <a:lstStyle/>
+          <a:p>
+            <a:pPr algn="ctr"/>
+            <a:r>
+              <a:rPr lang="en-US" sz="3600" u="sng" dirty="0"/>
+              <a:t>Accuracy of various approaches</a:t>
+            </a:r>
+          </a:p>
+        </p:txBody>
+      </p:sp>
+      <p:sp>
+        <p:nvSpPr>
+          <p:cNvPr id="133" name="TextBox 132">
+            <a:extLst>
+              <a:ext uri="{FF2B5EF4-FFF2-40B4-BE49-F238E27FC236}">
+                <a16:creationId xmlns:a16="http://schemas.microsoft.com/office/drawing/2014/main" id="{8505CE53-AB5C-4748-A608-3ADB0A62BECA}"/>
+              </a:ext>
+            </a:extLst>
+          </p:cNvPr>
+          <p:cNvSpPr txBox="1"/>
+          <p:nvPr/>
+        </p:nvSpPr>
+        <p:spPr>
+          <a:xfrm>
+            <a:off x="14905699" y="20948826"/>
+            <a:ext cx="12801600" cy="646331"/>
+          </a:xfrm>
+          <a:prstGeom prst="rect">
+            <a:avLst/>
+          </a:prstGeom>
+          <a:noFill/>
+        </p:spPr>
+        <p:txBody>
+          <a:bodyPr wrap="square" rtlCol="0">
+            <a:spAutoFit/>
+          </a:bodyPr>
+          <a:lstStyle/>
+          <a:p>
+            <a:pPr algn="ctr"/>
+            <a:r>
+              <a:rPr lang="en-US" sz="3600" u="sng" dirty="0"/>
+              <a:t>Sensitivity to quantiles </a:t>
+            </a:r>
+          </a:p>
+        </p:txBody>
+      </p:sp>
+      <p:sp>
+        <p:nvSpPr>
+          <p:cNvPr id="27" name="Rectangle 26">
+            <a:extLst>
+              <a:ext uri="{FF2B5EF4-FFF2-40B4-BE49-F238E27FC236}">
+                <a16:creationId xmlns:a16="http://schemas.microsoft.com/office/drawing/2014/main" id="{66F9E55C-999C-4F5B-B64C-29EE3FDE3C67}"/>
+              </a:ext>
+            </a:extLst>
+          </p:cNvPr>
+          <p:cNvSpPr/>
+          <p:nvPr/>
+        </p:nvSpPr>
+        <p:spPr>
+          <a:xfrm>
+            <a:off x="18081616" y="22394699"/>
+            <a:ext cx="7053024" cy="4793320"/>
+          </a:xfrm>
+          <a:prstGeom prst="rect">
+            <a:avLst/>
+          </a:prstGeom>
+          <a:ln/>
+        </p:spPr>
+        <p:style>
+          <a:lnRef idx="2">
+            <a:schemeClr val="dk1">
+              <a:shade val="50000"/>
+            </a:schemeClr>
+          </a:lnRef>
+          <a:fillRef idx="1">
+            <a:schemeClr val="dk1"/>
+          </a:fillRef>
+          <a:effectRef idx="0">
+            <a:schemeClr val="dk1"/>
+          </a:effectRef>
+          <a:fontRef idx="minor">
+            <a:schemeClr val="lt1"/>
+          </a:fontRef>
+        </p:style>
+        <p:txBody>
+          <a:bodyPr rtlCol="0" anchor="ctr"/>
+          <a:lstStyle/>
+          <a:p>
+            <a:pPr algn="ctr"/>
+            <a:r>
+              <a:rPr lang="en-US" sz="6000" dirty="0"/>
+              <a:t>Histogram?</a:t>
             </a:r>
           </a:p>
         </p:txBody>

</xml_diff>

<commit_message>
Update poster, add quantile results.
</commit_message>
<xml_diff>
--- a/poster/NDAC_Poster.pptx
+++ b/poster/NDAC_Poster.pptx
@@ -203,7 +203,7 @@
           <a:p>
             <a:fld id="{F1C0B079-A316-4C9B-B165-DF9EA8325D2C}" type="datetimeFigureOut">
               <a:rPr lang="en-US" smtClean="0"/>
-              <a:t>6/27/2018</a:t>
+              <a:t>6/27/18</a:t>
             </a:fld>
             <a:endParaRPr lang="en-US"/>
           </a:p>
@@ -368,7 +368,7 @@
           <a:p>
             <a:fld id="{38F28AB8-57D1-494F-9851-055AD867E790}" type="datetimeFigureOut">
               <a:rPr lang="en-US" smtClean="0"/>
-              <a:t>6/27/2018</a:t>
+              <a:t>6/27/18</a:t>
             </a:fld>
             <a:endParaRPr lang="en-US"/>
           </a:p>
@@ -3570,7 +3570,7 @@
           <a:p>
             <a:fld id="{ECAA57DF-1C19-4726-AB84-014692BAD8F5}" type="datetimeFigureOut">
               <a:rPr lang="en-US" smtClean="0"/>
-              <a:t>6/27/2018</a:t>
+              <a:t>6/27/18</a:t>
             </a:fld>
             <a:endParaRPr lang="en-US"/>
           </a:p>
@@ -3909,7 +3909,7 @@
             <a:fld id="{ECAA57DF-1C19-4726-AB84-014692BAD8F5}" type="datetimeFigureOut">
               <a:rPr lang="en-US" smtClean="0"/>
               <a:pPr/>
-              <a:t>6/27/2018</a:t>
+              <a:t>6/27/18</a:t>
             </a:fld>
             <a:endParaRPr lang="en-US"/>
           </a:p>
@@ -4461,12 +4461,42 @@
           <a:chExt cx="0" cy="0"/>
         </a:xfrm>
       </p:grpSpPr>
+      <p:pic>
+        <p:nvPicPr>
+          <p:cNvPr id="6" name="Picture 5"/>
+          <p:cNvPicPr>
+            <a:picLocks noChangeAspect="1"/>
+          </p:cNvPicPr>
+          <p:nvPr/>
+        </p:nvPicPr>
+        <p:blipFill>
+          <a:blip r:embed="rId2">
+            <a:extLst>
+              <a:ext uri="{28A0092B-C50C-407E-A947-70E740481C1C}">
+                <a14:useLocalDpi xmlns:a14="http://schemas.microsoft.com/office/drawing/2010/main" val="0"/>
+              </a:ext>
+            </a:extLst>
+          </a:blip>
+          <a:stretch>
+            <a:fillRect/>
+          </a:stretch>
+        </p:blipFill>
+        <p:spPr>
+          <a:xfrm>
+            <a:off x="15076511" y="20464427"/>
+            <a:ext cx="13676173" cy="9135369"/>
+          </a:xfrm>
+          <a:prstGeom prst="rect">
+            <a:avLst/>
+          </a:prstGeom>
+        </p:spPr>
+      </p:pic>
       <p:cxnSp>
         <p:nvCxnSpPr>
           <p:cNvPr id="127" name="Straight Arrow Connector 126">
             <a:extLst>
               <a:ext uri="{FF2B5EF4-FFF2-40B4-BE49-F238E27FC236}">
-                <a16:creationId xmlns:a16="http://schemas.microsoft.com/office/drawing/2014/main" id="{5B933B62-CE99-4DFF-8394-774C06FF3D90}"/>
+                <a16:creationId xmlns:a16="http://schemas.microsoft.com/office/drawing/2014/main" xmlns="" id="{5B933B62-CE99-4DFF-8394-774C06FF3D90}"/>
               </a:ext>
             </a:extLst>
           </p:cNvPr>
@@ -4478,7 +4508,7 @@
         </p:nvCxnSpPr>
         <p:spPr>
           <a:xfrm flipH="1">
-            <a:off x="2711052" y="25440975"/>
+            <a:off x="2564748" y="25440975"/>
             <a:ext cx="554120" cy="1380386"/>
           </a:xfrm>
           <a:prstGeom prst="straightConnector1">
@@ -4501,7 +4531,7 @@
           <p:cNvPr id="119" name="Group 118">
             <a:extLst>
               <a:ext uri="{FF2B5EF4-FFF2-40B4-BE49-F238E27FC236}">
-                <a16:creationId xmlns:a16="http://schemas.microsoft.com/office/drawing/2014/main" id="{4BA76585-47AF-4965-A06F-DDA8F05F9F69}"/>
+                <a16:creationId xmlns:a16="http://schemas.microsoft.com/office/drawing/2014/main" xmlns="" id="{4BA76585-47AF-4965-A06F-DDA8F05F9F69}"/>
               </a:ext>
             </a:extLst>
           </p:cNvPr>
@@ -4521,7 +4551,7 @@
             <p:cNvPr id="120" name="Picture 119">
               <a:extLst>
                 <a:ext uri="{FF2B5EF4-FFF2-40B4-BE49-F238E27FC236}">
-                  <a16:creationId xmlns:a16="http://schemas.microsoft.com/office/drawing/2014/main" id="{856E1430-1AE6-42E7-A83A-4CB7D6D420A6}"/>
+                  <a16:creationId xmlns:a16="http://schemas.microsoft.com/office/drawing/2014/main" xmlns="" id="{856E1430-1AE6-42E7-A83A-4CB7D6D420A6}"/>
                 </a:ext>
               </a:extLst>
             </p:cNvPr>
@@ -4531,7 +4561,7 @@
             <p:nvPr/>
           </p:nvPicPr>
           <p:blipFill>
-            <a:blip r:embed="rId2"/>
+            <a:blip r:embed="rId3"/>
             <a:stretch>
               <a:fillRect/>
             </a:stretch>
@@ -4551,7 +4581,7 @@
             <p:cNvPr id="121" name="Picture 120">
               <a:extLst>
                 <a:ext uri="{FF2B5EF4-FFF2-40B4-BE49-F238E27FC236}">
-                  <a16:creationId xmlns:a16="http://schemas.microsoft.com/office/drawing/2014/main" id="{DABD3466-0653-4589-B0CE-81F85C39B0CE}"/>
+                  <a16:creationId xmlns:a16="http://schemas.microsoft.com/office/drawing/2014/main" xmlns="" id="{DABD3466-0653-4589-B0CE-81F85C39B0CE}"/>
                 </a:ext>
               </a:extLst>
             </p:cNvPr>
@@ -4561,7 +4591,7 @@
             <p:nvPr/>
           </p:nvPicPr>
           <p:blipFill>
-            <a:blip r:embed="rId3"/>
+            <a:blip r:embed="rId4"/>
             <a:stretch>
               <a:fillRect/>
             </a:stretch>
@@ -4582,7 +4612,7 @@
           <p:cNvPr id="38" name="Picture 37">
             <a:extLst>
               <a:ext uri="{FF2B5EF4-FFF2-40B4-BE49-F238E27FC236}">
-                <a16:creationId xmlns:a16="http://schemas.microsoft.com/office/drawing/2014/main" id="{2A45A7F2-0DC1-40A6-B5BD-992CDD52F82F}"/>
+                <a16:creationId xmlns:a16="http://schemas.microsoft.com/office/drawing/2014/main" xmlns="" id="{2A45A7F2-0DC1-40A6-B5BD-992CDD52F82F}"/>
               </a:ext>
             </a:extLst>
           </p:cNvPr>
@@ -4592,7 +4622,7 @@
           <p:nvPr/>
         </p:nvPicPr>
         <p:blipFill>
-          <a:blip r:embed="rId4" cstate="print">
+          <a:blip r:embed="rId5" cstate="print">
             <a:extLst>
               <a:ext uri="{28A0092B-C50C-407E-A947-70E740481C1C}">
                 <a14:useLocalDpi xmlns:a14="http://schemas.microsoft.com/office/drawing/2010/main" val="0"/>
@@ -4790,7 +4820,7 @@
         </p:spPr>
         <p:txBody>
           <a:bodyPr lIns="0" tIns="0" rIns="0" bIns="0">
-            <a:normAutofit fontScale="92500"/>
+            <a:noAutofit/>
           </a:bodyPr>
           <a:lstStyle/>
           <a:p>
@@ -4800,7 +4830,15 @@
             </a:pPr>
             <a:r>
               <a:rPr lang="en-US" sz="2800" dirty="0"/>
-              <a:t>Use data generated by the Human Protein Atlas to predict protein expression and solubility directly from DNA or amino acid sequences using a neural network.</a:t>
+              <a:t>Use data </a:t>
+            </a:r>
+            <a:r>
+              <a:rPr lang="en-US" sz="2800" dirty="0" smtClean="0"/>
+              <a:t>from the </a:t>
+            </a:r>
+            <a:r>
+              <a:rPr lang="en-US" sz="2800" dirty="0"/>
+              <a:t>Human Protein Atlas to predict protein expression and solubility directly from DNA or amino acid sequences using a neural network.</a:t>
             </a:r>
           </a:p>
           <a:p>
@@ -4809,8 +4847,12 @@
               <a:buSzPct val="150000"/>
             </a:pPr>
             <a:r>
+              <a:rPr lang="en-US" sz="2800" dirty="0" smtClean="0"/>
+              <a:t>Improve upon the computational biology approach </a:t>
+            </a:r>
+            <a:r>
               <a:rPr lang="en-US" sz="2800" dirty="0"/>
-              <a:t>Compare this approach with the computational biology approach of Sastry et. al.</a:t>
+              <a:t>of Sastry et. al.</a:t>
             </a:r>
             <a:r>
               <a:rPr lang="en-US" sz="2800" baseline="30000" dirty="0"/>
@@ -4929,7 +4971,7 @@
         </p:nvSpPr>
         <p:spPr>
           <a:xfrm>
-            <a:off x="29900879" y="21686973"/>
+            <a:off x="29900879" y="22345341"/>
             <a:ext cx="12801600" cy="1219200"/>
           </a:xfrm>
           <a:gradFill>
@@ -4978,13 +5020,13 @@
         </p:nvSpPr>
         <p:spPr>
           <a:xfrm>
-            <a:off x="29900879" y="22941539"/>
-            <a:ext cx="12801600" cy="2908771"/>
+            <a:off x="29900879" y="23563332"/>
+            <a:ext cx="12801600" cy="2499436"/>
           </a:xfrm>
         </p:spPr>
         <p:txBody>
           <a:bodyPr>
-            <a:normAutofit lnSpcReduction="10000"/>
+            <a:normAutofit/>
           </a:bodyPr>
           <a:lstStyle/>
           <a:p>
@@ -4993,7 +5035,7 @@
               <a:buNone/>
             </a:pPr>
             <a:r>
-              <a:rPr lang="en-US" dirty="0"/>
+              <a:rPr lang="en-US" sz="2800" dirty="0"/>
               <a:t>We achieved an accuracy of 73.5% compared to an accuracy of 70% reported by Sastry et. al. for predicting protein expression showing direct prediction from sequence data is may be the best approach.  Predicting solubility gave a less accurate result than reported by Sastry et. al. indicating a computation biology approach may be superior for predicting solubility.</a:t>
             </a:r>
           </a:p>
@@ -5011,7 +5053,7 @@
         </p:nvSpPr>
         <p:spPr>
           <a:xfrm>
-            <a:off x="29900880" y="25968819"/>
+            <a:off x="29900880" y="26041971"/>
             <a:ext cx="12801600" cy="1219200"/>
           </a:xfrm>
           <a:gradFill>
@@ -5060,7 +5102,7 @@
         </p:nvSpPr>
         <p:spPr>
           <a:xfrm>
-            <a:off x="29900880" y="27268427"/>
+            <a:off x="29900880" y="27141427"/>
             <a:ext cx="12801600" cy="2830574"/>
           </a:xfrm>
         </p:spPr>
@@ -5121,23 +5163,52 @@
             </a:pPr>
             <a:r>
               <a:rPr lang="en-US" sz="2800" dirty="0"/>
-              <a:t>This work makes use of: </a:t>
+              <a:t>This work makes use </a:t>
+            </a:r>
+            <a:r>
+              <a:rPr lang="en-US" sz="2800" dirty="0" smtClean="0"/>
+              <a:t>of the following open source Python libraries: </a:t>
+            </a:r>
+          </a:p>
+          <a:p>
+            <a:pPr marL="0" indent="0">
+              <a:buNone/>
+            </a:pPr>
+            <a:r>
+              <a:rPr lang="en-US" sz="2800" dirty="0" err="1" smtClean="0"/>
+              <a:t>Keras</a:t>
+            </a:r>
+            <a:r>
+              <a:rPr lang="en-US" sz="2800" dirty="0"/>
+              <a:t>, TensorFlow, </a:t>
             </a:r>
             <a:r>
               <a:rPr lang="en-US" sz="2800" dirty="0" err="1"/>
-              <a:t>Keras</a:t>
+              <a:t>matplotlib</a:t>
+            </a:r>
+            <a:r>
+              <a:rPr lang="en-US" sz="2800" dirty="0" smtClean="0"/>
+              <a:t>, </a:t>
+            </a:r>
+            <a:r>
+              <a:rPr lang="en-US" sz="2800" dirty="0" err="1" smtClean="0"/>
+              <a:t>seaborn</a:t>
+            </a:r>
+            <a:r>
+              <a:rPr lang="en-US" sz="2800" dirty="0" smtClean="0"/>
+              <a:t>, </a:t>
+            </a:r>
+            <a:r>
+              <a:rPr lang="en-US" sz="2800" dirty="0" err="1" smtClean="0"/>
+              <a:t>sklearn</a:t>
+            </a:r>
+            <a:r>
+              <a:rPr lang="en-US" sz="2800" dirty="0" smtClean="0"/>
+              <a:t>, h5py</a:t>
             </a:r>
             <a:r>
               <a:rPr lang="en-US" sz="2800" dirty="0"/>
-              <a:t>, TensorFlow, matplotlib, </a:t>
-            </a:r>
-            <a:r>
-              <a:rPr lang="en-US" sz="2800" dirty="0" err="1"/>
-              <a:t>sklearn</a:t>
-            </a:r>
-            <a:r>
-              <a:rPr lang="en-US" sz="2800" dirty="0"/>
-              <a:t>, 	 h5py, </a:t>
+              <a:t>, </a:t>
             </a:r>
             <a:r>
               <a:rPr lang="en-US" sz="2800" dirty="0" err="1"/>
@@ -5159,7 +5230,7 @@
           <p:nvPr/>
         </p:nvPicPr>
         <p:blipFill>
-          <a:blip r:embed="rId5"/>
+          <a:blip r:embed="rId6"/>
           <a:stretch>
             <a:fillRect/>
           </a:stretch>
@@ -5224,426 +5295,10 @@
       </p:sp>
       <p:sp>
         <p:nvSpPr>
-          <p:cNvPr id="159" name="Content Placeholder 10">
-            <a:extLst>
-              <a:ext uri="{FF2B5EF4-FFF2-40B4-BE49-F238E27FC236}">
-                <a16:creationId xmlns:a16="http://schemas.microsoft.com/office/drawing/2014/main" id="{D11CB54C-D508-4605-91BB-7EE2911A4F9C}"/>
-              </a:ext>
-            </a:extLst>
-          </p:cNvPr>
-          <p:cNvSpPr txBox="1">
-            <a:spLocks/>
-          </p:cNvSpPr>
-          <p:nvPr/>
-        </p:nvSpPr>
-        <p:spPr>
-          <a:xfrm>
-            <a:off x="15619154" y="7034624"/>
-            <a:ext cx="7240846" cy="6437873"/>
-          </a:xfrm>
-          <a:prstGeom prst="rect">
-            <a:avLst/>
-          </a:prstGeom>
-          <a:ln w="38100">
-            <a:noFill/>
-          </a:ln>
-        </p:spPr>
-        <p:txBody>
-          <a:bodyPr vert="horz" lIns="91440" tIns="91440" rIns="91440" bIns="91440" rtlCol="0" anchor="t">
-            <a:normAutofit/>
-          </a:bodyPr>
-          <a:lstStyle>
-            <a:lvl1pPr marL="457200" indent="-457200" algn="l" defTabSz="4389120" rtl="0" eaLnBrk="1" latinLnBrk="0" hangingPunct="1">
-              <a:lnSpc>
-                <a:spcPct val="100000"/>
-              </a:lnSpc>
-              <a:spcBef>
-                <a:spcPts val="1200"/>
-              </a:spcBef>
-              <a:buClr>
-                <a:schemeClr val="bg1">
-                  <a:lumMod val="65000"/>
-                </a:schemeClr>
-              </a:buClr>
-              <a:buFont typeface="Arial" panose="020B0604020202020204" pitchFamily="34" charset="0"/>
-              <a:buChar char="•"/>
-              <a:defRPr sz="3200" kern="1200" baseline="0">
-                <a:solidFill>
-                  <a:schemeClr val="tx1"/>
-                </a:solidFill>
-                <a:latin typeface="+mn-lt"/>
-                <a:ea typeface="+mn-ea"/>
-                <a:cs typeface="+mn-cs"/>
-              </a:defRPr>
-            </a:lvl1pPr>
-            <a:lvl2pPr marL="1097280" indent="-457200" algn="l" defTabSz="4389120" rtl="0" eaLnBrk="1" latinLnBrk="0" hangingPunct="1">
-              <a:lnSpc>
-                <a:spcPct val="100000"/>
-              </a:lnSpc>
-              <a:spcBef>
-                <a:spcPts val="1200"/>
-              </a:spcBef>
-              <a:buClr>
-                <a:schemeClr val="bg1">
-                  <a:lumMod val="65000"/>
-                </a:schemeClr>
-              </a:buClr>
-              <a:buFont typeface="Arial" panose="020B0604020202020204" pitchFamily="34" charset="0"/>
-              <a:buChar char="•"/>
-              <a:defRPr sz="2800" kern="1200">
-                <a:solidFill>
-                  <a:schemeClr val="tx1"/>
-                </a:solidFill>
-                <a:latin typeface="+mn-lt"/>
-                <a:ea typeface="+mn-ea"/>
-                <a:cs typeface="+mn-cs"/>
-              </a:defRPr>
-            </a:lvl2pPr>
-            <a:lvl3pPr marL="1097280" indent="-457200" algn="l" defTabSz="4389120" rtl="0" eaLnBrk="1" latinLnBrk="0" hangingPunct="1">
-              <a:lnSpc>
-                <a:spcPct val="100000"/>
-              </a:lnSpc>
-              <a:spcBef>
-                <a:spcPts val="1200"/>
-              </a:spcBef>
-              <a:buClr>
-                <a:schemeClr val="bg1">
-                  <a:lumMod val="65000"/>
-                </a:schemeClr>
-              </a:buClr>
-              <a:buFont typeface="Arial" panose="020B0604020202020204" pitchFamily="34" charset="0"/>
-              <a:buChar char="•"/>
-              <a:defRPr sz="2800" kern="1200">
-                <a:solidFill>
-                  <a:schemeClr val="tx1"/>
-                </a:solidFill>
-                <a:latin typeface="+mn-lt"/>
-                <a:ea typeface="+mn-ea"/>
-                <a:cs typeface="+mn-cs"/>
-              </a:defRPr>
-            </a:lvl3pPr>
-            <a:lvl4pPr marL="1097280" indent="-457200" algn="l" defTabSz="4389120" rtl="0" eaLnBrk="1" latinLnBrk="0" hangingPunct="1">
-              <a:lnSpc>
-                <a:spcPct val="100000"/>
-              </a:lnSpc>
-              <a:spcBef>
-                <a:spcPts val="1200"/>
-              </a:spcBef>
-              <a:buClr>
-                <a:schemeClr val="bg1">
-                  <a:lumMod val="65000"/>
-                </a:schemeClr>
-              </a:buClr>
-              <a:buFont typeface="Arial" panose="020B0604020202020204" pitchFamily="34" charset="0"/>
-              <a:buChar char="•"/>
-              <a:defRPr sz="2800" kern="1200">
-                <a:solidFill>
-                  <a:schemeClr val="tx1"/>
-                </a:solidFill>
-                <a:latin typeface="+mn-lt"/>
-                <a:ea typeface="+mn-ea"/>
-                <a:cs typeface="+mn-cs"/>
-              </a:defRPr>
-            </a:lvl4pPr>
-            <a:lvl5pPr marL="1097280" indent="-457200" algn="l" defTabSz="4389120" rtl="0" eaLnBrk="1" latinLnBrk="0" hangingPunct="1">
-              <a:lnSpc>
-                <a:spcPct val="100000"/>
-              </a:lnSpc>
-              <a:spcBef>
-                <a:spcPts val="1200"/>
-              </a:spcBef>
-              <a:buClr>
-                <a:schemeClr val="bg1">
-                  <a:lumMod val="65000"/>
-                </a:schemeClr>
-              </a:buClr>
-              <a:buFont typeface="Arial" panose="020B0604020202020204" pitchFamily="34" charset="0"/>
-              <a:buChar char="•"/>
-              <a:defRPr sz="2800" kern="1200">
-                <a:solidFill>
-                  <a:schemeClr val="tx1"/>
-                </a:solidFill>
-                <a:latin typeface="+mn-lt"/>
-                <a:ea typeface="+mn-ea"/>
-                <a:cs typeface="+mn-cs"/>
-              </a:defRPr>
-            </a:lvl5pPr>
-            <a:lvl6pPr marL="1097280" indent="-457200" algn="l" defTabSz="4389120" rtl="0" eaLnBrk="1" latinLnBrk="0" hangingPunct="1">
-              <a:lnSpc>
-                <a:spcPct val="100000"/>
-              </a:lnSpc>
-              <a:spcBef>
-                <a:spcPts val="1200"/>
-              </a:spcBef>
-              <a:buClr>
-                <a:schemeClr val="bg1">
-                  <a:lumMod val="65000"/>
-                </a:schemeClr>
-              </a:buClr>
-              <a:buFont typeface="Arial" panose="020B0604020202020204" pitchFamily="34" charset="0"/>
-              <a:buChar char="•"/>
-              <a:defRPr sz="2800" kern="1200">
-                <a:solidFill>
-                  <a:schemeClr val="tx1"/>
-                </a:solidFill>
-                <a:latin typeface="+mn-lt"/>
-                <a:ea typeface="+mn-ea"/>
-                <a:cs typeface="+mn-cs"/>
-              </a:defRPr>
-            </a:lvl6pPr>
-            <a:lvl7pPr marL="1097280" indent="-457200" algn="l" defTabSz="4389120" rtl="0" eaLnBrk="1" latinLnBrk="0" hangingPunct="1">
-              <a:lnSpc>
-                <a:spcPct val="100000"/>
-              </a:lnSpc>
-              <a:spcBef>
-                <a:spcPts val="1200"/>
-              </a:spcBef>
-              <a:buClr>
-                <a:schemeClr val="bg1">
-                  <a:lumMod val="65000"/>
-                </a:schemeClr>
-              </a:buClr>
-              <a:buFont typeface="Arial" panose="020B0604020202020204" pitchFamily="34" charset="0"/>
-              <a:buChar char="•"/>
-              <a:defRPr sz="2800" kern="1200">
-                <a:solidFill>
-                  <a:schemeClr val="tx1"/>
-                </a:solidFill>
-                <a:latin typeface="+mn-lt"/>
-                <a:ea typeface="+mn-ea"/>
-                <a:cs typeface="+mn-cs"/>
-              </a:defRPr>
-            </a:lvl7pPr>
-            <a:lvl8pPr marL="1097280" indent="-457200" algn="l" defTabSz="4389120" rtl="0" eaLnBrk="1" latinLnBrk="0" hangingPunct="1">
-              <a:lnSpc>
-                <a:spcPct val="100000"/>
-              </a:lnSpc>
-              <a:spcBef>
-                <a:spcPts val="1200"/>
-              </a:spcBef>
-              <a:buClr>
-                <a:schemeClr val="bg1">
-                  <a:lumMod val="65000"/>
-                </a:schemeClr>
-              </a:buClr>
-              <a:buFont typeface="Arial" panose="020B0604020202020204" pitchFamily="34" charset="0"/>
-              <a:buChar char="•"/>
-              <a:defRPr sz="2800" kern="1200">
-                <a:solidFill>
-                  <a:schemeClr val="tx1"/>
-                </a:solidFill>
-                <a:latin typeface="+mn-lt"/>
-                <a:ea typeface="+mn-ea"/>
-                <a:cs typeface="+mn-cs"/>
-              </a:defRPr>
-            </a:lvl8pPr>
-            <a:lvl9pPr marL="1097280" indent="-457200" algn="l" defTabSz="4389120" rtl="0" eaLnBrk="1" latinLnBrk="0" hangingPunct="1">
-              <a:lnSpc>
-                <a:spcPct val="100000"/>
-              </a:lnSpc>
-              <a:spcBef>
-                <a:spcPts val="1200"/>
-              </a:spcBef>
-              <a:buClr>
-                <a:schemeClr val="bg1">
-                  <a:lumMod val="65000"/>
-                </a:schemeClr>
-              </a:buClr>
-              <a:buFont typeface="Arial" panose="020B0604020202020204" pitchFamily="34" charset="0"/>
-              <a:buChar char="•"/>
-              <a:defRPr sz="2800" kern="1200">
-                <a:solidFill>
-                  <a:schemeClr val="tx1"/>
-                </a:solidFill>
-                <a:latin typeface="+mn-lt"/>
-                <a:ea typeface="+mn-ea"/>
-                <a:cs typeface="+mn-cs"/>
-              </a:defRPr>
-            </a:lvl9pPr>
-          </a:lstStyle>
-          <a:p>
-            <a:pPr>
-              <a:buClrTx/>
-              <a:buSzPct val="150000"/>
-            </a:pPr>
-            <a:r>
-              <a:rPr lang="en-US" sz="2600" dirty="0"/>
-              <a:t>Protein </a:t>
-            </a:r>
-            <a:r>
-              <a:rPr lang="en-US" sz="2600" dirty="0" err="1"/>
-              <a:t>Epitote</a:t>
-            </a:r>
-            <a:r>
-              <a:rPr lang="en-US" sz="2600" dirty="0"/>
-              <a:t> Signature Tags (</a:t>
-            </a:r>
-            <a:r>
-              <a:rPr lang="en-US" sz="2600" dirty="0" err="1"/>
-              <a:t>PrESTs</a:t>
-            </a:r>
-            <a:r>
-              <a:rPr lang="en-US" sz="2600" dirty="0"/>
-              <a:t>), consisting of 20-150 amino acids</a:t>
-            </a:r>
-          </a:p>
-          <a:p>
-            <a:pPr lvl="1">
-              <a:buClrTx/>
-              <a:buSzPct val="150000"/>
-            </a:pPr>
-            <a:r>
-              <a:rPr lang="en-US" sz="2200" dirty="0"/>
-              <a:t>Expressed for Proteomics – Human Protein Atlas </a:t>
-            </a:r>
-          </a:p>
-          <a:p>
-            <a:pPr lvl="1">
-              <a:buClrTx/>
-              <a:buSzPct val="150000"/>
-            </a:pPr>
-            <a:r>
-              <a:rPr lang="en-US" sz="2200" dirty="0"/>
-              <a:t>Classified according to Sastry et. al.</a:t>
-            </a:r>
-          </a:p>
-          <a:p>
-            <a:pPr>
-              <a:buClrTx/>
-              <a:buSzPct val="150000"/>
-            </a:pPr>
-            <a:r>
-              <a:rPr lang="en-US" sz="2600" dirty="0"/>
-              <a:t>Protein expression data for 45,206 </a:t>
-            </a:r>
-            <a:r>
-              <a:rPr lang="en-US" sz="2600" dirty="0" err="1"/>
-              <a:t>PrESTs</a:t>
-            </a:r>
-            <a:endParaRPr lang="en-US" sz="2600" dirty="0"/>
-          </a:p>
-          <a:p>
-            <a:pPr lvl="1">
-              <a:buClrTx/>
-              <a:buSzPct val="150000"/>
-            </a:pPr>
-            <a:r>
-              <a:rPr lang="en-US" sz="2200" dirty="0"/>
-              <a:t>1</a:t>
-            </a:r>
-            <a:r>
-              <a:rPr lang="en-US" sz="2200" baseline="30000" dirty="0"/>
-              <a:t>st</a:t>
-            </a:r>
-            <a:r>
-              <a:rPr lang="en-US" sz="2200" dirty="0"/>
-              <a:t> quantile = low expression (11302 samples)</a:t>
-            </a:r>
-          </a:p>
-          <a:p>
-            <a:pPr lvl="1">
-              <a:buClrTx/>
-              <a:buSzPct val="150000"/>
-            </a:pPr>
-            <a:r>
-              <a:rPr lang="en-US" sz="2200" dirty="0"/>
-              <a:t>4</a:t>
-            </a:r>
-            <a:r>
-              <a:rPr lang="en-US" sz="2200" baseline="30000" dirty="0"/>
-              <a:t>th</a:t>
-            </a:r>
-            <a:r>
-              <a:rPr lang="en-US" sz="2200" dirty="0"/>
-              <a:t> quantile = high expression (11301 samples)</a:t>
-            </a:r>
-          </a:p>
-          <a:p>
-            <a:pPr lvl="1">
-              <a:buClrTx/>
-              <a:buSzPct val="150000"/>
-            </a:pPr>
-            <a:r>
-              <a:rPr lang="en-US" sz="2200" dirty="0"/>
-              <a:t>2</a:t>
-            </a:r>
-            <a:r>
-              <a:rPr lang="en-US" sz="2200" baseline="30000" dirty="0"/>
-              <a:t>nd</a:t>
-            </a:r>
-            <a:r>
-              <a:rPr lang="en-US" sz="2200" dirty="0"/>
-              <a:t> and 3</a:t>
-            </a:r>
-            <a:r>
-              <a:rPr lang="en-US" sz="2200" baseline="30000" dirty="0"/>
-              <a:t>rd</a:t>
-            </a:r>
-            <a:r>
-              <a:rPr lang="en-US" sz="2200" dirty="0"/>
-              <a:t> quantiles removed (22603 samples)</a:t>
-            </a:r>
-          </a:p>
-          <a:p>
-            <a:pPr>
-              <a:buClrTx/>
-              <a:buSzPct val="150000"/>
-            </a:pPr>
-            <a:r>
-              <a:rPr lang="en-US" sz="2600" dirty="0"/>
-              <a:t>Protein solubility data for 16,082 </a:t>
-            </a:r>
-            <a:r>
-              <a:rPr lang="en-US" sz="2600" dirty="0" err="1"/>
-              <a:t>PrESTs</a:t>
-            </a:r>
-            <a:endParaRPr lang="en-US" sz="2600" dirty="0"/>
-          </a:p>
-          <a:p>
-            <a:pPr lvl="1">
-              <a:buClrTx/>
-              <a:buSzPct val="150000"/>
-            </a:pPr>
-            <a:r>
-              <a:rPr lang="en-US" sz="2200" dirty="0"/>
-              <a:t>Low solubility classes 1 - 3.5 (3324 samples)</a:t>
-            </a:r>
-          </a:p>
-          <a:p>
-            <a:pPr lvl="1">
-              <a:buClrTx/>
-              <a:buSzPct val="150000"/>
-            </a:pPr>
-            <a:r>
-              <a:rPr lang="en-US" sz="2200" dirty="0"/>
-              <a:t>High solubility classes 4.5 – 5 (5091 samples)</a:t>
-            </a:r>
-          </a:p>
-          <a:p>
-            <a:pPr lvl="1">
-              <a:buClrTx/>
-              <a:buSzPct val="150000"/>
-            </a:pPr>
-            <a:r>
-              <a:rPr lang="en-US" sz="2200" dirty="0"/>
-              <a:t>Solubility class 4 removed (7667 samples) </a:t>
-            </a:r>
-          </a:p>
-          <a:p>
-            <a:pPr>
-              <a:buClrTx/>
-              <a:buSzPct val="150000"/>
-            </a:pPr>
-            <a:endParaRPr lang="en-US" sz="2000" dirty="0"/>
-          </a:p>
-        </p:txBody>
-      </p:sp>
-      <p:sp>
-        <p:nvSpPr>
           <p:cNvPr id="87" name="Text Placeholder 17">
             <a:extLst>
               <a:ext uri="{FF2B5EF4-FFF2-40B4-BE49-F238E27FC236}">
-                <a16:creationId xmlns:a16="http://schemas.microsoft.com/office/drawing/2014/main" id="{A22261F9-E02C-44BE-8CD1-89EFBA26F91F}"/>
+                <a16:creationId xmlns:a16="http://schemas.microsoft.com/office/drawing/2014/main" xmlns="" id="{A22261F9-E02C-44BE-8CD1-89EFBA26F91F}"/>
               </a:ext>
             </a:extLst>
           </p:cNvPr>
@@ -5910,7 +5565,7 @@
           <p:cNvPr id="128" name="Text Placeholder 15">
             <a:extLst>
               <a:ext uri="{FF2B5EF4-FFF2-40B4-BE49-F238E27FC236}">
-                <a16:creationId xmlns:a16="http://schemas.microsoft.com/office/drawing/2014/main" id="{E21C95D8-2A50-4154-A1C0-765F5E11F29F}"/>
+                <a16:creationId xmlns:a16="http://schemas.microsoft.com/office/drawing/2014/main" xmlns="" id="{E21C95D8-2A50-4154-A1C0-765F5E11F29F}"/>
               </a:ext>
             </a:extLst>
           </p:cNvPr>
@@ -6174,7 +5829,7 @@
           <p:cNvPr id="58" name="TextBox 57">
             <a:extLst>
               <a:ext uri="{FF2B5EF4-FFF2-40B4-BE49-F238E27FC236}">
-                <a16:creationId xmlns:a16="http://schemas.microsoft.com/office/drawing/2014/main" id="{62587145-3D62-4214-8A65-1D30FA6D0C6F}"/>
+                <a16:creationId xmlns:a16="http://schemas.microsoft.com/office/drawing/2014/main" xmlns="" id="{62587145-3D62-4214-8A65-1D30FA6D0C6F}"/>
               </a:ext>
             </a:extLst>
           </p:cNvPr>
@@ -6259,7 +5914,7 @@
           <p:cNvPr id="60" name="Picture 59">
             <a:extLst>
               <a:ext uri="{FF2B5EF4-FFF2-40B4-BE49-F238E27FC236}">
-                <a16:creationId xmlns:a16="http://schemas.microsoft.com/office/drawing/2014/main" id="{0F30854E-9B0E-4856-9B02-A649D20F927A}"/>
+                <a16:creationId xmlns:a16="http://schemas.microsoft.com/office/drawing/2014/main" xmlns="" id="{0F30854E-9B0E-4856-9B02-A649D20F927A}"/>
               </a:ext>
             </a:extLst>
           </p:cNvPr>
@@ -6269,7 +5924,7 @@
           <p:nvPr/>
         </p:nvPicPr>
         <p:blipFill>
-          <a:blip r:embed="rId6" cstate="print">
+          <a:blip r:embed="rId7" cstate="print">
             <a:extLst>
               <a:ext uri="{28A0092B-C50C-407E-A947-70E740481C1C}">
                 <a14:useLocalDpi xmlns:a14="http://schemas.microsoft.com/office/drawing/2010/main" val="0"/>
@@ -6295,7 +5950,7 @@
           <p:cNvPr id="130" name="Content Placeholder 5">
             <a:extLst>
               <a:ext uri="{FF2B5EF4-FFF2-40B4-BE49-F238E27FC236}">
-                <a16:creationId xmlns:a16="http://schemas.microsoft.com/office/drawing/2014/main" id="{1DCC0D6B-9505-4E72-B19F-AFC9EA48B797}"/>
+                <a16:creationId xmlns:a16="http://schemas.microsoft.com/office/drawing/2014/main" xmlns="" id="{1DCC0D6B-9505-4E72-B19F-AFC9EA48B797}"/>
               </a:ext>
             </a:extLst>
           </p:cNvPr>
@@ -6306,8 +5961,8 @@
         </p:nvSpPr>
         <p:spPr>
           <a:xfrm>
-            <a:off x="9032204" y="15743278"/>
-            <a:ext cx="5295375" cy="13500605"/>
+            <a:off x="9033616" y="15488297"/>
+            <a:ext cx="5295375" cy="13705933"/>
           </a:xfrm>
           <a:prstGeom prst="rect">
             <a:avLst/>
@@ -6315,7 +5970,7 @@
         </p:spPr>
         <p:txBody>
           <a:bodyPr vert="horz" lIns="91440" tIns="182880" rIns="91440" bIns="45720" rtlCol="0">
-            <a:normAutofit/>
+            <a:noAutofit/>
           </a:bodyPr>
           <a:lstStyle>
             <a:lvl1pPr marL="457200" indent="-457200" algn="l" defTabSz="4389120" rtl="0" eaLnBrk="1" latinLnBrk="0" hangingPunct="1">
@@ -6527,94 +6182,68 @@
             </a:lvl9pPr>
           </a:lstStyle>
           <a:p>
-            <a:pPr>
+            <a:pPr marL="0" indent="0">
               <a:buClrTx/>
+              <a:buNone/>
             </a:pPr>
             <a:r>
+              <a:rPr lang="en-US" sz="2800" u="sng" dirty="0" smtClean="0"/>
+              <a:t>Our CNN-LSTM architecture</a:t>
+            </a:r>
+          </a:p>
+          <a:p>
+            <a:pPr marL="514350" indent="-514350">
+              <a:buClrTx/>
+              <a:buFont typeface="+mj-lt"/>
+              <a:buAutoNum type="arabicPeriod"/>
+            </a:pPr>
+            <a:r>
+              <a:rPr lang="en-US" sz="2800" dirty="0" smtClean="0"/>
+              <a:t>Amino </a:t>
+            </a:r>
+            <a:r>
               <a:rPr lang="en-US" sz="2800" dirty="0"/>
-              <a:t>Amino acid or DNA sequence input</a:t>
-            </a:r>
-          </a:p>
-          <a:p>
-            <a:pPr>
+              <a:t>acid or DNA sequence </a:t>
+            </a:r>
+            <a:r>
+              <a:rPr lang="en-US" sz="2800" dirty="0" smtClean="0"/>
+              <a:t>input</a:t>
+            </a:r>
+            <a:endParaRPr lang="en-US" sz="1200" dirty="0"/>
+          </a:p>
+          <a:p>
+            <a:pPr marL="514350" indent="-514350">
               <a:buClrTx/>
-            </a:pPr>
-            <a:endParaRPr lang="en-US" sz="2800" dirty="0"/>
-          </a:p>
-          <a:p>
-            <a:pPr>
-              <a:buClrTx/>
+              <a:buFont typeface="+mj-lt"/>
+              <a:buAutoNum type="arabicPeriod"/>
             </a:pPr>
             <a:r>
               <a:rPr lang="en-US" sz="2800" dirty="0"/>
               <a:t>One-Hot Encode – represent as a matrix and pad with zeros to make all sequences the same length. </a:t>
             </a:r>
-          </a:p>
-          <a:p>
-            <a:pPr>
+            <a:endParaRPr lang="en-US" sz="1200" dirty="0"/>
+          </a:p>
+          <a:p>
+            <a:pPr marL="514350" indent="-514350">
               <a:buClrTx/>
+              <a:buFont typeface="+mj-lt"/>
+              <a:buAutoNum type="arabicPeriod"/>
             </a:pPr>
             <a:r>
+              <a:rPr lang="en-US" sz="2800" dirty="0" smtClean="0"/>
+              <a:t>Embedding – </a:t>
+            </a:r>
+            <a:r>
               <a:rPr lang="en-US" sz="2800" dirty="0"/>
-              <a:t>Embedding– learn similarities between amino acids/codons</a:t>
-            </a:r>
-          </a:p>
-          <a:p>
-            <a:pPr marL="640080" lvl="1" indent="0">
-              <a:buClrTx/>
-              <a:buNone/>
-            </a:pPr>
-            <a:r>
-              <a:rPr lang="en-US" sz="2400" dirty="0"/>
-              <a:t>AA embedding length = 16 </a:t>
-            </a:r>
-          </a:p>
-          <a:p>
-            <a:pPr marL="640080" lvl="1" indent="0">
-              <a:buClrTx/>
-              <a:buNone/>
-            </a:pPr>
-            <a:r>
-              <a:rPr lang="en-US" sz="2400" dirty="0"/>
-              <a:t>DNA embedding length = 16</a:t>
-            </a:r>
-          </a:p>
-          <a:p>
-            <a:pPr>
-              <a:buClrTx/>
-            </a:pPr>
+              <a:t>learn </a:t>
+            </a:r>
+            <a:r>
+              <a:rPr lang="en-US" sz="2800" dirty="0" smtClean="0"/>
+              <a:t>semantic similarities </a:t>
+            </a:r>
             <a:r>
               <a:rPr lang="en-US" sz="2800" dirty="0"/>
-              <a:t>Convolution – learn short range patterns</a:t>
-            </a:r>
-          </a:p>
-          <a:p>
-            <a:pPr marL="640080" lvl="1" indent="0">
-              <a:buClrTx/>
-              <a:buNone/>
-            </a:pPr>
-            <a:r>
-              <a:rPr lang="en-US" sz="2400" dirty="0"/>
-              <a:t>AA -  filter length 8,  100 filters</a:t>
-            </a:r>
-          </a:p>
-          <a:p>
-            <a:pPr marL="640080" lvl="1" indent="0">
-              <a:buClrTx/>
-              <a:buNone/>
-            </a:pPr>
-            <a:r>
-              <a:rPr lang="en-US" sz="2400" dirty="0"/>
-              <a:t>DNA - filter length 5, 200 filters</a:t>
-            </a:r>
-          </a:p>
-          <a:p>
-            <a:pPr>
-              <a:buClrTx/>
-            </a:pPr>
-            <a:r>
-              <a:rPr lang="en-US" sz="2800" dirty="0"/>
-              <a:t>Pooling – generalize pattern recognition</a:t>
+              <a:t>between amino acids/codons</a:t>
             </a:r>
           </a:p>
           <a:p>
@@ -6622,8 +6251,8 @@
               <a:buClrTx/>
             </a:pPr>
             <a:r>
-              <a:rPr lang="en-US" sz="2400" dirty="0"/>
-              <a:t> AA – pool size = 3</a:t>
+              <a:rPr lang="en-US" sz="2200" dirty="0" smtClean="0"/>
+              <a:t>AA embedding length = 16 </a:t>
             </a:r>
           </a:p>
           <a:p>
@@ -6631,17 +6260,20 @@
               <a:buClrTx/>
             </a:pPr>
             <a:r>
-              <a:rPr lang="en-US" sz="2400" dirty="0"/>
-              <a:t>DNA – pool size = 4</a:t>
-            </a:r>
-          </a:p>
-          <a:p>
-            <a:pPr>
+              <a:rPr lang="en-US" sz="2200" dirty="0" smtClean="0"/>
+              <a:t>DNA embedding length = 16</a:t>
+            </a:r>
+            <a:endParaRPr lang="en-US" sz="1200" dirty="0" smtClean="0"/>
+          </a:p>
+          <a:p>
+            <a:pPr marL="514350" indent="-514350">
               <a:buClrTx/>
+              <a:buFont typeface="+mj-lt"/>
+              <a:buAutoNum type="arabicPeriod"/>
             </a:pPr>
             <a:r>
-              <a:rPr lang="en-US" sz="2800" dirty="0"/>
-              <a:t>LSTM – Learn long range patterns</a:t>
+              <a:rPr lang="en-US" sz="2800" dirty="0" smtClean="0"/>
+              <a:t>Convolution – learn short range patterns</a:t>
             </a:r>
           </a:p>
           <a:p>
@@ -6649,8 +6281,12 @@
               <a:buClrTx/>
             </a:pPr>
             <a:r>
-              <a:rPr lang="en-US" sz="2400" dirty="0"/>
-              <a:t>AA - 200 nodes</a:t>
+              <a:rPr lang="en-US" sz="2200" dirty="0" smtClean="0"/>
+              <a:t>AA </a:t>
+            </a:r>
+            <a:r>
+              <a:rPr lang="en-US" sz="2200" dirty="0"/>
+              <a:t>-  filter length 8,  100 filters</a:t>
             </a:r>
           </a:p>
           <a:p>
@@ -6658,9 +6294,135 @@
               <a:buClrTx/>
             </a:pPr>
             <a:r>
+              <a:rPr lang="en-US" sz="2200" dirty="0"/>
+              <a:t>DNA - filter length </a:t>
+            </a:r>
+            <a:r>
+              <a:rPr lang="en-US" sz="2200" dirty="0" smtClean="0"/>
+              <a:t>5, 200 filters</a:t>
+            </a:r>
+            <a:endParaRPr lang="en-US" sz="1200" dirty="0"/>
+          </a:p>
+          <a:p>
+            <a:pPr marL="514350" indent="-514350">
+              <a:buClrTx/>
+              <a:buFont typeface="+mj-lt"/>
+              <a:buAutoNum type="arabicPeriod"/>
+            </a:pPr>
+            <a:r>
+              <a:rPr lang="en-US" sz="2800" dirty="0"/>
+              <a:t>Pooling – generalize pattern recognition</a:t>
+            </a:r>
+          </a:p>
+          <a:p>
+            <a:pPr lvl="1">
+              <a:buClrTx/>
+            </a:pPr>
+            <a:r>
               <a:rPr lang="en-US" sz="2400" dirty="0"/>
+              <a:t> </a:t>
+            </a:r>
+            <a:r>
+              <a:rPr lang="en-US" sz="2200" dirty="0"/>
+              <a:t>AA </a:t>
+            </a:r>
+            <a:r>
+              <a:rPr lang="en-US" sz="2200" dirty="0" smtClean="0"/>
+              <a:t>- </a:t>
+            </a:r>
+            <a:r>
+              <a:rPr lang="en-US" sz="2200" dirty="0"/>
+              <a:t>pool size = 3</a:t>
+            </a:r>
+          </a:p>
+          <a:p>
+            <a:pPr lvl="1">
+              <a:buClrTx/>
+            </a:pPr>
+            <a:r>
+              <a:rPr lang="en-US" sz="2200" dirty="0"/>
+              <a:t>DNA </a:t>
+            </a:r>
+            <a:r>
+              <a:rPr lang="en-US" sz="2200" dirty="0" smtClean="0"/>
+              <a:t>- </a:t>
+            </a:r>
+            <a:r>
+              <a:rPr lang="en-US" sz="2200" dirty="0"/>
+              <a:t>pool size = </a:t>
+            </a:r>
+            <a:r>
+              <a:rPr lang="en-US" sz="2200" dirty="0" smtClean="0"/>
+              <a:t>4</a:t>
+            </a:r>
+            <a:endParaRPr lang="en-US" sz="1200" dirty="0"/>
+          </a:p>
+          <a:p>
+            <a:pPr marL="514350" indent="-514350">
+              <a:buClrTx/>
+              <a:buFont typeface="+mj-lt"/>
+              <a:buAutoNum type="arabicPeriod"/>
+            </a:pPr>
+            <a:r>
+              <a:rPr lang="en-US" sz="2800" dirty="0"/>
+              <a:t>LSTM – Learn long range </a:t>
+            </a:r>
+            <a:r>
+              <a:rPr lang="en-US" sz="2800" dirty="0" smtClean="0"/>
+              <a:t>patterns</a:t>
+            </a:r>
+          </a:p>
+          <a:p>
+            <a:pPr lvl="1">
+              <a:buClrTx/>
+            </a:pPr>
+            <a:r>
+              <a:rPr lang="en-US" sz="2200" dirty="0" smtClean="0"/>
+              <a:t>AA - 200 nodes</a:t>
+            </a:r>
+          </a:p>
+          <a:p>
+            <a:pPr lvl="1">
+              <a:buClrTx/>
+            </a:pPr>
+            <a:r>
+              <a:rPr lang="en-US" sz="2200" dirty="0" smtClean="0"/>
               <a:t>DNA - 150 nodes</a:t>
             </a:r>
+          </a:p>
+          <a:p>
+            <a:pPr marL="514350" indent="-514350">
+              <a:buClrTx/>
+              <a:buFont typeface="+mj-lt"/>
+              <a:buAutoNum type="arabicPeriod"/>
+            </a:pPr>
+            <a:r>
+              <a:rPr lang="en-US" sz="2800" dirty="0" smtClean="0"/>
+              <a:t>Prediction</a:t>
+            </a:r>
+          </a:p>
+          <a:p>
+            <a:pPr lvl="1">
+              <a:buClrTx/>
+            </a:pPr>
+            <a:r>
+              <a:rPr lang="en-US" sz="2400" dirty="0" smtClean="0"/>
+              <a:t>Sigmoid for binary classes</a:t>
+            </a:r>
+          </a:p>
+          <a:p>
+            <a:pPr lvl="1">
+              <a:buClrTx/>
+            </a:pPr>
+            <a:r>
+              <a:rPr lang="en-US" sz="2400" dirty="0" err="1" smtClean="0"/>
+              <a:t>Softmax</a:t>
+            </a:r>
+            <a:r>
+              <a:rPr lang="en-US" sz="2400" dirty="0" smtClean="0"/>
+              <a:t> for multiple classes</a:t>
+            </a:r>
+            <a:endParaRPr lang="en-US" sz="2400" dirty="0"/>
           </a:p>
           <a:p>
             <a:pPr>
@@ -6682,7 +6444,7 @@
           <p:cNvPr id="77" name="Straight Arrow Connector 76">
             <a:extLst>
               <a:ext uri="{FF2B5EF4-FFF2-40B4-BE49-F238E27FC236}">
-                <a16:creationId xmlns:a16="http://schemas.microsoft.com/office/drawing/2014/main" id="{8B598608-B9CE-437E-8B0F-674166F384FC}"/>
+                <a16:creationId xmlns:a16="http://schemas.microsoft.com/office/drawing/2014/main" xmlns="" id="{8B598608-B9CE-437E-8B0F-674166F384FC}"/>
               </a:ext>
             </a:extLst>
           </p:cNvPr>
@@ -6694,7 +6456,7 @@
         </p:nvCxnSpPr>
         <p:spPr>
           <a:xfrm flipH="1">
-            <a:off x="2711053" y="79313541"/>
+            <a:off x="2564749" y="79313541"/>
             <a:ext cx="531620" cy="1353605"/>
           </a:xfrm>
           <a:prstGeom prst="straightConnector1">
@@ -6717,7 +6479,7 @@
           <p:cNvPr id="103" name="Straight Arrow Connector 102">
             <a:extLst>
               <a:ext uri="{FF2B5EF4-FFF2-40B4-BE49-F238E27FC236}">
-                <a16:creationId xmlns:a16="http://schemas.microsoft.com/office/drawing/2014/main" id="{ADBCEA7C-3519-4647-88B2-2B94347AAC21}"/>
+                <a16:creationId xmlns:a16="http://schemas.microsoft.com/office/drawing/2014/main" xmlns="" id="{ADBCEA7C-3519-4647-88B2-2B94347AAC21}"/>
               </a:ext>
             </a:extLst>
           </p:cNvPr>
@@ -6729,7 +6491,7 @@
         </p:nvCxnSpPr>
         <p:spPr>
           <a:xfrm flipH="1">
-            <a:off x="3848973" y="79485540"/>
+            <a:off x="3702669" y="79485540"/>
             <a:ext cx="531623" cy="1388955"/>
           </a:xfrm>
           <a:prstGeom prst="straightConnector1">
@@ -6752,7 +6514,7 @@
           <p:cNvPr id="105" name="Straight Arrow Connector 104">
             <a:extLst>
               <a:ext uri="{FF2B5EF4-FFF2-40B4-BE49-F238E27FC236}">
-                <a16:creationId xmlns:a16="http://schemas.microsoft.com/office/drawing/2014/main" id="{47E14222-F401-4E5C-BF5E-C2D85DBEF2A5}"/>
+                <a16:creationId xmlns:a16="http://schemas.microsoft.com/office/drawing/2014/main" xmlns="" id="{47E14222-F401-4E5C-BF5E-C2D85DBEF2A5}"/>
               </a:ext>
             </a:extLst>
           </p:cNvPr>
@@ -6764,7 +6526,7 @@
         </p:nvCxnSpPr>
         <p:spPr>
           <a:xfrm>
-            <a:off x="5873724" y="106517077"/>
+            <a:off x="5727420" y="106517077"/>
             <a:ext cx="251095" cy="1307749"/>
           </a:xfrm>
           <a:prstGeom prst="straightConnector1">
@@ -6787,7 +6549,7 @@
           <p:cNvPr id="106" name="Straight Arrow Connector 105">
             <a:extLst>
               <a:ext uri="{FF2B5EF4-FFF2-40B4-BE49-F238E27FC236}">
-                <a16:creationId xmlns:a16="http://schemas.microsoft.com/office/drawing/2014/main" id="{6B55560B-2B8B-4DCB-BC39-18476E36B78E}"/>
+                <a16:creationId xmlns:a16="http://schemas.microsoft.com/office/drawing/2014/main" xmlns="" id="{6B55560B-2B8B-4DCB-BC39-18476E36B78E}"/>
               </a:ext>
             </a:extLst>
           </p:cNvPr>
@@ -6799,7 +6561,7 @@
         </p:nvCxnSpPr>
         <p:spPr>
           <a:xfrm>
-            <a:off x="6776578" y="79302660"/>
+            <a:off x="6630274" y="79302660"/>
             <a:ext cx="472830" cy="1344138"/>
           </a:xfrm>
           <a:prstGeom prst="straightConnector1">
@@ -6822,7 +6584,7 @@
           <p:cNvPr id="70" name="Rectangle 69">
             <a:extLst>
               <a:ext uri="{FF2B5EF4-FFF2-40B4-BE49-F238E27FC236}">
-                <a16:creationId xmlns:a16="http://schemas.microsoft.com/office/drawing/2014/main" id="{6F2CE29A-824B-43BF-88B2-05CFD59F2850}"/>
+                <a16:creationId xmlns:a16="http://schemas.microsoft.com/office/drawing/2014/main" xmlns="" id="{6F2CE29A-824B-43BF-88B2-05CFD59F2850}"/>
               </a:ext>
             </a:extLst>
           </p:cNvPr>
@@ -6831,7 +6593,7 @@
         </p:nvSpPr>
         <p:spPr>
           <a:xfrm>
-            <a:off x="2927845" y="25391559"/>
+            <a:off x="2781541" y="25391559"/>
             <a:ext cx="4428242" cy="228127"/>
           </a:xfrm>
           <a:prstGeom prst="rect">
@@ -6892,7 +6654,7 @@
           <p:cNvPr id="72" name="Rectangle 71">
             <a:extLst>
               <a:ext uri="{FF2B5EF4-FFF2-40B4-BE49-F238E27FC236}">
-                <a16:creationId xmlns:a16="http://schemas.microsoft.com/office/drawing/2014/main" id="{1140E907-9299-4CD9-BAFE-622C27188A85}"/>
+                <a16:creationId xmlns:a16="http://schemas.microsoft.com/office/drawing/2014/main" xmlns="" id="{1140E907-9299-4CD9-BAFE-622C27188A85}"/>
               </a:ext>
             </a:extLst>
           </p:cNvPr>
@@ -6901,7 +6663,7 @@
         </p:nvSpPr>
         <p:spPr>
           <a:xfrm>
-            <a:off x="2880221" y="25341553"/>
+            <a:off x="2733917" y="25341553"/>
             <a:ext cx="4428242" cy="228127"/>
           </a:xfrm>
           <a:prstGeom prst="rect">
@@ -6962,7 +6724,7 @@
           <p:cNvPr id="73" name="Rectangle 72">
             <a:extLst>
               <a:ext uri="{FF2B5EF4-FFF2-40B4-BE49-F238E27FC236}">
-                <a16:creationId xmlns:a16="http://schemas.microsoft.com/office/drawing/2014/main" id="{1BEF5A98-B74E-4DCF-BA24-91BB3AF86C67}"/>
+                <a16:creationId xmlns:a16="http://schemas.microsoft.com/office/drawing/2014/main" xmlns="" id="{1BEF5A98-B74E-4DCF-BA24-91BB3AF86C67}"/>
               </a:ext>
             </a:extLst>
           </p:cNvPr>
@@ -6971,7 +6733,7 @@
         </p:nvSpPr>
         <p:spPr>
           <a:xfrm>
-            <a:off x="2832593" y="25286784"/>
+            <a:off x="2686289" y="25286784"/>
             <a:ext cx="4428242" cy="228127"/>
           </a:xfrm>
           <a:prstGeom prst="rect">
@@ -7032,7 +6794,7 @@
           <p:cNvPr id="74" name="Rectangle 73">
             <a:extLst>
               <a:ext uri="{FF2B5EF4-FFF2-40B4-BE49-F238E27FC236}">
-                <a16:creationId xmlns:a16="http://schemas.microsoft.com/office/drawing/2014/main" id="{7ED72B90-FED8-4BB6-9EF7-D6D8C019D826}"/>
+                <a16:creationId xmlns:a16="http://schemas.microsoft.com/office/drawing/2014/main" xmlns="" id="{7ED72B90-FED8-4BB6-9EF7-D6D8C019D826}"/>
               </a:ext>
             </a:extLst>
           </p:cNvPr>
@@ -7041,7 +6803,7 @@
         </p:nvSpPr>
         <p:spPr>
           <a:xfrm>
-            <a:off x="1479223" y="23193235"/>
+            <a:off x="1332919" y="23193235"/>
             <a:ext cx="7620481" cy="228127"/>
           </a:xfrm>
           <a:prstGeom prst="rect">
@@ -7102,7 +6864,7 @@
           <p:cNvPr id="75" name="Rectangle 74">
             <a:extLst>
               <a:ext uri="{FF2B5EF4-FFF2-40B4-BE49-F238E27FC236}">
-                <a16:creationId xmlns:a16="http://schemas.microsoft.com/office/drawing/2014/main" id="{A701CBB1-3428-44FB-8325-3222717419AF}"/>
+                <a16:creationId xmlns:a16="http://schemas.microsoft.com/office/drawing/2014/main" xmlns="" id="{A701CBB1-3428-44FB-8325-3222717419AF}"/>
               </a:ext>
             </a:extLst>
           </p:cNvPr>
@@ -7111,7 +6873,7 @@
         </p:nvSpPr>
         <p:spPr>
           <a:xfrm>
-            <a:off x="1423342" y="23136265"/>
+            <a:off x="1277038" y="23136265"/>
             <a:ext cx="7620481" cy="228127"/>
           </a:xfrm>
           <a:prstGeom prst="rect">
@@ -7172,7 +6934,7 @@
           <p:cNvPr id="76" name="Rectangle 75">
             <a:extLst>
               <a:ext uri="{FF2B5EF4-FFF2-40B4-BE49-F238E27FC236}">
-                <a16:creationId xmlns:a16="http://schemas.microsoft.com/office/drawing/2014/main" id="{F5730D44-F15E-422B-A9CB-BD63160E6BF6}"/>
+                <a16:creationId xmlns:a16="http://schemas.microsoft.com/office/drawing/2014/main" xmlns="" id="{F5730D44-F15E-422B-A9CB-BD63160E6BF6}"/>
               </a:ext>
             </a:extLst>
           </p:cNvPr>
@@ -7181,7 +6943,7 @@
         </p:nvSpPr>
         <p:spPr>
           <a:xfrm>
-            <a:off x="1367098" y="23079295"/>
+            <a:off x="1220794" y="23079295"/>
             <a:ext cx="7620481" cy="228127"/>
           </a:xfrm>
           <a:prstGeom prst="rect">
@@ -7242,7 +7004,7 @@
           <p:cNvPr id="78" name="Rectangle 77">
             <a:extLst>
               <a:ext uri="{FF2B5EF4-FFF2-40B4-BE49-F238E27FC236}">
-                <a16:creationId xmlns:a16="http://schemas.microsoft.com/office/drawing/2014/main" id="{69BD4D2F-1B82-4DC0-A465-98093981A444}"/>
+                <a16:creationId xmlns:a16="http://schemas.microsoft.com/office/drawing/2014/main" xmlns="" id="{69BD4D2F-1B82-4DC0-A465-98093981A444}"/>
               </a:ext>
             </a:extLst>
           </p:cNvPr>
@@ -7251,7 +7013,7 @@
         </p:nvSpPr>
         <p:spPr>
           <a:xfrm>
-            <a:off x="1307227" y="23028859"/>
+            <a:off x="1160923" y="23028859"/>
             <a:ext cx="7620481" cy="228127"/>
           </a:xfrm>
           <a:prstGeom prst="rect">
@@ -7312,7 +7074,7 @@
           <p:cNvPr id="79" name="Picture 78">
             <a:extLst>
               <a:ext uri="{FF2B5EF4-FFF2-40B4-BE49-F238E27FC236}">
-                <a16:creationId xmlns:a16="http://schemas.microsoft.com/office/drawing/2014/main" id="{CEF8605E-61D2-45AD-B9D1-7164C99F6881}"/>
+                <a16:creationId xmlns:a16="http://schemas.microsoft.com/office/drawing/2014/main" xmlns="" id="{CEF8605E-61D2-45AD-B9D1-7164C99F6881}"/>
               </a:ext>
             </a:extLst>
           </p:cNvPr>
@@ -7322,14 +7084,14 @@
           <p:nvPr/>
         </p:nvPicPr>
         <p:blipFill>
-          <a:blip r:embed="rId7"/>
+          <a:blip r:embed="rId8"/>
           <a:stretch>
             <a:fillRect/>
           </a:stretch>
         </p:blipFill>
         <p:spPr>
           <a:xfrm>
-            <a:off x="1307231" y="18252625"/>
+            <a:off x="1160927" y="18252625"/>
             <a:ext cx="7620483" cy="1052272"/>
           </a:xfrm>
           <a:prstGeom prst="rect">
@@ -7342,7 +7104,7 @@
           <p:cNvPr id="80" name="Rectangle 1">
             <a:extLst>
               <a:ext uri="{FF2B5EF4-FFF2-40B4-BE49-F238E27FC236}">
-                <a16:creationId xmlns:a16="http://schemas.microsoft.com/office/drawing/2014/main" id="{A88C27C5-9A89-4504-AF87-B4C854B05D8A}"/>
+                <a16:creationId xmlns:a16="http://schemas.microsoft.com/office/drawing/2014/main" xmlns="" id="{A88C27C5-9A89-4504-AF87-B4C854B05D8A}"/>
               </a:ext>
             </a:extLst>
           </p:cNvPr>
@@ -7353,7 +7115,7 @@
         </p:nvSpPr>
         <p:spPr bwMode="auto">
           <a:xfrm>
-            <a:off x="1143000" y="16423727"/>
+            <a:off x="996696" y="16423727"/>
             <a:ext cx="8122737" cy="584776"/>
           </a:xfrm>
           <a:prstGeom prst="rect">
@@ -7453,7 +7215,7 @@
           <p:cNvPr id="81" name="Rectangle: Rounded Corners 80">
             <a:extLst>
               <a:ext uri="{FF2B5EF4-FFF2-40B4-BE49-F238E27FC236}">
-                <a16:creationId xmlns:a16="http://schemas.microsoft.com/office/drawing/2014/main" id="{46DE295B-144D-45D2-A208-130BBFE3569B}"/>
+                <a16:creationId xmlns:a16="http://schemas.microsoft.com/office/drawing/2014/main" xmlns="" id="{46DE295B-144D-45D2-A208-130BBFE3569B}"/>
               </a:ext>
             </a:extLst>
           </p:cNvPr>
@@ -7462,7 +7224,7 @@
         </p:nvSpPr>
         <p:spPr>
           <a:xfrm>
-            <a:off x="1307231" y="15786998"/>
+            <a:off x="1160927" y="15786998"/>
             <a:ext cx="5239130" cy="573754"/>
           </a:xfrm>
           <a:prstGeom prst="roundRect">
@@ -7526,7 +7288,7 @@
           <p:cNvPr id="82" name="Rectangle: Rounded Corners 81">
             <a:extLst>
               <a:ext uri="{FF2B5EF4-FFF2-40B4-BE49-F238E27FC236}">
-                <a16:creationId xmlns:a16="http://schemas.microsoft.com/office/drawing/2014/main" id="{131C0E62-9AA9-4760-B18B-E2BE2AD1AB1D}"/>
+                <a16:creationId xmlns:a16="http://schemas.microsoft.com/office/drawing/2014/main" xmlns="" id="{131C0E62-9AA9-4760-B18B-E2BE2AD1AB1D}"/>
               </a:ext>
             </a:extLst>
           </p:cNvPr>
@@ -7535,7 +7297,7 @@
         </p:nvSpPr>
         <p:spPr>
           <a:xfrm>
-            <a:off x="1307231" y="17506637"/>
+            <a:off x="1160927" y="17506637"/>
             <a:ext cx="5239130" cy="573754"/>
           </a:xfrm>
           <a:prstGeom prst="roundRect">
@@ -7599,7 +7361,7 @@
           <p:cNvPr id="83" name="Rectangle: Rounded Corners 82">
             <a:extLst>
               <a:ext uri="{FF2B5EF4-FFF2-40B4-BE49-F238E27FC236}">
-                <a16:creationId xmlns:a16="http://schemas.microsoft.com/office/drawing/2014/main" id="{5D0B200B-B00C-4453-877B-A92D388C04C3}"/>
+                <a16:creationId xmlns:a16="http://schemas.microsoft.com/office/drawing/2014/main" xmlns="" id="{5D0B200B-B00C-4453-877B-A92D388C04C3}"/>
               </a:ext>
             </a:extLst>
           </p:cNvPr>
@@ -7608,7 +7370,7 @@
         </p:nvSpPr>
         <p:spPr>
           <a:xfrm>
-            <a:off x="1307231" y="20040746"/>
+            <a:off x="1160927" y="20040746"/>
             <a:ext cx="5239130" cy="573754"/>
           </a:xfrm>
           <a:prstGeom prst="roundRect">
@@ -7672,7 +7434,7 @@
           <p:cNvPr id="84" name="Rectangle: Rounded Corners 83">
             <a:extLst>
               <a:ext uri="{FF2B5EF4-FFF2-40B4-BE49-F238E27FC236}">
-                <a16:creationId xmlns:a16="http://schemas.microsoft.com/office/drawing/2014/main" id="{B48105C7-0ED8-475E-B51D-2E8443AF6409}"/>
+                <a16:creationId xmlns:a16="http://schemas.microsoft.com/office/drawing/2014/main" xmlns="" id="{B48105C7-0ED8-475E-B51D-2E8443AF6409}"/>
               </a:ext>
             </a:extLst>
           </p:cNvPr>
@@ -7681,7 +7443,7 @@
         </p:nvSpPr>
         <p:spPr>
           <a:xfrm>
-            <a:off x="1307227" y="22183715"/>
+            <a:off x="1160923" y="22183715"/>
             <a:ext cx="5239130" cy="573754"/>
           </a:xfrm>
           <a:prstGeom prst="roundRect">
@@ -7745,7 +7507,7 @@
           <p:cNvPr id="88" name="Straight Connector 87">
             <a:extLst>
               <a:ext uri="{FF2B5EF4-FFF2-40B4-BE49-F238E27FC236}">
-                <a16:creationId xmlns:a16="http://schemas.microsoft.com/office/drawing/2014/main" id="{824740E1-75F7-413D-8F94-5E1AE2CF7A54}"/>
+                <a16:creationId xmlns:a16="http://schemas.microsoft.com/office/drawing/2014/main" xmlns="" id="{824740E1-75F7-413D-8F94-5E1AE2CF7A54}"/>
               </a:ext>
             </a:extLst>
           </p:cNvPr>
@@ -7754,7 +7516,7 @@
         </p:nvCxnSpPr>
         <p:spPr>
           <a:xfrm>
-            <a:off x="7003862" y="21090656"/>
+            <a:off x="6857558" y="21090656"/>
             <a:ext cx="252212" cy="2052267"/>
           </a:xfrm>
           <a:prstGeom prst="line">
@@ -7776,7 +7538,7 @@
           <p:cNvPr id="89" name="Straight Connector 88">
             <a:extLst>
               <a:ext uri="{FF2B5EF4-FFF2-40B4-BE49-F238E27FC236}">
-                <a16:creationId xmlns:a16="http://schemas.microsoft.com/office/drawing/2014/main" id="{33E32160-BE99-46AB-A5E5-0E0044F7B462}"/>
+                <a16:creationId xmlns:a16="http://schemas.microsoft.com/office/drawing/2014/main" xmlns="" id="{33E32160-BE99-46AB-A5E5-0E0044F7B462}"/>
               </a:ext>
             </a:extLst>
           </p:cNvPr>
@@ -7787,7 +7549,7 @@
         </p:nvCxnSpPr>
         <p:spPr>
           <a:xfrm flipH="1">
-            <a:off x="7256075" y="21113491"/>
+            <a:off x="7109771" y="21113491"/>
             <a:ext cx="252212" cy="2029431"/>
           </a:xfrm>
           <a:prstGeom prst="line">
@@ -7809,7 +7571,7 @@
           <p:cNvPr id="92" name="Rectangle 91">
             <a:extLst>
               <a:ext uri="{FF2B5EF4-FFF2-40B4-BE49-F238E27FC236}">
-                <a16:creationId xmlns:a16="http://schemas.microsoft.com/office/drawing/2014/main" id="{99B64FC2-7503-48F6-932C-F11880473E95}"/>
+                <a16:creationId xmlns:a16="http://schemas.microsoft.com/office/drawing/2014/main" xmlns="" id="{99B64FC2-7503-48F6-932C-F11880473E95}"/>
               </a:ext>
             </a:extLst>
           </p:cNvPr>
@@ -7818,7 +7580,7 @@
         </p:nvSpPr>
         <p:spPr>
           <a:xfrm>
-            <a:off x="2775445" y="25227254"/>
+            <a:off x="2629141" y="25227254"/>
             <a:ext cx="4428242" cy="228127"/>
           </a:xfrm>
           <a:prstGeom prst="rect">
@@ -7879,7 +7641,7 @@
           <p:cNvPr id="93" name="Rectangle: Rounded Corners 92">
             <a:extLst>
               <a:ext uri="{FF2B5EF4-FFF2-40B4-BE49-F238E27FC236}">
-                <a16:creationId xmlns:a16="http://schemas.microsoft.com/office/drawing/2014/main" id="{4FDB5C83-4923-4110-B12C-5D444C6EB9ED}"/>
+                <a16:creationId xmlns:a16="http://schemas.microsoft.com/office/drawing/2014/main" xmlns="" id="{4FDB5C83-4923-4110-B12C-5D444C6EB9ED}"/>
               </a:ext>
             </a:extLst>
           </p:cNvPr>
@@ -7888,7 +7650,7 @@
         </p:nvSpPr>
         <p:spPr>
           <a:xfrm>
-            <a:off x="1307227" y="24327801"/>
+            <a:off x="1160923" y="24327801"/>
             <a:ext cx="3027878" cy="573754"/>
           </a:xfrm>
           <a:prstGeom prst="roundRect">
@@ -7952,7 +7714,7 @@
           <p:cNvPr id="94" name="Rectangle 93">
             <a:extLst>
               <a:ext uri="{FF2B5EF4-FFF2-40B4-BE49-F238E27FC236}">
-                <a16:creationId xmlns:a16="http://schemas.microsoft.com/office/drawing/2014/main" id="{027ED020-165B-46C2-91F1-3833249DF4E1}"/>
+                <a16:creationId xmlns:a16="http://schemas.microsoft.com/office/drawing/2014/main" xmlns="" id="{027ED020-165B-46C2-91F1-3833249DF4E1}"/>
               </a:ext>
             </a:extLst>
           </p:cNvPr>
@@ -7961,7 +7723,7 @@
         </p:nvSpPr>
         <p:spPr>
           <a:xfrm>
-            <a:off x="4666500" y="23022370"/>
+            <a:off x="4520196" y="23022370"/>
             <a:ext cx="504425" cy="228127"/>
           </a:xfrm>
           <a:prstGeom prst="rect">
@@ -8022,7 +7784,7 @@
           <p:cNvPr id="95" name="Straight Connector 94">
             <a:extLst>
               <a:ext uri="{FF2B5EF4-FFF2-40B4-BE49-F238E27FC236}">
-                <a16:creationId xmlns:a16="http://schemas.microsoft.com/office/drawing/2014/main" id="{27FD0851-60A7-425E-88D5-B9FF2910B567}"/>
+                <a16:creationId xmlns:a16="http://schemas.microsoft.com/office/drawing/2014/main" xmlns="" id="{27FD0851-60A7-425E-88D5-B9FF2910B567}"/>
               </a:ext>
             </a:extLst>
           </p:cNvPr>
@@ -8031,7 +7793,7 @@
         </p:nvCxnSpPr>
         <p:spPr>
           <a:xfrm>
-            <a:off x="4666500" y="23266214"/>
+            <a:off x="4520196" y="23266214"/>
             <a:ext cx="252212" cy="2052267"/>
           </a:xfrm>
           <a:prstGeom prst="line">
@@ -8053,7 +7815,7 @@
           <p:cNvPr id="96" name="Straight Connector 95">
             <a:extLst>
               <a:ext uri="{FF2B5EF4-FFF2-40B4-BE49-F238E27FC236}">
-                <a16:creationId xmlns:a16="http://schemas.microsoft.com/office/drawing/2014/main" id="{0AF9BBB5-32D3-40F9-B943-B0522785DB6C}"/>
+                <a16:creationId xmlns:a16="http://schemas.microsoft.com/office/drawing/2014/main" xmlns="" id="{0AF9BBB5-32D3-40F9-B943-B0522785DB6C}"/>
               </a:ext>
             </a:extLst>
           </p:cNvPr>
@@ -8064,7 +7826,7 @@
         </p:nvCxnSpPr>
         <p:spPr>
           <a:xfrm flipH="1">
-            <a:off x="4918712" y="23254212"/>
+            <a:off x="4772408" y="23254212"/>
             <a:ext cx="252965" cy="2064269"/>
           </a:xfrm>
           <a:prstGeom prst="line">
@@ -8086,7 +7848,7 @@
           <p:cNvPr id="97" name="Rectangle: Rounded Corners 96">
             <a:extLst>
               <a:ext uri="{FF2B5EF4-FFF2-40B4-BE49-F238E27FC236}">
-                <a16:creationId xmlns:a16="http://schemas.microsoft.com/office/drawing/2014/main" id="{FC6B87FB-9DA7-432C-8EE2-62F81F90F715}"/>
+                <a16:creationId xmlns:a16="http://schemas.microsoft.com/office/drawing/2014/main" xmlns="" id="{FC6B87FB-9DA7-432C-8EE2-62F81F90F715}"/>
               </a:ext>
             </a:extLst>
           </p:cNvPr>
@@ -8095,7 +7857,7 @@
         </p:nvSpPr>
         <p:spPr>
           <a:xfrm>
-            <a:off x="1292494" y="25781079"/>
+            <a:off x="1146190" y="25781079"/>
             <a:ext cx="2346025" cy="573754"/>
           </a:xfrm>
           <a:prstGeom prst="roundRect">
@@ -8159,7 +7921,7 @@
           <p:cNvPr id="98" name="Oval 97">
             <a:extLst>
               <a:ext uri="{FF2B5EF4-FFF2-40B4-BE49-F238E27FC236}">
-                <a16:creationId xmlns:a16="http://schemas.microsoft.com/office/drawing/2014/main" id="{7D7ABFCF-5210-4740-AE98-6AA3358F4D53}"/>
+                <a16:creationId xmlns:a16="http://schemas.microsoft.com/office/drawing/2014/main" xmlns="" id="{7D7ABFCF-5210-4740-AE98-6AA3358F4D53}"/>
               </a:ext>
             </a:extLst>
           </p:cNvPr>
@@ -8168,7 +7930,7 @@
         </p:nvSpPr>
         <p:spPr>
           <a:xfrm>
-            <a:off x="2355462" y="26821361"/>
+            <a:off x="2209158" y="26821361"/>
             <a:ext cx="711180" cy="711180"/>
           </a:xfrm>
           <a:prstGeom prst="ellipse">
@@ -8229,7 +7991,7 @@
           <p:cNvPr id="99" name="Oval 98">
             <a:extLst>
               <a:ext uri="{FF2B5EF4-FFF2-40B4-BE49-F238E27FC236}">
-                <a16:creationId xmlns:a16="http://schemas.microsoft.com/office/drawing/2014/main" id="{4B0C94D5-70A0-4EB3-9C13-83B57A03F73B}"/>
+                <a16:creationId xmlns:a16="http://schemas.microsoft.com/office/drawing/2014/main" xmlns="" id="{4B0C94D5-70A0-4EB3-9C13-83B57A03F73B}"/>
               </a:ext>
             </a:extLst>
           </p:cNvPr>
@@ -8238,7 +8000,7 @@
         </p:nvSpPr>
         <p:spPr>
           <a:xfrm>
-            <a:off x="3493382" y="26821361"/>
+            <a:off x="3347078" y="26821361"/>
             <a:ext cx="711180" cy="711180"/>
           </a:xfrm>
           <a:prstGeom prst="ellipse">
@@ -8299,7 +8061,7 @@
           <p:cNvPr id="100" name="Oval 99">
             <a:extLst>
               <a:ext uri="{FF2B5EF4-FFF2-40B4-BE49-F238E27FC236}">
-                <a16:creationId xmlns:a16="http://schemas.microsoft.com/office/drawing/2014/main" id="{2517EE10-60F4-4D50-A0F4-ED6FA56D7836}"/>
+                <a16:creationId xmlns:a16="http://schemas.microsoft.com/office/drawing/2014/main" xmlns="" id="{2517EE10-60F4-4D50-A0F4-ED6FA56D7836}"/>
               </a:ext>
             </a:extLst>
           </p:cNvPr>
@@ -8308,7 +8070,7 @@
         </p:nvSpPr>
         <p:spPr>
           <a:xfrm>
-            <a:off x="4631305" y="26821361"/>
+            <a:off x="4485001" y="26821361"/>
             <a:ext cx="711180" cy="711180"/>
           </a:xfrm>
           <a:prstGeom prst="ellipse">
@@ -8369,7 +8131,7 @@
           <p:cNvPr id="101" name="Oval 100">
             <a:extLst>
               <a:ext uri="{FF2B5EF4-FFF2-40B4-BE49-F238E27FC236}">
-                <a16:creationId xmlns:a16="http://schemas.microsoft.com/office/drawing/2014/main" id="{02E48D20-F87E-4AED-9491-879AF3600076}"/>
+                <a16:creationId xmlns:a16="http://schemas.microsoft.com/office/drawing/2014/main" xmlns="" id="{02E48D20-F87E-4AED-9491-879AF3600076}"/>
               </a:ext>
             </a:extLst>
           </p:cNvPr>
@@ -8378,7 +8140,7 @@
         </p:nvSpPr>
         <p:spPr>
           <a:xfrm>
-            <a:off x="5769228" y="26821361"/>
+            <a:off x="5622924" y="26821361"/>
             <a:ext cx="711180" cy="711180"/>
           </a:xfrm>
           <a:prstGeom prst="ellipse">
@@ -8439,7 +8201,7 @@
           <p:cNvPr id="102" name="Oval 101">
             <a:extLst>
               <a:ext uri="{FF2B5EF4-FFF2-40B4-BE49-F238E27FC236}">
-                <a16:creationId xmlns:a16="http://schemas.microsoft.com/office/drawing/2014/main" id="{9D382AB9-4BD0-4DE5-9873-9C6EDCD70846}"/>
+                <a16:creationId xmlns:a16="http://schemas.microsoft.com/office/drawing/2014/main" xmlns="" id="{9D382AB9-4BD0-4DE5-9873-9C6EDCD70846}"/>
               </a:ext>
             </a:extLst>
           </p:cNvPr>
@@ -8448,7 +8210,7 @@
         </p:nvSpPr>
         <p:spPr>
           <a:xfrm>
-            <a:off x="6893817" y="26821361"/>
+            <a:off x="6747513" y="26821361"/>
             <a:ext cx="711180" cy="711180"/>
           </a:xfrm>
           <a:prstGeom prst="ellipse">
@@ -8509,7 +8271,7 @@
           <p:cNvPr id="104" name="Straight Arrow Connector 103">
             <a:extLst>
               <a:ext uri="{FF2B5EF4-FFF2-40B4-BE49-F238E27FC236}">
-                <a16:creationId xmlns:a16="http://schemas.microsoft.com/office/drawing/2014/main" id="{65AC804A-CBD2-4D88-88D1-3DFFAB054869}"/>
+                <a16:creationId xmlns:a16="http://schemas.microsoft.com/office/drawing/2014/main" xmlns="" id="{65AC804A-CBD2-4D88-88D1-3DFFAB054869}"/>
               </a:ext>
             </a:extLst>
           </p:cNvPr>
@@ -8522,7 +8284,7 @@
         </p:nvCxnSpPr>
         <p:spPr>
           <a:xfrm flipH="1">
-            <a:off x="4986895" y="25455381"/>
+            <a:off x="4840591" y="25455381"/>
             <a:ext cx="2671" cy="1365980"/>
           </a:xfrm>
           <a:prstGeom prst="straightConnector1">
@@ -8545,7 +8307,7 @@
           <p:cNvPr id="107" name="Straight Arrow Connector 106">
             <a:extLst>
               <a:ext uri="{FF2B5EF4-FFF2-40B4-BE49-F238E27FC236}">
-                <a16:creationId xmlns:a16="http://schemas.microsoft.com/office/drawing/2014/main" id="{3B6F916F-9027-4FDC-B04A-D5A0443A88C7}"/>
+                <a16:creationId xmlns:a16="http://schemas.microsoft.com/office/drawing/2014/main" xmlns="" id="{3B6F916F-9027-4FDC-B04A-D5A0443A88C7}"/>
               </a:ext>
             </a:extLst>
           </p:cNvPr>
@@ -8558,7 +8320,7 @@
         </p:nvCxnSpPr>
         <p:spPr>
           <a:xfrm>
-            <a:off x="3066642" y="27176951"/>
+            <a:off x="2920338" y="27176951"/>
             <a:ext cx="426740" cy="0"/>
           </a:xfrm>
           <a:prstGeom prst="straightConnector1">
@@ -8581,7 +8343,7 @@
           <p:cNvPr id="108" name="Straight Arrow Connector 107">
             <a:extLst>
               <a:ext uri="{FF2B5EF4-FFF2-40B4-BE49-F238E27FC236}">
-                <a16:creationId xmlns:a16="http://schemas.microsoft.com/office/drawing/2014/main" id="{96E7F067-52CD-421E-998E-1C2C2D7EC42B}"/>
+                <a16:creationId xmlns:a16="http://schemas.microsoft.com/office/drawing/2014/main" xmlns="" id="{96E7F067-52CD-421E-998E-1C2C2D7EC42B}"/>
               </a:ext>
             </a:extLst>
           </p:cNvPr>
@@ -8594,7 +8356,7 @@
         </p:nvCxnSpPr>
         <p:spPr>
           <a:xfrm>
-            <a:off x="4204562" y="27176951"/>
+            <a:off x="4058258" y="27176951"/>
             <a:ext cx="426743" cy="0"/>
           </a:xfrm>
           <a:prstGeom prst="straightConnector1">
@@ -8617,7 +8379,7 @@
           <p:cNvPr id="109" name="Straight Arrow Connector 108">
             <a:extLst>
               <a:ext uri="{FF2B5EF4-FFF2-40B4-BE49-F238E27FC236}">
-                <a16:creationId xmlns:a16="http://schemas.microsoft.com/office/drawing/2014/main" id="{AA6BFE0C-F0BF-498F-9515-35A1DEF8E752}"/>
+                <a16:creationId xmlns:a16="http://schemas.microsoft.com/office/drawing/2014/main" xmlns="" id="{AA6BFE0C-F0BF-498F-9515-35A1DEF8E752}"/>
               </a:ext>
             </a:extLst>
           </p:cNvPr>
@@ -8630,7 +8392,7 @@
         </p:nvCxnSpPr>
         <p:spPr>
           <a:xfrm>
-            <a:off x="5342485" y="27176951"/>
+            <a:off x="5196181" y="27176951"/>
             <a:ext cx="426743" cy="0"/>
           </a:xfrm>
           <a:prstGeom prst="straightConnector1">
@@ -8653,7 +8415,7 @@
           <p:cNvPr id="110" name="Straight Arrow Connector 109">
             <a:extLst>
               <a:ext uri="{FF2B5EF4-FFF2-40B4-BE49-F238E27FC236}">
-                <a16:creationId xmlns:a16="http://schemas.microsoft.com/office/drawing/2014/main" id="{DE32880D-28B2-465F-932D-DC816ADF3B25}"/>
+                <a16:creationId xmlns:a16="http://schemas.microsoft.com/office/drawing/2014/main" xmlns="" id="{DE32880D-28B2-465F-932D-DC816ADF3B25}"/>
               </a:ext>
             </a:extLst>
           </p:cNvPr>
@@ -8666,7 +8428,7 @@
         </p:nvCxnSpPr>
         <p:spPr>
           <a:xfrm>
-            <a:off x="6480408" y="27176951"/>
+            <a:off x="6334104" y="27176951"/>
             <a:ext cx="413409" cy="0"/>
           </a:xfrm>
           <a:prstGeom prst="straightConnector1">
@@ -8689,7 +8451,7 @@
           <p:cNvPr id="111" name="Straight Arrow Connector 110">
             <a:extLst>
               <a:ext uri="{FF2B5EF4-FFF2-40B4-BE49-F238E27FC236}">
-                <a16:creationId xmlns:a16="http://schemas.microsoft.com/office/drawing/2014/main" id="{9EBDBC0A-45A5-4528-BC86-934407F43BAA}"/>
+                <a16:creationId xmlns:a16="http://schemas.microsoft.com/office/drawing/2014/main" xmlns="" id="{9EBDBC0A-45A5-4528-BC86-934407F43BAA}"/>
               </a:ext>
             </a:extLst>
           </p:cNvPr>
@@ -8702,7 +8464,7 @@
         </p:nvCxnSpPr>
         <p:spPr>
           <a:xfrm flipH="1">
-            <a:off x="4052161" y="27532541"/>
+            <a:off x="3905857" y="27532541"/>
             <a:ext cx="3197246" cy="1252572"/>
           </a:xfrm>
           <a:prstGeom prst="straightConnector1">
@@ -8725,7 +8487,7 @@
           <p:cNvPr id="112" name="Picture 111">
             <a:extLst>
               <a:ext uri="{FF2B5EF4-FFF2-40B4-BE49-F238E27FC236}">
-                <a16:creationId xmlns:a16="http://schemas.microsoft.com/office/drawing/2014/main" id="{484FFDF6-315A-474C-96C2-7F906F436DCE}"/>
+                <a16:creationId xmlns:a16="http://schemas.microsoft.com/office/drawing/2014/main" xmlns="" id="{484FFDF6-315A-474C-96C2-7F906F436DCE}"/>
               </a:ext>
             </a:extLst>
           </p:cNvPr>
@@ -8735,14 +8497,14 @@
           <p:nvPr/>
         </p:nvPicPr>
         <p:blipFill>
-          <a:blip r:embed="rId8"/>
+          <a:blip r:embed="rId9"/>
           <a:stretch>
             <a:fillRect/>
           </a:stretch>
         </p:blipFill>
         <p:spPr>
           <a:xfrm>
-            <a:off x="1307227" y="20830680"/>
+            <a:off x="1160923" y="20830680"/>
             <a:ext cx="7621677" cy="271933"/>
           </a:xfrm>
           <a:prstGeom prst="rect">
@@ -8755,7 +8517,7 @@
           <p:cNvPr id="113" name="Rectangle 112">
             <a:extLst>
               <a:ext uri="{FF2B5EF4-FFF2-40B4-BE49-F238E27FC236}">
-                <a16:creationId xmlns:a16="http://schemas.microsoft.com/office/drawing/2014/main" id="{0704FD7C-06EA-4FEF-8CFC-7ED66F17F558}"/>
+                <a16:creationId xmlns:a16="http://schemas.microsoft.com/office/drawing/2014/main" xmlns="" id="{0704FD7C-06EA-4FEF-8CFC-7ED66F17F558}"/>
               </a:ext>
             </a:extLst>
           </p:cNvPr>
@@ -8764,7 +8526,7 @@
         </p:nvSpPr>
         <p:spPr>
           <a:xfrm>
-            <a:off x="7003862" y="20820240"/>
+            <a:off x="6857558" y="20820240"/>
             <a:ext cx="504425" cy="282373"/>
           </a:xfrm>
           <a:prstGeom prst="rect">
@@ -8825,7 +8587,7 @@
           <p:cNvPr id="114" name="Rectangle: Rounded Corners 113">
             <a:extLst>
               <a:ext uri="{FF2B5EF4-FFF2-40B4-BE49-F238E27FC236}">
-                <a16:creationId xmlns:a16="http://schemas.microsoft.com/office/drawing/2014/main" id="{CD9E25C1-A722-4C54-AD59-467E0A9F8A88}"/>
+                <a16:creationId xmlns:a16="http://schemas.microsoft.com/office/drawing/2014/main" xmlns="" id="{CD9E25C1-A722-4C54-AD59-467E0A9F8A88}"/>
               </a:ext>
             </a:extLst>
           </p:cNvPr>
@@ -8834,7 +8596,7 @@
         </p:nvSpPr>
         <p:spPr>
           <a:xfrm>
-            <a:off x="1281495" y="28498236"/>
+            <a:off x="1135191" y="28498236"/>
             <a:ext cx="2770666" cy="573754"/>
           </a:xfrm>
           <a:prstGeom prst="roundRect">
@@ -8898,7 +8660,7 @@
           <p:cNvPr id="115" name="Straight Connector 114">
             <a:extLst>
               <a:ext uri="{FF2B5EF4-FFF2-40B4-BE49-F238E27FC236}">
-                <a16:creationId xmlns:a16="http://schemas.microsoft.com/office/drawing/2014/main" id="{BD85D54E-463A-4E8D-92E7-E619BCD97EF8}"/>
+                <a16:creationId xmlns:a16="http://schemas.microsoft.com/office/drawing/2014/main" xmlns="" id="{BD85D54E-463A-4E8D-92E7-E619BCD97EF8}"/>
               </a:ext>
             </a:extLst>
           </p:cNvPr>
@@ -8909,7 +8671,7 @@
         </p:nvCxnSpPr>
         <p:spPr>
           <a:xfrm>
-            <a:off x="3692921" y="25227254"/>
+            <a:off x="3546617" y="25227254"/>
             <a:ext cx="0" cy="228127"/>
           </a:xfrm>
           <a:prstGeom prst="line">
@@ -8937,7 +8699,7 @@
           <p:cNvPr id="116" name="Straight Connector 115">
             <a:extLst>
               <a:ext uri="{FF2B5EF4-FFF2-40B4-BE49-F238E27FC236}">
-                <a16:creationId xmlns:a16="http://schemas.microsoft.com/office/drawing/2014/main" id="{9846F6BB-442C-4F2A-9A2F-CA6B14FBC502}"/>
+                <a16:creationId xmlns:a16="http://schemas.microsoft.com/office/drawing/2014/main" xmlns="" id="{9846F6BB-442C-4F2A-9A2F-CA6B14FBC502}"/>
               </a:ext>
             </a:extLst>
           </p:cNvPr>
@@ -8948,7 +8710,7 @@
         </p:nvCxnSpPr>
         <p:spPr>
           <a:xfrm>
-            <a:off x="4585585" y="25227253"/>
+            <a:off x="4439281" y="25227253"/>
             <a:ext cx="0" cy="228127"/>
           </a:xfrm>
           <a:prstGeom prst="line">
@@ -8976,7 +8738,7 @@
           <p:cNvPr id="117" name="Straight Connector 116">
             <a:extLst>
               <a:ext uri="{FF2B5EF4-FFF2-40B4-BE49-F238E27FC236}">
-                <a16:creationId xmlns:a16="http://schemas.microsoft.com/office/drawing/2014/main" id="{B37D2054-9111-412D-9D7F-9E44971ACD58}"/>
+                <a16:creationId xmlns:a16="http://schemas.microsoft.com/office/drawing/2014/main" xmlns="" id="{B37D2054-9111-412D-9D7F-9E44971ACD58}"/>
               </a:ext>
             </a:extLst>
           </p:cNvPr>
@@ -8987,7 +8749,7 @@
         </p:nvCxnSpPr>
         <p:spPr>
           <a:xfrm>
-            <a:off x="5447902" y="25227253"/>
+            <a:off x="5301598" y="25227253"/>
             <a:ext cx="0" cy="228127"/>
           </a:xfrm>
           <a:prstGeom prst="line">
@@ -9015,7 +8777,7 @@
           <p:cNvPr id="118" name="Straight Connector 117">
             <a:extLst>
               <a:ext uri="{FF2B5EF4-FFF2-40B4-BE49-F238E27FC236}">
-                <a16:creationId xmlns:a16="http://schemas.microsoft.com/office/drawing/2014/main" id="{7421ADCE-F0B8-4E1E-B2D5-0B560AB1E16E}"/>
+                <a16:creationId xmlns:a16="http://schemas.microsoft.com/office/drawing/2014/main" xmlns="" id="{7421ADCE-F0B8-4E1E-B2D5-0B560AB1E16E}"/>
               </a:ext>
             </a:extLst>
           </p:cNvPr>
@@ -9026,7 +8788,7 @@
         </p:nvCxnSpPr>
         <p:spPr>
           <a:xfrm>
-            <a:off x="6290865" y="25227252"/>
+            <a:off x="6144561" y="25227252"/>
             <a:ext cx="0" cy="228127"/>
           </a:xfrm>
           <a:prstGeom prst="line">
@@ -9051,10 +8813,10 @@
       </p:cxnSp>
       <p:pic>
         <p:nvPicPr>
-          <p:cNvPr id="3" name="Graphic 2">
+          <p:cNvPr id="2" name="Picture 1">
             <a:extLst>
               <a:ext uri="{FF2B5EF4-FFF2-40B4-BE49-F238E27FC236}">
-                <a16:creationId xmlns:a16="http://schemas.microsoft.com/office/drawing/2014/main" id="{4DBA3C3C-33F3-4C80-B9C2-58B3F9B6421C}"/>
+                <a16:creationId xmlns:a16="http://schemas.microsoft.com/office/drawing/2014/main" xmlns="" id="{9B7E50B6-8EFE-4711-B07F-0540B8E709F4}"/>
               </a:ext>
             </a:extLst>
           </p:cNvPr>
@@ -9064,85 +8826,7 @@
           <p:nvPr/>
         </p:nvPicPr>
         <p:blipFill>
-          <a:blip r:embed="rId9">
-            <a:extLst>
-              <a:ext uri="{28A0092B-C50C-407E-A947-70E740481C1C}">
-                <a14:useLocalDpi xmlns:a14="http://schemas.microsoft.com/office/drawing/2010/main" val="0"/>
-              </a:ext>
-              <a:ext uri="{96DAC541-7B7A-43D3-8B79-37D633B846F1}">
-                <asvg:svgBlip xmlns:asvg="http://schemas.microsoft.com/office/drawing/2016/SVG/main" r:embed="rId10"/>
-              </a:ext>
-            </a:extLst>
-          </a:blip>
-          <a:stretch>
-            <a:fillRect/>
-          </a:stretch>
-        </p:blipFill>
-        <p:spPr>
-          <a:xfrm>
-            <a:off x="23134320" y="6797917"/>
-            <a:ext cx="5212080" cy="3474720"/>
-          </a:xfrm>
-          <a:prstGeom prst="rect">
-            <a:avLst/>
-          </a:prstGeom>
-        </p:spPr>
-      </p:pic>
-      <p:pic>
-        <p:nvPicPr>
-          <p:cNvPr id="19" name="Graphic 18">
-            <a:extLst>
-              <a:ext uri="{FF2B5EF4-FFF2-40B4-BE49-F238E27FC236}">
-                <a16:creationId xmlns:a16="http://schemas.microsoft.com/office/drawing/2014/main" id="{7B200219-3871-4F29-9461-34FEB7BC1838}"/>
-              </a:ext>
-            </a:extLst>
-          </p:cNvPr>
-          <p:cNvPicPr>
-            <a:picLocks noChangeAspect="1"/>
-          </p:cNvPicPr>
-          <p:nvPr/>
-        </p:nvPicPr>
-        <p:blipFill>
-          <a:blip r:embed="rId11">
-            <a:extLst>
-              <a:ext uri="{28A0092B-C50C-407E-A947-70E740481C1C}">
-                <a14:useLocalDpi xmlns:a14="http://schemas.microsoft.com/office/drawing/2010/main" val="0"/>
-              </a:ext>
-              <a:ext uri="{96DAC541-7B7A-43D3-8B79-37D633B846F1}">
-                <asvg:svgBlip xmlns:asvg="http://schemas.microsoft.com/office/drawing/2016/SVG/main" r:embed="rId12"/>
-              </a:ext>
-            </a:extLst>
-          </a:blip>
-          <a:stretch>
-            <a:fillRect/>
-          </a:stretch>
-        </p:blipFill>
-        <p:spPr>
-          <a:xfrm>
-            <a:off x="23134320" y="10298964"/>
-            <a:ext cx="5212080" cy="3474720"/>
-          </a:xfrm>
-          <a:prstGeom prst="rect">
-            <a:avLst/>
-          </a:prstGeom>
-        </p:spPr>
-      </p:pic>
-      <p:pic>
-        <p:nvPicPr>
-          <p:cNvPr id="2" name="Picture 1">
-            <a:extLst>
-              <a:ext uri="{FF2B5EF4-FFF2-40B4-BE49-F238E27FC236}">
-                <a16:creationId xmlns:a16="http://schemas.microsoft.com/office/drawing/2014/main" id="{9B7E50B6-8EFE-4711-B07F-0540B8E709F4}"/>
-              </a:ext>
-            </a:extLst>
-          </p:cNvPr>
-          <p:cNvPicPr>
-            <a:picLocks noChangeAspect="1"/>
-          </p:cNvPicPr>
-          <p:nvPr/>
-        </p:nvPicPr>
-        <p:blipFill>
-          <a:blip r:embed="rId13"/>
+          <a:blip r:embed="rId10"/>
           <a:stretch>
             <a:fillRect/>
           </a:stretch>
@@ -9162,7 +8846,7 @@
           <p:cNvPr id="8" name="Picture 7">
             <a:extLst>
               <a:ext uri="{FF2B5EF4-FFF2-40B4-BE49-F238E27FC236}">
-                <a16:creationId xmlns:a16="http://schemas.microsoft.com/office/drawing/2014/main" id="{5A031D0C-3D99-49C9-A572-1EF6AF8AB465}"/>
+                <a16:creationId xmlns:a16="http://schemas.microsoft.com/office/drawing/2014/main" xmlns="" id="{5A031D0C-3D99-49C9-A572-1EF6AF8AB465}"/>
               </a:ext>
             </a:extLst>
           </p:cNvPr>
@@ -9172,7 +8856,7 @@
           <p:nvPr/>
         </p:nvPicPr>
         <p:blipFill>
-          <a:blip r:embed="rId14"/>
+          <a:blip r:embed="rId11"/>
           <a:stretch>
             <a:fillRect/>
           </a:stretch>
@@ -9192,7 +8876,7 @@
           <p:cNvPr id="26" name="TextBox 25">
             <a:extLst>
               <a:ext uri="{FF2B5EF4-FFF2-40B4-BE49-F238E27FC236}">
-                <a16:creationId xmlns:a16="http://schemas.microsoft.com/office/drawing/2014/main" id="{3AEA94AE-4F7B-4627-B42A-B493CB3F677B}"/>
+                <a16:creationId xmlns:a16="http://schemas.microsoft.com/office/drawing/2014/main" xmlns="" id="{3AEA94AE-4F7B-4627-B42A-B493CB3F677B}"/>
               </a:ext>
             </a:extLst>
           </p:cNvPr>
@@ -9227,7 +8911,7 @@
           <p:cNvPr id="31" name="TextBox 30">
             <a:extLst>
               <a:ext uri="{FF2B5EF4-FFF2-40B4-BE49-F238E27FC236}">
-                <a16:creationId xmlns:a16="http://schemas.microsoft.com/office/drawing/2014/main" id="{B1D37A79-6F0D-4C9D-83CE-19AA24A1E29F}"/>
+                <a16:creationId xmlns:a16="http://schemas.microsoft.com/office/drawing/2014/main" xmlns="" id="{B1D37A79-6F0D-4C9D-83CE-19AA24A1E29F}"/>
               </a:ext>
             </a:extLst>
           </p:cNvPr>
@@ -9263,7 +8947,7 @@
           <p:cNvPr id="122" name="TextBox 121">
             <a:extLst>
               <a:ext uri="{FF2B5EF4-FFF2-40B4-BE49-F238E27FC236}">
-                <a16:creationId xmlns:a16="http://schemas.microsoft.com/office/drawing/2014/main" id="{CB0995F5-E783-4AE2-9012-C1A17BAA625C}"/>
+                <a16:creationId xmlns:a16="http://schemas.microsoft.com/office/drawing/2014/main" xmlns="" id="{CB0995F5-E783-4AE2-9012-C1A17BAA625C}"/>
               </a:ext>
             </a:extLst>
           </p:cNvPr>
@@ -9306,7 +8990,7 @@
           <p:cNvPr id="123" name="Text Placeholder 17">
             <a:extLst>
               <a:ext uri="{FF2B5EF4-FFF2-40B4-BE49-F238E27FC236}">
-                <a16:creationId xmlns:a16="http://schemas.microsoft.com/office/drawing/2014/main" id="{4438A751-58AF-449E-ABA6-C8F72BF492D9}"/>
+                <a16:creationId xmlns:a16="http://schemas.microsoft.com/office/drawing/2014/main" xmlns="" id="{4438A751-58AF-449E-ABA6-C8F72BF492D9}"/>
               </a:ext>
             </a:extLst>
           </p:cNvPr>
@@ -9568,48 +9252,12 @@
           </a:p>
         </p:txBody>
       </p:sp>
-      <p:pic>
-        <p:nvPicPr>
-          <p:cNvPr id="20" name="Picture 19">
-            <a:extLst>
-              <a:ext uri="{FF2B5EF4-FFF2-40B4-BE49-F238E27FC236}">
-                <a16:creationId xmlns:a16="http://schemas.microsoft.com/office/drawing/2014/main" id="{CEB5BE10-E70A-46EE-9828-0A98F0E7792C}"/>
-              </a:ext>
-            </a:extLst>
-          </p:cNvPr>
-          <p:cNvPicPr>
-            <a:picLocks noChangeAspect="1"/>
-          </p:cNvPicPr>
-          <p:nvPr/>
-        </p:nvPicPr>
-        <p:blipFill>
-          <a:blip r:embed="rId15">
-            <a:extLst>
-              <a:ext uri="{28A0092B-C50C-407E-A947-70E740481C1C}">
-                <a14:useLocalDpi xmlns:a14="http://schemas.microsoft.com/office/drawing/2010/main" val="0"/>
-              </a:ext>
-            </a:extLst>
-          </a:blip>
-          <a:stretch>
-            <a:fillRect/>
-          </a:stretch>
-        </p:blipFill>
-        <p:spPr>
-          <a:xfrm>
-            <a:off x="29298141" y="7321236"/>
-            <a:ext cx="9433178" cy="7297681"/>
-          </a:xfrm>
-          <a:prstGeom prst="rect">
-            <a:avLst/>
-          </a:prstGeom>
-        </p:spPr>
-      </p:pic>
       <p:sp>
         <p:nvSpPr>
           <p:cNvPr id="124" name="TextBox 123">
             <a:extLst>
               <a:ext uri="{FF2B5EF4-FFF2-40B4-BE49-F238E27FC236}">
-                <a16:creationId xmlns:a16="http://schemas.microsoft.com/office/drawing/2014/main" id="{D9A6AAEE-5E70-4AB2-A617-1C8A402C3997}"/>
+                <a16:creationId xmlns:a16="http://schemas.microsoft.com/office/drawing/2014/main" xmlns="" id="{D9A6AAEE-5E70-4AB2-A617-1C8A402C3997}"/>
               </a:ext>
             </a:extLst>
           </p:cNvPr>
@@ -9640,83 +9288,12 @@
           </a:p>
         </p:txBody>
       </p:sp>
-      <p:sp>
-        <p:nvSpPr>
-          <p:cNvPr id="125" name="TextBox 124">
-            <a:extLst>
-              <a:ext uri="{FF2B5EF4-FFF2-40B4-BE49-F238E27FC236}">
-                <a16:creationId xmlns:a16="http://schemas.microsoft.com/office/drawing/2014/main" id="{A388065E-6140-4EDF-B243-EE75E6E33633}"/>
-              </a:ext>
-            </a:extLst>
-          </p:cNvPr>
-          <p:cNvSpPr txBox="1"/>
-          <p:nvPr/>
-        </p:nvSpPr>
-        <p:spPr>
-          <a:xfrm>
-            <a:off x="38393849" y="7849206"/>
-            <a:ext cx="4339111" cy="5509200"/>
-          </a:xfrm>
-          <a:prstGeom prst="rect">
-            <a:avLst/>
-          </a:prstGeom>
-          <a:noFill/>
-        </p:spPr>
-        <p:txBody>
-          <a:bodyPr wrap="square" rtlCol="0">
-            <a:spAutoFit/>
-          </a:bodyPr>
-          <a:lstStyle/>
-          <a:p>
-            <a:r>
-              <a:rPr lang="en-US" sz="3200" dirty="0"/>
-              <a:t>We evaluated the embedding weights using t-SNE and found that codons that code for the same amino acids grouped together as well as codons of similar hydropathy… (sorry if this is non-sense, just trying to gauge space**) </a:t>
-            </a:r>
-          </a:p>
-        </p:txBody>
-      </p:sp>
-      <p:sp>
-        <p:nvSpPr>
-          <p:cNvPr id="126" name="TextBox 125">
-            <a:extLst>
-              <a:ext uri="{FF2B5EF4-FFF2-40B4-BE49-F238E27FC236}">
-                <a16:creationId xmlns:a16="http://schemas.microsoft.com/office/drawing/2014/main" id="{DDDF0EB4-5F05-45A5-AC44-7AEE153D222A}"/>
-              </a:ext>
-            </a:extLst>
-          </p:cNvPr>
-          <p:cNvSpPr txBox="1"/>
-          <p:nvPr/>
-        </p:nvSpPr>
-        <p:spPr>
-          <a:xfrm>
-            <a:off x="29900879" y="14254078"/>
-            <a:ext cx="12801600" cy="646331"/>
-          </a:xfrm>
-          <a:prstGeom prst="rect">
-            <a:avLst/>
-          </a:prstGeom>
-          <a:noFill/>
-        </p:spPr>
-        <p:txBody>
-          <a:bodyPr wrap="square" rtlCol="0">
-            <a:spAutoFit/>
-          </a:bodyPr>
-          <a:lstStyle/>
-          <a:p>
-            <a:pPr algn="ctr"/>
-            <a:r>
-              <a:rPr lang="en-US" sz="3600" u="sng" dirty="0"/>
-              <a:t>Model Aided Experimentation</a:t>
-            </a:r>
-          </a:p>
-        </p:txBody>
-      </p:sp>
       <p:graphicFrame>
         <p:nvGraphicFramePr>
           <p:cNvPr id="129" name="Table 128">
             <a:extLst>
               <a:ext uri="{FF2B5EF4-FFF2-40B4-BE49-F238E27FC236}">
-                <a16:creationId xmlns:a16="http://schemas.microsoft.com/office/drawing/2014/main" id="{78DCC267-FA1F-4034-AEC8-2571A0AB40B4}"/>
+                <a16:creationId xmlns:a16="http://schemas.microsoft.com/office/drawing/2014/main" xmlns="" id="{78DCC267-FA1F-4034-AEC8-2571A0AB40B4}"/>
               </a:ext>
             </a:extLst>
           </p:cNvPr>
@@ -9726,7 +9303,7 @@
           <p:nvPr>
             <p:extLst>
               <p:ext uri="{D42A27DB-BD31-4B8C-83A1-F6EECF244321}">
-                <p14:modId xmlns:p14="http://schemas.microsoft.com/office/powerpoint/2010/main" val="3064443012"/>
+                <p14:modId xmlns:p14="http://schemas.microsoft.com/office/powerpoint/2010/main" val="1532212138"/>
               </p:ext>
             </p:extLst>
           </p:nvPr>
@@ -9745,35 +9322,35 @@
                 <a:gridCol w="2237048">
                   <a:extLst>
                     <a:ext uri="{9D8B030D-6E8A-4147-A177-3AD203B41FA5}">
-                      <a16:colId xmlns:a16="http://schemas.microsoft.com/office/drawing/2014/main" val="3739837609"/>
+                      <a16:colId xmlns:a16="http://schemas.microsoft.com/office/drawing/2014/main" xmlns="" val="3739837609"/>
                     </a:ext>
                   </a:extLst>
                 </a:gridCol>
                 <a:gridCol w="2590800">
                   <a:extLst>
                     <a:ext uri="{9D8B030D-6E8A-4147-A177-3AD203B41FA5}">
-                      <a16:colId xmlns:a16="http://schemas.microsoft.com/office/drawing/2014/main" val="2642331103"/>
+                      <a16:colId xmlns:a16="http://schemas.microsoft.com/office/drawing/2014/main" xmlns="" val="2642331103"/>
                     </a:ext>
                   </a:extLst>
                 </a:gridCol>
                 <a:gridCol w="2667000">
                   <a:extLst>
                     <a:ext uri="{9D8B030D-6E8A-4147-A177-3AD203B41FA5}">
-                      <a16:colId xmlns:a16="http://schemas.microsoft.com/office/drawing/2014/main" val="20002"/>
+                      <a16:colId xmlns:a16="http://schemas.microsoft.com/office/drawing/2014/main" xmlns="" val="20002"/>
                     </a:ext>
                   </a:extLst>
                 </a:gridCol>
                 <a:gridCol w="2590800">
                   <a:extLst>
                     <a:ext uri="{9D8B030D-6E8A-4147-A177-3AD203B41FA5}">
-                      <a16:colId xmlns:a16="http://schemas.microsoft.com/office/drawing/2014/main" val="572115807"/>
+                      <a16:colId xmlns:a16="http://schemas.microsoft.com/office/drawing/2014/main" xmlns="" val="572115807"/>
                     </a:ext>
                   </a:extLst>
                 </a:gridCol>
                 <a:gridCol w="2641600">
                   <a:extLst>
                     <a:ext uri="{9D8B030D-6E8A-4147-A177-3AD203B41FA5}">
-                      <a16:colId xmlns:a16="http://schemas.microsoft.com/office/drawing/2014/main" val="1144260684"/>
+                      <a16:colId xmlns:a16="http://schemas.microsoft.com/office/drawing/2014/main" xmlns="" val="1144260684"/>
                     </a:ext>
                   </a:extLst>
                 </a:gridCol>
@@ -10078,7 +9655,7 @@
                 </a:tc>
                 <a:extLst>
                   <a:ext uri="{0D108BD9-81ED-4DB2-BD59-A6C34878D82A}">
-                    <a16:rowId xmlns:a16="http://schemas.microsoft.com/office/drawing/2014/main" val="2399813256"/>
+                    <a16:rowId xmlns:a16="http://schemas.microsoft.com/office/drawing/2014/main" xmlns="" val="2399813256"/>
                   </a:ext>
                 </a:extLst>
               </a:tr>
@@ -10347,13 +9924,13 @@
                     <a:p>
                       <a:pPr algn="ctr"/>
                       <a:r>
-                        <a:rPr lang="en-US" sz="3000" dirty="0">
+                        <a:rPr lang="en-US" sz="3000" b="1" dirty="0">
                           <a:latin typeface="+mn-lt"/>
                           <a:cs typeface="Calibri" panose="020F0502020204030204" pitchFamily="34" charset="0"/>
                         </a:rPr>
                         <a:t>73.5% ± 1.0%</a:t>
                       </a:r>
-                      <a:endParaRPr lang="en-US" sz="3000" dirty="0">
+                      <a:endParaRPr lang="en-US" sz="3000" b="1" dirty="0">
                         <a:latin typeface="+mn-lt"/>
                       </a:endParaRPr>
                     </a:p>
@@ -10399,7 +9976,7 @@
                 </a:tc>
                 <a:extLst>
                   <a:ext uri="{0D108BD9-81ED-4DB2-BD59-A6C34878D82A}">
-                    <a16:rowId xmlns:a16="http://schemas.microsoft.com/office/drawing/2014/main" val="3575149461"/>
+                    <a16:rowId xmlns:a16="http://schemas.microsoft.com/office/drawing/2014/main" xmlns="" val="3575149461"/>
                   </a:ext>
                 </a:extLst>
               </a:tr>
@@ -10463,7 +10040,7 @@
                     <a:p>
                       <a:pPr algn="ctr"/>
                       <a:r>
-                        <a:rPr lang="en-US" sz="3000" dirty="0">
+                        <a:rPr lang="en-US" sz="3000" b="1" dirty="0">
                           <a:latin typeface="+mn-lt"/>
                         </a:rPr>
                         <a:t>82%</a:t>
@@ -10674,7 +10251,7 @@
                 </a:tc>
                 <a:extLst>
                   <a:ext uri="{0D108BD9-81ED-4DB2-BD59-A6C34878D82A}">
-                    <a16:rowId xmlns:a16="http://schemas.microsoft.com/office/drawing/2014/main" val="3545368195"/>
+                    <a16:rowId xmlns:a16="http://schemas.microsoft.com/office/drawing/2014/main" xmlns="" val="3545368195"/>
                   </a:ext>
                 </a:extLst>
               </a:tr>
@@ -10687,7 +10264,7 @@
           <p:cNvPr id="131" name="TextBox 130">
             <a:extLst>
               <a:ext uri="{FF2B5EF4-FFF2-40B4-BE49-F238E27FC236}">
-                <a16:creationId xmlns:a16="http://schemas.microsoft.com/office/drawing/2014/main" id="{A5EC576F-442F-4C9C-BD00-B23E43E6EA57}"/>
+                <a16:creationId xmlns:a16="http://schemas.microsoft.com/office/drawing/2014/main" xmlns="" id="{A5EC576F-442F-4C9C-BD00-B23E43E6EA57}"/>
               </a:ext>
             </a:extLst>
           </p:cNvPr>
@@ -10723,7 +10300,7 @@
           <p:cNvPr id="133" name="TextBox 132">
             <a:extLst>
               <a:ext uri="{FF2B5EF4-FFF2-40B4-BE49-F238E27FC236}">
-                <a16:creationId xmlns:a16="http://schemas.microsoft.com/office/drawing/2014/main" id="{8505CE53-AB5C-4748-A608-3ADB0A62BECA}"/>
+                <a16:creationId xmlns:a16="http://schemas.microsoft.com/office/drawing/2014/main" xmlns="" id="{8505CE53-AB5C-4748-A608-3ADB0A62BECA}"/>
               </a:ext>
             </a:extLst>
           </p:cNvPr>
@@ -10749,21 +10326,690 @@
             <a:pPr algn="ctr"/>
             <a:r>
               <a:rPr lang="en-US" sz="3600" u="sng" dirty="0"/>
-              <a:t>Sensitivity to quantiles </a:t>
-            </a:r>
+              <a:t>Sensitivity to </a:t>
+            </a:r>
+            <a:r>
+              <a:rPr lang="en-US" sz="3600" u="sng" dirty="0" smtClean="0"/>
+              <a:t>binary classification and quantile cutoff </a:t>
+            </a:r>
+            <a:endParaRPr lang="en-US" sz="3600" u="sng" dirty="0"/>
+          </a:p>
+        </p:txBody>
+      </p:sp>
+      <p:sp>
+        <p:nvSpPr>
+          <p:cNvPr id="91" name="TextBox 90">
+            <a:extLst>
+              <a:ext uri="{FF2B5EF4-FFF2-40B4-BE49-F238E27FC236}">
+                <a16:creationId xmlns:a16="http://schemas.microsoft.com/office/drawing/2014/main" xmlns="" id="{BAD07FC7-3085-47F7-8A51-83E184F5226C}"/>
+              </a:ext>
+            </a:extLst>
+          </p:cNvPr>
+          <p:cNvSpPr txBox="1"/>
+          <p:nvPr/>
+        </p:nvSpPr>
+        <p:spPr>
+          <a:xfrm>
+            <a:off x="29900879" y="14619838"/>
+            <a:ext cx="12801600" cy="646331"/>
+          </a:xfrm>
+          <a:prstGeom prst="rect">
+            <a:avLst/>
+          </a:prstGeom>
+          <a:noFill/>
+        </p:spPr>
+        <p:txBody>
+          <a:bodyPr wrap="square" rtlCol="0">
+            <a:spAutoFit/>
+          </a:bodyPr>
+          <a:lstStyle/>
+          <a:p>
+            <a:pPr algn="ctr"/>
+            <a:r>
+              <a:rPr lang="en-US" sz="3600" u="sng" dirty="0"/>
+              <a:t>Model Aided Experimentation</a:t>
+            </a:r>
+          </a:p>
+        </p:txBody>
+      </p:sp>
+      <p:sp>
+        <p:nvSpPr>
+          <p:cNvPr id="132" name="TextBox 131">
+            <a:extLst>
+              <a:ext uri="{FF2B5EF4-FFF2-40B4-BE49-F238E27FC236}">
+                <a16:creationId xmlns:a16="http://schemas.microsoft.com/office/drawing/2014/main" xmlns="" id="{B4E1E494-D186-4BC9-AD23-C2514D064FC6}"/>
+              </a:ext>
+            </a:extLst>
+          </p:cNvPr>
+          <p:cNvSpPr txBox="1"/>
+          <p:nvPr/>
+        </p:nvSpPr>
+        <p:spPr>
+          <a:xfrm>
+            <a:off x="29900880" y="20446418"/>
+            <a:ext cx="12625349" cy="1815882"/>
+          </a:xfrm>
+          <a:prstGeom prst="rect">
+            <a:avLst/>
+          </a:prstGeom>
+          <a:noFill/>
+        </p:spPr>
+        <p:txBody>
+          <a:bodyPr wrap="square" rtlCol="0">
+            <a:spAutoFit/>
+          </a:bodyPr>
+          <a:lstStyle/>
+          <a:p>
+            <a:r>
+              <a:rPr lang="en-US" sz="2800" dirty="0"/>
+              <a:t>Following the same prediction pipeline used in Sastry et. al., our optimized network showed only 2780 experiments are necessary for high expression </a:t>
+            </a:r>
+            <a:r>
+              <a:rPr lang="en-US" sz="2800" dirty="0" err="1"/>
+              <a:t>PrESTs</a:t>
+            </a:r>
+            <a:r>
+              <a:rPr lang="en-US" sz="2800" dirty="0"/>
+              <a:t> (38.98% reduction), compared to 38.70% reduction for their best ensemble model.</a:t>
+            </a:r>
+          </a:p>
+        </p:txBody>
+      </p:sp>
+      <p:cxnSp>
+        <p:nvCxnSpPr>
+          <p:cNvPr id="134" name="Straight Arrow Connector 133">
+            <a:extLst>
+              <a:ext uri="{FF2B5EF4-FFF2-40B4-BE49-F238E27FC236}">
+                <a16:creationId xmlns:a16="http://schemas.microsoft.com/office/drawing/2014/main" xmlns="" id="{1CE39C02-EFA9-4EE7-A24F-1F306500A36A}"/>
+              </a:ext>
+            </a:extLst>
+          </p:cNvPr>
+          <p:cNvCxnSpPr>
+            <a:cxnSpLocks/>
+            <a:endCxn id="99" idx="0"/>
+          </p:cNvCxnSpPr>
+          <p:nvPr/>
+        </p:nvCxnSpPr>
+        <p:spPr>
+          <a:xfrm flipH="1">
+            <a:off x="3702668" y="25441606"/>
+            <a:ext cx="355584" cy="1379755"/>
+          </a:xfrm>
+          <a:prstGeom prst="straightConnector1">
+            <a:avLst/>
+          </a:prstGeom>
+          <a:noFill/>
+          <a:ln w="38100" cap="flat" cmpd="sng" algn="ctr">
+            <a:solidFill>
+              <a:sysClr val="windowText" lastClr="000000"/>
+            </a:solidFill>
+            <a:prstDash val="solid"/>
+            <a:miter lim="800000"/>
+            <a:tailEnd type="triangle"/>
+          </a:ln>
+          <a:effectLst/>
+        </p:spPr>
+      </p:cxnSp>
+      <p:cxnSp>
+        <p:nvCxnSpPr>
+          <p:cNvPr id="135" name="Straight Arrow Connector 134">
+            <a:extLst>
+              <a:ext uri="{FF2B5EF4-FFF2-40B4-BE49-F238E27FC236}">
+                <a16:creationId xmlns:a16="http://schemas.microsoft.com/office/drawing/2014/main" xmlns="" id="{F71D40E3-49A6-49DE-A2B3-2CB5CD810ABB}"/>
+              </a:ext>
+            </a:extLst>
+          </p:cNvPr>
+          <p:cNvCxnSpPr>
+            <a:cxnSpLocks/>
+            <a:endCxn id="101" idx="0"/>
+          </p:cNvCxnSpPr>
+          <p:nvPr/>
+        </p:nvCxnSpPr>
+        <p:spPr>
+          <a:xfrm>
+            <a:off x="5730112" y="25462334"/>
+            <a:ext cx="248402" cy="1359027"/>
+          </a:xfrm>
+          <a:prstGeom prst="straightConnector1">
+            <a:avLst/>
+          </a:prstGeom>
+          <a:noFill/>
+          <a:ln w="38100" cap="flat" cmpd="sng" algn="ctr">
+            <a:solidFill>
+              <a:sysClr val="windowText" lastClr="000000"/>
+            </a:solidFill>
+            <a:prstDash val="solid"/>
+            <a:miter lim="800000"/>
+            <a:tailEnd type="triangle"/>
+          </a:ln>
+          <a:effectLst/>
+        </p:spPr>
+      </p:cxnSp>
+      <p:cxnSp>
+        <p:nvCxnSpPr>
+          <p:cNvPr id="136" name="Straight Arrow Connector 135">
+            <a:extLst>
+              <a:ext uri="{FF2B5EF4-FFF2-40B4-BE49-F238E27FC236}">
+                <a16:creationId xmlns:a16="http://schemas.microsoft.com/office/drawing/2014/main" xmlns="" id="{3074D19F-FE32-4550-93A4-C8D59974D4B5}"/>
+              </a:ext>
+            </a:extLst>
+          </p:cNvPr>
+          <p:cNvCxnSpPr>
+            <a:cxnSpLocks/>
+            <a:endCxn id="102" idx="0"/>
+          </p:cNvCxnSpPr>
+          <p:nvPr/>
+        </p:nvCxnSpPr>
+        <p:spPr>
+          <a:xfrm>
+            <a:off x="6629383" y="25442267"/>
+            <a:ext cx="473720" cy="1379094"/>
+          </a:xfrm>
+          <a:prstGeom prst="straightConnector1">
+            <a:avLst/>
+          </a:prstGeom>
+          <a:noFill/>
+          <a:ln w="38100" cap="flat" cmpd="sng" algn="ctr">
+            <a:solidFill>
+              <a:sysClr val="windowText" lastClr="000000"/>
+            </a:solidFill>
+            <a:prstDash val="solid"/>
+            <a:miter lim="800000"/>
+            <a:tailEnd type="triangle"/>
+          </a:ln>
+          <a:effectLst/>
+        </p:spPr>
+      </p:cxnSp>
+      <p:sp>
+        <p:nvSpPr>
+          <p:cNvPr id="140" name="TextBox 139">
+            <a:extLst>
+              <a:ext uri="{FF2B5EF4-FFF2-40B4-BE49-F238E27FC236}">
+                <a16:creationId xmlns:a16="http://schemas.microsoft.com/office/drawing/2014/main" xmlns="" id="{A388065E-6140-4EDF-B243-EE75E6E33633}"/>
+              </a:ext>
+            </a:extLst>
+          </p:cNvPr>
+          <p:cNvSpPr txBox="1"/>
+          <p:nvPr/>
+        </p:nvSpPr>
+        <p:spPr>
+          <a:xfrm>
+            <a:off x="22950597" y="20868435"/>
+            <a:ext cx="6099254" cy="4401205"/>
+          </a:xfrm>
+          <a:prstGeom prst="rect">
+            <a:avLst/>
+          </a:prstGeom>
+          <a:noFill/>
+        </p:spPr>
+        <p:txBody>
+          <a:bodyPr wrap="square" rtlCol="0">
+            <a:spAutoFit/>
+          </a:bodyPr>
+          <a:lstStyle/>
+          <a:p>
+            <a:r>
+              <a:rPr lang="en-US" sz="2800" dirty="0" smtClean="0"/>
+              <a:t>We explored two strategies to make use of more of the available training data. Adding an intermediate class for expression hurts classification accuracy, especially for high expression proteins. Binary classification is relatively insensitive to the quantiles used to separate high and low expression peptides.</a:t>
+            </a:r>
+          </a:p>
+          <a:p>
+            <a:pPr marL="457200" indent="-457200">
+              <a:buFontTx/>
+              <a:buChar char="-"/>
+            </a:pPr>
+            <a:endParaRPr lang="en-US" sz="2800" dirty="0"/>
+          </a:p>
+        </p:txBody>
+      </p:sp>
+      <p:sp>
+        <p:nvSpPr>
+          <p:cNvPr id="141" name="Content Placeholder 10">
+            <a:extLst>
+              <a:ext uri="{FF2B5EF4-FFF2-40B4-BE49-F238E27FC236}">
+                <a16:creationId xmlns:a16="http://schemas.microsoft.com/office/drawing/2014/main" xmlns="" id="{D11CB54C-D508-4605-91BB-7EE2911A4F9C}"/>
+              </a:ext>
+            </a:extLst>
+          </p:cNvPr>
+          <p:cNvSpPr txBox="1">
+            <a:spLocks/>
+          </p:cNvSpPr>
+          <p:nvPr/>
+        </p:nvSpPr>
+        <p:spPr>
+          <a:xfrm>
+            <a:off x="15562003" y="6947538"/>
+            <a:ext cx="7555172" cy="7270906"/>
+          </a:xfrm>
+          <a:prstGeom prst="rect">
+            <a:avLst/>
+          </a:prstGeom>
+          <a:ln w="38100">
+            <a:noFill/>
+          </a:ln>
+        </p:spPr>
+        <p:txBody>
+          <a:bodyPr vert="horz" lIns="91440" tIns="91440" rIns="91440" bIns="91440" rtlCol="0" anchor="t">
+            <a:noAutofit/>
+          </a:bodyPr>
+          <a:lstStyle>
+            <a:lvl1pPr marL="457200" indent="-457200" algn="l" defTabSz="4389120" rtl="0" eaLnBrk="1" latinLnBrk="0" hangingPunct="1">
+              <a:lnSpc>
+                <a:spcPct val="100000"/>
+              </a:lnSpc>
+              <a:spcBef>
+                <a:spcPts val="1200"/>
+              </a:spcBef>
+              <a:buClr>
+                <a:schemeClr val="bg1">
+                  <a:lumMod val="65000"/>
+                </a:schemeClr>
+              </a:buClr>
+              <a:buFont typeface="Arial" panose="020B0604020202020204" pitchFamily="34" charset="0"/>
+              <a:buChar char="•"/>
+              <a:defRPr sz="3200" kern="1200" baseline="0">
+                <a:solidFill>
+                  <a:schemeClr val="tx1"/>
+                </a:solidFill>
+                <a:latin typeface="+mn-lt"/>
+                <a:ea typeface="+mn-ea"/>
+                <a:cs typeface="+mn-cs"/>
+              </a:defRPr>
+            </a:lvl1pPr>
+            <a:lvl2pPr marL="1097280" indent="-457200" algn="l" defTabSz="4389120" rtl="0" eaLnBrk="1" latinLnBrk="0" hangingPunct="1">
+              <a:lnSpc>
+                <a:spcPct val="100000"/>
+              </a:lnSpc>
+              <a:spcBef>
+                <a:spcPts val="1200"/>
+              </a:spcBef>
+              <a:buClr>
+                <a:schemeClr val="bg1">
+                  <a:lumMod val="65000"/>
+                </a:schemeClr>
+              </a:buClr>
+              <a:buFont typeface="Arial" panose="020B0604020202020204" pitchFamily="34" charset="0"/>
+              <a:buChar char="•"/>
+              <a:defRPr sz="2800" kern="1200">
+                <a:solidFill>
+                  <a:schemeClr val="tx1"/>
+                </a:solidFill>
+                <a:latin typeface="+mn-lt"/>
+                <a:ea typeface="+mn-ea"/>
+                <a:cs typeface="+mn-cs"/>
+              </a:defRPr>
+            </a:lvl2pPr>
+            <a:lvl3pPr marL="1097280" indent="-457200" algn="l" defTabSz="4389120" rtl="0" eaLnBrk="1" latinLnBrk="0" hangingPunct="1">
+              <a:lnSpc>
+                <a:spcPct val="100000"/>
+              </a:lnSpc>
+              <a:spcBef>
+                <a:spcPts val="1200"/>
+              </a:spcBef>
+              <a:buClr>
+                <a:schemeClr val="bg1">
+                  <a:lumMod val="65000"/>
+                </a:schemeClr>
+              </a:buClr>
+              <a:buFont typeface="Arial" panose="020B0604020202020204" pitchFamily="34" charset="0"/>
+              <a:buChar char="•"/>
+              <a:defRPr sz="2800" kern="1200">
+                <a:solidFill>
+                  <a:schemeClr val="tx1"/>
+                </a:solidFill>
+                <a:latin typeface="+mn-lt"/>
+                <a:ea typeface="+mn-ea"/>
+                <a:cs typeface="+mn-cs"/>
+              </a:defRPr>
+            </a:lvl3pPr>
+            <a:lvl4pPr marL="1097280" indent="-457200" algn="l" defTabSz="4389120" rtl="0" eaLnBrk="1" latinLnBrk="0" hangingPunct="1">
+              <a:lnSpc>
+                <a:spcPct val="100000"/>
+              </a:lnSpc>
+              <a:spcBef>
+                <a:spcPts val="1200"/>
+              </a:spcBef>
+              <a:buClr>
+                <a:schemeClr val="bg1">
+                  <a:lumMod val="65000"/>
+                </a:schemeClr>
+              </a:buClr>
+              <a:buFont typeface="Arial" panose="020B0604020202020204" pitchFamily="34" charset="0"/>
+              <a:buChar char="•"/>
+              <a:defRPr sz="2800" kern="1200">
+                <a:solidFill>
+                  <a:schemeClr val="tx1"/>
+                </a:solidFill>
+                <a:latin typeface="+mn-lt"/>
+                <a:ea typeface="+mn-ea"/>
+                <a:cs typeface="+mn-cs"/>
+              </a:defRPr>
+            </a:lvl4pPr>
+            <a:lvl5pPr marL="1097280" indent="-457200" algn="l" defTabSz="4389120" rtl="0" eaLnBrk="1" latinLnBrk="0" hangingPunct="1">
+              <a:lnSpc>
+                <a:spcPct val="100000"/>
+              </a:lnSpc>
+              <a:spcBef>
+                <a:spcPts val="1200"/>
+              </a:spcBef>
+              <a:buClr>
+                <a:schemeClr val="bg1">
+                  <a:lumMod val="65000"/>
+                </a:schemeClr>
+              </a:buClr>
+              <a:buFont typeface="Arial" panose="020B0604020202020204" pitchFamily="34" charset="0"/>
+              <a:buChar char="•"/>
+              <a:defRPr sz="2800" kern="1200">
+                <a:solidFill>
+                  <a:schemeClr val="tx1"/>
+                </a:solidFill>
+                <a:latin typeface="+mn-lt"/>
+                <a:ea typeface="+mn-ea"/>
+                <a:cs typeface="+mn-cs"/>
+              </a:defRPr>
+            </a:lvl5pPr>
+            <a:lvl6pPr marL="1097280" indent="-457200" algn="l" defTabSz="4389120" rtl="0" eaLnBrk="1" latinLnBrk="0" hangingPunct="1">
+              <a:lnSpc>
+                <a:spcPct val="100000"/>
+              </a:lnSpc>
+              <a:spcBef>
+                <a:spcPts val="1200"/>
+              </a:spcBef>
+              <a:buClr>
+                <a:schemeClr val="bg1">
+                  <a:lumMod val="65000"/>
+                </a:schemeClr>
+              </a:buClr>
+              <a:buFont typeface="Arial" panose="020B0604020202020204" pitchFamily="34" charset="0"/>
+              <a:buChar char="•"/>
+              <a:defRPr sz="2800" kern="1200">
+                <a:solidFill>
+                  <a:schemeClr val="tx1"/>
+                </a:solidFill>
+                <a:latin typeface="+mn-lt"/>
+                <a:ea typeface="+mn-ea"/>
+                <a:cs typeface="+mn-cs"/>
+              </a:defRPr>
+            </a:lvl6pPr>
+            <a:lvl7pPr marL="1097280" indent="-457200" algn="l" defTabSz="4389120" rtl="0" eaLnBrk="1" latinLnBrk="0" hangingPunct="1">
+              <a:lnSpc>
+                <a:spcPct val="100000"/>
+              </a:lnSpc>
+              <a:spcBef>
+                <a:spcPts val="1200"/>
+              </a:spcBef>
+              <a:buClr>
+                <a:schemeClr val="bg1">
+                  <a:lumMod val="65000"/>
+                </a:schemeClr>
+              </a:buClr>
+              <a:buFont typeface="Arial" panose="020B0604020202020204" pitchFamily="34" charset="0"/>
+              <a:buChar char="•"/>
+              <a:defRPr sz="2800" kern="1200">
+                <a:solidFill>
+                  <a:schemeClr val="tx1"/>
+                </a:solidFill>
+                <a:latin typeface="+mn-lt"/>
+                <a:ea typeface="+mn-ea"/>
+                <a:cs typeface="+mn-cs"/>
+              </a:defRPr>
+            </a:lvl7pPr>
+            <a:lvl8pPr marL="1097280" indent="-457200" algn="l" defTabSz="4389120" rtl="0" eaLnBrk="1" latinLnBrk="0" hangingPunct="1">
+              <a:lnSpc>
+                <a:spcPct val="100000"/>
+              </a:lnSpc>
+              <a:spcBef>
+                <a:spcPts val="1200"/>
+              </a:spcBef>
+              <a:buClr>
+                <a:schemeClr val="bg1">
+                  <a:lumMod val="65000"/>
+                </a:schemeClr>
+              </a:buClr>
+              <a:buFont typeface="Arial" panose="020B0604020202020204" pitchFamily="34" charset="0"/>
+              <a:buChar char="•"/>
+              <a:defRPr sz="2800" kern="1200">
+                <a:solidFill>
+                  <a:schemeClr val="tx1"/>
+                </a:solidFill>
+                <a:latin typeface="+mn-lt"/>
+                <a:ea typeface="+mn-ea"/>
+                <a:cs typeface="+mn-cs"/>
+              </a:defRPr>
+            </a:lvl8pPr>
+            <a:lvl9pPr marL="1097280" indent="-457200" algn="l" defTabSz="4389120" rtl="0" eaLnBrk="1" latinLnBrk="0" hangingPunct="1">
+              <a:lnSpc>
+                <a:spcPct val="100000"/>
+              </a:lnSpc>
+              <a:spcBef>
+                <a:spcPts val="1200"/>
+              </a:spcBef>
+              <a:buClr>
+                <a:schemeClr val="bg1">
+                  <a:lumMod val="65000"/>
+                </a:schemeClr>
+              </a:buClr>
+              <a:buFont typeface="Arial" panose="020B0604020202020204" pitchFamily="34" charset="0"/>
+              <a:buChar char="•"/>
+              <a:defRPr sz="2800" kern="1200">
+                <a:solidFill>
+                  <a:schemeClr val="tx1"/>
+                </a:solidFill>
+                <a:latin typeface="+mn-lt"/>
+                <a:ea typeface="+mn-ea"/>
+                <a:cs typeface="+mn-cs"/>
+              </a:defRPr>
+            </a:lvl9pPr>
+          </a:lstStyle>
+          <a:p>
+            <a:pPr>
+              <a:buClrTx/>
+              <a:buSzPct val="150000"/>
+            </a:pPr>
+            <a:r>
+              <a:rPr lang="en-US" sz="2800" dirty="0"/>
+              <a:t>Protein </a:t>
+            </a:r>
+            <a:r>
+              <a:rPr lang="en-US" sz="2800" dirty="0" smtClean="0"/>
+              <a:t>Epitope </a:t>
+            </a:r>
+            <a:r>
+              <a:rPr lang="en-US" sz="2800" dirty="0"/>
+              <a:t>Signature Tags (</a:t>
+            </a:r>
+            <a:r>
+              <a:rPr lang="en-US" sz="2800" dirty="0" err="1"/>
+              <a:t>PrESTs</a:t>
+            </a:r>
+            <a:r>
+              <a:rPr lang="en-US" sz="2800" dirty="0"/>
+              <a:t>), consisting of 20-150 amino acids</a:t>
+            </a:r>
+          </a:p>
+          <a:p>
+            <a:pPr lvl="1">
+              <a:buClrTx/>
+              <a:buSzPct val="150000"/>
+            </a:pPr>
+            <a:r>
+              <a:rPr lang="en-US" sz="2200" dirty="0"/>
+              <a:t>Expressed for Proteomics – Human Protein Atlas </a:t>
+            </a:r>
+          </a:p>
+          <a:p>
+            <a:pPr lvl="1">
+              <a:buClrTx/>
+              <a:buSzPct val="150000"/>
+            </a:pPr>
+            <a:r>
+              <a:rPr lang="en-US" sz="2200" dirty="0"/>
+              <a:t>Classified according to Sastry et. al</a:t>
+            </a:r>
+            <a:r>
+              <a:rPr lang="en-US" sz="2200" dirty="0" smtClean="0"/>
+              <a:t>.</a:t>
+            </a:r>
+          </a:p>
+          <a:p>
+            <a:pPr lvl="1">
+              <a:buClrTx/>
+              <a:buSzPct val="150000"/>
+            </a:pPr>
+            <a:endParaRPr lang="en-US" sz="1200" dirty="0"/>
+          </a:p>
+          <a:p>
+            <a:pPr>
+              <a:buClrTx/>
+              <a:buSzPct val="150000"/>
+            </a:pPr>
+            <a:r>
+              <a:rPr lang="en-US" sz="2800" dirty="0"/>
+              <a:t>Protein expression data for 45,206 </a:t>
+            </a:r>
+            <a:r>
+              <a:rPr lang="en-US" sz="2800" dirty="0" err="1"/>
+              <a:t>PrESTs</a:t>
+            </a:r>
+            <a:endParaRPr lang="en-US" sz="2800" dirty="0"/>
+          </a:p>
+          <a:p>
+            <a:pPr lvl="1">
+              <a:buClrTx/>
+              <a:buSzPct val="150000"/>
+            </a:pPr>
+            <a:r>
+              <a:rPr lang="en-US" sz="2200" dirty="0"/>
+              <a:t>1</a:t>
+            </a:r>
+            <a:r>
+              <a:rPr lang="en-US" sz="2200" baseline="30000" dirty="0"/>
+              <a:t>st</a:t>
+            </a:r>
+            <a:r>
+              <a:rPr lang="en-US" sz="2200" dirty="0"/>
+              <a:t> quantile = low expression (11302 samples)</a:t>
+            </a:r>
+          </a:p>
+          <a:p>
+            <a:pPr lvl="1">
+              <a:buClrTx/>
+              <a:buSzPct val="150000"/>
+            </a:pPr>
+            <a:r>
+              <a:rPr lang="en-US" sz="2200" dirty="0"/>
+              <a:t>4</a:t>
+            </a:r>
+            <a:r>
+              <a:rPr lang="en-US" sz="2200" baseline="30000" dirty="0"/>
+              <a:t>th</a:t>
+            </a:r>
+            <a:r>
+              <a:rPr lang="en-US" sz="2200" dirty="0"/>
+              <a:t> quantile = high expression (11301 samples)</a:t>
+            </a:r>
+          </a:p>
+          <a:p>
+            <a:pPr lvl="1">
+              <a:buClrTx/>
+              <a:buSzPct val="150000"/>
+            </a:pPr>
+            <a:r>
+              <a:rPr lang="en-US" sz="2200" dirty="0"/>
+              <a:t>2</a:t>
+            </a:r>
+            <a:r>
+              <a:rPr lang="en-US" sz="2200" baseline="30000" dirty="0"/>
+              <a:t>nd</a:t>
+            </a:r>
+            <a:r>
+              <a:rPr lang="en-US" sz="2200" dirty="0"/>
+              <a:t> and 3</a:t>
+            </a:r>
+            <a:r>
+              <a:rPr lang="en-US" sz="2200" baseline="30000" dirty="0"/>
+              <a:t>rd</a:t>
+            </a:r>
+            <a:r>
+              <a:rPr lang="en-US" sz="2200" dirty="0"/>
+              <a:t> quantiles removed (22603 samples</a:t>
+            </a:r>
+            <a:r>
+              <a:rPr lang="en-US" sz="2200" dirty="0" smtClean="0"/>
+              <a:t>)</a:t>
+            </a:r>
+          </a:p>
+          <a:p>
+            <a:pPr lvl="1">
+              <a:buClrTx/>
+              <a:buSzPct val="150000"/>
+            </a:pPr>
+            <a:endParaRPr lang="en-US" sz="1200" dirty="0"/>
+          </a:p>
+          <a:p>
+            <a:pPr>
+              <a:buClrTx/>
+              <a:buSzPct val="150000"/>
+            </a:pPr>
+            <a:r>
+              <a:rPr lang="en-US" sz="2800" dirty="0" smtClean="0"/>
+              <a:t>Protein solubility data for 16,082 </a:t>
+            </a:r>
+            <a:r>
+              <a:rPr lang="en-US" sz="2800" dirty="0" err="1" smtClean="0"/>
+              <a:t>PrESTs</a:t>
+            </a:r>
+            <a:endParaRPr lang="en-US" sz="2800" dirty="0"/>
+          </a:p>
+          <a:p>
+            <a:pPr lvl="1">
+              <a:buClrTx/>
+              <a:buSzPct val="150000"/>
+            </a:pPr>
+            <a:r>
+              <a:rPr lang="en-US" sz="2200" dirty="0"/>
+              <a:t>Low solubility classes 1 - 3.5 (3324 samples)</a:t>
+            </a:r>
+          </a:p>
+          <a:p>
+            <a:pPr lvl="1">
+              <a:buClrTx/>
+              <a:buSzPct val="150000"/>
+            </a:pPr>
+            <a:r>
+              <a:rPr lang="en-US" sz="2200" dirty="0"/>
+              <a:t>High solubility classes 4.5 – 5 (5091 samples)</a:t>
+            </a:r>
+          </a:p>
+          <a:p>
+            <a:pPr lvl="1">
+              <a:buClrTx/>
+              <a:buSzPct val="150000"/>
+            </a:pPr>
+            <a:r>
+              <a:rPr lang="en-US" sz="2200" dirty="0"/>
+              <a:t>Solubility class 4 removed (7667 samples) </a:t>
+            </a:r>
+          </a:p>
+          <a:p>
+            <a:pPr>
+              <a:buClrTx/>
+              <a:buSzPct val="150000"/>
+            </a:pPr>
+            <a:endParaRPr lang="en-US" sz="2000" dirty="0"/>
           </a:p>
         </p:txBody>
       </p:sp>
       <p:pic>
         <p:nvPicPr>
-          <p:cNvPr id="137" name="Picture 136"/>
+          <p:cNvPr id="142" name="Picture 141"/>
           <p:cNvPicPr>
             <a:picLocks noChangeAspect="1"/>
           </p:cNvPicPr>
           <p:nvPr/>
         </p:nvPicPr>
         <p:blipFill>
-          <a:blip r:embed="rId16">
+          <a:blip r:embed="rId12">
             <a:extLst>
               <a:ext uri="{28A0092B-C50C-407E-A947-70E740481C1C}">
                 <a14:useLocalDpi xmlns:a14="http://schemas.microsoft.com/office/drawing/2010/main" val="0"/>
@@ -10776,8 +11022,38 @@
         </p:blipFill>
         <p:spPr>
           <a:xfrm>
-            <a:off x="14938282" y="20643063"/>
-            <a:ext cx="7946249" cy="9287442"/>
+            <a:off x="22948517" y="6883037"/>
+            <a:ext cx="5760720" cy="7092696"/>
+          </a:xfrm>
+          <a:prstGeom prst="rect">
+            <a:avLst/>
+          </a:prstGeom>
+        </p:spPr>
+      </p:pic>
+      <p:pic>
+        <p:nvPicPr>
+          <p:cNvPr id="143" name="Picture 142"/>
+          <p:cNvPicPr>
+            <a:picLocks noChangeAspect="1"/>
+          </p:cNvPicPr>
+          <p:nvPr/>
+        </p:nvPicPr>
+        <p:blipFill>
+          <a:blip r:embed="rId13">
+            <a:extLst>
+              <a:ext uri="{28A0092B-C50C-407E-A947-70E740481C1C}">
+                <a14:useLocalDpi xmlns:a14="http://schemas.microsoft.com/office/drawing/2010/main" val="0"/>
+              </a:ext>
+            </a:extLst>
+          </a:blip>
+          <a:stretch>
+            <a:fillRect/>
+          </a:stretch>
+        </p:blipFill>
+        <p:spPr>
+          <a:xfrm>
+            <a:off x="29712140" y="7593096"/>
+            <a:ext cx="8093459" cy="6823961"/>
           </a:xfrm>
           <a:prstGeom prst="rect">
             <a:avLst/>
@@ -10786,10 +11062,10 @@
       </p:pic>
       <p:sp>
         <p:nvSpPr>
-          <p:cNvPr id="138" name="TextBox 137">
+          <p:cNvPr id="144" name="TextBox 143">
             <a:extLst>
               <a:ext uri="{FF2B5EF4-FFF2-40B4-BE49-F238E27FC236}">
-                <a16:creationId xmlns:a16="http://schemas.microsoft.com/office/drawing/2014/main" id="{A388065E-6140-4EDF-B243-EE75E6E33633}"/>
+                <a16:creationId xmlns:a16="http://schemas.microsoft.com/office/drawing/2014/main" xmlns="" id="{A388065E-6140-4EDF-B243-EE75E6E33633}"/>
               </a:ext>
             </a:extLst>
           </p:cNvPr>
@@ -10798,8 +11074,8 @@
         </p:nvSpPr>
         <p:spPr>
           <a:xfrm>
-            <a:off x="22484614" y="21100395"/>
-            <a:ext cx="5861786" cy="6986528"/>
+            <a:off x="37863709" y="7612989"/>
+            <a:ext cx="5153305" cy="6986528"/>
           </a:xfrm>
           <a:prstGeom prst="rect">
             <a:avLst/>
@@ -10813,23 +11089,59 @@
           <a:lstStyle/>
           <a:p>
             <a:r>
-              <a:rPr lang="en-US" sz="3200" dirty="0"/>
-              <a:t>Discuss potential for multiclass prediction or changing quantiles to make use of more or less data. Multiclass apparently hurts classification performance, especially for highly expressed peptides. Potentially interesting, given that the high/medium expression proteins appear to belong to a single Gaussian. Will add effect of changing the bounds in the morning if we think it’ll be a </a:t>
-            </a:r>
-            <a:r>
-              <a:rPr lang="en-US" sz="3200"/>
-              <a:t>nice addition.</a:t>
-            </a:r>
-            <a:endParaRPr lang="en-US" sz="3200" dirty="0"/>
+              <a:rPr lang="en-US" sz="2800" dirty="0" smtClean="0"/>
+              <a:t>We used the t-distributed stochastic neighbor embedding (t-SNE) algorithm </a:t>
+            </a:r>
+            <a:r>
+              <a:rPr lang="en-US" sz="2800" dirty="0"/>
+              <a:t>to </a:t>
+            </a:r>
+            <a:r>
+              <a:rPr lang="en-US" sz="2800" dirty="0" smtClean="0"/>
+              <a:t>explore </a:t>
+            </a:r>
+            <a:r>
+              <a:rPr lang="en-US" sz="2800" dirty="0"/>
+              <a:t>the </a:t>
+            </a:r>
+            <a:r>
+              <a:rPr lang="en-US" sz="2800" dirty="0" smtClean="0"/>
+              <a:t>learned semantic </a:t>
+            </a:r>
+            <a:r>
+              <a:rPr lang="en-US" sz="2800" dirty="0"/>
+              <a:t>relationship </a:t>
+            </a:r>
+            <a:r>
+              <a:rPr lang="en-US" sz="2800" dirty="0" smtClean="0"/>
+              <a:t>between codons. </a:t>
+            </a:r>
+            <a:r>
+              <a:rPr lang="en-US" sz="2800" dirty="0"/>
+              <a:t>We found </a:t>
+            </a:r>
+            <a:r>
+              <a:rPr lang="en-US" sz="2800" dirty="0" smtClean="0"/>
+              <a:t>codons </a:t>
+            </a:r>
+            <a:r>
+              <a:rPr lang="en-US" sz="2800" dirty="0"/>
+              <a:t>coding for the same amino acid were tightly grouped </a:t>
+            </a:r>
+            <a:r>
+              <a:rPr lang="en-US" sz="2800" dirty="0" smtClean="0"/>
+              <a:t>in the reduced embedding space. The network also learned similar vector representations for codons which code for amino acids with similar physical properties. These findings support the use of amino acid sequence for predicting expression.</a:t>
+            </a:r>
+            <a:endParaRPr lang="en-US" sz="2800" dirty="0"/>
           </a:p>
         </p:txBody>
       </p:sp>
       <p:graphicFrame>
         <p:nvGraphicFramePr>
-          <p:cNvPr id="90" name="Table 89">
+          <p:cNvPr id="145" name="Table 144">
             <a:extLst>
               <a:ext uri="{FF2B5EF4-FFF2-40B4-BE49-F238E27FC236}">
-                <a16:creationId xmlns:a16="http://schemas.microsoft.com/office/drawing/2014/main" id="{468D0813-A812-49B6-A763-4D5017AFDE45}"/>
+                <a16:creationId xmlns:a16="http://schemas.microsoft.com/office/drawing/2014/main" xmlns="" id="{E1225497-D27D-43E1-AB00-A66B97C348A4}"/>
               </a:ext>
             </a:extLst>
           </p:cNvPr>
@@ -10839,14 +11151,14 @@
           <p:nvPr>
             <p:extLst>
               <p:ext uri="{D42A27DB-BD31-4B8C-83A1-F6EECF244321}">
-                <p14:modId xmlns:p14="http://schemas.microsoft.com/office/powerpoint/2010/main" val="1165269436"/>
+                <p14:modId xmlns:p14="http://schemas.microsoft.com/office/powerpoint/2010/main" val="467874557"/>
               </p:ext>
             </p:extLst>
           </p:nvPr>
         </p:nvGraphicFramePr>
         <p:xfrm>
-          <a:off x="29900880" y="15063723"/>
-          <a:ext cx="12801599" cy="4241175"/>
+          <a:off x="30059305" y="15429483"/>
+          <a:ext cx="11785651" cy="4861039"/>
         </p:xfrm>
         <a:graphic>
           <a:graphicData uri="http://schemas.openxmlformats.org/drawingml/2006/table">
@@ -10855,24 +11167,24 @@
                 <a:tableStyleId>{7E9639D4-E3E2-4D34-9284-5A2195B3D0D7}</a:tableStyleId>
               </a:tblPr>
               <a:tblGrid>
-                <a:gridCol w="4119807">
+                <a:gridCol w="3792855">
                   <a:extLst>
                     <a:ext uri="{9D8B030D-6E8A-4147-A177-3AD203B41FA5}">
-                      <a16:colId xmlns:a16="http://schemas.microsoft.com/office/drawing/2014/main" val="4183596025"/>
+                      <a16:colId xmlns:a16="http://schemas.microsoft.com/office/drawing/2014/main" xmlns="" val="4183596025"/>
                     </a:ext>
                   </a:extLst>
                 </a:gridCol>
-                <a:gridCol w="4161472">
+                <a:gridCol w="3831213">
                   <a:extLst>
                     <a:ext uri="{9D8B030D-6E8A-4147-A177-3AD203B41FA5}">
-                      <a16:colId xmlns:a16="http://schemas.microsoft.com/office/drawing/2014/main" val="3739837609"/>
+                      <a16:colId xmlns:a16="http://schemas.microsoft.com/office/drawing/2014/main" xmlns="" val="3739837609"/>
                     </a:ext>
                   </a:extLst>
                 </a:gridCol>
-                <a:gridCol w="4520320">
+                <a:gridCol w="4161583">
                   <a:extLst>
                     <a:ext uri="{9D8B030D-6E8A-4147-A177-3AD203B41FA5}">
-                      <a16:colId xmlns:a16="http://schemas.microsoft.com/office/drawing/2014/main" val="2642331103"/>
+                      <a16:colId xmlns:a16="http://schemas.microsoft.com/office/drawing/2014/main" xmlns="" val="2642331103"/>
                     </a:ext>
                   </a:extLst>
                 </a:gridCol>
@@ -11047,7 +11359,7 @@
                 </a:tc>
                 <a:extLst>
                   <a:ext uri="{0D108BD9-81ED-4DB2-BD59-A6C34878D82A}">
-                    <a16:rowId xmlns:a16="http://schemas.microsoft.com/office/drawing/2014/main" val="2399813256"/>
+                    <a16:rowId xmlns:a16="http://schemas.microsoft.com/office/drawing/2014/main" xmlns="" val="2399813256"/>
                   </a:ext>
                 </a:extLst>
               </a:tr>
@@ -11057,7 +11369,6 @@
                     <a:bodyPr/>
                     <a:lstStyle/>
                     <a:p>
-                      <a:pPr algn="ctr"/>
                       <a:r>
                         <a:rPr lang="en-US" sz="3200" dirty="0"/>
                         <a:t>Iteration 1</a:t>
@@ -11207,7 +11518,7 @@
                 </a:tc>
                 <a:extLst>
                   <a:ext uri="{0D108BD9-81ED-4DB2-BD59-A6C34878D82A}">
-                    <a16:rowId xmlns:a16="http://schemas.microsoft.com/office/drawing/2014/main" val="3575149461"/>
+                    <a16:rowId xmlns:a16="http://schemas.microsoft.com/office/drawing/2014/main" xmlns="" val="3575149461"/>
                   </a:ext>
                 </a:extLst>
               </a:tr>
@@ -11217,7 +11528,6 @@
                     <a:bodyPr/>
                     <a:lstStyle/>
                     <a:p>
-                      <a:pPr algn="ctr"/>
                       <a:r>
                         <a:rPr lang="en-US" sz="3200" dirty="0"/>
                         <a:t>Iteration 2 </a:t>
@@ -11322,7 +11632,7 @@
                       <a:pPr algn="ctr"/>
                       <a:r>
                         <a:rPr lang="en-US" sz="3200" dirty="0"/>
-                        <a:t>201</a:t>
+                        <a:t>181</a:t>
                       </a:r>
                     </a:p>
                   </a:txBody>
@@ -11367,7 +11677,7 @@
                 </a:tc>
                 <a:extLst>
                   <a:ext uri="{0D108BD9-81ED-4DB2-BD59-A6C34878D82A}">
-                    <a16:rowId xmlns:a16="http://schemas.microsoft.com/office/drawing/2014/main" val="3545368195"/>
+                    <a16:rowId xmlns:a16="http://schemas.microsoft.com/office/drawing/2014/main" xmlns="" val="3545368195"/>
                   </a:ext>
                 </a:extLst>
               </a:tr>
@@ -11377,7 +11687,6 @@
                     <a:bodyPr/>
                     <a:lstStyle/>
                     <a:p>
-                      <a:pPr algn="ctr"/>
                       <a:r>
                         <a:rPr lang="en-US" sz="3200" dirty="0"/>
                         <a:t>Iteration 3 </a:t>
@@ -11527,7 +11836,7 @@
                 </a:tc>
                 <a:extLst>
                   <a:ext uri="{0D108BD9-81ED-4DB2-BD59-A6C34878D82A}">
-                    <a16:rowId xmlns:a16="http://schemas.microsoft.com/office/drawing/2014/main" val="2424674796"/>
+                    <a16:rowId xmlns:a16="http://schemas.microsoft.com/office/drawing/2014/main" xmlns="" val="2424674796"/>
                   </a:ext>
                 </a:extLst>
               </a:tr>
@@ -11537,9 +11846,167 @@
                     <a:bodyPr/>
                     <a:lstStyle/>
                     <a:p>
+                      <a:r>
+                        <a:rPr lang="en-US" sz="3200" dirty="0"/>
+                        <a:t>Iteration 4</a:t>
+                      </a:r>
+                    </a:p>
+                  </a:txBody>
+                  <a:tcPr>
+                    <a:lnL w="12700" cap="flat" cmpd="sng" algn="ctr">
+                      <a:solidFill>
+                        <a:schemeClr val="tx1"/>
+                      </a:solidFill>
+                      <a:prstDash val="solid"/>
+                      <a:round/>
+                      <a:headEnd type="none" w="med" len="med"/>
+                      <a:tailEnd type="none" w="med" len="med"/>
+                    </a:lnL>
+                    <a:lnR w="12700" cap="flat" cmpd="sng" algn="ctr">
+                      <a:solidFill>
+                        <a:schemeClr val="tx1"/>
+                      </a:solidFill>
+                      <a:prstDash val="solid"/>
+                      <a:round/>
+                      <a:headEnd type="none" w="med" len="med"/>
+                      <a:tailEnd type="none" w="med" len="med"/>
+                    </a:lnR>
+                    <a:lnT w="12700" cap="flat" cmpd="sng" algn="ctr">
+                      <a:solidFill>
+                        <a:schemeClr val="tx1"/>
+                      </a:solidFill>
+                      <a:prstDash val="solid"/>
+                      <a:round/>
+                      <a:headEnd type="none" w="med" len="med"/>
+                      <a:tailEnd type="none" w="med" len="med"/>
+                    </a:lnT>
+                    <a:lnB w="12700" cap="flat" cmpd="sng" algn="ctr">
+                      <a:solidFill>
+                        <a:schemeClr val="tx1"/>
+                      </a:solidFill>
+                      <a:prstDash val="solid"/>
+                      <a:round/>
+                      <a:headEnd type="none" w="med" len="med"/>
+                      <a:tailEnd type="none" w="med" len="med"/>
+                    </a:lnB>
+                  </a:tcPr>
+                </a:tc>
+                <a:tc>
+                  <a:txBody>
+                    <a:bodyPr/>
+                    <a:lstStyle/>
+                    <a:p>
                       <a:pPr algn="ctr"/>
                       <a:r>
-                        <a:rPr lang="en-US" sz="3200" b="1" dirty="0"/>
+                        <a:rPr lang="en-US" sz="3200" dirty="0"/>
+                        <a:t>37</a:t>
+                      </a:r>
+                    </a:p>
+                  </a:txBody>
+                  <a:tcPr>
+                    <a:lnL w="12700" cap="flat" cmpd="sng" algn="ctr">
+                      <a:solidFill>
+                        <a:schemeClr val="tx1"/>
+                      </a:solidFill>
+                      <a:prstDash val="solid"/>
+                      <a:round/>
+                      <a:headEnd type="none" w="med" len="med"/>
+                      <a:tailEnd type="none" w="med" len="med"/>
+                    </a:lnL>
+                    <a:lnR w="12700" cap="flat" cmpd="sng" algn="ctr">
+                      <a:solidFill>
+                        <a:schemeClr val="tx1"/>
+                      </a:solidFill>
+                      <a:prstDash val="solid"/>
+                      <a:round/>
+                      <a:headEnd type="none" w="med" len="med"/>
+                      <a:tailEnd type="none" w="med" len="med"/>
+                    </a:lnR>
+                    <a:lnT w="12700" cap="flat" cmpd="sng" algn="ctr">
+                      <a:solidFill>
+                        <a:schemeClr val="tx1"/>
+                      </a:solidFill>
+                      <a:prstDash val="solid"/>
+                      <a:round/>
+                      <a:headEnd type="none" w="med" len="med"/>
+                      <a:tailEnd type="none" w="med" len="med"/>
+                    </a:lnT>
+                    <a:lnB w="12700" cap="flat" cmpd="sng" algn="ctr">
+                      <a:solidFill>
+                        <a:schemeClr val="tx1"/>
+                      </a:solidFill>
+                      <a:prstDash val="solid"/>
+                      <a:round/>
+                      <a:headEnd type="none" w="med" len="med"/>
+                      <a:tailEnd type="none" w="med" len="med"/>
+                    </a:lnB>
+                  </a:tcPr>
+                </a:tc>
+                <a:tc>
+                  <a:txBody>
+                    <a:bodyPr/>
+                    <a:lstStyle/>
+                    <a:p>
+                      <a:pPr algn="ctr"/>
+                      <a:r>
+                        <a:rPr lang="en-US" sz="3200" dirty="0"/>
+                        <a:t>0</a:t>
+                      </a:r>
+                    </a:p>
+                  </a:txBody>
+                  <a:tcPr>
+                    <a:lnL w="12700" cap="flat" cmpd="sng" algn="ctr">
+                      <a:solidFill>
+                        <a:schemeClr val="tx1"/>
+                      </a:solidFill>
+                      <a:prstDash val="solid"/>
+                      <a:round/>
+                      <a:headEnd type="none" w="med" len="med"/>
+                      <a:tailEnd type="none" w="med" len="med"/>
+                    </a:lnL>
+                    <a:lnR w="12700" cap="flat" cmpd="sng" algn="ctr">
+                      <a:solidFill>
+                        <a:schemeClr val="tx1"/>
+                      </a:solidFill>
+                      <a:prstDash val="solid"/>
+                      <a:round/>
+                      <a:headEnd type="none" w="med" len="med"/>
+                      <a:tailEnd type="none" w="med" len="med"/>
+                    </a:lnR>
+                    <a:lnT w="12700" cap="flat" cmpd="sng" algn="ctr">
+                      <a:solidFill>
+                        <a:schemeClr val="tx1"/>
+                      </a:solidFill>
+                      <a:prstDash val="solid"/>
+                      <a:round/>
+                      <a:headEnd type="none" w="med" len="med"/>
+                      <a:tailEnd type="none" w="med" len="med"/>
+                    </a:lnT>
+                    <a:lnB w="12700" cap="flat" cmpd="sng" algn="ctr">
+                      <a:solidFill>
+                        <a:schemeClr val="tx1"/>
+                      </a:solidFill>
+                      <a:prstDash val="solid"/>
+                      <a:round/>
+                      <a:headEnd type="none" w="med" len="med"/>
+                      <a:tailEnd type="none" w="med" len="med"/>
+                    </a:lnB>
+                  </a:tcPr>
+                </a:tc>
+                <a:extLst>
+                  <a:ext uri="{0D108BD9-81ED-4DB2-BD59-A6C34878D82A}">
+                    <a16:rowId xmlns:a16="http://schemas.microsoft.com/office/drawing/2014/main" xmlns="" val="2341255875"/>
+                  </a:ext>
+                </a:extLst>
+              </a:tr>
+              <a:tr h="619864">
+                <a:tc>
+                  <a:txBody>
+                    <a:bodyPr/>
+                    <a:lstStyle/>
+                    <a:p>
+                      <a:r>
+                        <a:rPr lang="en-US" sz="3200" dirty="0"/>
                         <a:t>Total </a:t>
                       </a:r>
                     </a:p>
@@ -11687,7 +12154,7 @@
                 </a:tc>
                 <a:extLst>
                   <a:ext uri="{0D108BD9-81ED-4DB2-BD59-A6C34878D82A}">
-                    <a16:rowId xmlns:a16="http://schemas.microsoft.com/office/drawing/2014/main" val="1810382673"/>
+                    <a16:rowId xmlns:a16="http://schemas.microsoft.com/office/drawing/2014/main" xmlns="" val="1810382673"/>
                   </a:ext>
                 </a:extLst>
               </a:tr>
@@ -11697,7 +12164,6 @@
                     <a:bodyPr/>
                     <a:lstStyle/>
                     <a:p>
-                      <a:pPr algn="ctr"/>
                       <a:r>
                         <a:rPr lang="en-US" sz="3200" i="1" dirty="0"/>
                         <a:t>Actual Experiments</a:t>
@@ -11750,7 +12216,7 @@
                     <a:p>
                       <a:pPr algn="ctr"/>
                       <a:r>
-                        <a:rPr lang="en-US" sz="3200" i="1" dirty="0"/>
+                        <a:rPr lang="en-US" sz="3200" dirty="0"/>
                         <a:t>4556</a:t>
                       </a:r>
                     </a:p>
@@ -11801,7 +12267,7 @@
                     <a:p>
                       <a:pPr algn="ctr"/>
                       <a:r>
-                        <a:rPr lang="en-US" sz="3200" i="1" dirty="0"/>
+                        <a:rPr lang="en-US" sz="3200" dirty="0"/>
                         <a:t>1395</a:t>
                       </a:r>
                     </a:p>
@@ -11847,7 +12313,7 @@
                 </a:tc>
                 <a:extLst>
                   <a:ext uri="{0D108BD9-81ED-4DB2-BD59-A6C34878D82A}">
-                    <a16:rowId xmlns:a16="http://schemas.microsoft.com/office/drawing/2014/main" val="1117193689"/>
+                    <a16:rowId xmlns:a16="http://schemas.microsoft.com/office/drawing/2014/main" xmlns="" val="1117193689"/>
                   </a:ext>
                 </a:extLst>
               </a:tr>
@@ -11855,190 +12321,6 @@
           </a:graphicData>
         </a:graphic>
       </p:graphicFrame>
-      <p:sp>
-        <p:nvSpPr>
-          <p:cNvPr id="91" name="TextBox 90">
-            <a:extLst>
-              <a:ext uri="{FF2B5EF4-FFF2-40B4-BE49-F238E27FC236}">
-                <a16:creationId xmlns:a16="http://schemas.microsoft.com/office/drawing/2014/main" id="{BAD07FC7-3085-47F7-8A51-83E184F5226C}"/>
-              </a:ext>
-            </a:extLst>
-          </p:cNvPr>
-          <p:cNvSpPr txBox="1"/>
-          <p:nvPr/>
-        </p:nvSpPr>
-        <p:spPr>
-          <a:xfrm>
-            <a:off x="29900879" y="14254078"/>
-            <a:ext cx="12801600" cy="646331"/>
-          </a:xfrm>
-          <a:prstGeom prst="rect">
-            <a:avLst/>
-          </a:prstGeom>
-          <a:noFill/>
-        </p:spPr>
-        <p:txBody>
-          <a:bodyPr wrap="square" rtlCol="0">
-            <a:spAutoFit/>
-          </a:bodyPr>
-          <a:lstStyle/>
-          <a:p>
-            <a:pPr algn="ctr"/>
-            <a:r>
-              <a:rPr lang="en-US" sz="3600" u="sng" dirty="0"/>
-              <a:t>Model Aided Experimentation</a:t>
-            </a:r>
-          </a:p>
-        </p:txBody>
-      </p:sp>
-      <p:sp>
-        <p:nvSpPr>
-          <p:cNvPr id="132" name="TextBox 131">
-            <a:extLst>
-              <a:ext uri="{FF2B5EF4-FFF2-40B4-BE49-F238E27FC236}">
-                <a16:creationId xmlns:a16="http://schemas.microsoft.com/office/drawing/2014/main" id="{B4E1E494-D186-4BC9-AD23-C2514D064FC6}"/>
-              </a:ext>
-            </a:extLst>
-          </p:cNvPr>
-          <p:cNvSpPr txBox="1"/>
-          <p:nvPr/>
-        </p:nvSpPr>
-        <p:spPr>
-          <a:xfrm>
-            <a:off x="29900880" y="19422290"/>
-            <a:ext cx="12625349" cy="2062103"/>
-          </a:xfrm>
-          <a:prstGeom prst="rect">
-            <a:avLst/>
-          </a:prstGeom>
-          <a:noFill/>
-        </p:spPr>
-        <p:txBody>
-          <a:bodyPr wrap="square" rtlCol="0">
-            <a:spAutoFit/>
-          </a:bodyPr>
-          <a:lstStyle/>
-          <a:p>
-            <a:r>
-              <a:rPr lang="en-US" sz="3200" dirty="0"/>
-              <a:t>Following the same prediction pipeline used in Sastry et. al., our optimized network showed only 2780 experiments are necessary for high expression </a:t>
-            </a:r>
-            <a:r>
-              <a:rPr lang="en-US" sz="3200" dirty="0" err="1"/>
-              <a:t>PrESTs</a:t>
-            </a:r>
-            <a:r>
-              <a:rPr lang="en-US" sz="3200" dirty="0"/>
-              <a:t> (38.98% reduction), compared to 38.70% reduction for their best ensemble model.</a:t>
-            </a:r>
-          </a:p>
-        </p:txBody>
-      </p:sp>
-      <p:cxnSp>
-        <p:nvCxnSpPr>
-          <p:cNvPr id="134" name="Straight Arrow Connector 133">
-            <a:extLst>
-              <a:ext uri="{FF2B5EF4-FFF2-40B4-BE49-F238E27FC236}">
-                <a16:creationId xmlns:a16="http://schemas.microsoft.com/office/drawing/2014/main" id="{1CE39C02-EFA9-4EE7-A24F-1F306500A36A}"/>
-              </a:ext>
-            </a:extLst>
-          </p:cNvPr>
-          <p:cNvCxnSpPr>
-            <a:cxnSpLocks/>
-            <a:endCxn id="99" idx="0"/>
-          </p:cNvCxnSpPr>
-          <p:nvPr/>
-        </p:nvCxnSpPr>
-        <p:spPr>
-          <a:xfrm flipH="1">
-            <a:off x="3848972" y="25441606"/>
-            <a:ext cx="355584" cy="1379755"/>
-          </a:xfrm>
-          <a:prstGeom prst="straightConnector1">
-            <a:avLst/>
-          </a:prstGeom>
-          <a:noFill/>
-          <a:ln w="38100" cap="flat" cmpd="sng" algn="ctr">
-            <a:solidFill>
-              <a:sysClr val="windowText" lastClr="000000"/>
-            </a:solidFill>
-            <a:prstDash val="solid"/>
-            <a:miter lim="800000"/>
-            <a:tailEnd type="triangle"/>
-          </a:ln>
-          <a:effectLst/>
-        </p:spPr>
-      </p:cxnSp>
-      <p:cxnSp>
-        <p:nvCxnSpPr>
-          <p:cNvPr id="135" name="Straight Arrow Connector 134">
-            <a:extLst>
-              <a:ext uri="{FF2B5EF4-FFF2-40B4-BE49-F238E27FC236}">
-                <a16:creationId xmlns:a16="http://schemas.microsoft.com/office/drawing/2014/main" id="{F71D40E3-49A6-49DE-A2B3-2CB5CD810ABB}"/>
-              </a:ext>
-            </a:extLst>
-          </p:cNvPr>
-          <p:cNvCxnSpPr>
-            <a:cxnSpLocks/>
-            <a:endCxn id="101" idx="0"/>
-          </p:cNvCxnSpPr>
-          <p:nvPr/>
-        </p:nvCxnSpPr>
-        <p:spPr>
-          <a:xfrm>
-            <a:off x="5876416" y="25462334"/>
-            <a:ext cx="248402" cy="1359027"/>
-          </a:xfrm>
-          <a:prstGeom prst="straightConnector1">
-            <a:avLst/>
-          </a:prstGeom>
-          <a:noFill/>
-          <a:ln w="38100" cap="flat" cmpd="sng" algn="ctr">
-            <a:solidFill>
-              <a:sysClr val="windowText" lastClr="000000"/>
-            </a:solidFill>
-            <a:prstDash val="solid"/>
-            <a:miter lim="800000"/>
-            <a:tailEnd type="triangle"/>
-          </a:ln>
-          <a:effectLst/>
-        </p:spPr>
-      </p:cxnSp>
-      <p:cxnSp>
-        <p:nvCxnSpPr>
-          <p:cNvPr id="136" name="Straight Arrow Connector 135">
-            <a:extLst>
-              <a:ext uri="{FF2B5EF4-FFF2-40B4-BE49-F238E27FC236}">
-                <a16:creationId xmlns:a16="http://schemas.microsoft.com/office/drawing/2014/main" id="{3074D19F-FE32-4550-93A4-C8D59974D4B5}"/>
-              </a:ext>
-            </a:extLst>
-          </p:cNvPr>
-          <p:cNvCxnSpPr>
-            <a:cxnSpLocks/>
-            <a:endCxn id="102" idx="0"/>
-          </p:cNvCxnSpPr>
-          <p:nvPr/>
-        </p:nvCxnSpPr>
-        <p:spPr>
-          <a:xfrm>
-            <a:off x="6775687" y="25442267"/>
-            <a:ext cx="473720" cy="1379094"/>
-          </a:xfrm>
-          <a:prstGeom prst="straightConnector1">
-            <a:avLst/>
-          </a:prstGeom>
-          <a:noFill/>
-          <a:ln w="38100" cap="flat" cmpd="sng" algn="ctr">
-            <a:solidFill>
-              <a:sysClr val="windowText" lastClr="000000"/>
-            </a:solidFill>
-            <a:prstDash val="solid"/>
-            <a:miter lim="800000"/>
-            <a:tailEnd type="triangle"/>
-          </a:ln>
-          <a:effectLst/>
-        </p:spPr>
-      </p:cxnSp>
     </p:spTree>
     <p:extLst>
       <p:ext uri="{BB962C8B-B14F-4D97-AF65-F5344CB8AC3E}">

</xml_diff>